<commit_message>
Se agregaron ejemplos a la presentación
</commit_message>
<xml_diff>
--- a/documentos/Presentacion_ffmf.pptx
+++ b/documentos/Presentacion_ffmf.pptx
@@ -5,10 +5,10 @@
     <p:sldMasterId id="2147483768" r:id="rId4"/>
   </p:sldMasterIdLst>
   <p:notesMasterIdLst>
-    <p:notesMasterId r:id="rId22"/>
+    <p:notesMasterId r:id="rId28"/>
   </p:notesMasterIdLst>
   <p:handoutMasterIdLst>
-    <p:handoutMasterId r:id="rId23"/>
+    <p:handoutMasterId r:id="rId29"/>
   </p:handoutMasterIdLst>
   <p:sldIdLst>
     <p:sldId id="3825" r:id="rId5"/>
@@ -24,10 +24,16 @@
     <p:sldId id="3836" r:id="rId15"/>
     <p:sldId id="3837" r:id="rId16"/>
     <p:sldId id="3838" r:id="rId17"/>
-    <p:sldId id="3840" r:id="rId18"/>
-    <p:sldId id="3841" r:id="rId19"/>
-    <p:sldId id="3851" r:id="rId20"/>
-    <p:sldId id="3834" r:id="rId21"/>
+    <p:sldId id="3855" r:id="rId18"/>
+    <p:sldId id="3856" r:id="rId19"/>
+    <p:sldId id="3857" r:id="rId20"/>
+    <p:sldId id="3840" r:id="rId21"/>
+    <p:sldId id="3852" r:id="rId22"/>
+    <p:sldId id="3853" r:id="rId23"/>
+    <p:sldId id="3841" r:id="rId24"/>
+    <p:sldId id="3854" r:id="rId25"/>
+    <p:sldId id="3851" r:id="rId26"/>
+    <p:sldId id="3834" r:id="rId27"/>
   </p:sldIdLst>
   <p:sldSz cx="12192000" cy="6858000"/>
   <p:notesSz cx="6858000" cy="9144000"/>
@@ -861,7 +867,7 @@
             <a:pPr rtl="0"/>
             <a:fld id="{D40C6A29-4676-420C-BBE3-ACC2B80F64D4}" type="slidenum">
               <a:rPr lang="es-ES" smtClean="0"/>
-              <a:t>17</a:t>
+              <a:t>23</a:t>
             </a:fld>
             <a:endParaRPr lang="es-ES"/>
           </a:p>
@@ -1541,7 +1547,7 @@
             <a:pPr rtl="0"/>
             <a:fld id="{D40C6A29-4676-420C-BBE3-ACC2B80F64D4}" type="slidenum">
               <a:rPr lang="es-ES" smtClean="0"/>
-              <a:t>14</a:t>
+              <a:t>17</a:t>
             </a:fld>
             <a:endParaRPr lang="es-ES"/>
           </a:p>
@@ -13515,15 +13521,6 @@
           <a:solidFill>
             <a:srgbClr val="FFFFFF"/>
           </a:solidFill>
-          <a:extLst>
-            <a:ext uri="{909E8E84-426E-40DD-AFC4-6F175D3DCCD1}">
-              <a14:hiddenFill xmlns:a14="http://schemas.microsoft.com/office/drawing/2010/main">
-                <a:solidFill>
-                  <a:srgbClr val="FFFFFF"/>
-                </a:solidFill>
-              </a14:hiddenFill>
-            </a:ext>
-          </a:extLst>
         </p:spPr>
       </p:pic>
       <p:sp>
@@ -14109,341 +14106,65 @@
           </a:p>
         </p:txBody>
       </p:sp>
-      <mc:AlternateContent xmlns:mc="http://schemas.openxmlformats.org/markup-compatibility/2006">
-        <mc:Choice xmlns:a14="http://schemas.microsoft.com/office/drawing/2010/main" Requires="a14">
-          <p:sp>
-            <p:nvSpPr>
-              <p:cNvPr id="5" name="Marcador de contenido 4">
-                <a:extLst>
-                  <a:ext uri="{FF2B5EF4-FFF2-40B4-BE49-F238E27FC236}">
-                    <a16:creationId xmlns:a16="http://schemas.microsoft.com/office/drawing/2014/main" id="{B67B1E24-2840-4BB0-AE5A-2320A01CB80F}"/>
-                  </a:ext>
-                </a:extLst>
-              </p:cNvPr>
-              <p:cNvSpPr>
-                <a:spLocks noGrp="1"/>
-              </p:cNvSpPr>
-              <p:nvPr>
-                <p:ph sz="half" idx="1"/>
-              </p:nvPr>
-            </p:nvSpPr>
-            <p:spPr>
-              <a:xfrm>
-                <a:off x="838199" y="1825625"/>
-                <a:ext cx="10515599" cy="4351338"/>
-              </a:xfrm>
-            </p:spPr>
-            <p:txBody>
-              <a:bodyPr rtlCol="0">
-                <a:normAutofit/>
-              </a:bodyPr>
-              <a:lstStyle/>
-              <a:p>
-                <a:r>
-                  <a:rPr lang="es-MX" sz="2000" b="0" i="0" dirty="0">
-                    <a:solidFill>
-                      <a:srgbClr val="000000"/>
-                    </a:solidFill>
-                    <a:effectLst/>
-                    <a:latin typeface="Helvetica Neue"/>
-                  </a:rPr>
-                  <a:t>En el problema de la eliminación del béisbol, hay </a:t>
-                </a:r>
-                <a14:m>
-                  <m:oMath xmlns:m="http://schemas.openxmlformats.org/officeDocument/2006/math">
-                    <m:r>
-                      <a:rPr lang="es-MX" sz="2000" b="0" i="1" smtClean="0">
-                        <a:solidFill>
-                          <a:srgbClr val="000000"/>
-                        </a:solidFill>
-                        <a:effectLst/>
-                        <a:latin typeface="Cambria Math" panose="02040503050406030204" pitchFamily="18" charset="0"/>
-                      </a:rPr>
-                      <m:t>𝑛</m:t>
-                    </m:r>
-                  </m:oMath>
-                </a14:m>
-                <a:r>
-                  <a:rPr lang="es-MX" sz="2000" b="0" i="0" dirty="0">
-                    <a:solidFill>
-                      <a:srgbClr val="000000"/>
-                    </a:solidFill>
-                    <a:effectLst/>
-                    <a:latin typeface="Helvetica Neue"/>
-                  </a:rPr>
-                  <a:t> equipos compitiendo en una liga. En una etapa específica de la temporada de la liga, </a:t>
-                </a:r>
-                <a14:m>
-                  <m:oMath xmlns:m="http://schemas.openxmlformats.org/officeDocument/2006/math">
-                    <m:sSub>
-                      <m:sSubPr>
-                        <m:ctrlPr>
-                          <a:rPr lang="es-MX" sz="2000" b="0" i="1" smtClean="0">
-                            <a:solidFill>
-                              <a:srgbClr val="000000"/>
-                            </a:solidFill>
-                            <a:effectLst/>
-                            <a:latin typeface="Cambria Math" panose="02040503050406030204" pitchFamily="18" charset="0"/>
-                          </a:rPr>
-                        </m:ctrlPr>
-                      </m:sSubPr>
-                      <m:e>
-                        <m:r>
-                          <a:rPr lang="es-MX" sz="2000" b="0" i="1" smtClean="0">
-                            <a:solidFill>
-                              <a:srgbClr val="000000"/>
-                            </a:solidFill>
-                            <a:effectLst/>
-                            <a:latin typeface="Cambria Math" panose="02040503050406030204" pitchFamily="18" charset="0"/>
-                          </a:rPr>
-                          <m:t>𝑤</m:t>
-                        </m:r>
-                      </m:e>
-                      <m:sub>
-                        <m:r>
-                          <a:rPr lang="es-MX" sz="2000" b="0" i="1" smtClean="0">
-                            <a:solidFill>
-                              <a:srgbClr val="000000"/>
-                            </a:solidFill>
-                            <a:effectLst/>
-                            <a:latin typeface="Cambria Math" panose="02040503050406030204" pitchFamily="18" charset="0"/>
-                          </a:rPr>
-                          <m:t>𝑖</m:t>
-                        </m:r>
-                      </m:sub>
-                    </m:sSub>
-                  </m:oMath>
-                </a14:m>
-                <a:r>
-                  <a:rPr lang="es-MX" sz="2000" dirty="0">
-                    <a:solidFill>
-                      <a:srgbClr val="000000"/>
-                    </a:solidFill>
-                    <a:latin typeface="Helvetica Neue"/>
-                  </a:rPr>
-                  <a:t> es el número de victorias y </a:t>
-                </a:r>
-                <a14:m>
-                  <m:oMath xmlns:m="http://schemas.openxmlformats.org/officeDocument/2006/math">
-                    <m:sSub>
-                      <m:sSubPr>
-                        <m:ctrlPr>
-                          <a:rPr lang="es-MX" sz="2000" i="1">
-                            <a:solidFill>
-                              <a:srgbClr val="000000"/>
-                            </a:solidFill>
-                            <a:latin typeface="Cambria Math" panose="02040503050406030204" pitchFamily="18" charset="0"/>
-                          </a:rPr>
-                        </m:ctrlPr>
-                      </m:sSubPr>
-                      <m:e>
-                        <m:r>
-                          <a:rPr lang="es-MX" sz="2000" b="0" i="1" smtClean="0">
-                            <a:solidFill>
-                              <a:srgbClr val="000000"/>
-                            </a:solidFill>
-                            <a:latin typeface="Cambria Math" panose="02040503050406030204" pitchFamily="18" charset="0"/>
-                          </a:rPr>
-                          <m:t>𝑟</m:t>
-                        </m:r>
-                      </m:e>
-                      <m:sub>
-                        <m:r>
-                          <a:rPr lang="es-MX" sz="2000" b="0" i="1" smtClean="0">
-                            <a:solidFill>
-                              <a:srgbClr val="000000"/>
-                            </a:solidFill>
-                            <a:latin typeface="Cambria Math" panose="02040503050406030204" pitchFamily="18" charset="0"/>
-                          </a:rPr>
-                          <m:t>𝑖</m:t>
-                        </m:r>
-                      </m:sub>
-                    </m:sSub>
-                  </m:oMath>
-                </a14:m>
-                <a:r>
-                  <a:rPr lang="es-MX" sz="2000" dirty="0">
-                    <a:solidFill>
-                      <a:srgbClr val="000000"/>
-                    </a:solidFill>
-                    <a:latin typeface="Helvetica Neue"/>
-                  </a:rPr>
-                  <a:t> es el número de juegos que quedan por jugar para el equipo  </a:t>
-                </a:r>
-                <a14:m>
-                  <m:oMath xmlns:m="http://schemas.openxmlformats.org/officeDocument/2006/math">
-                    <m:r>
-                      <a:rPr lang="es-MX" sz="2000" b="0" i="1" smtClean="0">
-                        <a:solidFill>
-                          <a:srgbClr val="000000"/>
-                        </a:solidFill>
-                        <a:latin typeface="Cambria Math" panose="02040503050406030204" pitchFamily="18" charset="0"/>
-                      </a:rPr>
-                      <m:t>𝑖</m:t>
-                    </m:r>
-                  </m:oMath>
-                </a14:m>
-                <a:r>
-                  <a:rPr lang="es-MX" sz="2000" dirty="0">
-                    <a:solidFill>
-                      <a:srgbClr val="000000"/>
-                    </a:solidFill>
-                    <a:latin typeface="Helvetica Neue"/>
-                  </a:rPr>
-                  <a:t> </a:t>
-                </a:r>
-                <a:r>
-                  <a:rPr lang="es-MX" sz="2000" b="0" i="0" dirty="0">
-                    <a:solidFill>
-                      <a:srgbClr val="000000"/>
-                    </a:solidFill>
-                    <a:effectLst/>
-                    <a:latin typeface="Helvetica Neue"/>
-                  </a:rPr>
-                  <a:t>y </a:t>
-                </a:r>
-                <a14:m>
-                  <m:oMath xmlns:m="http://schemas.openxmlformats.org/officeDocument/2006/math">
-                    <m:sSub>
-                      <m:sSubPr>
-                        <m:ctrlPr>
-                          <a:rPr lang="es-MX" sz="2000" i="1">
-                            <a:solidFill>
-                              <a:srgbClr val="000000"/>
-                            </a:solidFill>
-                            <a:latin typeface="Cambria Math" panose="02040503050406030204" pitchFamily="18" charset="0"/>
-                          </a:rPr>
-                        </m:ctrlPr>
-                      </m:sSubPr>
-                      <m:e>
-                        <m:r>
-                          <a:rPr lang="es-MX" sz="2000" i="1">
-                            <a:solidFill>
-                              <a:srgbClr val="000000"/>
-                            </a:solidFill>
-                            <a:latin typeface="Cambria Math" panose="02040503050406030204" pitchFamily="18" charset="0"/>
-                          </a:rPr>
-                          <m:t>𝑟</m:t>
-                        </m:r>
-                      </m:e>
-                      <m:sub>
-                        <m:r>
-                          <a:rPr lang="es-MX" sz="2000" b="0" i="1" smtClean="0">
-                            <a:solidFill>
-                              <a:srgbClr val="000000"/>
-                            </a:solidFill>
-                            <a:latin typeface="Cambria Math" panose="02040503050406030204" pitchFamily="18" charset="0"/>
-                          </a:rPr>
-                          <m:t>𝑗</m:t>
-                        </m:r>
-                      </m:sub>
-                    </m:sSub>
-                  </m:oMath>
-                </a14:m>
-                <a:r>
-                  <a:rPr lang="es-MX" sz="2000" b="0" i="0" dirty="0">
-                    <a:solidFill>
-                      <a:srgbClr val="000000"/>
-                    </a:solidFill>
-                    <a:effectLst/>
-                    <a:latin typeface="Helvetica Neue"/>
-                  </a:rPr>
-                  <a:t> es el número de juegos que quedan contra el equipo </a:t>
-                </a:r>
-                <a14:m>
-                  <m:oMath xmlns:m="http://schemas.openxmlformats.org/officeDocument/2006/math">
-                    <m:r>
-                      <a:rPr lang="es-MX" sz="2000" b="0" i="1" smtClean="0">
-                        <a:solidFill>
-                          <a:srgbClr val="000000"/>
-                        </a:solidFill>
-                        <a:effectLst/>
-                        <a:latin typeface="Cambria Math" panose="02040503050406030204" pitchFamily="18" charset="0"/>
-                      </a:rPr>
-                      <m:t>𝑗</m:t>
-                    </m:r>
-                  </m:oMath>
-                </a14:m>
-                <a:r>
-                  <a:rPr lang="es-MX" sz="2000" b="0" i="0" dirty="0">
-                    <a:solidFill>
-                      <a:srgbClr val="000000"/>
-                    </a:solidFill>
-                    <a:effectLst/>
-                    <a:latin typeface="Helvetica Neue"/>
-                  </a:rPr>
-                  <a:t>. </a:t>
-                </a:r>
-              </a:p>
-              <a:p>
-                <a:pPr marL="0" indent="0">
-                  <a:buNone/>
-                </a:pPr>
-                <a:endParaRPr lang="es-MX" sz="2000" dirty="0">
-                  <a:solidFill>
-                    <a:srgbClr val="000000"/>
-                  </a:solidFill>
-                  <a:latin typeface="Helvetica Neue"/>
-                </a:endParaRPr>
-              </a:p>
-              <a:p>
-                <a:r>
-                  <a:rPr lang="es-MX" sz="2000" dirty="0">
-                    <a:solidFill>
-                      <a:srgbClr val="000000"/>
-                    </a:solidFill>
-                    <a:latin typeface="Helvetica Neue"/>
-                  </a:rPr>
-                  <a:t>Un equipo es eliminado si no tiene la oportunidad de terminar la temporada en primer lugar. La tarea del problema de eliminación del béisbol es determinar qué equipos son eliminados en cada momento de la temporada, por ejemplo, cuartos de final, octavos de final, final, etc.</a:t>
-                </a:r>
-              </a:p>
-            </p:txBody>
-          </p:sp>
-        </mc:Choice>
-        <mc:Fallback>
-          <p:sp>
-            <p:nvSpPr>
-              <p:cNvPr id="5" name="Marcador de contenido 4">
-                <a:extLst>
-                  <a:ext uri="{FF2B5EF4-FFF2-40B4-BE49-F238E27FC236}">
-                    <a16:creationId xmlns:a16="http://schemas.microsoft.com/office/drawing/2014/main" id="{B67B1E24-2840-4BB0-AE5A-2320A01CB80F}"/>
-                  </a:ext>
-                </a:extLst>
-              </p:cNvPr>
-              <p:cNvSpPr>
-                <a:spLocks noGrp="1" noRot="1" noChangeAspect="1" noMove="1" noResize="1" noEditPoints="1" noAdjustHandles="1" noChangeArrowheads="1" noChangeShapeType="1" noTextEdit="1"/>
-              </p:cNvSpPr>
-              <p:nvPr>
-                <p:ph sz="half" idx="1"/>
-              </p:nvPr>
-            </p:nvSpPr>
-            <p:spPr>
-              <a:xfrm>
-                <a:off x="838199" y="1825625"/>
-                <a:ext cx="10515599" cy="4351338"/>
-              </a:xfrm>
-              <a:blipFill>
-                <a:blip r:embed="rId3"/>
-                <a:stretch>
-                  <a:fillRect l="-464" t="-1261" r="-1043"/>
-                </a:stretch>
-              </a:blipFill>
-            </p:spPr>
-            <p:txBody>
-              <a:bodyPr/>
-              <a:lstStyle/>
-              <a:p>
-                <a:r>
-                  <a:rPr lang="en-US">
-                    <a:noFill/>
-                  </a:rPr>
-                  <a:t> </a:t>
-                </a:r>
-              </a:p>
-            </p:txBody>
-          </p:sp>
-        </mc:Fallback>
-      </mc:AlternateContent>
+      <p:sp>
+        <p:nvSpPr>
+          <p:cNvPr id="5" name="Marcador de contenido 4">
+            <a:extLst>
+              <a:ext uri="{FF2B5EF4-FFF2-40B4-BE49-F238E27FC236}">
+                <a16:creationId xmlns:a16="http://schemas.microsoft.com/office/drawing/2014/main" id="{B67B1E24-2840-4BB0-AE5A-2320A01CB80F}"/>
+              </a:ext>
+            </a:extLst>
+          </p:cNvPr>
+          <p:cNvSpPr>
+            <a:spLocks noGrp="1"/>
+          </p:cNvSpPr>
+          <p:nvPr>
+            <p:ph sz="half" idx="1"/>
+          </p:nvPr>
+        </p:nvSpPr>
+        <p:spPr>
+          <a:xfrm>
+            <a:off x="838199" y="1825625"/>
+            <a:ext cx="10515599" cy="4351338"/>
+          </a:xfrm>
+        </p:spPr>
+        <p:txBody>
+          <a:bodyPr rtlCol="0">
+            <a:normAutofit/>
+          </a:bodyPr>
+          <a:lstStyle/>
+          <a:p>
+            <a:r>
+              <a:rPr lang="es-MX" sz="2000" dirty="0">
+                <a:solidFill>
+                  <a:srgbClr val="000000"/>
+                </a:solidFill>
+                <a:latin typeface="Helvetica Neue"/>
+              </a:rPr>
+              <a:t>El béisbol en los EE.UU. Consta de dos ligas diferentes, cada una de las cuales se divide en tres divisiones de aproximadamente 5 equipos. Durante la temporada regular, cada equipo juega 162 partidos en total, la mayoría de los cuales son contra equipos de su división (76 contra la misma división, 66 contra la misma liga, 20 contra una liga diferente). El objetivo de esto es intentar clasificarse para los playoffs, lo que se puede hacer terminando primero en la división.</a:t>
+            </a:r>
+          </a:p>
+          <a:p>
+            <a:endParaRPr lang="es-MX" sz="2000" dirty="0">
+              <a:solidFill>
+                <a:srgbClr val="000000"/>
+              </a:solidFill>
+              <a:latin typeface="Helvetica Neue"/>
+            </a:endParaRPr>
+          </a:p>
+          <a:p>
+            <a:r>
+              <a:rPr lang="es-MX" sz="2000" dirty="0">
+                <a:solidFill>
+                  <a:srgbClr val="000000"/>
+                </a:solidFill>
+                <a:latin typeface="Helvetica Neue"/>
+              </a:rPr>
+              <a:t>Todo esto se suma al deseo de poder determinar si es posible ver si un equipo en particular aún puede potencialmente ganar la división y llegar a los playoffs dada la clasificación actual de la liga. Resolver este problema significa que tenemos que mirar tablas que podrían parecerse a la siguiente:</a:t>
+            </a:r>
+          </a:p>
+        </p:txBody>
+      </p:sp>
       <p:sp>
         <p:nvSpPr>
           <p:cNvPr id="16" name="Marcador de número de diapositiva 15">
@@ -14562,8 +14283,8 @@
           <a:chExt cx="0" cy="0"/>
         </a:xfrm>
       </p:grpSpPr>
-      <mc:AlternateContent xmlns:mc="http://schemas.openxmlformats.org/markup-compatibility/2006">
-        <mc:Choice xmlns:a14="http://schemas.microsoft.com/office/drawing/2010/main" Requires="a14">
+      <mc:AlternateContent xmlns:mc="http://schemas.openxmlformats.org/markup-compatibility/2006" xmlns:a14="http://schemas.microsoft.com/office/drawing/2010/main">
+        <mc:Choice Requires="a14">
           <p:sp>
             <p:nvSpPr>
               <p:cNvPr id="3" name="Marcador de contenido 2">
@@ -14623,7 +14344,7 @@
             </p:txBody>
           </p:sp>
         </mc:Choice>
-        <mc:Fallback>
+        <mc:Fallback xmlns="">
           <p:sp>
             <p:nvSpPr>
               <p:cNvPr id="3" name="Marcador de contenido 2">
@@ -14706,15 +14427,6 @@
           <a:solidFill>
             <a:srgbClr val="FFFFFF"/>
           </a:solidFill>
-          <a:extLst>
-            <a:ext uri="{909E8E84-426E-40DD-AFC4-6F175D3DCCD1}">
-              <a14:hiddenFill xmlns:a14="http://schemas.microsoft.com/office/drawing/2010/main">
-                <a:solidFill>
-                  <a:srgbClr val="FFFFFF"/>
-                </a:solidFill>
-              </a14:hiddenFill>
-            </a:ext>
-          </a:extLst>
         </p:spPr>
       </p:pic>
       <p:sp>
@@ -14809,10 +14521,10 @@
       </p:grpSpPr>
       <p:sp>
         <p:nvSpPr>
-          <p:cNvPr id="4" name="Título 3">
+          <p:cNvPr id="2" name="Título 1">
             <a:extLst>
               <a:ext uri="{FF2B5EF4-FFF2-40B4-BE49-F238E27FC236}">
-                <a16:creationId xmlns:a16="http://schemas.microsoft.com/office/drawing/2014/main" id="{7B290457-2071-4F7C-9327-CE85A282B4D5}"/>
+                <a16:creationId xmlns:a16="http://schemas.microsoft.com/office/drawing/2014/main" id="{40EB430E-F69D-41A9-A50E-2656CB55B392}"/>
               </a:ext>
             </a:extLst>
           </p:cNvPr>
@@ -14823,6 +14535,627 @@
             <p:ph type="title"/>
           </p:nvPr>
         </p:nvSpPr>
+        <p:spPr/>
+        <p:txBody>
+          <a:bodyPr/>
+          <a:lstStyle/>
+          <a:p>
+            <a:r>
+              <a:rPr lang="en-US" dirty="0" err="1"/>
+              <a:t>Descripción</a:t>
+            </a:r>
+            <a:r>
+              <a:rPr lang="en-US" dirty="0"/>
+              <a:t> del dataset</a:t>
+            </a:r>
+          </a:p>
+        </p:txBody>
+      </p:sp>
+      <mc:AlternateContent xmlns:mc="http://schemas.openxmlformats.org/markup-compatibility/2006">
+        <mc:Choice xmlns:a14="http://schemas.microsoft.com/office/drawing/2010/main" Requires="a14">
+          <p:sp>
+            <p:nvSpPr>
+              <p:cNvPr id="3" name="Marcador de contenido 2">
+                <a:extLst>
+                  <a:ext uri="{FF2B5EF4-FFF2-40B4-BE49-F238E27FC236}">
+                    <a16:creationId xmlns:a16="http://schemas.microsoft.com/office/drawing/2014/main" id="{66F34B46-F768-4F16-8147-A29B79597829}"/>
+                  </a:ext>
+                </a:extLst>
+              </p:cNvPr>
+              <p:cNvSpPr>
+                <a:spLocks noGrp="1"/>
+              </p:cNvSpPr>
+              <p:nvPr>
+                <p:ph sz="half" idx="1"/>
+              </p:nvPr>
+            </p:nvSpPr>
+            <p:spPr/>
+            <p:txBody>
+              <a:bodyPr>
+                <a:normAutofit fontScale="85000" lnSpcReduction="20000"/>
+              </a:bodyPr>
+              <a:lstStyle/>
+              <a:p>
+                <a:r>
+                  <a:rPr lang="es-MX" sz="1800" dirty="0"/>
+                  <a:t>En este ejemplo se ve claramente que Houston ya está eliminado, la cantidad máxima de victorias que pueden obtener es </a:t>
+                </a:r>
+                <a14:m>
+                  <m:oMath xmlns:m="http://schemas.openxmlformats.org/officeDocument/2006/math">
+                    <m:r>
+                      <a:rPr lang="es-MX" sz="1800" b="0" i="1" smtClean="0">
+                        <a:latin typeface="Cambria Math" panose="02040503050406030204" pitchFamily="18" charset="0"/>
+                      </a:rPr>
+                      <m:t>77+4=82</m:t>
+                    </m:r>
+                  </m:oMath>
+                </a14:m>
+                <a:r>
+                  <a:rPr lang="es-MX" sz="1800" dirty="0"/>
+                  <a:t> que es menos de las </a:t>
+                </a:r>
+                <a14:m>
+                  <m:oMath xmlns:m="http://schemas.openxmlformats.org/officeDocument/2006/math">
+                    <m:r>
+                      <a:rPr lang="es-MX" sz="1800" i="1">
+                        <a:latin typeface="Cambria Math" panose="02040503050406030204" pitchFamily="18" charset="0"/>
+                      </a:rPr>
+                      <m:t>82</m:t>
+                    </m:r>
+                  </m:oMath>
+                </a14:m>
+                <a:r>
+                  <a:rPr lang="es-MX" sz="1800" dirty="0"/>
+                  <a:t> victorias que ya tiene LA. Sin embargo, los casos de los tres equipos restantes están todos entrelazados. Tomemos a Texas, por ejemplo, si ganan tres juegos pueden llegar a </a:t>
+                </a:r>
+                <a14:m>
+                  <m:oMath xmlns:m="http://schemas.openxmlformats.org/officeDocument/2006/math">
+                    <m:r>
+                      <a:rPr lang="es-MX" sz="1800" i="1">
+                        <a:latin typeface="Cambria Math" panose="02040503050406030204" pitchFamily="18" charset="0"/>
+                      </a:rPr>
+                      <m:t>8</m:t>
+                    </m:r>
+                    <m:r>
+                      <a:rPr lang="es-MX" sz="1800" b="0" i="1" smtClean="0">
+                        <a:latin typeface="Cambria Math" panose="02040503050406030204" pitchFamily="18" charset="0"/>
+                      </a:rPr>
+                      <m:t>3</m:t>
+                    </m:r>
+                  </m:oMath>
+                </a14:m>
+                <a:r>
+                  <a:rPr lang="es-MX" sz="1800" dirty="0"/>
+                  <a:t> victorias y superar a Los Ángeles. Sin embargo, para ganar que Texas gane la liga, Los Ángeles debería perder 8 de sus 9 juegos restantes. Entonces se tiene el siguiente escenario para LA:</a:t>
+                </a:r>
+              </a:p>
+              <a:p>
+                <a:endParaRPr lang="es-MX" sz="1800" dirty="0"/>
+              </a:p>
+              <a:p>
+                <a:r>
+                  <a:rPr lang="es-MX" sz="1800" dirty="0"/>
+                  <a:t>1 derrota contra Texas</a:t>
+                </a:r>
+              </a:p>
+              <a:p>
+                <a:r>
+                  <a:rPr lang="es-MX" sz="1800" dirty="0"/>
+                  <a:t>2 derrotas contra Houston</a:t>
+                </a:r>
+              </a:p>
+              <a:p>
+                <a:r>
+                  <a:rPr lang="es-MX" sz="1800" dirty="0"/>
+                  <a:t>Y todavía tendría 5 derrotas necesarias de 6 juegos contra Oakland.</a:t>
+                </a:r>
+              </a:p>
+              <a:p>
+                <a:r>
+                  <a:rPr lang="es-MX" sz="1800" dirty="0"/>
+                  <a:t>Sin embargo, si esto sucede, Oakland alcanzará 83 victorias y sería el equipo ganador. Claramente, no es suficiente mirar las victorias de un equipo y los juegos que quedan por jugar. Necesitamos considerar contra quién se juegan esos juegos.</a:t>
+                </a:r>
+                <a:endParaRPr lang="en-US" sz="1800" dirty="0"/>
+              </a:p>
+            </p:txBody>
+          </p:sp>
+        </mc:Choice>
+        <mc:Fallback>
+          <p:sp>
+            <p:nvSpPr>
+              <p:cNvPr id="3" name="Marcador de contenido 2">
+                <a:extLst>
+                  <a:ext uri="{FF2B5EF4-FFF2-40B4-BE49-F238E27FC236}">
+                    <a16:creationId xmlns:a16="http://schemas.microsoft.com/office/drawing/2014/main" id="{66F34B46-F768-4F16-8147-A29B79597829}"/>
+                  </a:ext>
+                </a:extLst>
+              </p:cNvPr>
+              <p:cNvSpPr>
+                <a:spLocks noGrp="1" noRot="1" noChangeAspect="1" noMove="1" noResize="1" noEditPoints="1" noAdjustHandles="1" noChangeArrowheads="1" noChangeShapeType="1" noTextEdit="1"/>
+              </p:cNvSpPr>
+              <p:nvPr>
+                <p:ph sz="half" idx="1"/>
+              </p:nvPr>
+            </p:nvSpPr>
+            <p:spPr>
+              <a:blipFill>
+                <a:blip r:embed="rId2"/>
+                <a:stretch>
+                  <a:fillRect l="-353" t="-1541" r="-588"/>
+                </a:stretch>
+              </a:blipFill>
+            </p:spPr>
+            <p:txBody>
+              <a:bodyPr/>
+              <a:lstStyle/>
+              <a:p>
+                <a:r>
+                  <a:rPr lang="en-US">
+                    <a:noFill/>
+                  </a:rPr>
+                  <a:t> </a:t>
+                </a:r>
+              </a:p>
+            </p:txBody>
+          </p:sp>
+        </mc:Fallback>
+      </mc:AlternateContent>
+      <p:sp>
+        <p:nvSpPr>
+          <p:cNvPr id="5" name="Marcador de fecha 4">
+            <a:extLst>
+              <a:ext uri="{FF2B5EF4-FFF2-40B4-BE49-F238E27FC236}">
+                <a16:creationId xmlns:a16="http://schemas.microsoft.com/office/drawing/2014/main" id="{318C4090-B6A2-41B6-9F24-39B6ECBF22D1}"/>
+              </a:ext>
+            </a:extLst>
+          </p:cNvPr>
+          <p:cNvSpPr>
+            <a:spLocks noGrp="1"/>
+          </p:cNvSpPr>
+          <p:nvPr>
+            <p:ph type="dt" sz="half" idx="10"/>
+          </p:nvPr>
+        </p:nvSpPr>
+        <p:spPr/>
+        <p:txBody>
+          <a:bodyPr/>
+          <a:lstStyle/>
+          <a:p>
+            <a:pPr rtl="0">
+              <a:defRPr/>
+            </a:pPr>
+            <a:r>
+              <a:rPr lang="es-ES" noProof="0">
+                <a:solidFill>
+                  <a:prstClr val="black">
+                    <a:tint val="75000"/>
+                  </a:prstClr>
+                </a:solidFill>
+              </a:rPr>
+              <a:t>3/9/20XX</a:t>
+            </a:r>
+          </a:p>
+        </p:txBody>
+      </p:sp>
+      <p:sp>
+        <p:nvSpPr>
+          <p:cNvPr id="6" name="Marcador de pie de página 5">
+            <a:extLst>
+              <a:ext uri="{FF2B5EF4-FFF2-40B4-BE49-F238E27FC236}">
+                <a16:creationId xmlns:a16="http://schemas.microsoft.com/office/drawing/2014/main" id="{24EB3927-1177-47DD-AFE2-B0E9730CF6DB}"/>
+              </a:ext>
+            </a:extLst>
+          </p:cNvPr>
+          <p:cNvSpPr>
+            <a:spLocks noGrp="1"/>
+          </p:cNvSpPr>
+          <p:nvPr>
+            <p:ph type="ftr" sz="quarter" idx="11"/>
+          </p:nvPr>
+        </p:nvSpPr>
+        <p:spPr/>
+        <p:txBody>
+          <a:bodyPr/>
+          <a:lstStyle/>
+          <a:p>
+            <a:pPr rtl="0">
+              <a:defRPr/>
+            </a:pPr>
+            <a:r>
+              <a:rPr lang="es-ES" noProof="0">
+                <a:solidFill>
+                  <a:prstClr val="black">
+                    <a:tint val="75000"/>
+                  </a:prstClr>
+                </a:solidFill>
+              </a:rPr>
+              <a:t>Título de la presentación</a:t>
+            </a:r>
+          </a:p>
+        </p:txBody>
+      </p:sp>
+      <p:sp>
+        <p:nvSpPr>
+          <p:cNvPr id="7" name="Marcador de número de diapositiva 6">
+            <a:extLst>
+              <a:ext uri="{FF2B5EF4-FFF2-40B4-BE49-F238E27FC236}">
+                <a16:creationId xmlns:a16="http://schemas.microsoft.com/office/drawing/2014/main" id="{D9F671EC-902F-4C7A-8068-F2801AD56BCC}"/>
+              </a:ext>
+            </a:extLst>
+          </p:cNvPr>
+          <p:cNvSpPr>
+            <a:spLocks noGrp="1"/>
+          </p:cNvSpPr>
+          <p:nvPr>
+            <p:ph type="sldNum" sz="quarter" idx="12"/>
+          </p:nvPr>
+        </p:nvSpPr>
+        <p:spPr/>
+        <p:txBody>
+          <a:bodyPr/>
+          <a:lstStyle/>
+          <a:p>
+            <a:pPr rtl="0">
+              <a:defRPr/>
+            </a:pPr>
+            <a:fld id="{D76B855D-E9CC-4FF8-AD85-6CDC7B89A0DE}" type="slidenum">
+              <a:rPr lang="es-ES" noProof="0" smtClean="0">
+                <a:solidFill>
+                  <a:prstClr val="black">
+                    <a:tint val="75000"/>
+                  </a:prstClr>
+                </a:solidFill>
+              </a:rPr>
+              <a:pPr rtl="0">
+                <a:defRPr/>
+              </a:pPr>
+              <a:t>14</a:t>
+            </a:fld>
+            <a:endParaRPr lang="es-ES" noProof="0">
+              <a:solidFill>
+                <a:prstClr val="black">
+                  <a:tint val="75000"/>
+                </a:prstClr>
+              </a:solidFill>
+            </a:endParaRPr>
+          </a:p>
+        </p:txBody>
+      </p:sp>
+      <p:pic>
+        <p:nvPicPr>
+          <p:cNvPr id="8" name="Imagen 7">
+            <a:extLst>
+              <a:ext uri="{FF2B5EF4-FFF2-40B4-BE49-F238E27FC236}">
+                <a16:creationId xmlns:a16="http://schemas.microsoft.com/office/drawing/2014/main" id="{11A814C3-D56A-4E5B-950F-5CC88C1822F9}"/>
+              </a:ext>
+            </a:extLst>
+          </p:cNvPr>
+          <p:cNvPicPr>
+            <a:picLocks noChangeAspect="1"/>
+          </p:cNvPicPr>
+          <p:nvPr/>
+        </p:nvPicPr>
+        <p:blipFill>
+          <a:blip r:embed="rId3"/>
+          <a:stretch>
+            <a:fillRect/>
+          </a:stretch>
+        </p:blipFill>
+        <p:spPr>
+          <a:xfrm>
+            <a:off x="6470374" y="1938975"/>
+            <a:ext cx="4582164" cy="1743318"/>
+          </a:xfrm>
+          <a:prstGeom prst="rect">
+            <a:avLst/>
+          </a:prstGeom>
+        </p:spPr>
+      </p:pic>
+    </p:spTree>
+    <p:extLst>
+      <p:ext uri="{BB962C8B-B14F-4D97-AF65-F5344CB8AC3E}">
+        <p14:creationId xmlns:p14="http://schemas.microsoft.com/office/powerpoint/2010/main" val="874043100"/>
+      </p:ext>
+    </p:extLst>
+  </p:cSld>
+  <p:clrMapOvr>
+    <a:masterClrMapping/>
+  </p:clrMapOvr>
+</p:sld>
+</file>
+
+<file path=ppt/slides/slide15.xml><?xml version="1.0" encoding="utf-8"?>
+<p:sld xmlns:a="http://schemas.openxmlformats.org/drawingml/2006/main" xmlns:r="http://schemas.openxmlformats.org/officeDocument/2006/relationships" xmlns:p="http://schemas.openxmlformats.org/presentationml/2006/main">
+  <p:cSld>
+    <p:spTree>
+      <p:nvGrpSpPr>
+        <p:cNvPr id="1" name=""/>
+        <p:cNvGrpSpPr/>
+        <p:nvPr/>
+      </p:nvGrpSpPr>
+      <p:grpSpPr>
+        <a:xfrm>
+          <a:off x="0" y="0"/>
+          <a:ext cx="0" cy="0"/>
+          <a:chOff x="0" y="0"/>
+          <a:chExt cx="0" cy="0"/>
+        </a:xfrm>
+      </p:grpSpPr>
+      <p:sp>
+        <p:nvSpPr>
+          <p:cNvPr id="71" name="Title 1">
+            <a:extLst>
+              <a:ext uri="{FF2B5EF4-FFF2-40B4-BE49-F238E27FC236}">
+                <a16:creationId xmlns:a16="http://schemas.microsoft.com/office/drawing/2014/main" id="{FB32599D-D1DA-4C81-AF20-285979709633}"/>
+              </a:ext>
+            </a:extLst>
+          </p:cNvPr>
+          <p:cNvSpPr>
+            <a:spLocks noGrp="1"/>
+          </p:cNvSpPr>
+          <p:nvPr>
+            <p:ph type="title"/>
+          </p:nvPr>
+        </p:nvSpPr>
+        <p:spPr>
+          <a:xfrm>
+            <a:off x="1170432" y="1399032"/>
+            <a:ext cx="3236976" cy="4069080"/>
+          </a:xfrm>
+        </p:spPr>
+        <p:txBody>
+          <a:bodyPr anchor="ctr">
+            <a:normAutofit/>
+          </a:bodyPr>
+          <a:lstStyle/>
+          <a:p>
+            <a:r>
+              <a:rPr lang="en-US" dirty="0" err="1"/>
+              <a:t>Gráfica</a:t>
+            </a:r>
+            <a:r>
+              <a:rPr lang="en-US" dirty="0"/>
+              <a:t> de las </a:t>
+            </a:r>
+            <a:r>
+              <a:rPr lang="en-US" dirty="0" err="1"/>
+              <a:t>rutas</a:t>
+            </a:r>
+            <a:endParaRPr lang="en-US" dirty="0"/>
+          </a:p>
+        </p:txBody>
+      </p:sp>
+      <p:pic>
+        <p:nvPicPr>
+          <p:cNvPr id="3" name="Imagen 2">
+            <a:extLst>
+              <a:ext uri="{FF2B5EF4-FFF2-40B4-BE49-F238E27FC236}">
+                <a16:creationId xmlns:a16="http://schemas.microsoft.com/office/drawing/2014/main" id="{A2EF8514-C818-490F-AFE3-275267227734}"/>
+              </a:ext>
+            </a:extLst>
+          </p:cNvPr>
+          <p:cNvPicPr>
+            <a:picLocks noChangeAspect="1"/>
+          </p:cNvPicPr>
+          <p:nvPr/>
+        </p:nvPicPr>
+        <p:blipFill>
+          <a:blip r:embed="rId2"/>
+          <a:stretch>
+            <a:fillRect/>
+          </a:stretch>
+        </p:blipFill>
+        <p:spPr>
+          <a:xfrm>
+            <a:off x="4949687" y="1261313"/>
+            <a:ext cx="6788426" cy="4463390"/>
+          </a:xfrm>
+          <a:prstGeom prst="rect">
+            <a:avLst/>
+          </a:prstGeom>
+          <a:noFill/>
+        </p:spPr>
+      </p:pic>
+      <p:sp>
+        <p:nvSpPr>
+          <p:cNvPr id="5" name="Marcador de fecha 4">
+            <a:extLst>
+              <a:ext uri="{FF2B5EF4-FFF2-40B4-BE49-F238E27FC236}">
+                <a16:creationId xmlns:a16="http://schemas.microsoft.com/office/drawing/2014/main" id="{50B79849-55F4-48E3-8978-BAEA91C0E8F8}"/>
+              </a:ext>
+            </a:extLst>
+          </p:cNvPr>
+          <p:cNvSpPr>
+            <a:spLocks noGrp="1"/>
+          </p:cNvSpPr>
+          <p:nvPr>
+            <p:ph type="dt" sz="half" idx="10"/>
+          </p:nvPr>
+        </p:nvSpPr>
+        <p:spPr>
+          <a:xfrm>
+            <a:off x="838200" y="6356350"/>
+            <a:ext cx="2743200" cy="365125"/>
+          </a:xfrm>
+        </p:spPr>
+        <p:txBody>
+          <a:bodyPr anchor="ctr">
+            <a:normAutofit/>
+          </a:bodyPr>
+          <a:lstStyle/>
+          <a:p>
+            <a:pPr rtl="0">
+              <a:spcAft>
+                <a:spcPts val="600"/>
+              </a:spcAft>
+              <a:defRPr/>
+            </a:pPr>
+            <a:r>
+              <a:rPr lang="es-ES" noProof="0" dirty="0">
+                <a:solidFill>
+                  <a:prstClr val="black">
+                    <a:tint val="75000"/>
+                  </a:prstClr>
+                </a:solidFill>
+              </a:rPr>
+              <a:t>3/9/20XX</a:t>
+            </a:r>
+          </a:p>
+        </p:txBody>
+      </p:sp>
+      <p:sp>
+        <p:nvSpPr>
+          <p:cNvPr id="6" name="Marcador de pie de página 5">
+            <a:extLst>
+              <a:ext uri="{FF2B5EF4-FFF2-40B4-BE49-F238E27FC236}">
+                <a16:creationId xmlns:a16="http://schemas.microsoft.com/office/drawing/2014/main" id="{F9AA2089-BC95-4199-BFB0-03FBB959FB2D}"/>
+              </a:ext>
+            </a:extLst>
+          </p:cNvPr>
+          <p:cNvSpPr>
+            <a:spLocks noGrp="1"/>
+          </p:cNvSpPr>
+          <p:nvPr>
+            <p:ph type="ftr" sz="quarter" idx="11"/>
+          </p:nvPr>
+        </p:nvSpPr>
+        <p:spPr>
+          <a:xfrm>
+            <a:off x="4038600" y="6356350"/>
+            <a:ext cx="4114800" cy="365125"/>
+          </a:xfrm>
+        </p:spPr>
+        <p:txBody>
+          <a:bodyPr anchor="ctr">
+            <a:normAutofit/>
+          </a:bodyPr>
+          <a:lstStyle/>
+          <a:p>
+            <a:pPr rtl="0">
+              <a:spcAft>
+                <a:spcPts val="600"/>
+              </a:spcAft>
+              <a:defRPr/>
+            </a:pPr>
+            <a:r>
+              <a:rPr lang="es-ES" noProof="0">
+                <a:solidFill>
+                  <a:prstClr val="black">
+                    <a:tint val="75000"/>
+                  </a:prstClr>
+                </a:solidFill>
+              </a:rPr>
+              <a:t>Título de la presentación</a:t>
+            </a:r>
+          </a:p>
+        </p:txBody>
+      </p:sp>
+      <p:sp>
+        <p:nvSpPr>
+          <p:cNvPr id="7" name="Marcador de número de diapositiva 6">
+            <a:extLst>
+              <a:ext uri="{FF2B5EF4-FFF2-40B4-BE49-F238E27FC236}">
+                <a16:creationId xmlns:a16="http://schemas.microsoft.com/office/drawing/2014/main" id="{01324B33-FD84-4510-918A-37BDD691F73E}"/>
+              </a:ext>
+            </a:extLst>
+          </p:cNvPr>
+          <p:cNvSpPr>
+            <a:spLocks noGrp="1"/>
+          </p:cNvSpPr>
+          <p:nvPr>
+            <p:ph type="sldNum" sz="quarter" idx="12"/>
+          </p:nvPr>
+        </p:nvSpPr>
+        <p:spPr>
+          <a:xfrm>
+            <a:off x="8610600" y="6356350"/>
+            <a:ext cx="2743200" cy="365125"/>
+          </a:xfrm>
+        </p:spPr>
+        <p:txBody>
+          <a:bodyPr anchor="ctr">
+            <a:normAutofit/>
+          </a:bodyPr>
+          <a:lstStyle/>
+          <a:p>
+            <a:pPr rtl="0">
+              <a:spcAft>
+                <a:spcPts val="600"/>
+              </a:spcAft>
+              <a:defRPr/>
+            </a:pPr>
+            <a:fld id="{D76B855D-E9CC-4FF8-AD85-6CDC7B89A0DE}" type="slidenum">
+              <a:rPr lang="es-ES" noProof="0" smtClean="0">
+                <a:solidFill>
+                  <a:prstClr val="black">
+                    <a:tint val="75000"/>
+                  </a:prstClr>
+                </a:solidFill>
+              </a:rPr>
+              <a:pPr rtl="0">
+                <a:spcAft>
+                  <a:spcPts val="600"/>
+                </a:spcAft>
+                <a:defRPr/>
+              </a:pPr>
+              <a:t>15</a:t>
+            </a:fld>
+            <a:endParaRPr lang="es-ES" noProof="0">
+              <a:solidFill>
+                <a:prstClr val="black">
+                  <a:tint val="75000"/>
+                </a:prstClr>
+              </a:solidFill>
+            </a:endParaRPr>
+          </a:p>
+        </p:txBody>
+      </p:sp>
+    </p:spTree>
+    <p:extLst>
+      <p:ext uri="{BB962C8B-B14F-4D97-AF65-F5344CB8AC3E}">
+        <p14:creationId xmlns:p14="http://schemas.microsoft.com/office/powerpoint/2010/main" val="4274820978"/>
+      </p:ext>
+    </p:extLst>
+  </p:cSld>
+  <p:clrMapOvr>
+    <a:masterClrMapping/>
+  </p:clrMapOvr>
+</p:sld>
+</file>
+
+<file path=ppt/slides/slide16.xml><?xml version="1.0" encoding="utf-8"?>
+<p:sld xmlns:a="http://schemas.openxmlformats.org/drawingml/2006/main" xmlns:r="http://schemas.openxmlformats.org/officeDocument/2006/relationships" xmlns:p="http://schemas.openxmlformats.org/presentationml/2006/main">
+  <p:cSld>
+    <p:spTree>
+      <p:nvGrpSpPr>
+        <p:cNvPr id="1" name=""/>
+        <p:cNvGrpSpPr/>
+        <p:nvPr/>
+      </p:nvGrpSpPr>
+      <p:grpSpPr>
+        <a:xfrm>
+          <a:off x="0" y="0"/>
+          <a:ext cx="0" cy="0"/>
+          <a:chOff x="0" y="0"/>
+          <a:chExt cx="0" cy="0"/>
+        </a:xfrm>
+      </p:grpSpPr>
+      <p:sp>
+        <p:nvSpPr>
+          <p:cNvPr id="2" name="Título 1">
+            <a:extLst>
+              <a:ext uri="{FF2B5EF4-FFF2-40B4-BE49-F238E27FC236}">
+                <a16:creationId xmlns:a16="http://schemas.microsoft.com/office/drawing/2014/main" id="{15E79C85-C865-4DA7-8EF1-81F045D4796A}"/>
+              </a:ext>
+            </a:extLst>
+          </p:cNvPr>
+          <p:cNvSpPr>
+            <a:spLocks noGrp="1"/>
+          </p:cNvSpPr>
+          <p:nvPr>
+            <p:ph type="title"/>
+          </p:nvPr>
+        </p:nvSpPr>
         <p:spPr>
           <a:xfrm>
             <a:off x="838200" y="365125"/>
@@ -14830,6 +15163,548 @@
           </a:xfrm>
         </p:spPr>
         <p:txBody>
+          <a:bodyPr anchor="ctr">
+            <a:normAutofit/>
+          </a:bodyPr>
+          <a:lstStyle/>
+          <a:p>
+            <a:r>
+              <a:rPr lang="en-US" dirty="0" err="1"/>
+              <a:t>Resultados</a:t>
+            </a:r>
+            <a:endParaRPr lang="en-US" dirty="0"/>
+          </a:p>
+        </p:txBody>
+      </p:sp>
+      <p:sp>
+        <p:nvSpPr>
+          <p:cNvPr id="3" name="Marcador de contenido 2">
+            <a:extLst>
+              <a:ext uri="{FF2B5EF4-FFF2-40B4-BE49-F238E27FC236}">
+                <a16:creationId xmlns:a16="http://schemas.microsoft.com/office/drawing/2014/main" id="{F43B265C-25D0-475B-8B2A-B45C613BAB76}"/>
+              </a:ext>
+            </a:extLst>
+          </p:cNvPr>
+          <p:cNvSpPr>
+            <a:spLocks noGrp="1"/>
+          </p:cNvSpPr>
+          <p:nvPr>
+            <p:ph sz="half" idx="1"/>
+          </p:nvPr>
+        </p:nvSpPr>
+        <p:spPr>
+          <a:xfrm>
+            <a:off x="838200" y="1825625"/>
+            <a:ext cx="10515600" cy="4351338"/>
+          </a:xfrm>
+        </p:spPr>
+        <p:txBody>
+          <a:bodyPr>
+            <a:normAutofit/>
+          </a:bodyPr>
+          <a:lstStyle/>
+          <a:p>
+            <a:r>
+              <a:rPr lang="en-US" dirty="0"/>
+              <a:t>Se </a:t>
+            </a:r>
+            <a:r>
+              <a:rPr lang="en-US" dirty="0" err="1"/>
+              <a:t>realizó</a:t>
+            </a:r>
+            <a:r>
+              <a:rPr lang="en-US" dirty="0"/>
+              <a:t> el </a:t>
+            </a:r>
+            <a:r>
+              <a:rPr lang="en-US" dirty="0" err="1"/>
+              <a:t>ejercicio</a:t>
+            </a:r>
+            <a:r>
+              <a:rPr lang="en-US" dirty="0"/>
+              <a:t> con 3 </a:t>
+            </a:r>
+            <a:r>
+              <a:rPr lang="en-US" dirty="0" err="1"/>
+              <a:t>distintos</a:t>
+            </a:r>
+            <a:r>
+              <a:rPr lang="en-US" dirty="0"/>
+              <a:t> </a:t>
+            </a:r>
+            <a:r>
+              <a:rPr lang="en-US" dirty="0" err="1"/>
+              <a:t>paquetes</a:t>
+            </a:r>
+            <a:r>
+              <a:rPr lang="en-US" dirty="0"/>
+              <a:t> (</a:t>
+            </a:r>
+            <a:r>
+              <a:rPr lang="es-MX" i="1" dirty="0" err="1"/>
+              <a:t>ffmaxflow</a:t>
+            </a:r>
+            <a:r>
+              <a:rPr lang="es-MX" i="1" dirty="0"/>
+              <a:t>, </a:t>
+            </a:r>
+            <a:r>
+              <a:rPr lang="es-MX" i="1" dirty="0" err="1"/>
+              <a:t>ffmaxc</a:t>
+            </a:r>
+            <a:r>
+              <a:rPr lang="es-MX" i="1" dirty="0"/>
+              <a:t> y </a:t>
+            </a:r>
+            <a:r>
+              <a:rPr lang="es-MX" i="1" dirty="0" err="1"/>
+              <a:t>networkx</a:t>
+            </a:r>
+            <a:r>
+              <a:rPr lang="es-MX" dirty="0"/>
+              <a:t>) y se comparó el tiempo de ejecución de cado uno de ellos.</a:t>
+            </a:r>
+            <a:endParaRPr lang="en-US" dirty="0"/>
+          </a:p>
+        </p:txBody>
+      </p:sp>
+      <p:sp>
+        <p:nvSpPr>
+          <p:cNvPr id="5" name="Marcador de fecha 4">
+            <a:extLst>
+              <a:ext uri="{FF2B5EF4-FFF2-40B4-BE49-F238E27FC236}">
+                <a16:creationId xmlns:a16="http://schemas.microsoft.com/office/drawing/2014/main" id="{8BB584FD-6084-4492-BA1A-FBC794F21754}"/>
+              </a:ext>
+            </a:extLst>
+          </p:cNvPr>
+          <p:cNvSpPr>
+            <a:spLocks noGrp="1"/>
+          </p:cNvSpPr>
+          <p:nvPr>
+            <p:ph type="dt" sz="half" idx="10"/>
+          </p:nvPr>
+        </p:nvSpPr>
+        <p:spPr>
+          <a:xfrm>
+            <a:off x="838200" y="6356350"/>
+            <a:ext cx="2743200" cy="365125"/>
+          </a:xfrm>
+        </p:spPr>
+        <p:txBody>
+          <a:bodyPr anchor="ctr">
+            <a:normAutofit/>
+          </a:bodyPr>
+          <a:lstStyle/>
+          <a:p>
+            <a:pPr rtl="0">
+              <a:spcAft>
+                <a:spcPts val="600"/>
+              </a:spcAft>
+              <a:defRPr/>
+            </a:pPr>
+            <a:r>
+              <a:rPr lang="es-ES" noProof="0">
+                <a:solidFill>
+                  <a:prstClr val="black">
+                    <a:tint val="75000"/>
+                  </a:prstClr>
+                </a:solidFill>
+              </a:rPr>
+              <a:t>3/9/20XX</a:t>
+            </a:r>
+          </a:p>
+        </p:txBody>
+      </p:sp>
+      <p:sp>
+        <p:nvSpPr>
+          <p:cNvPr id="6" name="Marcador de pie de página 5">
+            <a:extLst>
+              <a:ext uri="{FF2B5EF4-FFF2-40B4-BE49-F238E27FC236}">
+                <a16:creationId xmlns:a16="http://schemas.microsoft.com/office/drawing/2014/main" id="{9E1BE0B4-D3F5-402F-B747-BB1D72EFD2BE}"/>
+              </a:ext>
+            </a:extLst>
+          </p:cNvPr>
+          <p:cNvSpPr>
+            <a:spLocks noGrp="1"/>
+          </p:cNvSpPr>
+          <p:nvPr>
+            <p:ph type="ftr" sz="quarter" idx="11"/>
+          </p:nvPr>
+        </p:nvSpPr>
+        <p:spPr>
+          <a:xfrm>
+            <a:off x="4038600" y="6356350"/>
+            <a:ext cx="4114800" cy="365125"/>
+          </a:xfrm>
+        </p:spPr>
+        <p:txBody>
+          <a:bodyPr anchor="ctr">
+            <a:normAutofit/>
+          </a:bodyPr>
+          <a:lstStyle/>
+          <a:p>
+            <a:pPr rtl="0">
+              <a:spcAft>
+                <a:spcPts val="600"/>
+              </a:spcAft>
+              <a:defRPr/>
+            </a:pPr>
+            <a:r>
+              <a:rPr lang="es-ES" noProof="0">
+                <a:solidFill>
+                  <a:prstClr val="black">
+                    <a:tint val="75000"/>
+                  </a:prstClr>
+                </a:solidFill>
+              </a:rPr>
+              <a:t>Título de la presentación</a:t>
+            </a:r>
+          </a:p>
+        </p:txBody>
+      </p:sp>
+      <p:sp>
+        <p:nvSpPr>
+          <p:cNvPr id="7" name="Marcador de número de diapositiva 6">
+            <a:extLst>
+              <a:ext uri="{FF2B5EF4-FFF2-40B4-BE49-F238E27FC236}">
+                <a16:creationId xmlns:a16="http://schemas.microsoft.com/office/drawing/2014/main" id="{9065B48F-F636-4381-AB7F-F9C6D8562E83}"/>
+              </a:ext>
+            </a:extLst>
+          </p:cNvPr>
+          <p:cNvSpPr>
+            <a:spLocks noGrp="1"/>
+          </p:cNvSpPr>
+          <p:nvPr>
+            <p:ph type="sldNum" sz="quarter" idx="12"/>
+          </p:nvPr>
+        </p:nvSpPr>
+        <p:spPr>
+          <a:xfrm>
+            <a:off x="8610600" y="6356350"/>
+            <a:ext cx="2743200" cy="365125"/>
+          </a:xfrm>
+        </p:spPr>
+        <p:txBody>
+          <a:bodyPr anchor="ctr">
+            <a:normAutofit/>
+          </a:bodyPr>
+          <a:lstStyle/>
+          <a:p>
+            <a:pPr rtl="0">
+              <a:spcAft>
+                <a:spcPts val="600"/>
+              </a:spcAft>
+              <a:defRPr/>
+            </a:pPr>
+            <a:fld id="{D76B855D-E9CC-4FF8-AD85-6CDC7B89A0DE}" type="slidenum">
+              <a:rPr lang="es-ES" noProof="0" smtClean="0">
+                <a:solidFill>
+                  <a:prstClr val="black">
+                    <a:tint val="75000"/>
+                  </a:prstClr>
+                </a:solidFill>
+              </a:rPr>
+              <a:pPr rtl="0">
+                <a:spcAft>
+                  <a:spcPts val="600"/>
+                </a:spcAft>
+                <a:defRPr/>
+              </a:pPr>
+              <a:t>16</a:t>
+            </a:fld>
+            <a:endParaRPr lang="es-ES" noProof="0">
+              <a:solidFill>
+                <a:prstClr val="black">
+                  <a:tint val="75000"/>
+                </a:prstClr>
+              </a:solidFill>
+            </a:endParaRPr>
+          </a:p>
+        </p:txBody>
+      </p:sp>
+      <p:graphicFrame>
+        <p:nvGraphicFramePr>
+          <p:cNvPr id="8" name="Tabla 9">
+            <a:extLst>
+              <a:ext uri="{FF2B5EF4-FFF2-40B4-BE49-F238E27FC236}">
+                <a16:creationId xmlns:a16="http://schemas.microsoft.com/office/drawing/2014/main" id="{E03866CE-2D32-49F7-8DAE-C6B53D878132}"/>
+              </a:ext>
+            </a:extLst>
+          </p:cNvPr>
+          <p:cNvGraphicFramePr>
+            <a:graphicFrameLocks noGrp="1"/>
+          </p:cNvGraphicFramePr>
+          <p:nvPr>
+            <p:extLst>
+              <p:ext uri="{D42A27DB-BD31-4B8C-83A1-F6EECF244321}">
+                <p14:modId xmlns:p14="http://schemas.microsoft.com/office/powerpoint/2010/main" val="4190164854"/>
+              </p:ext>
+            </p:extLst>
+          </p:nvPr>
+        </p:nvGraphicFramePr>
+        <p:xfrm>
+          <a:off x="3386667" y="3773585"/>
+          <a:ext cx="5418666" cy="1483360"/>
+        </p:xfrm>
+        <a:graphic>
+          <a:graphicData uri="http://schemas.openxmlformats.org/drawingml/2006/table">
+            <a:tbl>
+              <a:tblPr firstRow="1" bandRow="1">
+                <a:tableStyleId>{21E4AEA4-8DFA-4A89-87EB-49C32662AFE0}</a:tableStyleId>
+              </a:tblPr>
+              <a:tblGrid>
+                <a:gridCol w="2709333">
+                  <a:extLst>
+                    <a:ext uri="{9D8B030D-6E8A-4147-A177-3AD203B41FA5}">
+                      <a16:colId xmlns:a16="http://schemas.microsoft.com/office/drawing/2014/main" val="1629945468"/>
+                    </a:ext>
+                  </a:extLst>
+                </a:gridCol>
+                <a:gridCol w="2709333">
+                  <a:extLst>
+                    <a:ext uri="{9D8B030D-6E8A-4147-A177-3AD203B41FA5}">
+                      <a16:colId xmlns:a16="http://schemas.microsoft.com/office/drawing/2014/main" val="1414973209"/>
+                    </a:ext>
+                  </a:extLst>
+                </a:gridCol>
+              </a:tblGrid>
+              <a:tr h="370840">
+                <a:tc>
+                  <a:txBody>
+                    <a:bodyPr/>
+                    <a:lstStyle/>
+                    <a:p>
+                      <a:r>
+                        <a:rPr lang="en-US" dirty="0" err="1"/>
+                        <a:t>Método</a:t>
+                      </a:r>
+                      <a:endParaRPr lang="en-US" dirty="0"/>
+                    </a:p>
+                  </a:txBody>
+                  <a:tcPr/>
+                </a:tc>
+                <a:tc>
+                  <a:txBody>
+                    <a:bodyPr/>
+                    <a:lstStyle/>
+                    <a:p>
+                      <a:r>
+                        <a:rPr lang="en-US" dirty="0" err="1"/>
+                        <a:t>Tiempo</a:t>
+                      </a:r>
+                      <a:r>
+                        <a:rPr lang="en-US" dirty="0"/>
+                        <a:t> de </a:t>
+                      </a:r>
+                      <a:r>
+                        <a:rPr lang="en-US" dirty="0" err="1"/>
+                        <a:t>ejecución</a:t>
+                      </a:r>
+                      <a:endParaRPr lang="en-US" dirty="0"/>
+                    </a:p>
+                  </a:txBody>
+                  <a:tcPr/>
+                </a:tc>
+                <a:extLst>
+                  <a:ext uri="{0D108BD9-81ED-4DB2-BD59-A6C34878D82A}">
+                    <a16:rowId xmlns:a16="http://schemas.microsoft.com/office/drawing/2014/main" val="416732907"/>
+                  </a:ext>
+                </a:extLst>
+              </a:tr>
+              <a:tr h="370840">
+                <a:tc>
+                  <a:txBody>
+                    <a:bodyPr/>
+                    <a:lstStyle/>
+                    <a:p>
+                      <a:r>
+                        <a:rPr lang="es-MX" sz="1800" b="0" i="0" kern="1200" dirty="0" err="1">
+                          <a:solidFill>
+                            <a:schemeClr val="dk1"/>
+                          </a:solidFill>
+                          <a:effectLst/>
+                          <a:latin typeface="+mn-lt"/>
+                          <a:ea typeface="+mn-ea"/>
+                          <a:cs typeface="+mn-cs"/>
+                        </a:rPr>
+                        <a:t>ffmaxflow</a:t>
+                      </a:r>
+                      <a:endParaRPr lang="en-US" dirty="0"/>
+                    </a:p>
+                  </a:txBody>
+                  <a:tcPr/>
+                </a:tc>
+                <a:tc>
+                  <a:txBody>
+                    <a:bodyPr/>
+                    <a:lstStyle/>
+                    <a:p>
+                      <a:r>
+                        <a:rPr lang="es-MX" sz="1800" b="0" i="0" kern="1200" dirty="0">
+                          <a:solidFill>
+                            <a:schemeClr val="dk1"/>
+                          </a:solidFill>
+                          <a:effectLst/>
+                          <a:latin typeface="+mn-lt"/>
+                          <a:ea typeface="+mn-ea"/>
+                          <a:cs typeface="+mn-cs"/>
+                        </a:rPr>
+                        <a:t>0.002524 s</a:t>
+                      </a:r>
+                      <a:endParaRPr lang="en-US" dirty="0"/>
+                    </a:p>
+                  </a:txBody>
+                  <a:tcPr/>
+                </a:tc>
+                <a:extLst>
+                  <a:ext uri="{0D108BD9-81ED-4DB2-BD59-A6C34878D82A}">
+                    <a16:rowId xmlns:a16="http://schemas.microsoft.com/office/drawing/2014/main" val="3856107920"/>
+                  </a:ext>
+                </a:extLst>
+              </a:tr>
+              <a:tr h="370840">
+                <a:tc>
+                  <a:txBody>
+                    <a:bodyPr/>
+                    <a:lstStyle/>
+                    <a:p>
+                      <a:r>
+                        <a:rPr lang="es-MX" sz="1800" b="0" i="0" kern="1200" dirty="0" err="1">
+                          <a:solidFill>
+                            <a:schemeClr val="dk1"/>
+                          </a:solidFill>
+                          <a:effectLst/>
+                          <a:latin typeface="+mn-lt"/>
+                          <a:ea typeface="+mn-ea"/>
+                          <a:cs typeface="+mn-cs"/>
+                        </a:rPr>
+                        <a:t>ffmaxflowc</a:t>
+                      </a:r>
+                      <a:endParaRPr lang="en-US" dirty="0"/>
+                    </a:p>
+                  </a:txBody>
+                  <a:tcPr/>
+                </a:tc>
+                <a:tc>
+                  <a:txBody>
+                    <a:bodyPr/>
+                    <a:lstStyle/>
+                    <a:p>
+                      <a:r>
+                        <a:rPr lang="es-MX" dirty="0"/>
+                        <a:t>0.001595 s </a:t>
+                      </a:r>
+                      <a:endParaRPr lang="en-US" dirty="0"/>
+                    </a:p>
+                  </a:txBody>
+                  <a:tcPr/>
+                </a:tc>
+                <a:extLst>
+                  <a:ext uri="{0D108BD9-81ED-4DB2-BD59-A6C34878D82A}">
+                    <a16:rowId xmlns:a16="http://schemas.microsoft.com/office/drawing/2014/main" val="3099703105"/>
+                  </a:ext>
+                </a:extLst>
+              </a:tr>
+              <a:tr h="370840">
+                <a:tc>
+                  <a:txBody>
+                    <a:bodyPr/>
+                    <a:lstStyle/>
+                    <a:p>
+                      <a:r>
+                        <a:rPr lang="es-MX" sz="1800" b="0" i="0" kern="1200" dirty="0" err="1">
+                          <a:solidFill>
+                            <a:schemeClr val="dk1"/>
+                          </a:solidFill>
+                          <a:effectLst/>
+                          <a:latin typeface="+mn-lt"/>
+                          <a:ea typeface="+mn-ea"/>
+                          <a:cs typeface="+mn-cs"/>
+                        </a:rPr>
+                        <a:t>networkx</a:t>
+                      </a:r>
+                      <a:endParaRPr lang="en-US" dirty="0"/>
+                    </a:p>
+                  </a:txBody>
+                  <a:tcPr/>
+                </a:tc>
+                <a:tc>
+                  <a:txBody>
+                    <a:bodyPr/>
+                    <a:lstStyle/>
+                    <a:p>
+                      <a:r>
+                        <a:rPr lang="es-MX" dirty="0"/>
+                        <a:t>0.006794 s</a:t>
+                      </a:r>
+                      <a:endParaRPr lang="en-US" dirty="0"/>
+                    </a:p>
+                  </a:txBody>
+                  <a:tcPr/>
+                </a:tc>
+                <a:extLst>
+                  <a:ext uri="{0D108BD9-81ED-4DB2-BD59-A6C34878D82A}">
+                    <a16:rowId xmlns:a16="http://schemas.microsoft.com/office/drawing/2014/main" val="3751879717"/>
+                  </a:ext>
+                </a:extLst>
+              </a:tr>
+            </a:tbl>
+          </a:graphicData>
+        </a:graphic>
+      </p:graphicFrame>
+    </p:spTree>
+    <p:extLst>
+      <p:ext uri="{BB962C8B-B14F-4D97-AF65-F5344CB8AC3E}">
+        <p14:creationId xmlns:p14="http://schemas.microsoft.com/office/powerpoint/2010/main" val="1377596844"/>
+      </p:ext>
+    </p:extLst>
+  </p:cSld>
+  <p:clrMapOvr>
+    <a:masterClrMapping/>
+  </p:clrMapOvr>
+</p:sld>
+</file>
+
+<file path=ppt/slides/slide17.xml><?xml version="1.0" encoding="utf-8"?>
+<p:sld xmlns:a="http://schemas.openxmlformats.org/drawingml/2006/main" xmlns:r="http://schemas.openxmlformats.org/officeDocument/2006/relationships" xmlns:p="http://schemas.openxmlformats.org/presentationml/2006/main">
+  <p:cSld>
+    <p:spTree>
+      <p:nvGrpSpPr>
+        <p:cNvPr id="1" name=""/>
+        <p:cNvGrpSpPr/>
+        <p:nvPr/>
+      </p:nvGrpSpPr>
+      <p:grpSpPr>
+        <a:xfrm>
+          <a:off x="0" y="0"/>
+          <a:ext cx="0" cy="0"/>
+          <a:chOff x="0" y="0"/>
+          <a:chExt cx="0" cy="0"/>
+        </a:xfrm>
+      </p:grpSpPr>
+      <p:sp>
+        <p:nvSpPr>
+          <p:cNvPr id="4" name="Título 3">
+            <a:extLst>
+              <a:ext uri="{FF2B5EF4-FFF2-40B4-BE49-F238E27FC236}">
+                <a16:creationId xmlns:a16="http://schemas.microsoft.com/office/drawing/2014/main" id="{7B290457-2071-4F7C-9327-CE85A282B4D5}"/>
+              </a:ext>
+            </a:extLst>
+          </p:cNvPr>
+          <p:cNvSpPr>
+            <a:spLocks noGrp="1"/>
+          </p:cNvSpPr>
+          <p:nvPr>
+            <p:ph type="title"/>
+          </p:nvPr>
+        </p:nvSpPr>
+        <p:spPr>
+          <a:xfrm>
+            <a:off x="838200" y="365125"/>
+            <a:ext cx="10515600" cy="1325563"/>
+          </a:xfrm>
+        </p:spPr>
+        <p:txBody>
           <a:bodyPr rtlCol="0" anchor="ctr">
             <a:normAutofit/>
           </a:bodyPr>
@@ -14843,8 +15718,8 @@
           </a:p>
         </p:txBody>
       </p:sp>
-      <mc:AlternateContent xmlns:mc="http://schemas.openxmlformats.org/markup-compatibility/2006">
-        <mc:Choice xmlns:a14="http://schemas.microsoft.com/office/drawing/2010/main" Requires="a14">
+      <mc:AlternateContent xmlns:mc="http://schemas.openxmlformats.org/markup-compatibility/2006" xmlns:a14="http://schemas.microsoft.com/office/drawing/2010/main">
+        <mc:Choice Requires="a14">
           <p:sp>
             <p:nvSpPr>
               <p:cNvPr id="5" name="Marcador de contenido 4">
@@ -14919,7 +15794,7 @@
             </p:txBody>
           </p:sp>
         </mc:Choice>
-        <mc:Fallback>
+        <mc:Fallback xmlns="">
           <p:sp>
             <p:nvSpPr>
               <p:cNvPr id="5" name="Marcador de contenido 4">
@@ -15033,7 +15908,7 @@
                 <a:tabLst/>
                 <a:defRPr/>
               </a:pPr>
-              <a:t>14</a:t>
+              <a:t>17</a:t>
             </a:fld>
             <a:endParaRPr kumimoji="0" lang="es-ES" b="0" i="0" u="none" strike="noStrike" kern="1200" cap="none" spc="0" normalizeH="0" baseline="0">
               <a:ln>
@@ -15064,7 +15939,7 @@
 </p:sld>
 </file>
 
-<file path=ppt/slides/slide15.xml><?xml version="1.0" encoding="utf-8"?>
+<file path=ppt/slides/slide18.xml><?xml version="1.0" encoding="utf-8"?>
 <p:sld xmlns:a="http://schemas.openxmlformats.org/drawingml/2006/main" xmlns:r="http://schemas.openxmlformats.org/officeDocument/2006/relationships" xmlns:p="http://schemas.openxmlformats.org/presentationml/2006/main">
   <p:cSld>
     <p:spTree>
@@ -15083,10 +15958,10 @@
       </p:grpSpPr>
       <p:sp>
         <p:nvSpPr>
-          <p:cNvPr id="71" name="Title 1">
+          <p:cNvPr id="2" name="Título 1">
             <a:extLst>
               <a:ext uri="{FF2B5EF4-FFF2-40B4-BE49-F238E27FC236}">
-                <a16:creationId xmlns:a16="http://schemas.microsoft.com/office/drawing/2014/main" id="{769E5028-762C-4BBF-8875-CD5D6B9F4677}"/>
+                <a16:creationId xmlns:a16="http://schemas.microsoft.com/office/drawing/2014/main" id="{40EB430E-F69D-41A9-A50E-2656CB55B392}"/>
               </a:ext>
             </a:extLst>
           </p:cNvPr>
@@ -15097,6 +15972,925 @@
             <p:ph type="title"/>
           </p:nvPr>
         </p:nvSpPr>
+        <p:spPr/>
+        <p:txBody>
+          <a:bodyPr/>
+          <a:lstStyle/>
+          <a:p>
+            <a:r>
+              <a:rPr lang="en-US" dirty="0" err="1"/>
+              <a:t>Descripción</a:t>
+            </a:r>
+            <a:r>
+              <a:rPr lang="en-US" dirty="0"/>
+              <a:t> del dataset</a:t>
+            </a:r>
+          </a:p>
+        </p:txBody>
+      </p:sp>
+      <p:sp>
+        <p:nvSpPr>
+          <p:cNvPr id="3" name="Marcador de contenido 2">
+            <a:extLst>
+              <a:ext uri="{FF2B5EF4-FFF2-40B4-BE49-F238E27FC236}">
+                <a16:creationId xmlns:a16="http://schemas.microsoft.com/office/drawing/2014/main" id="{66F34B46-F768-4F16-8147-A29B79597829}"/>
+              </a:ext>
+            </a:extLst>
+          </p:cNvPr>
+          <p:cNvSpPr>
+            <a:spLocks noGrp="1"/>
+          </p:cNvSpPr>
+          <p:nvPr>
+            <p:ph sz="half" idx="1"/>
+          </p:nvPr>
+        </p:nvSpPr>
+        <p:spPr/>
+        <p:txBody>
+          <a:bodyPr>
+            <a:normAutofit fontScale="70000" lnSpcReduction="20000"/>
+          </a:bodyPr>
+          <a:lstStyle/>
+          <a:p>
+            <a:r>
+              <a:rPr lang="es-MX" sz="2600" dirty="0"/>
+              <a:t>El </a:t>
+            </a:r>
+            <a:r>
+              <a:rPr lang="es-MX" sz="2600" dirty="0" err="1"/>
+              <a:t>dataset</a:t>
+            </a:r>
+            <a:r>
+              <a:rPr lang="es-MX" sz="2600" dirty="0"/>
+              <a:t> a utilizar viene de un repositorio en </a:t>
+            </a:r>
+            <a:r>
+              <a:rPr lang="es-MX" sz="2600" dirty="0" err="1"/>
+              <a:t>github</a:t>
+            </a:r>
+            <a:r>
+              <a:rPr lang="es-MX" sz="2600" dirty="0"/>
+              <a:t>.</a:t>
+            </a:r>
+          </a:p>
+          <a:p>
+            <a:r>
+              <a:rPr lang="es-MX" sz="2600" dirty="0"/>
+              <a:t>El </a:t>
+            </a:r>
+            <a:r>
+              <a:rPr lang="es-MX" sz="2600" dirty="0" err="1"/>
+              <a:t>dataset</a:t>
+            </a:r>
+            <a:r>
+              <a:rPr lang="es-MX" sz="2600" dirty="0"/>
+              <a:t> contiene información de los vuelos del 6 enero de 2019 de una cierta aerolínea en Estados Unidos y muestra los registros de sus 565 vuelos de ese día para únicamente 10 aeropuertos. </a:t>
+            </a:r>
+          </a:p>
+          <a:p>
+            <a:endParaRPr lang="en-US" sz="1800" dirty="0"/>
+          </a:p>
+        </p:txBody>
+      </p:sp>
+      <p:sp>
+        <p:nvSpPr>
+          <p:cNvPr id="5" name="Marcador de fecha 4">
+            <a:extLst>
+              <a:ext uri="{FF2B5EF4-FFF2-40B4-BE49-F238E27FC236}">
+                <a16:creationId xmlns:a16="http://schemas.microsoft.com/office/drawing/2014/main" id="{318C4090-B6A2-41B6-9F24-39B6ECBF22D1}"/>
+              </a:ext>
+            </a:extLst>
+          </p:cNvPr>
+          <p:cNvSpPr>
+            <a:spLocks noGrp="1"/>
+          </p:cNvSpPr>
+          <p:nvPr>
+            <p:ph type="dt" sz="half" idx="10"/>
+          </p:nvPr>
+        </p:nvSpPr>
+        <p:spPr/>
+        <p:txBody>
+          <a:bodyPr/>
+          <a:lstStyle/>
+          <a:p>
+            <a:pPr rtl="0">
+              <a:defRPr/>
+            </a:pPr>
+            <a:r>
+              <a:rPr lang="es-ES" noProof="0">
+                <a:solidFill>
+                  <a:prstClr val="black">
+                    <a:tint val="75000"/>
+                  </a:prstClr>
+                </a:solidFill>
+              </a:rPr>
+              <a:t>3/9/20XX</a:t>
+            </a:r>
+          </a:p>
+        </p:txBody>
+      </p:sp>
+      <p:sp>
+        <p:nvSpPr>
+          <p:cNvPr id="6" name="Marcador de pie de página 5">
+            <a:extLst>
+              <a:ext uri="{FF2B5EF4-FFF2-40B4-BE49-F238E27FC236}">
+                <a16:creationId xmlns:a16="http://schemas.microsoft.com/office/drawing/2014/main" id="{24EB3927-1177-47DD-AFE2-B0E9730CF6DB}"/>
+              </a:ext>
+            </a:extLst>
+          </p:cNvPr>
+          <p:cNvSpPr>
+            <a:spLocks noGrp="1"/>
+          </p:cNvSpPr>
+          <p:nvPr>
+            <p:ph type="ftr" sz="quarter" idx="11"/>
+          </p:nvPr>
+        </p:nvSpPr>
+        <p:spPr/>
+        <p:txBody>
+          <a:bodyPr/>
+          <a:lstStyle/>
+          <a:p>
+            <a:pPr rtl="0">
+              <a:defRPr/>
+            </a:pPr>
+            <a:r>
+              <a:rPr lang="es-ES" noProof="0">
+                <a:solidFill>
+                  <a:prstClr val="black">
+                    <a:tint val="75000"/>
+                  </a:prstClr>
+                </a:solidFill>
+              </a:rPr>
+              <a:t>Título de la presentación</a:t>
+            </a:r>
+          </a:p>
+        </p:txBody>
+      </p:sp>
+      <p:sp>
+        <p:nvSpPr>
+          <p:cNvPr id="7" name="Marcador de número de diapositiva 6">
+            <a:extLst>
+              <a:ext uri="{FF2B5EF4-FFF2-40B4-BE49-F238E27FC236}">
+                <a16:creationId xmlns:a16="http://schemas.microsoft.com/office/drawing/2014/main" id="{D9F671EC-902F-4C7A-8068-F2801AD56BCC}"/>
+              </a:ext>
+            </a:extLst>
+          </p:cNvPr>
+          <p:cNvSpPr>
+            <a:spLocks noGrp="1"/>
+          </p:cNvSpPr>
+          <p:nvPr>
+            <p:ph type="sldNum" sz="quarter" idx="12"/>
+          </p:nvPr>
+        </p:nvSpPr>
+        <p:spPr/>
+        <p:txBody>
+          <a:bodyPr/>
+          <a:lstStyle/>
+          <a:p>
+            <a:pPr rtl="0">
+              <a:defRPr/>
+            </a:pPr>
+            <a:fld id="{D76B855D-E9CC-4FF8-AD85-6CDC7B89A0DE}" type="slidenum">
+              <a:rPr lang="es-ES" noProof="0" smtClean="0">
+                <a:solidFill>
+                  <a:prstClr val="black">
+                    <a:tint val="75000"/>
+                  </a:prstClr>
+                </a:solidFill>
+              </a:rPr>
+              <a:pPr rtl="0">
+                <a:defRPr/>
+              </a:pPr>
+              <a:t>18</a:t>
+            </a:fld>
+            <a:endParaRPr lang="es-ES" noProof="0">
+              <a:solidFill>
+                <a:prstClr val="black">
+                  <a:tint val="75000"/>
+                </a:prstClr>
+              </a:solidFill>
+            </a:endParaRPr>
+          </a:p>
+        </p:txBody>
+      </p:sp>
+      <p:sp>
+        <p:nvSpPr>
+          <p:cNvPr id="13" name="Marcador de contenido 12">
+            <a:extLst>
+              <a:ext uri="{FF2B5EF4-FFF2-40B4-BE49-F238E27FC236}">
+                <a16:creationId xmlns:a16="http://schemas.microsoft.com/office/drawing/2014/main" id="{4E39429C-E896-497F-9888-2956C0B20243}"/>
+              </a:ext>
+            </a:extLst>
+          </p:cNvPr>
+          <p:cNvSpPr>
+            <a:spLocks noGrp="1"/>
+          </p:cNvSpPr>
+          <p:nvPr>
+            <p:ph sz="half" idx="2"/>
+          </p:nvPr>
+        </p:nvSpPr>
+        <p:spPr/>
+        <p:txBody>
+          <a:bodyPr>
+            <a:normAutofit fontScale="70000" lnSpcReduction="20000"/>
+          </a:bodyPr>
+          <a:lstStyle/>
+          <a:p>
+            <a:pPr marL="0" indent="0">
+              <a:buNone/>
+            </a:pPr>
+            <a:r>
+              <a:rPr lang="es-MX" dirty="0"/>
+              <a:t>El </a:t>
+            </a:r>
+            <a:r>
+              <a:rPr lang="es-MX" dirty="0" err="1"/>
+              <a:t>dataset</a:t>
+            </a:r>
+            <a:r>
+              <a:rPr lang="es-MX" dirty="0"/>
+              <a:t> cuenta con cinco columnas:</a:t>
+            </a:r>
+          </a:p>
+          <a:p>
+            <a:endParaRPr lang="es-MX" dirty="0"/>
+          </a:p>
+          <a:p>
+            <a:r>
+              <a:rPr lang="es-MX" dirty="0" err="1"/>
+              <a:t>Source</a:t>
+            </a:r>
+            <a:r>
+              <a:rPr lang="es-MX" dirty="0"/>
+              <a:t>: identificador del aeropuerto origen del que sale el vuelo</a:t>
+            </a:r>
+          </a:p>
+          <a:p>
+            <a:r>
+              <a:rPr lang="es-MX" dirty="0" err="1"/>
+              <a:t>Destination</a:t>
+            </a:r>
+            <a:r>
+              <a:rPr lang="es-MX" dirty="0"/>
+              <a:t>: identificador del aeropuerto destino al que llega el vuelo</a:t>
+            </a:r>
+          </a:p>
+          <a:p>
+            <a:r>
+              <a:rPr lang="es-MX" dirty="0" err="1"/>
+              <a:t>Departure</a:t>
+            </a:r>
+            <a:r>
+              <a:rPr lang="es-MX" dirty="0"/>
+              <a:t>: hora de despegue del vuelo en el aeropuerto origen en horas militares</a:t>
+            </a:r>
+          </a:p>
+          <a:p>
+            <a:r>
+              <a:rPr lang="es-MX" dirty="0" err="1"/>
+              <a:t>Arrival</a:t>
+            </a:r>
+            <a:r>
+              <a:rPr lang="es-MX" dirty="0"/>
+              <a:t>: hora de aterrizaje del vuelo en el aeropuerto destino en horas militares</a:t>
+            </a:r>
+          </a:p>
+          <a:p>
+            <a:r>
+              <a:rPr lang="es-MX" dirty="0" err="1"/>
+              <a:t>capacity</a:t>
+            </a:r>
+            <a:r>
+              <a:rPr lang="es-MX" dirty="0"/>
+              <a:t>: cantidad máxima de pasajeros que puede transportar el vuelo (sin contar al </a:t>
+            </a:r>
+            <a:r>
+              <a:rPr lang="es-MX" dirty="0" err="1"/>
+              <a:t>crew</a:t>
+            </a:r>
+            <a:r>
+              <a:rPr lang="es-MX" dirty="0"/>
+              <a:t>)</a:t>
+            </a:r>
+            <a:endParaRPr lang="en-US" dirty="0"/>
+          </a:p>
+        </p:txBody>
+      </p:sp>
+      <p:pic>
+        <p:nvPicPr>
+          <p:cNvPr id="17" name="Imagen 16">
+            <a:extLst>
+              <a:ext uri="{FF2B5EF4-FFF2-40B4-BE49-F238E27FC236}">
+                <a16:creationId xmlns:a16="http://schemas.microsoft.com/office/drawing/2014/main" id="{9B571B55-1069-430C-BAFA-F1C5AD23FEF4}"/>
+              </a:ext>
+            </a:extLst>
+          </p:cNvPr>
+          <p:cNvPicPr>
+            <a:picLocks noChangeAspect="1"/>
+          </p:cNvPicPr>
+          <p:nvPr/>
+        </p:nvPicPr>
+        <p:blipFill>
+          <a:blip r:embed="rId2"/>
+          <a:stretch>
+            <a:fillRect/>
+          </a:stretch>
+        </p:blipFill>
+        <p:spPr>
+          <a:xfrm>
+            <a:off x="1204602" y="3630260"/>
+            <a:ext cx="4448796" cy="2172003"/>
+          </a:xfrm>
+          <a:prstGeom prst="rect">
+            <a:avLst/>
+          </a:prstGeom>
+        </p:spPr>
+      </p:pic>
+    </p:spTree>
+    <p:extLst>
+      <p:ext uri="{BB962C8B-B14F-4D97-AF65-F5344CB8AC3E}">
+        <p14:creationId xmlns:p14="http://schemas.microsoft.com/office/powerpoint/2010/main" val="2405662673"/>
+      </p:ext>
+    </p:extLst>
+  </p:cSld>
+  <p:clrMapOvr>
+    <a:masterClrMapping/>
+  </p:clrMapOvr>
+</p:sld>
+</file>
+
+<file path=ppt/slides/slide19.xml><?xml version="1.0" encoding="utf-8"?>
+<p:sld xmlns:a="http://schemas.openxmlformats.org/drawingml/2006/main" xmlns:r="http://schemas.openxmlformats.org/officeDocument/2006/relationships" xmlns:p="http://schemas.openxmlformats.org/presentationml/2006/main">
+  <p:cSld>
+    <p:spTree>
+      <p:nvGrpSpPr>
+        <p:cNvPr id="1" name=""/>
+        <p:cNvGrpSpPr/>
+        <p:nvPr/>
+      </p:nvGrpSpPr>
+      <p:grpSpPr>
+        <a:xfrm>
+          <a:off x="0" y="0"/>
+          <a:ext cx="0" cy="0"/>
+          <a:chOff x="0" y="0"/>
+          <a:chExt cx="0" cy="0"/>
+        </a:xfrm>
+      </p:grpSpPr>
+      <p:sp>
+        <p:nvSpPr>
+          <p:cNvPr id="71" name="Title 1">
+            <a:extLst>
+              <a:ext uri="{FF2B5EF4-FFF2-40B4-BE49-F238E27FC236}">
+                <a16:creationId xmlns:a16="http://schemas.microsoft.com/office/drawing/2014/main" id="{FB32599D-D1DA-4C81-AF20-285979709633}"/>
+              </a:ext>
+            </a:extLst>
+          </p:cNvPr>
+          <p:cNvSpPr>
+            <a:spLocks noGrp="1"/>
+          </p:cNvSpPr>
+          <p:nvPr>
+            <p:ph type="title"/>
+          </p:nvPr>
+        </p:nvSpPr>
+        <p:spPr>
+          <a:xfrm>
+            <a:off x="838200" y="365125"/>
+            <a:ext cx="10515600" cy="1325563"/>
+          </a:xfrm>
+        </p:spPr>
+        <p:txBody>
+          <a:bodyPr anchor="ctr">
+            <a:normAutofit/>
+          </a:bodyPr>
+          <a:lstStyle/>
+          <a:p>
+            <a:r>
+              <a:rPr lang="en-US" dirty="0" err="1"/>
+              <a:t>Gráfica</a:t>
+            </a:r>
+            <a:r>
+              <a:rPr lang="en-US" dirty="0"/>
+              <a:t> de las </a:t>
+            </a:r>
+            <a:r>
+              <a:rPr lang="en-US" dirty="0" err="1"/>
+              <a:t>rutas</a:t>
+            </a:r>
+            <a:endParaRPr lang="en-US" dirty="0"/>
+          </a:p>
+        </p:txBody>
+      </p:sp>
+      <p:pic>
+        <p:nvPicPr>
+          <p:cNvPr id="9" name="Imagen 8">
+            <a:extLst>
+              <a:ext uri="{FF2B5EF4-FFF2-40B4-BE49-F238E27FC236}">
+                <a16:creationId xmlns:a16="http://schemas.microsoft.com/office/drawing/2014/main" id="{AFE2707D-5AFA-442B-AC20-9279C839A16E}"/>
+              </a:ext>
+            </a:extLst>
+          </p:cNvPr>
+          <p:cNvPicPr>
+            <a:picLocks noChangeAspect="1"/>
+          </p:cNvPicPr>
+          <p:nvPr/>
+        </p:nvPicPr>
+        <p:blipFill rotWithShape="1">
+          <a:blip r:embed="rId2"/>
+          <a:srcRect l="2132" r="3" b="3"/>
+          <a:stretch/>
+        </p:blipFill>
+        <p:spPr>
+          <a:xfrm>
+            <a:off x="912812" y="1690688"/>
+            <a:ext cx="5157787" cy="3684588"/>
+          </a:xfrm>
+          <a:prstGeom prst="rect">
+            <a:avLst/>
+          </a:prstGeom>
+          <a:noFill/>
+        </p:spPr>
+      </p:pic>
+      <p:pic>
+        <p:nvPicPr>
+          <p:cNvPr id="1026" name="Picture 2">
+            <a:extLst>
+              <a:ext uri="{FF2B5EF4-FFF2-40B4-BE49-F238E27FC236}">
+                <a16:creationId xmlns:a16="http://schemas.microsoft.com/office/drawing/2014/main" id="{1E0CF21C-D45E-49CB-850F-7BD01EBE1CF1}"/>
+              </a:ext>
+            </a:extLst>
+          </p:cNvPr>
+          <p:cNvPicPr>
+            <a:picLocks noChangeAspect="1" noChangeArrowheads="1"/>
+          </p:cNvPicPr>
+          <p:nvPr/>
+        </p:nvPicPr>
+        <p:blipFill rotWithShape="1">
+          <a:blip r:embed="rId3">
+            <a:extLst>
+              <a:ext uri="{28A0092B-C50C-407E-A947-70E740481C1C}">
+                <a14:useLocalDpi xmlns:a14="http://schemas.microsoft.com/office/drawing/2010/main" val="0"/>
+              </a:ext>
+            </a:extLst>
+          </a:blip>
+          <a:srcRect r="7858" b="-2"/>
+          <a:stretch/>
+        </p:blipFill>
+        <p:spPr bwMode="auto">
+          <a:xfrm>
+            <a:off x="6096000" y="1690688"/>
+            <a:ext cx="5183188" cy="3684588"/>
+          </a:xfrm>
+          <a:prstGeom prst="rect">
+            <a:avLst/>
+          </a:prstGeom>
+          <a:solidFill>
+            <a:srgbClr val="FFFFFF"/>
+          </a:solidFill>
+          <a:extLst>
+            <a:ext uri="{909E8E84-426E-40DD-AFC4-6F175D3DCCD1}">
+              <a14:hiddenFill xmlns:a14="http://schemas.microsoft.com/office/drawing/2010/main">
+                <a:solidFill>
+                  <a:srgbClr val="FFFFFF"/>
+                </a:solidFill>
+              </a14:hiddenFill>
+            </a:ext>
+          </a:extLst>
+        </p:spPr>
+      </p:pic>
+      <p:sp>
+        <p:nvSpPr>
+          <p:cNvPr id="5" name="Marcador de fecha 4">
+            <a:extLst>
+              <a:ext uri="{FF2B5EF4-FFF2-40B4-BE49-F238E27FC236}">
+                <a16:creationId xmlns:a16="http://schemas.microsoft.com/office/drawing/2014/main" id="{50B79849-55F4-48E3-8978-BAEA91C0E8F8}"/>
+              </a:ext>
+            </a:extLst>
+          </p:cNvPr>
+          <p:cNvSpPr>
+            <a:spLocks noGrp="1"/>
+          </p:cNvSpPr>
+          <p:nvPr>
+            <p:ph type="dt" sz="half" idx="10"/>
+          </p:nvPr>
+        </p:nvSpPr>
+        <p:spPr>
+          <a:xfrm>
+            <a:off x="838200" y="6356350"/>
+            <a:ext cx="2743200" cy="365125"/>
+          </a:xfrm>
+        </p:spPr>
+        <p:txBody>
+          <a:bodyPr anchor="ctr">
+            <a:normAutofit/>
+          </a:bodyPr>
+          <a:lstStyle/>
+          <a:p>
+            <a:pPr rtl="0">
+              <a:spcAft>
+                <a:spcPts val="600"/>
+              </a:spcAft>
+              <a:defRPr/>
+            </a:pPr>
+            <a:r>
+              <a:rPr lang="es-ES" noProof="0">
+                <a:solidFill>
+                  <a:prstClr val="black">
+                    <a:tint val="75000"/>
+                  </a:prstClr>
+                </a:solidFill>
+              </a:rPr>
+              <a:t>3/9/20XX</a:t>
+            </a:r>
+          </a:p>
+        </p:txBody>
+      </p:sp>
+      <p:sp>
+        <p:nvSpPr>
+          <p:cNvPr id="6" name="Marcador de pie de página 5">
+            <a:extLst>
+              <a:ext uri="{FF2B5EF4-FFF2-40B4-BE49-F238E27FC236}">
+                <a16:creationId xmlns:a16="http://schemas.microsoft.com/office/drawing/2014/main" id="{F9AA2089-BC95-4199-BFB0-03FBB959FB2D}"/>
+              </a:ext>
+            </a:extLst>
+          </p:cNvPr>
+          <p:cNvSpPr>
+            <a:spLocks noGrp="1"/>
+          </p:cNvSpPr>
+          <p:nvPr>
+            <p:ph type="ftr" sz="quarter" idx="11"/>
+          </p:nvPr>
+        </p:nvSpPr>
+        <p:spPr>
+          <a:xfrm>
+            <a:off x="4038600" y="6356350"/>
+            <a:ext cx="4114800" cy="365125"/>
+          </a:xfrm>
+        </p:spPr>
+        <p:txBody>
+          <a:bodyPr anchor="ctr">
+            <a:normAutofit/>
+          </a:bodyPr>
+          <a:lstStyle/>
+          <a:p>
+            <a:pPr rtl="0">
+              <a:spcAft>
+                <a:spcPts val="600"/>
+              </a:spcAft>
+              <a:defRPr/>
+            </a:pPr>
+            <a:r>
+              <a:rPr lang="es-ES" noProof="0">
+                <a:solidFill>
+                  <a:prstClr val="black">
+                    <a:tint val="75000"/>
+                  </a:prstClr>
+                </a:solidFill>
+              </a:rPr>
+              <a:t>Título de la presentación</a:t>
+            </a:r>
+          </a:p>
+        </p:txBody>
+      </p:sp>
+      <p:sp>
+        <p:nvSpPr>
+          <p:cNvPr id="7" name="Marcador de número de diapositiva 6">
+            <a:extLst>
+              <a:ext uri="{FF2B5EF4-FFF2-40B4-BE49-F238E27FC236}">
+                <a16:creationId xmlns:a16="http://schemas.microsoft.com/office/drawing/2014/main" id="{01324B33-FD84-4510-918A-37BDD691F73E}"/>
+              </a:ext>
+            </a:extLst>
+          </p:cNvPr>
+          <p:cNvSpPr>
+            <a:spLocks noGrp="1"/>
+          </p:cNvSpPr>
+          <p:nvPr>
+            <p:ph type="sldNum" sz="quarter" idx="12"/>
+          </p:nvPr>
+        </p:nvSpPr>
+        <p:spPr>
+          <a:xfrm>
+            <a:off x="8610600" y="6356350"/>
+            <a:ext cx="2743200" cy="365125"/>
+          </a:xfrm>
+        </p:spPr>
+        <p:txBody>
+          <a:bodyPr anchor="ctr">
+            <a:normAutofit/>
+          </a:bodyPr>
+          <a:lstStyle/>
+          <a:p>
+            <a:pPr rtl="0">
+              <a:spcAft>
+                <a:spcPts val="600"/>
+              </a:spcAft>
+              <a:defRPr/>
+            </a:pPr>
+            <a:fld id="{D76B855D-E9CC-4FF8-AD85-6CDC7B89A0DE}" type="slidenum">
+              <a:rPr lang="es-ES" noProof="0" smtClean="0">
+                <a:solidFill>
+                  <a:prstClr val="black">
+                    <a:tint val="75000"/>
+                  </a:prstClr>
+                </a:solidFill>
+              </a:rPr>
+              <a:pPr rtl="0">
+                <a:spcAft>
+                  <a:spcPts val="600"/>
+                </a:spcAft>
+                <a:defRPr/>
+              </a:pPr>
+              <a:t>19</a:t>
+            </a:fld>
+            <a:endParaRPr lang="es-ES" noProof="0">
+              <a:solidFill>
+                <a:prstClr val="black">
+                  <a:tint val="75000"/>
+                </a:prstClr>
+              </a:solidFill>
+            </a:endParaRPr>
+          </a:p>
+        </p:txBody>
+      </p:sp>
+    </p:spTree>
+    <p:extLst>
+      <p:ext uri="{BB962C8B-B14F-4D97-AF65-F5344CB8AC3E}">
+        <p14:creationId xmlns:p14="http://schemas.microsoft.com/office/powerpoint/2010/main" val="4091659100"/>
+      </p:ext>
+    </p:extLst>
+  </p:cSld>
+  <p:clrMapOvr>
+    <a:masterClrMapping/>
+  </p:clrMapOvr>
+</p:sld>
+</file>
+
+<file path=ppt/slides/slide2.xml><?xml version="1.0" encoding="utf-8"?>
+<p:sld xmlns:a="http://schemas.openxmlformats.org/drawingml/2006/main" xmlns:r="http://schemas.openxmlformats.org/officeDocument/2006/relationships" xmlns:p="http://schemas.openxmlformats.org/presentationml/2006/main">
+  <p:cSld>
+    <p:spTree>
+      <p:nvGrpSpPr>
+        <p:cNvPr id="1" name=""/>
+        <p:cNvGrpSpPr/>
+        <p:nvPr/>
+      </p:nvGrpSpPr>
+      <p:grpSpPr>
+        <a:xfrm>
+          <a:off x="0" y="0"/>
+          <a:ext cx="0" cy="0"/>
+          <a:chOff x="0" y="0"/>
+          <a:chExt cx="0" cy="0"/>
+        </a:xfrm>
+      </p:grpSpPr>
+      <p:sp>
+        <p:nvSpPr>
+          <p:cNvPr id="2" name="Título 1">
+            <a:extLst>
+              <a:ext uri="{FF2B5EF4-FFF2-40B4-BE49-F238E27FC236}">
+                <a16:creationId xmlns:a16="http://schemas.microsoft.com/office/drawing/2014/main" id="{1836E49C-11A0-4C95-8A6E-FC7E9C57C105}"/>
+              </a:ext>
+            </a:extLst>
+          </p:cNvPr>
+          <p:cNvSpPr>
+            <a:spLocks noGrp="1"/>
+          </p:cNvSpPr>
+          <p:nvPr>
+            <p:ph type="title"/>
+          </p:nvPr>
+        </p:nvSpPr>
+        <p:spPr/>
+        <p:txBody>
+          <a:bodyPr rtlCol="0"/>
+          <a:lstStyle/>
+          <a:p>
+            <a:pPr rtl="0"/>
+            <a:r>
+              <a:rPr lang="es-ES">
+                <a:solidFill>
+                  <a:srgbClr val="FFFFFF"/>
+                </a:solidFill>
+              </a:rPr>
+              <a:t>Agenda</a:t>
+            </a:r>
+            <a:endParaRPr lang="es-ES"/>
+          </a:p>
+        </p:txBody>
+      </p:sp>
+      <p:sp>
+        <p:nvSpPr>
+          <p:cNvPr id="3" name="Marcador de contenido 2">
+            <a:extLst>
+              <a:ext uri="{FF2B5EF4-FFF2-40B4-BE49-F238E27FC236}">
+                <a16:creationId xmlns:a16="http://schemas.microsoft.com/office/drawing/2014/main" id="{869C3FD2-AF88-4EF1-AFB7-5D31BD5AA0BF}"/>
+              </a:ext>
+            </a:extLst>
+          </p:cNvPr>
+          <p:cNvSpPr>
+            <a:spLocks noGrp="1"/>
+          </p:cNvSpPr>
+          <p:nvPr>
+            <p:ph idx="1"/>
+          </p:nvPr>
+        </p:nvSpPr>
+        <p:spPr>
+          <a:xfrm>
+            <a:off x="5788152" y="1527048"/>
+            <a:ext cx="5565648" cy="3931920"/>
+          </a:xfrm>
+        </p:spPr>
+        <p:txBody>
+          <a:bodyPr rtlCol="0"/>
+          <a:lstStyle/>
+          <a:p>
+            <a:pPr marL="0" indent="0" rtl="0">
+              <a:buNone/>
+            </a:pPr>
+            <a:r>
+              <a:rPr lang="es-ES" dirty="0"/>
+              <a:t>Algoritmo Ford – </a:t>
+            </a:r>
+            <a:r>
+              <a:rPr lang="es-ES" dirty="0" err="1"/>
+              <a:t>Fulkerson</a:t>
+            </a:r>
+            <a:endParaRPr lang="es-ES" dirty="0"/>
+          </a:p>
+          <a:p>
+            <a:pPr marL="0" indent="0" rtl="0">
+              <a:buNone/>
+            </a:pPr>
+            <a:r>
+              <a:rPr lang="es-ES" dirty="0"/>
+              <a:t>Desarrollo de </a:t>
+            </a:r>
+            <a:r>
+              <a:rPr lang="es-ES" dirty="0" err="1"/>
+              <a:t>ffmaxflow</a:t>
+            </a:r>
+            <a:endParaRPr lang="es-ES" dirty="0"/>
+          </a:p>
+          <a:p>
+            <a:pPr marL="0" indent="0" rtl="0">
+              <a:buNone/>
+            </a:pPr>
+            <a:r>
+              <a:rPr lang="es-ES" dirty="0"/>
+              <a:t>Reimplementación de </a:t>
+            </a:r>
+            <a:r>
+              <a:rPr lang="es-ES" dirty="0" err="1"/>
+              <a:t>ffmaxflow</a:t>
+            </a:r>
+            <a:endParaRPr lang="es-ES" dirty="0"/>
+          </a:p>
+          <a:p>
+            <a:pPr marL="0" indent="0" rtl="0">
+              <a:buNone/>
+            </a:pPr>
+            <a:r>
+              <a:rPr lang="es-ES" dirty="0"/>
+              <a:t>Aplicación a datos reales</a:t>
+            </a:r>
+          </a:p>
+        </p:txBody>
+      </p:sp>
+      <p:sp>
+        <p:nvSpPr>
+          <p:cNvPr id="6" name="Marcador de número de diapositiva 5">
+            <a:extLst>
+              <a:ext uri="{FF2B5EF4-FFF2-40B4-BE49-F238E27FC236}">
+                <a16:creationId xmlns:a16="http://schemas.microsoft.com/office/drawing/2014/main" id="{88AB1A36-2D6E-4392-AAA4-996FFE03208D}"/>
+              </a:ext>
+            </a:extLst>
+          </p:cNvPr>
+          <p:cNvSpPr>
+            <a:spLocks noGrp="1"/>
+          </p:cNvSpPr>
+          <p:nvPr>
+            <p:ph type="sldNum" sz="quarter" idx="12"/>
+          </p:nvPr>
+        </p:nvSpPr>
+        <p:spPr/>
+        <p:txBody>
+          <a:bodyPr rtlCol="0"/>
+          <a:lstStyle/>
+          <a:p>
+            <a:pPr marL="0" marR="0" lvl="0" indent="0" algn="r" defTabSz="914400" rtl="0" eaLnBrk="1" fontAlgn="auto" latinLnBrk="0" hangingPunct="1">
+              <a:lnSpc>
+                <a:spcPct val="100000"/>
+              </a:lnSpc>
+              <a:spcBef>
+                <a:spcPts val="0"/>
+              </a:spcBef>
+              <a:spcAft>
+                <a:spcPts val="0"/>
+              </a:spcAft>
+              <a:buClrTx/>
+              <a:buSzTx/>
+              <a:buFontTx/>
+              <a:buNone/>
+              <a:tabLst/>
+              <a:defRPr/>
+            </a:pPr>
+            <a:fld id="{D76B855D-E9CC-4FF8-AD85-6CDC7B89A0DE}" type="slidenum">
+              <a:rPr kumimoji="0" lang="es-ES" sz="1200" b="0" i="0" u="none" strike="noStrike" kern="1200" cap="none" spc="0" normalizeH="0" baseline="0" smtClean="0">
+                <a:ln>
+                  <a:noFill/>
+                </a:ln>
+                <a:solidFill>
+                  <a:prstClr val="black">
+                    <a:tint val="75000"/>
+                  </a:prstClr>
+                </a:solidFill>
+                <a:effectLst/>
+                <a:uLnTx/>
+                <a:uFillTx/>
+                <a:latin typeface="Calibri" panose="020F0502020204030204"/>
+                <a:ea typeface="+mn-ea"/>
+                <a:cs typeface="+mn-cs"/>
+              </a:rPr>
+              <a:pPr marL="0" marR="0" lvl="0" indent="0" algn="r" defTabSz="914400" rtl="0" eaLnBrk="1" fontAlgn="auto" latinLnBrk="0" hangingPunct="1">
+                <a:lnSpc>
+                  <a:spcPct val="100000"/>
+                </a:lnSpc>
+                <a:spcBef>
+                  <a:spcPts val="0"/>
+                </a:spcBef>
+                <a:spcAft>
+                  <a:spcPts val="0"/>
+                </a:spcAft>
+                <a:buClrTx/>
+                <a:buSzTx/>
+                <a:buFontTx/>
+                <a:buNone/>
+                <a:tabLst/>
+                <a:defRPr/>
+              </a:pPr>
+              <a:t>2</a:t>
+            </a:fld>
+            <a:endParaRPr kumimoji="0" lang="es-ES" sz="1200" b="0" i="0" u="none" strike="noStrike" kern="1200" cap="none" spc="0" normalizeH="0" baseline="0">
+              <a:ln>
+                <a:noFill/>
+              </a:ln>
+              <a:solidFill>
+                <a:prstClr val="black">
+                  <a:tint val="75000"/>
+                </a:prstClr>
+              </a:solidFill>
+              <a:effectLst/>
+              <a:uLnTx/>
+              <a:uFillTx/>
+              <a:latin typeface="Calibri" panose="020F0502020204030204"/>
+              <a:ea typeface="+mn-ea"/>
+              <a:cs typeface="+mn-cs"/>
+            </a:endParaRPr>
+          </a:p>
+        </p:txBody>
+      </p:sp>
+    </p:spTree>
+    <p:extLst>
+      <p:ext uri="{BB962C8B-B14F-4D97-AF65-F5344CB8AC3E}">
+        <p14:creationId xmlns:p14="http://schemas.microsoft.com/office/powerpoint/2010/main" val="55160260"/>
+      </p:ext>
+    </p:extLst>
+  </p:cSld>
+  <p:clrMapOvr>
+    <a:masterClrMapping/>
+  </p:clrMapOvr>
+</p:sld>
+</file>
+
+<file path=ppt/slides/slide20.xml><?xml version="1.0" encoding="utf-8"?>
+<p:sld xmlns:a="http://schemas.openxmlformats.org/drawingml/2006/main" xmlns:r="http://schemas.openxmlformats.org/officeDocument/2006/relationships" xmlns:p="http://schemas.openxmlformats.org/presentationml/2006/main">
+  <p:cSld>
+    <p:spTree>
+      <p:nvGrpSpPr>
+        <p:cNvPr id="1" name=""/>
+        <p:cNvGrpSpPr/>
+        <p:nvPr/>
+      </p:nvGrpSpPr>
+      <p:grpSpPr>
+        <a:xfrm>
+          <a:off x="0" y="0"/>
+          <a:ext cx="0" cy="0"/>
+          <a:chOff x="0" y="0"/>
+          <a:chExt cx="0" cy="0"/>
+        </a:xfrm>
+      </p:grpSpPr>
+      <p:sp>
+        <p:nvSpPr>
+          <p:cNvPr id="71" name="Title 1">
+            <a:extLst>
+              <a:ext uri="{FF2B5EF4-FFF2-40B4-BE49-F238E27FC236}">
+                <a16:creationId xmlns:a16="http://schemas.microsoft.com/office/drawing/2014/main" id="{769E5028-762C-4BBF-8875-CD5D6B9F4677}"/>
+              </a:ext>
+            </a:extLst>
+          </p:cNvPr>
+          <p:cNvSpPr>
+            <a:spLocks noGrp="1"/>
+          </p:cNvSpPr>
+          <p:nvPr>
+            <p:ph type="title"/>
+          </p:nvPr>
+        </p:nvSpPr>
         <p:spPr>
           <a:xfrm>
             <a:off x="838200" y="365125"/>
@@ -15115,8 +16909,8 @@
           </a:p>
         </p:txBody>
       </p:sp>
-      <mc:AlternateContent xmlns:mc="http://schemas.openxmlformats.org/markup-compatibility/2006">
-        <mc:Choice xmlns:a14="http://schemas.microsoft.com/office/drawing/2010/main" Requires="a14">
+      <mc:AlternateContent xmlns:mc="http://schemas.openxmlformats.org/markup-compatibility/2006" xmlns:a14="http://schemas.microsoft.com/office/drawing/2010/main">
+        <mc:Choice Requires="a14">
           <p:sp>
             <p:nvSpPr>
               <p:cNvPr id="3" name="Marcador de contenido 2">
@@ -15659,7 +17453,7 @@
             </p:txBody>
           </p:sp>
         </mc:Choice>
-        <mc:Fallback>
+        <mc:Fallback xmlns="">
           <p:sp>
             <p:nvSpPr>
               <p:cNvPr id="3" name="Marcador de contenido 2">
@@ -15740,15 +17534,6 @@
           <a:solidFill>
             <a:srgbClr val="FFFFFF"/>
           </a:solidFill>
-          <a:extLst>
-            <a:ext uri="{909E8E84-426E-40DD-AFC4-6F175D3DCCD1}">
-              <a14:hiddenFill xmlns:a14="http://schemas.microsoft.com/office/drawing/2010/main">
-                <a:solidFill>
-                  <a:srgbClr val="FFFFFF"/>
-                </a:solidFill>
-              </a14:hiddenFill>
-            </a:ext>
-          </a:extLst>
         </p:spPr>
       </p:pic>
       <p:sp>
@@ -15799,7 +17584,7 @@
                 </a:spcAft>
                 <a:defRPr/>
               </a:pPr>
-              <a:t>15</a:t>
+              <a:t>20</a:t>
             </a:fld>
             <a:endParaRPr lang="es-ES" noProof="0">
               <a:solidFill>
@@ -15824,7 +17609,7 @@
 </p:sld>
 </file>
 
-<file path=ppt/slides/slide16.xml><?xml version="1.0" encoding="utf-8"?>
+<file path=ppt/slides/slide21.xml><?xml version="1.0" encoding="utf-8"?>
 <p:sld xmlns:a="http://schemas.openxmlformats.org/drawingml/2006/main" xmlns:r="http://schemas.openxmlformats.org/officeDocument/2006/relationships" xmlns:p="http://schemas.openxmlformats.org/presentationml/2006/main">
   <p:cSld>
     <p:spTree>
@@ -15843,6 +17628,597 @@
       </p:grpSpPr>
       <p:sp>
         <p:nvSpPr>
+          <p:cNvPr id="2" name="Título 1">
+            <a:extLst>
+              <a:ext uri="{FF2B5EF4-FFF2-40B4-BE49-F238E27FC236}">
+                <a16:creationId xmlns:a16="http://schemas.microsoft.com/office/drawing/2014/main" id="{15E79C85-C865-4DA7-8EF1-81F045D4796A}"/>
+              </a:ext>
+            </a:extLst>
+          </p:cNvPr>
+          <p:cNvSpPr>
+            <a:spLocks noGrp="1"/>
+          </p:cNvSpPr>
+          <p:nvPr>
+            <p:ph type="title"/>
+          </p:nvPr>
+        </p:nvSpPr>
+        <p:spPr>
+          <a:xfrm>
+            <a:off x="838200" y="365125"/>
+            <a:ext cx="10515600" cy="1325563"/>
+          </a:xfrm>
+        </p:spPr>
+        <p:txBody>
+          <a:bodyPr anchor="ctr">
+            <a:normAutofit/>
+          </a:bodyPr>
+          <a:lstStyle/>
+          <a:p>
+            <a:r>
+              <a:rPr lang="en-US" dirty="0" err="1"/>
+              <a:t>Resultados</a:t>
+            </a:r>
+            <a:endParaRPr lang="en-US" dirty="0"/>
+          </a:p>
+        </p:txBody>
+      </p:sp>
+      <p:sp>
+        <p:nvSpPr>
+          <p:cNvPr id="3" name="Marcador de contenido 2">
+            <a:extLst>
+              <a:ext uri="{FF2B5EF4-FFF2-40B4-BE49-F238E27FC236}">
+                <a16:creationId xmlns:a16="http://schemas.microsoft.com/office/drawing/2014/main" id="{F43B265C-25D0-475B-8B2A-B45C613BAB76}"/>
+              </a:ext>
+            </a:extLst>
+          </p:cNvPr>
+          <p:cNvSpPr>
+            <a:spLocks noGrp="1"/>
+          </p:cNvSpPr>
+          <p:nvPr>
+            <p:ph sz="half" idx="1"/>
+          </p:nvPr>
+        </p:nvSpPr>
+        <p:spPr>
+          <a:xfrm>
+            <a:off x="838200" y="1825625"/>
+            <a:ext cx="10515600" cy="4351338"/>
+          </a:xfrm>
+        </p:spPr>
+        <p:txBody>
+          <a:bodyPr>
+            <a:normAutofit/>
+          </a:bodyPr>
+          <a:lstStyle/>
+          <a:p>
+            <a:r>
+              <a:rPr lang="en-US" dirty="0"/>
+              <a:t>Se </a:t>
+            </a:r>
+            <a:r>
+              <a:rPr lang="en-US" dirty="0" err="1"/>
+              <a:t>realizó</a:t>
+            </a:r>
+            <a:r>
+              <a:rPr lang="en-US" dirty="0"/>
+              <a:t> el </a:t>
+            </a:r>
+            <a:r>
+              <a:rPr lang="en-US" dirty="0" err="1"/>
+              <a:t>ejercicio</a:t>
+            </a:r>
+            <a:r>
+              <a:rPr lang="en-US" dirty="0"/>
+              <a:t> con 3 </a:t>
+            </a:r>
+            <a:r>
+              <a:rPr lang="en-US" dirty="0" err="1"/>
+              <a:t>distintos</a:t>
+            </a:r>
+            <a:r>
+              <a:rPr lang="en-US" dirty="0"/>
+              <a:t> </a:t>
+            </a:r>
+            <a:r>
+              <a:rPr lang="en-US" dirty="0" err="1"/>
+              <a:t>paquetes</a:t>
+            </a:r>
+            <a:r>
+              <a:rPr lang="en-US" dirty="0"/>
+              <a:t> (</a:t>
+            </a:r>
+            <a:r>
+              <a:rPr lang="es-MX" i="1" dirty="0" err="1"/>
+              <a:t>ffmaxflow</a:t>
+            </a:r>
+            <a:r>
+              <a:rPr lang="es-MX" i="1" dirty="0"/>
+              <a:t>, </a:t>
+            </a:r>
+            <a:r>
+              <a:rPr lang="es-MX" i="1" dirty="0" err="1"/>
+              <a:t>ffmaxc</a:t>
+            </a:r>
+            <a:r>
+              <a:rPr lang="es-MX" i="1" dirty="0"/>
+              <a:t> y </a:t>
+            </a:r>
+            <a:r>
+              <a:rPr lang="es-MX" i="1" dirty="0" err="1"/>
+              <a:t>networkx</a:t>
+            </a:r>
+            <a:r>
+              <a:rPr lang="es-MX" dirty="0"/>
+              <a:t>) y se comparó el tiempo de ejecución de cado uno de ellos.</a:t>
+            </a:r>
+            <a:endParaRPr lang="en-US" dirty="0"/>
+          </a:p>
+        </p:txBody>
+      </p:sp>
+      <p:sp>
+        <p:nvSpPr>
+          <p:cNvPr id="5" name="Marcador de fecha 4">
+            <a:extLst>
+              <a:ext uri="{FF2B5EF4-FFF2-40B4-BE49-F238E27FC236}">
+                <a16:creationId xmlns:a16="http://schemas.microsoft.com/office/drawing/2014/main" id="{8BB584FD-6084-4492-BA1A-FBC794F21754}"/>
+              </a:ext>
+            </a:extLst>
+          </p:cNvPr>
+          <p:cNvSpPr>
+            <a:spLocks noGrp="1"/>
+          </p:cNvSpPr>
+          <p:nvPr>
+            <p:ph type="dt" sz="half" idx="10"/>
+          </p:nvPr>
+        </p:nvSpPr>
+        <p:spPr>
+          <a:xfrm>
+            <a:off x="838200" y="6356350"/>
+            <a:ext cx="2743200" cy="365125"/>
+          </a:xfrm>
+        </p:spPr>
+        <p:txBody>
+          <a:bodyPr anchor="ctr">
+            <a:normAutofit/>
+          </a:bodyPr>
+          <a:lstStyle/>
+          <a:p>
+            <a:pPr rtl="0">
+              <a:spcAft>
+                <a:spcPts val="600"/>
+              </a:spcAft>
+              <a:defRPr/>
+            </a:pPr>
+            <a:r>
+              <a:rPr lang="es-ES" noProof="0">
+                <a:solidFill>
+                  <a:prstClr val="black">
+                    <a:tint val="75000"/>
+                  </a:prstClr>
+                </a:solidFill>
+              </a:rPr>
+              <a:t>3/9/20XX</a:t>
+            </a:r>
+          </a:p>
+        </p:txBody>
+      </p:sp>
+      <p:sp>
+        <p:nvSpPr>
+          <p:cNvPr id="6" name="Marcador de pie de página 5">
+            <a:extLst>
+              <a:ext uri="{FF2B5EF4-FFF2-40B4-BE49-F238E27FC236}">
+                <a16:creationId xmlns:a16="http://schemas.microsoft.com/office/drawing/2014/main" id="{9E1BE0B4-D3F5-402F-B747-BB1D72EFD2BE}"/>
+              </a:ext>
+            </a:extLst>
+          </p:cNvPr>
+          <p:cNvSpPr>
+            <a:spLocks noGrp="1"/>
+          </p:cNvSpPr>
+          <p:nvPr>
+            <p:ph type="ftr" sz="quarter" idx="11"/>
+          </p:nvPr>
+        </p:nvSpPr>
+        <p:spPr>
+          <a:xfrm>
+            <a:off x="4038600" y="6356350"/>
+            <a:ext cx="4114800" cy="365125"/>
+          </a:xfrm>
+        </p:spPr>
+        <p:txBody>
+          <a:bodyPr anchor="ctr">
+            <a:normAutofit/>
+          </a:bodyPr>
+          <a:lstStyle/>
+          <a:p>
+            <a:pPr rtl="0">
+              <a:spcAft>
+                <a:spcPts val="600"/>
+              </a:spcAft>
+              <a:defRPr/>
+            </a:pPr>
+            <a:r>
+              <a:rPr lang="es-ES" noProof="0">
+                <a:solidFill>
+                  <a:prstClr val="black">
+                    <a:tint val="75000"/>
+                  </a:prstClr>
+                </a:solidFill>
+              </a:rPr>
+              <a:t>Título de la presentación</a:t>
+            </a:r>
+          </a:p>
+        </p:txBody>
+      </p:sp>
+      <p:sp>
+        <p:nvSpPr>
+          <p:cNvPr id="7" name="Marcador de número de diapositiva 6">
+            <a:extLst>
+              <a:ext uri="{FF2B5EF4-FFF2-40B4-BE49-F238E27FC236}">
+                <a16:creationId xmlns:a16="http://schemas.microsoft.com/office/drawing/2014/main" id="{9065B48F-F636-4381-AB7F-F9C6D8562E83}"/>
+              </a:ext>
+            </a:extLst>
+          </p:cNvPr>
+          <p:cNvSpPr>
+            <a:spLocks noGrp="1"/>
+          </p:cNvSpPr>
+          <p:nvPr>
+            <p:ph type="sldNum" sz="quarter" idx="12"/>
+          </p:nvPr>
+        </p:nvSpPr>
+        <p:spPr>
+          <a:xfrm>
+            <a:off x="8610600" y="6356350"/>
+            <a:ext cx="2743200" cy="365125"/>
+          </a:xfrm>
+        </p:spPr>
+        <p:txBody>
+          <a:bodyPr anchor="ctr">
+            <a:normAutofit/>
+          </a:bodyPr>
+          <a:lstStyle/>
+          <a:p>
+            <a:pPr rtl="0">
+              <a:spcAft>
+                <a:spcPts val="600"/>
+              </a:spcAft>
+              <a:defRPr/>
+            </a:pPr>
+            <a:fld id="{D76B855D-E9CC-4FF8-AD85-6CDC7B89A0DE}" type="slidenum">
+              <a:rPr lang="es-ES" noProof="0" smtClean="0">
+                <a:solidFill>
+                  <a:prstClr val="black">
+                    <a:tint val="75000"/>
+                  </a:prstClr>
+                </a:solidFill>
+              </a:rPr>
+              <a:pPr rtl="0">
+                <a:spcAft>
+                  <a:spcPts val="600"/>
+                </a:spcAft>
+                <a:defRPr/>
+              </a:pPr>
+              <a:t>21</a:t>
+            </a:fld>
+            <a:endParaRPr lang="es-ES" noProof="0">
+              <a:solidFill>
+                <a:prstClr val="black">
+                  <a:tint val="75000"/>
+                </a:prstClr>
+              </a:solidFill>
+            </a:endParaRPr>
+          </a:p>
+        </p:txBody>
+      </p:sp>
+      <p:graphicFrame>
+        <p:nvGraphicFramePr>
+          <p:cNvPr id="10" name="Tabla 9">
+            <a:extLst>
+              <a:ext uri="{FF2B5EF4-FFF2-40B4-BE49-F238E27FC236}">
+                <a16:creationId xmlns:a16="http://schemas.microsoft.com/office/drawing/2014/main" id="{3B430DC6-CB10-4B5A-9E87-B4D6B8D29CE6}"/>
+              </a:ext>
+            </a:extLst>
+          </p:cNvPr>
+          <p:cNvGraphicFramePr>
+            <a:graphicFrameLocks noGrp="1"/>
+          </p:cNvGraphicFramePr>
+          <p:nvPr>
+            <p:extLst>
+              <p:ext uri="{D42A27DB-BD31-4B8C-83A1-F6EECF244321}">
+                <p14:modId xmlns:p14="http://schemas.microsoft.com/office/powerpoint/2010/main" val="1435988066"/>
+              </p:ext>
+            </p:extLst>
+          </p:nvPr>
+        </p:nvGraphicFramePr>
+        <p:xfrm>
+          <a:off x="1854201" y="3827583"/>
+          <a:ext cx="8127999" cy="1483360"/>
+        </p:xfrm>
+        <a:graphic>
+          <a:graphicData uri="http://schemas.openxmlformats.org/drawingml/2006/table">
+            <a:tbl>
+              <a:tblPr firstRow="1" bandRow="1">
+                <a:tableStyleId>{21E4AEA4-8DFA-4A89-87EB-49C32662AFE0}</a:tableStyleId>
+              </a:tblPr>
+              <a:tblGrid>
+                <a:gridCol w="2709333">
+                  <a:extLst>
+                    <a:ext uri="{9D8B030D-6E8A-4147-A177-3AD203B41FA5}">
+                      <a16:colId xmlns:a16="http://schemas.microsoft.com/office/drawing/2014/main" val="1629945468"/>
+                    </a:ext>
+                  </a:extLst>
+                </a:gridCol>
+                <a:gridCol w="2709333">
+                  <a:extLst>
+                    <a:ext uri="{9D8B030D-6E8A-4147-A177-3AD203B41FA5}">
+                      <a16:colId xmlns:a16="http://schemas.microsoft.com/office/drawing/2014/main" val="1152541639"/>
+                    </a:ext>
+                  </a:extLst>
+                </a:gridCol>
+                <a:gridCol w="2709333">
+                  <a:extLst>
+                    <a:ext uri="{9D8B030D-6E8A-4147-A177-3AD203B41FA5}">
+                      <a16:colId xmlns:a16="http://schemas.microsoft.com/office/drawing/2014/main" val="1414973209"/>
+                    </a:ext>
+                  </a:extLst>
+                </a:gridCol>
+              </a:tblGrid>
+              <a:tr h="370840">
+                <a:tc>
+                  <a:txBody>
+                    <a:bodyPr/>
+                    <a:lstStyle/>
+                    <a:p>
+                      <a:r>
+                        <a:rPr lang="en-US" dirty="0" err="1"/>
+                        <a:t>Método</a:t>
+                      </a:r>
+                      <a:endParaRPr lang="en-US" dirty="0"/>
+                    </a:p>
+                  </a:txBody>
+                  <a:tcPr/>
+                </a:tc>
+                <a:tc>
+                  <a:txBody>
+                    <a:bodyPr/>
+                    <a:lstStyle/>
+                    <a:p>
+                      <a:r>
+                        <a:rPr lang="en-US" dirty="0" err="1"/>
+                        <a:t>Resultado</a:t>
+                      </a:r>
+                      <a:endParaRPr lang="en-US" dirty="0"/>
+                    </a:p>
+                  </a:txBody>
+                  <a:tcPr/>
+                </a:tc>
+                <a:tc>
+                  <a:txBody>
+                    <a:bodyPr/>
+                    <a:lstStyle/>
+                    <a:p>
+                      <a:r>
+                        <a:rPr lang="en-US" dirty="0" err="1"/>
+                        <a:t>Tiempo</a:t>
+                      </a:r>
+                      <a:r>
+                        <a:rPr lang="en-US" dirty="0"/>
+                        <a:t> de </a:t>
+                      </a:r>
+                      <a:r>
+                        <a:rPr lang="en-US" dirty="0" err="1"/>
+                        <a:t>ejecución</a:t>
+                      </a:r>
+                      <a:endParaRPr lang="en-US" dirty="0"/>
+                    </a:p>
+                  </a:txBody>
+                  <a:tcPr/>
+                </a:tc>
+                <a:extLst>
+                  <a:ext uri="{0D108BD9-81ED-4DB2-BD59-A6C34878D82A}">
+                    <a16:rowId xmlns:a16="http://schemas.microsoft.com/office/drawing/2014/main" val="416732907"/>
+                  </a:ext>
+                </a:extLst>
+              </a:tr>
+              <a:tr h="370840">
+                <a:tc>
+                  <a:txBody>
+                    <a:bodyPr/>
+                    <a:lstStyle/>
+                    <a:p>
+                      <a:r>
+                        <a:rPr lang="es-MX" sz="1800" b="0" i="0" kern="1200" dirty="0" err="1">
+                          <a:solidFill>
+                            <a:schemeClr val="dk1"/>
+                          </a:solidFill>
+                          <a:effectLst/>
+                          <a:latin typeface="+mn-lt"/>
+                          <a:ea typeface="+mn-ea"/>
+                          <a:cs typeface="+mn-cs"/>
+                        </a:rPr>
+                        <a:t>ffmaxflow</a:t>
+                      </a:r>
+                      <a:endParaRPr lang="en-US" dirty="0"/>
+                    </a:p>
+                  </a:txBody>
+                  <a:tcPr/>
+                </a:tc>
+                <a:tc>
+                  <a:txBody>
+                    <a:bodyPr/>
+                    <a:lstStyle/>
+                    <a:p>
+                      <a:r>
+                        <a:rPr lang="en-US" dirty="0"/>
+                        <a:t>10,179</a:t>
+                      </a:r>
+                    </a:p>
+                  </a:txBody>
+                  <a:tcPr/>
+                </a:tc>
+                <a:tc>
+                  <a:txBody>
+                    <a:bodyPr/>
+                    <a:lstStyle/>
+                    <a:p>
+                      <a:r>
+                        <a:rPr lang="en-US" dirty="0"/>
+                        <a:t>64 s</a:t>
+                      </a:r>
+                    </a:p>
+                  </a:txBody>
+                  <a:tcPr/>
+                </a:tc>
+                <a:extLst>
+                  <a:ext uri="{0D108BD9-81ED-4DB2-BD59-A6C34878D82A}">
+                    <a16:rowId xmlns:a16="http://schemas.microsoft.com/office/drawing/2014/main" val="3856107920"/>
+                  </a:ext>
+                </a:extLst>
+              </a:tr>
+              <a:tr h="370840">
+                <a:tc>
+                  <a:txBody>
+                    <a:bodyPr/>
+                    <a:lstStyle/>
+                    <a:p>
+                      <a:r>
+                        <a:rPr lang="es-MX" sz="1800" b="0" i="0" kern="1200" dirty="0" err="1">
+                          <a:solidFill>
+                            <a:schemeClr val="dk1"/>
+                          </a:solidFill>
+                          <a:effectLst/>
+                          <a:latin typeface="+mn-lt"/>
+                          <a:ea typeface="+mn-ea"/>
+                          <a:cs typeface="+mn-cs"/>
+                        </a:rPr>
+                        <a:t>ffmaxflowc</a:t>
+                      </a:r>
+                      <a:endParaRPr lang="en-US" dirty="0"/>
+                    </a:p>
+                  </a:txBody>
+                  <a:tcPr/>
+                </a:tc>
+                <a:tc>
+                  <a:txBody>
+                    <a:bodyPr/>
+                    <a:lstStyle/>
+                    <a:p>
+                      <a:r>
+                        <a:rPr lang="en-US" dirty="0"/>
+                        <a:t>10,179</a:t>
+                      </a:r>
+                    </a:p>
+                  </a:txBody>
+                  <a:tcPr/>
+                </a:tc>
+                <a:tc>
+                  <a:txBody>
+                    <a:bodyPr/>
+                    <a:lstStyle/>
+                    <a:p>
+                      <a:r>
+                        <a:rPr lang="en-US" dirty="0"/>
+                        <a:t>56 s</a:t>
+                      </a:r>
+                    </a:p>
+                  </a:txBody>
+                  <a:tcPr/>
+                </a:tc>
+                <a:extLst>
+                  <a:ext uri="{0D108BD9-81ED-4DB2-BD59-A6C34878D82A}">
+                    <a16:rowId xmlns:a16="http://schemas.microsoft.com/office/drawing/2014/main" val="3099703105"/>
+                  </a:ext>
+                </a:extLst>
+              </a:tr>
+              <a:tr h="370840">
+                <a:tc>
+                  <a:txBody>
+                    <a:bodyPr/>
+                    <a:lstStyle/>
+                    <a:p>
+                      <a:r>
+                        <a:rPr lang="es-MX" sz="1800" b="0" i="0" kern="1200" dirty="0" err="1">
+                          <a:solidFill>
+                            <a:schemeClr val="dk1"/>
+                          </a:solidFill>
+                          <a:effectLst/>
+                          <a:latin typeface="+mn-lt"/>
+                          <a:ea typeface="+mn-ea"/>
+                          <a:cs typeface="+mn-cs"/>
+                        </a:rPr>
+                        <a:t>networkx</a:t>
+                      </a:r>
+                      <a:endParaRPr lang="en-US" dirty="0"/>
+                    </a:p>
+                  </a:txBody>
+                  <a:tcPr/>
+                </a:tc>
+                <a:tc>
+                  <a:txBody>
+                    <a:bodyPr/>
+                    <a:lstStyle/>
+                    <a:p>
+                      <a:r>
+                        <a:rPr lang="en-US" dirty="0"/>
+                        <a:t>10,179</a:t>
+                      </a:r>
+                    </a:p>
+                  </a:txBody>
+                  <a:tcPr/>
+                </a:tc>
+                <a:tc>
+                  <a:txBody>
+                    <a:bodyPr/>
+                    <a:lstStyle/>
+                    <a:p>
+                      <a:r>
+                        <a:rPr lang="en-US" dirty="0"/>
+                        <a:t>0.002 s</a:t>
+                      </a:r>
+                    </a:p>
+                  </a:txBody>
+                  <a:tcPr/>
+                </a:tc>
+                <a:extLst>
+                  <a:ext uri="{0D108BD9-81ED-4DB2-BD59-A6C34878D82A}">
+                    <a16:rowId xmlns:a16="http://schemas.microsoft.com/office/drawing/2014/main" val="3751879717"/>
+                  </a:ext>
+                </a:extLst>
+              </a:tr>
+            </a:tbl>
+          </a:graphicData>
+        </a:graphic>
+      </p:graphicFrame>
+    </p:spTree>
+    <p:extLst>
+      <p:ext uri="{BB962C8B-B14F-4D97-AF65-F5344CB8AC3E}">
+        <p14:creationId xmlns:p14="http://schemas.microsoft.com/office/powerpoint/2010/main" val="2849640408"/>
+      </p:ext>
+    </p:extLst>
+  </p:cSld>
+  <p:clrMapOvr>
+    <a:masterClrMapping/>
+  </p:clrMapOvr>
+</p:sld>
+</file>
+
+<file path=ppt/slides/slide22.xml><?xml version="1.0" encoding="utf-8"?>
+<p:sld xmlns:a="http://schemas.openxmlformats.org/drawingml/2006/main" xmlns:r="http://schemas.openxmlformats.org/officeDocument/2006/relationships" xmlns:p="http://schemas.openxmlformats.org/presentationml/2006/main">
+  <p:cSld>
+    <p:spTree>
+      <p:nvGrpSpPr>
+        <p:cNvPr id="1" name=""/>
+        <p:cNvGrpSpPr/>
+        <p:nvPr/>
+      </p:nvGrpSpPr>
+      <p:grpSpPr>
+        <a:xfrm>
+          <a:off x="0" y="0"/>
+          <a:ext cx="0" cy="0"/>
+          <a:chOff x="0" y="0"/>
+          <a:chExt cx="0" cy="0"/>
+        </a:xfrm>
+      </p:grpSpPr>
+      <p:sp>
+        <p:nvSpPr>
           <p:cNvPr id="4" name="Marcador de número de diapositiva 3">
             <a:extLst>
               <a:ext uri="{FF2B5EF4-FFF2-40B4-BE49-F238E27FC236}">
@@ -15876,7 +18252,7 @@
               <a:pPr rtl="0">
                 <a:defRPr/>
               </a:pPr>
-              <a:t>16</a:t>
+              <a:t>22</a:t>
             </a:fld>
             <a:endParaRPr lang="es-ES" noProof="0">
               <a:solidFill>
@@ -16200,15 +18576,6 @@
           <a:solidFill>
             <a:srgbClr val="FFFFFF"/>
           </a:solidFill>
-          <a:extLst>
-            <a:ext uri="{909E8E84-426E-40DD-AFC4-6F175D3DCCD1}">
-              <a14:hiddenFill xmlns:a14="http://schemas.microsoft.com/office/drawing/2010/main">
-                <a:solidFill>
-                  <a:srgbClr val="FFFFFF"/>
-                </a:solidFill>
-              </a14:hiddenFill>
-            </a:ext>
-          </a:extLst>
         </p:spPr>
       </p:pic>
       <p:pic>
@@ -16365,7 +18732,7 @@
 </p:sld>
 </file>
 
-<file path=ppt/slides/slide17.xml><?xml version="1.0" encoding="utf-8"?>
+<file path=ppt/slides/slide23.xml><?xml version="1.0" encoding="utf-8"?>
 <p:sld xmlns:a="http://schemas.openxmlformats.org/drawingml/2006/main" xmlns:r="http://schemas.openxmlformats.org/officeDocument/2006/relationships" xmlns:p="http://schemas.openxmlformats.org/presentationml/2006/main">
   <p:cSld>
     <p:spTree>
@@ -16436,7 +18803,7 @@
             <a:fld id="{D76B855D-E9CC-4FF8-AD85-6CDC7B89A0DE}" type="slidenum">
               <a:rPr lang="es-ES" smtClean="0"/>
               <a:pPr lvl="0" rtl="0"/>
-              <a:t>17</a:t>
+              <a:t>23</a:t>
             </a:fld>
             <a:endParaRPr lang="es-ES"/>
           </a:p>
@@ -16500,241 +18867,6 @@
     <p:extLst>
       <p:ext uri="{BB962C8B-B14F-4D97-AF65-F5344CB8AC3E}">
         <p14:creationId xmlns:p14="http://schemas.microsoft.com/office/powerpoint/2010/main" val="962258905"/>
-      </p:ext>
-    </p:extLst>
-  </p:cSld>
-  <p:clrMapOvr>
-    <a:masterClrMapping/>
-  </p:clrMapOvr>
-</p:sld>
-</file>
-
-<file path=ppt/slides/slide2.xml><?xml version="1.0" encoding="utf-8"?>
-<p:sld xmlns:a="http://schemas.openxmlformats.org/drawingml/2006/main" xmlns:r="http://schemas.openxmlformats.org/officeDocument/2006/relationships" xmlns:p="http://schemas.openxmlformats.org/presentationml/2006/main">
-  <p:cSld>
-    <p:spTree>
-      <p:nvGrpSpPr>
-        <p:cNvPr id="1" name=""/>
-        <p:cNvGrpSpPr/>
-        <p:nvPr/>
-      </p:nvGrpSpPr>
-      <p:grpSpPr>
-        <a:xfrm>
-          <a:off x="0" y="0"/>
-          <a:ext cx="0" cy="0"/>
-          <a:chOff x="0" y="0"/>
-          <a:chExt cx="0" cy="0"/>
-        </a:xfrm>
-      </p:grpSpPr>
-      <p:sp>
-        <p:nvSpPr>
-          <p:cNvPr id="2" name="Título 1">
-            <a:extLst>
-              <a:ext uri="{FF2B5EF4-FFF2-40B4-BE49-F238E27FC236}">
-                <a16:creationId xmlns:a16="http://schemas.microsoft.com/office/drawing/2014/main" id="{1836E49C-11A0-4C95-8A6E-FC7E9C57C105}"/>
-              </a:ext>
-            </a:extLst>
-          </p:cNvPr>
-          <p:cNvSpPr>
-            <a:spLocks noGrp="1"/>
-          </p:cNvSpPr>
-          <p:nvPr>
-            <p:ph type="title"/>
-          </p:nvPr>
-        </p:nvSpPr>
-        <p:spPr/>
-        <p:txBody>
-          <a:bodyPr rtlCol="0"/>
-          <a:lstStyle/>
-          <a:p>
-            <a:pPr rtl="0"/>
-            <a:r>
-              <a:rPr lang="es-ES">
-                <a:solidFill>
-                  <a:srgbClr val="FFFFFF"/>
-                </a:solidFill>
-              </a:rPr>
-              <a:t>Agenda</a:t>
-            </a:r>
-            <a:endParaRPr lang="es-ES"/>
-          </a:p>
-        </p:txBody>
-      </p:sp>
-      <p:sp>
-        <p:nvSpPr>
-          <p:cNvPr id="3" name="Marcador de contenido 2">
-            <a:extLst>
-              <a:ext uri="{FF2B5EF4-FFF2-40B4-BE49-F238E27FC236}">
-                <a16:creationId xmlns:a16="http://schemas.microsoft.com/office/drawing/2014/main" id="{869C3FD2-AF88-4EF1-AFB7-5D31BD5AA0BF}"/>
-              </a:ext>
-            </a:extLst>
-          </p:cNvPr>
-          <p:cNvSpPr>
-            <a:spLocks noGrp="1"/>
-          </p:cNvSpPr>
-          <p:nvPr>
-            <p:ph idx="1"/>
-          </p:nvPr>
-        </p:nvSpPr>
-        <p:spPr>
-          <a:xfrm>
-            <a:off x="5788152" y="1527048"/>
-            <a:ext cx="5565648" cy="3931920"/>
-          </a:xfrm>
-        </p:spPr>
-        <p:txBody>
-          <a:bodyPr rtlCol="0"/>
-          <a:lstStyle/>
-          <a:p>
-            <a:pPr marL="0" indent="0" rtl="0">
-              <a:buNone/>
-            </a:pPr>
-            <a:r>
-              <a:rPr lang="es-ES" dirty="0"/>
-              <a:t>Algoritmo Ford – </a:t>
-            </a:r>
-            <a:r>
-              <a:rPr lang="es-ES" dirty="0" err="1"/>
-              <a:t>Fulkerson</a:t>
-            </a:r>
-            <a:endParaRPr lang="es-ES" dirty="0"/>
-          </a:p>
-          <a:p>
-            <a:pPr marL="0" indent="0" rtl="0">
-              <a:buNone/>
-            </a:pPr>
-            <a:r>
-              <a:rPr lang="es-ES" dirty="0"/>
-              <a:t>Desarrollo de </a:t>
-            </a:r>
-            <a:r>
-              <a:rPr lang="es-ES" dirty="0" err="1"/>
-              <a:t>ffmaxflow</a:t>
-            </a:r>
-            <a:endParaRPr lang="es-ES" dirty="0"/>
-          </a:p>
-          <a:p>
-            <a:pPr marL="0" indent="0" rtl="0">
-              <a:buNone/>
-            </a:pPr>
-            <a:r>
-              <a:rPr lang="es-ES" dirty="0"/>
-              <a:t>Reimplementación de </a:t>
-            </a:r>
-            <a:r>
-              <a:rPr lang="es-ES" dirty="0" err="1"/>
-              <a:t>ffmaxflow</a:t>
-            </a:r>
-            <a:endParaRPr lang="es-ES" dirty="0"/>
-          </a:p>
-          <a:p>
-            <a:pPr marL="0" indent="0" rtl="0">
-              <a:buNone/>
-            </a:pPr>
-            <a:r>
-              <a:rPr lang="es-ES" dirty="0"/>
-              <a:t>Aplicación a datos reales</a:t>
-            </a:r>
-          </a:p>
-        </p:txBody>
-      </p:sp>
-      <p:sp>
-        <p:nvSpPr>
-          <p:cNvPr id="6" name="Marcador de número de diapositiva 5">
-            <a:extLst>
-              <a:ext uri="{FF2B5EF4-FFF2-40B4-BE49-F238E27FC236}">
-                <a16:creationId xmlns:a16="http://schemas.microsoft.com/office/drawing/2014/main" id="{88AB1A36-2D6E-4392-AAA4-996FFE03208D}"/>
-              </a:ext>
-            </a:extLst>
-          </p:cNvPr>
-          <p:cNvSpPr>
-            <a:spLocks noGrp="1"/>
-          </p:cNvSpPr>
-          <p:nvPr>
-            <p:ph type="sldNum" sz="quarter" idx="12"/>
-          </p:nvPr>
-        </p:nvSpPr>
-        <p:spPr/>
-        <p:txBody>
-          <a:bodyPr rtlCol="0"/>
-          <a:lstStyle/>
-          <a:p>
-            <a:pPr marL="0" marR="0" lvl="0" indent="0" algn="r" defTabSz="914400" rtl="0" eaLnBrk="1" fontAlgn="auto" latinLnBrk="0" hangingPunct="1">
-              <a:lnSpc>
-                <a:spcPct val="100000"/>
-              </a:lnSpc>
-              <a:spcBef>
-                <a:spcPts val="0"/>
-              </a:spcBef>
-              <a:spcAft>
-                <a:spcPts val="0"/>
-              </a:spcAft>
-              <a:buClrTx/>
-              <a:buSzTx/>
-              <a:buFontTx/>
-              <a:buNone/>
-              <a:tabLst/>
-              <a:defRPr/>
-            </a:pPr>
-            <a:fld id="{D76B855D-E9CC-4FF8-AD85-6CDC7B89A0DE}" type="slidenum">
-              <a:rPr kumimoji="0" lang="es-ES" sz="1200" b="0" i="0" u="none" strike="noStrike" kern="1200" cap="none" spc="0" normalizeH="0" baseline="0" smtClean="0">
-                <a:ln>
-                  <a:noFill/>
-                </a:ln>
-                <a:solidFill>
-                  <a:prstClr val="black">
-                    <a:tint val="75000"/>
-                  </a:prstClr>
-                </a:solidFill>
-                <a:effectLst/>
-                <a:uLnTx/>
-                <a:uFillTx/>
-                <a:latin typeface="Calibri" panose="020F0502020204030204"/>
-                <a:ea typeface="+mn-ea"/>
-                <a:cs typeface="+mn-cs"/>
-              </a:rPr>
-              <a:pPr marL="0" marR="0" lvl="0" indent="0" algn="r" defTabSz="914400" rtl="0" eaLnBrk="1" fontAlgn="auto" latinLnBrk="0" hangingPunct="1">
-                <a:lnSpc>
-                  <a:spcPct val="100000"/>
-                </a:lnSpc>
-                <a:spcBef>
-                  <a:spcPts val="0"/>
-                </a:spcBef>
-                <a:spcAft>
-                  <a:spcPts val="0"/>
-                </a:spcAft>
-                <a:buClrTx/>
-                <a:buSzTx/>
-                <a:buFontTx/>
-                <a:buNone/>
-                <a:tabLst/>
-                <a:defRPr/>
-              </a:pPr>
-              <a:t>2</a:t>
-            </a:fld>
-            <a:endParaRPr kumimoji="0" lang="es-ES" sz="1200" b="0" i="0" u="none" strike="noStrike" kern="1200" cap="none" spc="0" normalizeH="0" baseline="0">
-              <a:ln>
-                <a:noFill/>
-              </a:ln>
-              <a:solidFill>
-                <a:prstClr val="black">
-                  <a:tint val="75000"/>
-                </a:prstClr>
-              </a:solidFill>
-              <a:effectLst/>
-              <a:uLnTx/>
-              <a:uFillTx/>
-              <a:latin typeface="Calibri" panose="020F0502020204030204"/>
-              <a:ea typeface="+mn-ea"/>
-              <a:cs typeface="+mn-cs"/>
-            </a:endParaRPr>
-          </a:p>
-        </p:txBody>
-      </p:sp>
-    </p:spTree>
-    <p:extLst>
-      <p:ext uri="{BB962C8B-B14F-4D97-AF65-F5344CB8AC3E}">
-        <p14:creationId xmlns:p14="http://schemas.microsoft.com/office/powerpoint/2010/main" val="55160260"/>
       </p:ext>
     </p:extLst>
   </p:cSld>
@@ -16797,8 +18929,8 @@
           </a:p>
         </p:txBody>
       </p:sp>
-      <mc:AlternateContent xmlns:mc="http://schemas.openxmlformats.org/markup-compatibility/2006">
-        <mc:Choice xmlns:a14="http://schemas.microsoft.com/office/drawing/2010/main" Requires="a14">
+      <mc:AlternateContent xmlns:mc="http://schemas.openxmlformats.org/markup-compatibility/2006" xmlns:a14="http://schemas.microsoft.com/office/drawing/2010/main">
+        <mc:Choice Requires="a14">
           <p:sp>
             <p:nvSpPr>
               <p:cNvPr id="5" name="Marcador de contenido 4">
@@ -16912,7 +19044,7 @@
             </p:txBody>
           </p:sp>
         </mc:Choice>
-        <mc:Fallback>
+        <mc:Fallback xmlns="">
           <p:sp>
             <p:nvSpPr>
               <p:cNvPr id="5" name="Marcador de contenido 4">
@@ -16995,15 +19127,6 @@
           <a:solidFill>
             <a:srgbClr val="FFFFFF"/>
           </a:solidFill>
-          <a:extLst>
-            <a:ext uri="{909E8E84-426E-40DD-AFC4-6F175D3DCCD1}">
-              <a14:hiddenFill xmlns:a14="http://schemas.microsoft.com/office/drawing/2010/main">
-                <a:solidFill>
-                  <a:srgbClr val="FFFFFF"/>
-                </a:solidFill>
-              </a14:hiddenFill>
-            </a:ext>
-          </a:extLst>
         </p:spPr>
       </p:pic>
       <p:sp>
@@ -17352,8 +19475,8 @@
           </a:p>
         </p:txBody>
       </p:sp>
-      <mc:AlternateContent xmlns:mc="http://schemas.openxmlformats.org/markup-compatibility/2006">
-        <mc:Choice xmlns:a14="http://schemas.microsoft.com/office/drawing/2010/main" Requires="a14">
+      <mc:AlternateContent xmlns:mc="http://schemas.openxmlformats.org/markup-compatibility/2006" xmlns:a14="http://schemas.microsoft.com/office/drawing/2010/main">
+        <mc:Choice Requires="a14">
           <p:sp>
             <p:nvSpPr>
               <p:cNvPr id="5" name="Marcador de contenido 4">
@@ -18143,7 +20266,7 @@
             </p:txBody>
           </p:sp>
         </mc:Choice>
-        <mc:Fallback>
+        <mc:Fallback xmlns="">
           <p:sp>
             <p:nvSpPr>
               <p:cNvPr id="5" name="Marcador de contenido 4">
@@ -18358,8 +20481,8 @@
           </a:p>
         </p:txBody>
       </p:sp>
-      <mc:AlternateContent xmlns:mc="http://schemas.openxmlformats.org/markup-compatibility/2006">
-        <mc:Choice xmlns:a14="http://schemas.microsoft.com/office/drawing/2010/main" Requires="a14">
+      <mc:AlternateContent xmlns:mc="http://schemas.openxmlformats.org/markup-compatibility/2006" xmlns:a14="http://schemas.microsoft.com/office/drawing/2010/main">
+        <mc:Choice Requires="a14">
           <p:sp>
             <p:nvSpPr>
               <p:cNvPr id="4" name="Marcador de contenido 3">
@@ -18475,7 +20598,7 @@
             </p:txBody>
           </p:sp>
         </mc:Choice>
-        <mc:Fallback>
+        <mc:Fallback xmlns="">
           <p:sp>
             <p:nvSpPr>
               <p:cNvPr id="4" name="Marcador de contenido 3">
@@ -18548,8 +20671,8 @@
           </a:p>
         </p:txBody>
       </p:sp>
-      <mc:AlternateContent xmlns:mc="http://schemas.openxmlformats.org/markup-compatibility/2006">
-        <mc:Choice xmlns:a14="http://schemas.microsoft.com/office/drawing/2010/main" Requires="a14">
+      <mc:AlternateContent xmlns:mc="http://schemas.openxmlformats.org/markup-compatibility/2006" xmlns:a14="http://schemas.microsoft.com/office/drawing/2010/main">
+        <mc:Choice Requires="a14">
           <p:sp>
             <p:nvSpPr>
               <p:cNvPr id="6" name="Marcador de contenido 5">
@@ -18641,7 +20764,7 @@
             </p:txBody>
           </p:sp>
         </mc:Choice>
-        <mc:Fallback>
+        <mc:Fallback xmlns="">
           <p:sp>
             <p:nvSpPr>
               <p:cNvPr id="6" name="Marcador de contenido 5">
@@ -18831,8 +20954,8 @@
           </a:p>
         </p:txBody>
       </p:sp>
-      <mc:AlternateContent xmlns:mc="http://schemas.openxmlformats.org/markup-compatibility/2006">
-        <mc:Choice xmlns:a14="http://schemas.microsoft.com/office/drawing/2010/main" Requires="a14">
+      <mc:AlternateContent xmlns:mc="http://schemas.openxmlformats.org/markup-compatibility/2006" xmlns:a14="http://schemas.microsoft.com/office/drawing/2010/main">
+        <mc:Choice Requires="a14">
           <p:sp>
             <p:nvSpPr>
               <p:cNvPr id="11" name="Marcador de contenido 10">
@@ -18958,7 +21081,7 @@
             </p:txBody>
           </p:sp>
         </mc:Choice>
-        <mc:Fallback>
+        <mc:Fallback xmlns="">
           <p:sp>
             <p:nvSpPr>
               <p:cNvPr id="11" name="Marcador de contenido 10">
@@ -19080,8 +21203,8 @@
           </a:p>
         </p:txBody>
       </p:sp>
-      <mc:AlternateContent xmlns:mc="http://schemas.openxmlformats.org/markup-compatibility/2006">
-        <mc:Choice xmlns:a14="http://schemas.microsoft.com/office/drawing/2010/main" Requires="a14">
+      <mc:AlternateContent xmlns:mc="http://schemas.openxmlformats.org/markup-compatibility/2006" xmlns:a14="http://schemas.microsoft.com/office/drawing/2010/main">
+        <mc:Choice Requires="a14">
           <p:sp>
             <p:nvSpPr>
               <p:cNvPr id="71" name="Content Placeholder 2">
@@ -19294,7 +21417,7 @@
             </p:txBody>
           </p:sp>
         </mc:Choice>
-        <mc:Fallback>
+        <mc:Fallback xmlns="">
           <p:sp>
             <p:nvSpPr>
               <p:cNvPr id="71" name="Content Placeholder 2">
@@ -19377,15 +21500,6 @@
           <a:solidFill>
             <a:srgbClr val="FFFFFF"/>
           </a:solidFill>
-          <a:extLst>
-            <a:ext uri="{909E8E84-426E-40DD-AFC4-6F175D3DCCD1}">
-              <a14:hiddenFill xmlns:a14="http://schemas.microsoft.com/office/drawing/2010/main">
-                <a:solidFill>
-                  <a:srgbClr val="FFFFFF"/>
-                </a:solidFill>
-              </a14:hiddenFill>
-            </a:ext>
-          </a:extLst>
         </p:spPr>
       </p:pic>
       <p:sp>
@@ -20740,21 +22854,21 @@
 </file>
 
 <file path=customXml/item1.xml><?xml version="1.0" encoding="utf-8"?>
+<p:properties xmlns:p="http://schemas.microsoft.com/office/2006/metadata/properties" xmlns:xsi="http://www.w3.org/2001/XMLSchema-instance" xmlns:pc="http://schemas.microsoft.com/office/infopath/2007/PartnerControls">
+  <documentManagement>
+    <Status xmlns="71af3243-3dd4-4a8d-8c0d-dd76da1f02a5">Not started</Status>
+    <MediaServiceKeyPoints xmlns="71af3243-3dd4-4a8d-8c0d-dd76da1f02a5" xsi:nil="true"/>
+  </documentManagement>
+</p:properties>
+</file>
+
+<file path=customXml/item2.xml><?xml version="1.0" encoding="utf-8"?>
 <?mso-contentType ?>
 <FormTemplates xmlns="http://schemas.microsoft.com/sharepoint/v3/contenttype/forms">
   <Display>DocumentLibraryForm</Display>
   <Edit>DocumentLibraryForm</Edit>
   <New>DocumentLibraryForm</New>
 </FormTemplates>
-</file>
-
-<file path=customXml/item2.xml><?xml version="1.0" encoding="utf-8"?>
-<p:properties xmlns:p="http://schemas.microsoft.com/office/2006/metadata/properties" xmlns:xsi="http://www.w3.org/2001/XMLSchema-instance" xmlns:pc="http://schemas.microsoft.com/office/infopath/2007/PartnerControls">
-  <documentManagement>
-    <Status xmlns="71af3243-3dd4-4a8d-8c0d-dd76da1f02a5">Not started</Status>
-    <MediaServiceKeyPoints xmlns="71af3243-3dd4-4a8d-8c0d-dd76da1f02a5" xsi:nil="true"/>
-  </documentManagement>
-</p:properties>
 </file>
 
 <file path=customXml/item3.xml><?xml version="1.0" encoding="utf-8"?>
@@ -20979,19 +23093,19 @@
 </file>
 
 <file path=customXml/itemProps1.xml><?xml version="1.0" encoding="utf-8"?>
-<ds:datastoreItem xmlns:ds="http://schemas.openxmlformats.org/officeDocument/2006/customXml" ds:itemID="{1A449C04-64B3-4403-94B7-8D2284C38D1B}">
+<ds:datastoreItem xmlns:ds="http://schemas.openxmlformats.org/officeDocument/2006/customXml" ds:itemID="{FBDEF148-1770-458F-8F5B-C3D0A278AA97}">
   <ds:schemaRefs>
-    <ds:schemaRef ds:uri="http://schemas.microsoft.com/sharepoint/v3/contenttype/forms"/>
+    <ds:schemaRef ds:uri="http://schemas.microsoft.com/office/2006/metadata/properties"/>
+    <ds:schemaRef ds:uri="http://schemas.microsoft.com/office/infopath/2007/PartnerControls"/>
+    <ds:schemaRef ds:uri="71af3243-3dd4-4a8d-8c0d-dd76da1f02a5"/>
   </ds:schemaRefs>
 </ds:datastoreItem>
 </file>
 
 <file path=customXml/itemProps2.xml><?xml version="1.0" encoding="utf-8"?>
-<ds:datastoreItem xmlns:ds="http://schemas.openxmlformats.org/officeDocument/2006/customXml" ds:itemID="{FBDEF148-1770-458F-8F5B-C3D0A278AA97}">
+<ds:datastoreItem xmlns:ds="http://schemas.openxmlformats.org/officeDocument/2006/customXml" ds:itemID="{1A449C04-64B3-4403-94B7-8D2284C38D1B}">
   <ds:schemaRefs>
-    <ds:schemaRef ds:uri="http://schemas.microsoft.com/office/2006/metadata/properties"/>
-    <ds:schemaRef ds:uri="http://schemas.microsoft.com/office/infopath/2007/PartnerControls"/>
-    <ds:schemaRef ds:uri="71af3243-3dd4-4a8d-8c0d-dd76da1f02a5"/>
+    <ds:schemaRef ds:uri="http://schemas.microsoft.com/sharepoint/v3/contenttype/forms"/>
   </ds:schemaRefs>
 </ds:datastoreItem>
 </file>

</xml_diff>

<commit_message>
Se agregó sección de reimplementación
</commit_message>
<xml_diff>
--- a/documentos/Presentacion_ffmf.pptx
+++ b/documentos/Presentacion_ffmf.pptx
@@ -5,10 +5,10 @@
     <p:sldMasterId id="2147483768" r:id="rId4"/>
   </p:sldMasterIdLst>
   <p:notesMasterIdLst>
-    <p:notesMasterId r:id="rId28"/>
+    <p:notesMasterId r:id="rId30"/>
   </p:notesMasterIdLst>
   <p:handoutMasterIdLst>
-    <p:handoutMasterId r:id="rId29"/>
+    <p:handoutMasterId r:id="rId31"/>
   </p:handoutMasterIdLst>
   <p:sldIdLst>
     <p:sldId id="3825" r:id="rId5"/>
@@ -21,19 +21,21 @@
     <p:sldId id="3843" r:id="rId12"/>
     <p:sldId id="3844" r:id="rId13"/>
     <p:sldId id="3845" r:id="rId14"/>
-    <p:sldId id="3836" r:id="rId15"/>
-    <p:sldId id="3837" r:id="rId16"/>
-    <p:sldId id="3838" r:id="rId17"/>
-    <p:sldId id="3855" r:id="rId18"/>
-    <p:sldId id="3856" r:id="rId19"/>
-    <p:sldId id="3857" r:id="rId20"/>
-    <p:sldId id="3840" r:id="rId21"/>
-    <p:sldId id="3852" r:id="rId22"/>
-    <p:sldId id="3853" r:id="rId23"/>
-    <p:sldId id="3841" r:id="rId24"/>
-    <p:sldId id="3854" r:id="rId25"/>
-    <p:sldId id="3851" r:id="rId26"/>
-    <p:sldId id="3834" r:id="rId27"/>
+    <p:sldId id="3858" r:id="rId15"/>
+    <p:sldId id="3859" r:id="rId16"/>
+    <p:sldId id="3836" r:id="rId17"/>
+    <p:sldId id="3837" r:id="rId18"/>
+    <p:sldId id="3838" r:id="rId19"/>
+    <p:sldId id="3855" r:id="rId20"/>
+    <p:sldId id="3856" r:id="rId21"/>
+    <p:sldId id="3857" r:id="rId22"/>
+    <p:sldId id="3840" r:id="rId23"/>
+    <p:sldId id="3852" r:id="rId24"/>
+    <p:sldId id="3853" r:id="rId25"/>
+    <p:sldId id="3841" r:id="rId26"/>
+    <p:sldId id="3854" r:id="rId27"/>
+    <p:sldId id="3851" r:id="rId28"/>
+    <p:sldId id="3834" r:id="rId29"/>
   </p:sldIdLst>
   <p:sldSz cx="12192000" cy="6858000"/>
   <p:notesSz cx="6858000" cy="9144000"/>
@@ -867,7 +869,7 @@
             <a:pPr rtl="0"/>
             <a:fld id="{D40C6A29-4676-420C-BBE3-ACC2B80F64D4}" type="slidenum">
               <a:rPr lang="es-ES" smtClean="0"/>
-              <a:t>23</a:t>
+              <a:t>25</a:t>
             </a:fld>
             <a:endParaRPr lang="es-ES"/>
           </a:p>
@@ -1377,7 +1379,7 @@
             <a:pPr rtl="0"/>
             <a:fld id="{D40C6A29-4676-420C-BBE3-ACC2B80F64D4}" type="slidenum">
               <a:rPr lang="es-ES" smtClean="0"/>
-              <a:t>11</a:t>
+              <a:t>13</a:t>
             </a:fld>
             <a:endParaRPr lang="es-ES"/>
           </a:p>
@@ -1462,7 +1464,7 @@
             <a:pPr rtl="0"/>
             <a:fld id="{D40C6A29-4676-420C-BBE3-ACC2B80F64D4}" type="slidenum">
               <a:rPr lang="es-ES" smtClean="0"/>
-              <a:t>12</a:t>
+              <a:t>14</a:t>
             </a:fld>
             <a:endParaRPr lang="es-ES"/>
           </a:p>
@@ -1547,7 +1549,7 @@
             <a:pPr rtl="0"/>
             <a:fld id="{D40C6A29-4676-420C-BBE3-ACC2B80F64D4}" type="slidenum">
               <a:rPr lang="es-ES" smtClean="0"/>
-              <a:t>17</a:t>
+              <a:t>19</a:t>
             </a:fld>
             <a:endParaRPr lang="es-ES"/>
           </a:p>
@@ -13863,82 +13865,6 @@
           </a:p>
         </p:txBody>
       </p:sp>
-      <p:sp>
-        <p:nvSpPr>
-          <p:cNvPr id="12" name="Marcador de fecha 3">
-            <a:extLst>
-              <a:ext uri="{FF2B5EF4-FFF2-40B4-BE49-F238E27FC236}">
-                <a16:creationId xmlns:a16="http://schemas.microsoft.com/office/drawing/2014/main" id="{BE2967DB-E5FD-4307-918C-A8B784D9B3DA}"/>
-              </a:ext>
-            </a:extLst>
-          </p:cNvPr>
-          <p:cNvSpPr>
-            <a:spLocks noGrp="1"/>
-          </p:cNvSpPr>
-          <p:nvPr>
-            <p:ph type="dt" sz="half" idx="10"/>
-          </p:nvPr>
-        </p:nvSpPr>
-        <p:spPr>
-          <a:xfrm>
-            <a:off x="838200" y="6356350"/>
-            <a:ext cx="2743200" cy="365125"/>
-          </a:xfrm>
-        </p:spPr>
-        <p:txBody>
-          <a:bodyPr rtlCol="0"/>
-          <a:lstStyle/>
-          <a:p>
-            <a:pPr marL="0" marR="0" lvl="0" indent="0" algn="l" defTabSz="914400" rtl="0" eaLnBrk="1" fontAlgn="auto" latinLnBrk="0" hangingPunct="1">
-              <a:lnSpc>
-                <a:spcPct val="100000"/>
-              </a:lnSpc>
-              <a:spcBef>
-                <a:spcPts val="0"/>
-              </a:spcBef>
-              <a:spcAft>
-                <a:spcPts val="0"/>
-              </a:spcAft>
-              <a:buClrTx/>
-              <a:buSzTx/>
-              <a:buFontTx/>
-              <a:buNone/>
-              <a:tabLst/>
-              <a:defRPr/>
-            </a:pPr>
-            <a:r>
-              <a:rPr lang="es-ES" dirty="0">
-                <a:solidFill>
-                  <a:prstClr val="black">
-                    <a:tint val="75000"/>
-                  </a:prstClr>
-                </a:solidFill>
-                <a:latin typeface="Calibri" panose="020F0502020204030204"/>
-              </a:rPr>
-              <a:t>20</a:t>
-            </a:r>
-            <a:r>
-              <a:rPr lang="es-ES" sz="1200" b="0" i="0" u="none" strike="noStrike" kern="1200" cap="none" spc="0" normalizeH="0" dirty="0">
-                <a:ln>
-                  <a:noFill/>
-                </a:ln>
-                <a:solidFill>
-                  <a:prstClr val="black">
-                    <a:tint val="75000"/>
-                  </a:prstClr>
-                </a:solidFill>
-                <a:effectLst/>
-                <a:uLnTx/>
-                <a:uFillTx/>
-                <a:latin typeface="Calibri" panose="020F0502020204030204"/>
-                <a:ea typeface="+mn-ea"/>
-                <a:cs typeface="+mn-cs"/>
-              </a:rPr>
-              <a:t>/05/2021</a:t>
-            </a:r>
-          </a:p>
-        </p:txBody>
-      </p:sp>
     </p:spTree>
     <p:extLst>
       <p:ext uri="{BB962C8B-B14F-4D97-AF65-F5344CB8AC3E}">
@@ -13974,6 +13900,556 @@
           <p:cNvPr id="2" name="Título 1">
             <a:extLst>
               <a:ext uri="{FF2B5EF4-FFF2-40B4-BE49-F238E27FC236}">
+                <a16:creationId xmlns:a16="http://schemas.microsoft.com/office/drawing/2014/main" id="{B32EF64A-5A7F-4E25-B723-6DA7FDC0B4A4}"/>
+              </a:ext>
+            </a:extLst>
+          </p:cNvPr>
+          <p:cNvSpPr>
+            <a:spLocks noGrp="1"/>
+          </p:cNvSpPr>
+          <p:nvPr>
+            <p:ph type="title"/>
+          </p:nvPr>
+        </p:nvSpPr>
+        <p:spPr/>
+        <p:txBody>
+          <a:bodyPr/>
+          <a:lstStyle/>
+          <a:p>
+            <a:r>
+              <a:rPr lang="en-US" dirty="0" err="1"/>
+              <a:t>Reimplementación</a:t>
+            </a:r>
+            <a:endParaRPr lang="en-US" dirty="0"/>
+          </a:p>
+        </p:txBody>
+      </p:sp>
+      <p:sp>
+        <p:nvSpPr>
+          <p:cNvPr id="3" name="Marcador de contenido 2">
+            <a:extLst>
+              <a:ext uri="{FF2B5EF4-FFF2-40B4-BE49-F238E27FC236}">
+                <a16:creationId xmlns:a16="http://schemas.microsoft.com/office/drawing/2014/main" id="{A953B6D4-9143-4D74-838D-AD9F6E723317}"/>
+              </a:ext>
+            </a:extLst>
+          </p:cNvPr>
+          <p:cNvSpPr>
+            <a:spLocks noGrp="1"/>
+          </p:cNvSpPr>
+          <p:nvPr>
+            <p:ph idx="1"/>
+          </p:nvPr>
+        </p:nvSpPr>
+        <p:spPr/>
+        <p:txBody>
+          <a:bodyPr>
+            <a:normAutofit fontScale="62500" lnSpcReduction="20000"/>
+          </a:bodyPr>
+          <a:lstStyle/>
+          <a:p>
+            <a:r>
+              <a:rPr lang="es-MX" dirty="0"/>
+              <a:t>La implementación del paquete se realizó a través de Python haciendo uso de clases.</a:t>
+            </a:r>
+          </a:p>
+          <a:p>
+            <a:endParaRPr lang="es-MX" dirty="0"/>
+          </a:p>
+          <a:p>
+            <a:r>
+              <a:rPr lang="es-MX" dirty="0"/>
+              <a:t>Una vez desarrollado el paquete de manera básica utilizamos las herramientas de kale y </a:t>
+            </a:r>
+            <a:r>
+              <a:rPr lang="es-MX" dirty="0" err="1"/>
+              <a:t>minikube</a:t>
+            </a:r>
+            <a:r>
+              <a:rPr lang="es-MX" dirty="0"/>
+              <a:t> para correr varios experimentos y así detectar valores con los cuales falla nuestro paquete o posibles mejoras a realizar.</a:t>
+            </a:r>
+          </a:p>
+          <a:p>
+            <a:endParaRPr lang="es-MX" dirty="0"/>
+          </a:p>
+          <a:p>
+            <a:r>
+              <a:rPr lang="es-MX" dirty="0"/>
+              <a:t>Ante de iniciar con la reimplementación realizamos un perfilamiento de </a:t>
+            </a:r>
+            <a:r>
+              <a:rPr lang="es-MX" dirty="0" err="1"/>
+              <a:t>ffmaxflow</a:t>
+            </a:r>
+            <a:r>
+              <a:rPr lang="es-MX" dirty="0"/>
+              <a:t> para así tener una idea del desempeño de nuestro paquete. Durante el perfilamiento descubrimos que el método de </a:t>
+            </a:r>
+            <a:r>
+              <a:rPr lang="es-MX" dirty="0" err="1"/>
+              <a:t>get_path</a:t>
+            </a:r>
+            <a:r>
+              <a:rPr lang="es-MX" dirty="0"/>
+              <a:t> toma mucho tiempo en relación con los tiempos de las demás líneas, además de la creación de </a:t>
+            </a:r>
+            <a:r>
+              <a:rPr lang="es-MX" dirty="0" err="1"/>
+              <a:t>vertices</a:t>
+            </a:r>
+            <a:r>
+              <a:rPr lang="es-MX" dirty="0"/>
+              <a:t> y el cálculo mismo del flujo máximo.</a:t>
+            </a:r>
+          </a:p>
+          <a:p>
+            <a:endParaRPr lang="es-MX" dirty="0"/>
+          </a:p>
+          <a:p>
+            <a:r>
+              <a:rPr lang="es-MX" dirty="0"/>
+              <a:t>En cuanto al perfilamiento de memoria, no encontramos que nuestro paquete estuviera usando memoria excesiva por lo que decidimos optimizar únicamente el tiempo de ejecución y la optimización se realizara con </a:t>
+            </a:r>
+            <a:r>
+              <a:rPr lang="es-MX" dirty="0" err="1"/>
+              <a:t>Cython</a:t>
+            </a:r>
+            <a:r>
+              <a:rPr lang="es-MX" dirty="0"/>
+              <a:t>.</a:t>
+            </a:r>
+            <a:endParaRPr lang="en-US" dirty="0"/>
+          </a:p>
+        </p:txBody>
+      </p:sp>
+      <p:sp>
+        <p:nvSpPr>
+          <p:cNvPr id="6" name="Marcador de número de diapositiva 5">
+            <a:extLst>
+              <a:ext uri="{FF2B5EF4-FFF2-40B4-BE49-F238E27FC236}">
+                <a16:creationId xmlns:a16="http://schemas.microsoft.com/office/drawing/2014/main" id="{A9A5B82C-EDD8-4256-BC74-16150B694C81}"/>
+              </a:ext>
+            </a:extLst>
+          </p:cNvPr>
+          <p:cNvSpPr>
+            <a:spLocks noGrp="1"/>
+          </p:cNvSpPr>
+          <p:nvPr>
+            <p:ph type="sldNum" sz="quarter" idx="12"/>
+          </p:nvPr>
+        </p:nvSpPr>
+        <p:spPr/>
+        <p:txBody>
+          <a:bodyPr/>
+          <a:lstStyle/>
+          <a:p>
+            <a:pPr rtl="0">
+              <a:defRPr/>
+            </a:pPr>
+            <a:fld id="{D76B855D-E9CC-4FF8-AD85-6CDC7B89A0DE}" type="slidenum">
+              <a:rPr lang="es-ES" noProof="0" smtClean="0">
+                <a:solidFill>
+                  <a:prstClr val="black">
+                    <a:tint val="75000"/>
+                  </a:prstClr>
+                </a:solidFill>
+              </a:rPr>
+              <a:pPr rtl="0">
+                <a:defRPr/>
+              </a:pPr>
+              <a:t>11</a:t>
+            </a:fld>
+            <a:endParaRPr lang="es-ES" noProof="0">
+              <a:solidFill>
+                <a:prstClr val="black">
+                  <a:tint val="75000"/>
+                </a:prstClr>
+              </a:solidFill>
+            </a:endParaRPr>
+          </a:p>
+        </p:txBody>
+      </p:sp>
+    </p:spTree>
+    <p:extLst>
+      <p:ext uri="{BB962C8B-B14F-4D97-AF65-F5344CB8AC3E}">
+        <p14:creationId xmlns:p14="http://schemas.microsoft.com/office/powerpoint/2010/main" val="579773198"/>
+      </p:ext>
+    </p:extLst>
+  </p:cSld>
+  <p:clrMapOvr>
+    <a:masterClrMapping/>
+  </p:clrMapOvr>
+</p:sld>
+</file>
+
+<file path=ppt/slides/slide12.xml><?xml version="1.0" encoding="utf-8"?>
+<p:sld xmlns:a="http://schemas.openxmlformats.org/drawingml/2006/main" xmlns:r="http://schemas.openxmlformats.org/officeDocument/2006/relationships" xmlns:p="http://schemas.openxmlformats.org/presentationml/2006/main">
+  <p:cSld>
+    <p:spTree>
+      <p:nvGrpSpPr>
+        <p:cNvPr id="1" name=""/>
+        <p:cNvGrpSpPr/>
+        <p:nvPr/>
+      </p:nvGrpSpPr>
+      <p:grpSpPr>
+        <a:xfrm>
+          <a:off x="0" y="0"/>
+          <a:ext cx="0" cy="0"/>
+          <a:chOff x="0" y="0"/>
+          <a:chExt cx="0" cy="0"/>
+        </a:xfrm>
+      </p:grpSpPr>
+      <p:sp>
+        <p:nvSpPr>
+          <p:cNvPr id="4" name="Título 3">
+            <a:extLst>
+              <a:ext uri="{FF2B5EF4-FFF2-40B4-BE49-F238E27FC236}">
+                <a16:creationId xmlns:a16="http://schemas.microsoft.com/office/drawing/2014/main" id="{A4BBC044-C46D-48AD-B954-0344D2E6C3FA}"/>
+              </a:ext>
+            </a:extLst>
+          </p:cNvPr>
+          <p:cNvSpPr>
+            <a:spLocks noGrp="1"/>
+          </p:cNvSpPr>
+          <p:nvPr>
+            <p:ph type="title"/>
+          </p:nvPr>
+        </p:nvSpPr>
+        <p:spPr>
+          <a:xfrm>
+            <a:off x="838200" y="365125"/>
+            <a:ext cx="10515600" cy="1325563"/>
+          </a:xfrm>
+        </p:spPr>
+        <p:txBody>
+          <a:bodyPr anchor="ctr">
+            <a:normAutofit/>
+          </a:bodyPr>
+          <a:lstStyle/>
+          <a:p>
+            <a:r>
+              <a:rPr lang="en-US" dirty="0" err="1"/>
+              <a:t>Reimplementación</a:t>
+            </a:r>
+            <a:r>
+              <a:rPr lang="en-US" dirty="0"/>
+              <a:t> </a:t>
+            </a:r>
+            <a:r>
+              <a:rPr lang="en-US" dirty="0" err="1"/>
+              <a:t>en</a:t>
+            </a:r>
+            <a:r>
+              <a:rPr lang="en-US" dirty="0"/>
+              <a:t> </a:t>
+            </a:r>
+            <a:r>
+              <a:rPr lang="en-US" dirty="0" err="1"/>
+              <a:t>Cython</a:t>
+            </a:r>
+            <a:endParaRPr lang="en-US" dirty="0"/>
+          </a:p>
+        </p:txBody>
+      </p:sp>
+      <p:sp>
+        <p:nvSpPr>
+          <p:cNvPr id="71" name="Content Placeholder 2">
+            <a:extLst>
+              <a:ext uri="{FF2B5EF4-FFF2-40B4-BE49-F238E27FC236}">
+                <a16:creationId xmlns:a16="http://schemas.microsoft.com/office/drawing/2014/main" id="{A292AE45-1B5A-405A-B21A-98816FABC7D3}"/>
+              </a:ext>
+            </a:extLst>
+          </p:cNvPr>
+          <p:cNvSpPr>
+            <a:spLocks noGrp="1"/>
+          </p:cNvSpPr>
+          <p:nvPr>
+            <p:ph sz="half" idx="1"/>
+          </p:nvPr>
+        </p:nvSpPr>
+        <p:spPr>
+          <a:xfrm>
+            <a:off x="838200" y="1825625"/>
+            <a:ext cx="5181600" cy="4351338"/>
+          </a:xfrm>
+        </p:spPr>
+        <p:txBody>
+          <a:bodyPr>
+            <a:normAutofit/>
+          </a:bodyPr>
+          <a:lstStyle/>
+          <a:p>
+            <a:r>
+              <a:rPr lang="es-MX" sz="2000" dirty="0"/>
+              <a:t>Con ayuda de las anotaciones amarillas dadas por </a:t>
+            </a:r>
+            <a:r>
+              <a:rPr lang="es-MX" sz="2000" dirty="0" err="1"/>
+              <a:t>Cython</a:t>
+            </a:r>
+            <a:r>
+              <a:rPr lang="es-MX" sz="2000" dirty="0"/>
+              <a:t> obtenidas a partir del archivo con extensión .</a:t>
+            </a:r>
+            <a:r>
+              <a:rPr lang="es-MX" sz="2000" dirty="0" err="1"/>
+              <a:t>pyx</a:t>
+            </a:r>
+            <a:r>
+              <a:rPr lang="es-MX" sz="2000" dirty="0"/>
+              <a:t> se identificaron las líneas que "más Python utilizaban". Recordemos que mientras más código que se pueda traducir a C se tenga, menor será el tiempo de ejecución. En particular, estas anotaciones se realizan sobre un archivo </a:t>
+            </a:r>
+            <a:r>
+              <a:rPr lang="es-MX" sz="2000" dirty="0" err="1"/>
+              <a:t>html</a:t>
+            </a:r>
+            <a:r>
+              <a:rPr lang="es-MX" sz="2000" dirty="0"/>
+              <a:t>, donde las líneas más amarillas representan que se está usando más Python y las blancas, más C.</a:t>
+            </a:r>
+          </a:p>
+          <a:p>
+            <a:endParaRPr lang="es-MX" dirty="0"/>
+          </a:p>
+        </p:txBody>
+      </p:sp>
+      <p:sp>
+        <p:nvSpPr>
+          <p:cNvPr id="8" name="Marcador de número de diapositiva 7">
+            <a:extLst>
+              <a:ext uri="{FF2B5EF4-FFF2-40B4-BE49-F238E27FC236}">
+                <a16:creationId xmlns:a16="http://schemas.microsoft.com/office/drawing/2014/main" id="{8BC9F251-CBE9-4932-BC7E-5A2BEE77A221}"/>
+              </a:ext>
+            </a:extLst>
+          </p:cNvPr>
+          <p:cNvSpPr>
+            <a:spLocks noGrp="1"/>
+          </p:cNvSpPr>
+          <p:nvPr>
+            <p:ph type="sldNum" sz="quarter" idx="12"/>
+          </p:nvPr>
+        </p:nvSpPr>
+        <p:spPr>
+          <a:xfrm>
+            <a:off x="8610600" y="6356350"/>
+            <a:ext cx="2743200" cy="365125"/>
+          </a:xfrm>
+        </p:spPr>
+        <p:txBody>
+          <a:bodyPr anchor="ctr">
+            <a:normAutofit/>
+          </a:bodyPr>
+          <a:lstStyle/>
+          <a:p>
+            <a:pPr rtl="0">
+              <a:spcAft>
+                <a:spcPts val="600"/>
+              </a:spcAft>
+              <a:defRPr/>
+            </a:pPr>
+            <a:fld id="{D76B855D-E9CC-4FF8-AD85-6CDC7B89A0DE}" type="slidenum">
+              <a:rPr lang="es-ES" noProof="0" smtClean="0">
+                <a:solidFill>
+                  <a:prstClr val="black">
+                    <a:tint val="75000"/>
+                  </a:prstClr>
+                </a:solidFill>
+              </a:rPr>
+              <a:pPr rtl="0">
+                <a:spcAft>
+                  <a:spcPts val="600"/>
+                </a:spcAft>
+                <a:defRPr/>
+              </a:pPr>
+              <a:t>12</a:t>
+            </a:fld>
+            <a:endParaRPr lang="es-ES" noProof="0">
+              <a:solidFill>
+                <a:prstClr val="black">
+                  <a:tint val="75000"/>
+                </a:prstClr>
+              </a:solidFill>
+            </a:endParaRPr>
+          </a:p>
+        </p:txBody>
+      </p:sp>
+      <p:pic>
+        <p:nvPicPr>
+          <p:cNvPr id="18" name="Picture 2" descr="cython">
+            <a:extLst>
+              <a:ext uri="{FF2B5EF4-FFF2-40B4-BE49-F238E27FC236}">
+                <a16:creationId xmlns:a16="http://schemas.microsoft.com/office/drawing/2014/main" id="{DCD38DF0-6A8C-4339-9D80-D4C670A57761}"/>
+              </a:ext>
+            </a:extLst>
+          </p:cNvPr>
+          <p:cNvPicPr>
+            <a:picLocks noChangeAspect="1" noChangeArrowheads="1"/>
+          </p:cNvPicPr>
+          <p:nvPr/>
+        </p:nvPicPr>
+        <p:blipFill>
+          <a:blip r:embed="rId2">
+            <a:extLst>
+              <a:ext uri="{28A0092B-C50C-407E-A947-70E740481C1C}">
+                <a14:useLocalDpi xmlns:a14="http://schemas.microsoft.com/office/drawing/2010/main" val="0"/>
+              </a:ext>
+            </a:extLst>
+          </a:blip>
+          <a:stretch>
+            <a:fillRect/>
+          </a:stretch>
+        </p:blipFill>
+        <p:spPr bwMode="auto">
+          <a:xfrm>
+            <a:off x="6361043" y="1383057"/>
+            <a:ext cx="5181600" cy="1334262"/>
+          </a:xfrm>
+          <a:prstGeom prst="rect">
+            <a:avLst/>
+          </a:prstGeom>
+          <a:solidFill>
+            <a:srgbClr val="FFFFFF"/>
+          </a:solidFill>
+          <a:extLst>
+            <a:ext uri="{909E8E84-426E-40DD-AFC4-6F175D3DCCD1}">
+              <a14:hiddenFill xmlns:a14="http://schemas.microsoft.com/office/drawing/2010/main">
+                <a:solidFill>
+                  <a:srgbClr val="FFFFFF"/>
+                </a:solidFill>
+              </a14:hiddenFill>
+            </a:ext>
+          </a:extLst>
+        </p:spPr>
+      </p:pic>
+      <p:pic>
+        <p:nvPicPr>
+          <p:cNvPr id="19" name="Picture 2" descr="cython">
+            <a:extLst>
+              <a:ext uri="{FF2B5EF4-FFF2-40B4-BE49-F238E27FC236}">
+                <a16:creationId xmlns:a16="http://schemas.microsoft.com/office/drawing/2014/main" id="{AEB80500-769A-43E5-BB7B-838908B95728}"/>
+              </a:ext>
+            </a:extLst>
+          </p:cNvPr>
+          <p:cNvPicPr>
+            <a:picLocks noChangeAspect="1" noChangeArrowheads="1"/>
+          </p:cNvPicPr>
+          <p:nvPr/>
+        </p:nvPicPr>
+        <p:blipFill>
+          <a:blip r:embed="rId3">
+            <a:extLst>
+              <a:ext uri="{28A0092B-C50C-407E-A947-70E740481C1C}">
+                <a14:useLocalDpi xmlns:a14="http://schemas.microsoft.com/office/drawing/2010/main" val="0"/>
+              </a:ext>
+            </a:extLst>
+          </a:blip>
+          <a:srcRect/>
+          <a:stretch>
+            <a:fillRect/>
+          </a:stretch>
+        </p:blipFill>
+        <p:spPr bwMode="auto">
+          <a:xfrm>
+            <a:off x="6361043" y="3131086"/>
+            <a:ext cx="5147555" cy="1463166"/>
+          </a:xfrm>
+          <a:prstGeom prst="rect">
+            <a:avLst/>
+          </a:prstGeom>
+          <a:noFill/>
+          <a:extLst>
+            <a:ext uri="{909E8E84-426E-40DD-AFC4-6F175D3DCCD1}">
+              <a14:hiddenFill xmlns:a14="http://schemas.microsoft.com/office/drawing/2010/main">
+                <a:solidFill>
+                  <a:srgbClr val="FFFFFF"/>
+                </a:solidFill>
+              </a14:hiddenFill>
+            </a:ext>
+          </a:extLst>
+        </p:spPr>
+      </p:pic>
+      <p:pic>
+        <p:nvPicPr>
+          <p:cNvPr id="20" name="Picture 6" descr="cython">
+            <a:extLst>
+              <a:ext uri="{FF2B5EF4-FFF2-40B4-BE49-F238E27FC236}">
+                <a16:creationId xmlns:a16="http://schemas.microsoft.com/office/drawing/2014/main" id="{92E8A12F-0CFD-4323-9435-58C5BF043AEE}"/>
+              </a:ext>
+            </a:extLst>
+          </p:cNvPr>
+          <p:cNvPicPr>
+            <a:picLocks noChangeAspect="1" noChangeArrowheads="1"/>
+          </p:cNvPicPr>
+          <p:nvPr/>
+        </p:nvPicPr>
+        <p:blipFill>
+          <a:blip r:embed="rId4">
+            <a:extLst>
+              <a:ext uri="{28A0092B-C50C-407E-A947-70E740481C1C}">
+                <a14:useLocalDpi xmlns:a14="http://schemas.microsoft.com/office/drawing/2010/main" val="0"/>
+              </a:ext>
+            </a:extLst>
+          </a:blip>
+          <a:srcRect/>
+          <a:stretch>
+            <a:fillRect/>
+          </a:stretch>
+        </p:blipFill>
+        <p:spPr bwMode="auto">
+          <a:xfrm>
+            <a:off x="6259995" y="5008019"/>
+            <a:ext cx="5383696" cy="1242176"/>
+          </a:xfrm>
+          <a:prstGeom prst="rect">
+            <a:avLst/>
+          </a:prstGeom>
+          <a:noFill/>
+          <a:extLst>
+            <a:ext uri="{909E8E84-426E-40DD-AFC4-6F175D3DCCD1}">
+              <a14:hiddenFill xmlns:a14="http://schemas.microsoft.com/office/drawing/2010/main">
+                <a:solidFill>
+                  <a:srgbClr val="FFFFFF"/>
+                </a:solidFill>
+              </a14:hiddenFill>
+            </a:ext>
+          </a:extLst>
+        </p:spPr>
+      </p:pic>
+    </p:spTree>
+    <p:extLst>
+      <p:ext uri="{BB962C8B-B14F-4D97-AF65-F5344CB8AC3E}">
+        <p14:creationId xmlns:p14="http://schemas.microsoft.com/office/powerpoint/2010/main" val="3060141734"/>
+      </p:ext>
+    </p:extLst>
+  </p:cSld>
+  <p:clrMapOvr>
+    <a:masterClrMapping/>
+  </p:clrMapOvr>
+</p:sld>
+</file>
+
+<file path=ppt/slides/slide13.xml><?xml version="1.0" encoding="utf-8"?>
+<p:sld xmlns:a="http://schemas.openxmlformats.org/drawingml/2006/main" xmlns:r="http://schemas.openxmlformats.org/officeDocument/2006/relationships" xmlns:p="http://schemas.openxmlformats.org/presentationml/2006/main">
+  <p:cSld>
+    <p:spTree>
+      <p:nvGrpSpPr>
+        <p:cNvPr id="1" name=""/>
+        <p:cNvGrpSpPr/>
+        <p:nvPr/>
+      </p:nvGrpSpPr>
+      <p:grpSpPr>
+        <a:xfrm>
+          <a:off x="0" y="0"/>
+          <a:ext cx="0" cy="0"/>
+          <a:chOff x="0" y="0"/>
+          <a:chExt cx="0" cy="0"/>
+        </a:xfrm>
+      </p:grpSpPr>
+      <p:sp>
+        <p:nvSpPr>
+          <p:cNvPr id="2" name="Título 1">
+            <a:extLst>
+              <a:ext uri="{FF2B5EF4-FFF2-40B4-BE49-F238E27FC236}">
                 <a16:creationId xmlns:a16="http://schemas.microsoft.com/office/drawing/2014/main" id="{1EFC037F-9B04-45A9-8AE6-A8517884947F}"/>
               </a:ext>
             </a:extLst>
@@ -14053,7 +14529,7 @@
 </p:sld>
 </file>
 
-<file path=ppt/slides/slide12.xml><?xml version="1.0" encoding="utf-8"?>
+<file path=ppt/slides/slide14.xml><?xml version="1.0" encoding="utf-8"?>
 <p:sld xmlns:a="http://schemas.openxmlformats.org/drawingml/2006/main" xmlns:r="http://schemas.openxmlformats.org/officeDocument/2006/relationships" xmlns:p="http://schemas.openxmlformats.org/presentationml/2006/main">
   <p:cSld>
     <p:spTree>
@@ -14235,7 +14711,7 @@
                 <a:tabLst/>
                 <a:defRPr/>
               </a:pPr>
-              <a:t>12</a:t>
+              <a:t>14</a:t>
             </a:fld>
             <a:endParaRPr kumimoji="0" lang="es-ES" b="0" i="0" u="none" strike="noStrike" kern="1200" cap="none" spc="0" normalizeH="0" baseline="0">
               <a:ln>
@@ -14266,7 +14742,7 @@
 </p:sld>
 </file>
 
-<file path=ppt/slides/slide13.xml><?xml version="1.0" encoding="utf-8"?>
+<file path=ppt/slides/slide15.xml><?xml version="1.0" encoding="utf-8"?>
 <p:sld xmlns:a="http://schemas.openxmlformats.org/drawingml/2006/main" xmlns:r="http://schemas.openxmlformats.org/officeDocument/2006/relationships" xmlns:p="http://schemas.openxmlformats.org/presentationml/2006/main">
   <p:cSld>
     <p:spTree>
@@ -14477,7 +14953,7 @@
                 </a:spcAft>
                 <a:defRPr/>
               </a:pPr>
-              <a:t>13</a:t>
+              <a:t>15</a:t>
             </a:fld>
             <a:endParaRPr lang="es-ES" noProof="0" dirty="0">
               <a:solidFill>
@@ -14502,7 +14978,7 @@
 </p:sld>
 </file>
 
-<file path=ppt/slides/slide14.xml><?xml version="1.0" encoding="utf-8"?>
+<file path=ppt/slides/slide16.xml><?xml version="1.0" encoding="utf-8"?>
 <p:sld xmlns:a="http://schemas.openxmlformats.org/drawingml/2006/main" xmlns:r="http://schemas.openxmlformats.org/officeDocument/2006/relationships" xmlns:p="http://schemas.openxmlformats.org/presentationml/2006/main">
   <p:cSld>
     <p:spTree>
@@ -14702,80 +15178,6 @@
       </mc:AlternateContent>
       <p:sp>
         <p:nvSpPr>
-          <p:cNvPr id="5" name="Marcador de fecha 4">
-            <a:extLst>
-              <a:ext uri="{FF2B5EF4-FFF2-40B4-BE49-F238E27FC236}">
-                <a16:creationId xmlns:a16="http://schemas.microsoft.com/office/drawing/2014/main" id="{318C4090-B6A2-41B6-9F24-39B6ECBF22D1}"/>
-              </a:ext>
-            </a:extLst>
-          </p:cNvPr>
-          <p:cNvSpPr>
-            <a:spLocks noGrp="1"/>
-          </p:cNvSpPr>
-          <p:nvPr>
-            <p:ph type="dt" sz="half" idx="10"/>
-          </p:nvPr>
-        </p:nvSpPr>
-        <p:spPr/>
-        <p:txBody>
-          <a:bodyPr/>
-          <a:lstStyle/>
-          <a:p>
-            <a:pPr rtl="0">
-              <a:defRPr/>
-            </a:pPr>
-            <a:r>
-              <a:rPr lang="es-ES" noProof="0">
-                <a:solidFill>
-                  <a:prstClr val="black">
-                    <a:tint val="75000"/>
-                  </a:prstClr>
-                </a:solidFill>
-              </a:rPr>
-              <a:t>3/9/20XX</a:t>
-            </a:r>
-          </a:p>
-        </p:txBody>
-      </p:sp>
-      <p:sp>
-        <p:nvSpPr>
-          <p:cNvPr id="6" name="Marcador de pie de página 5">
-            <a:extLst>
-              <a:ext uri="{FF2B5EF4-FFF2-40B4-BE49-F238E27FC236}">
-                <a16:creationId xmlns:a16="http://schemas.microsoft.com/office/drawing/2014/main" id="{24EB3927-1177-47DD-AFE2-B0E9730CF6DB}"/>
-              </a:ext>
-            </a:extLst>
-          </p:cNvPr>
-          <p:cNvSpPr>
-            <a:spLocks noGrp="1"/>
-          </p:cNvSpPr>
-          <p:nvPr>
-            <p:ph type="ftr" sz="quarter" idx="11"/>
-          </p:nvPr>
-        </p:nvSpPr>
-        <p:spPr/>
-        <p:txBody>
-          <a:bodyPr/>
-          <a:lstStyle/>
-          <a:p>
-            <a:pPr rtl="0">
-              <a:defRPr/>
-            </a:pPr>
-            <a:r>
-              <a:rPr lang="es-ES" noProof="0">
-                <a:solidFill>
-                  <a:prstClr val="black">
-                    <a:tint val="75000"/>
-                  </a:prstClr>
-                </a:solidFill>
-              </a:rPr>
-              <a:t>Título de la presentación</a:t>
-            </a:r>
-          </a:p>
-        </p:txBody>
-      </p:sp>
-      <p:sp>
-        <p:nvSpPr>
           <p:cNvPr id="7" name="Marcador de número de diapositiva 6">
             <a:extLst>
               <a:ext uri="{FF2B5EF4-FFF2-40B4-BE49-F238E27FC236}">
@@ -14809,7 +15211,7 @@
               <a:pPr rtl="0">
                 <a:defRPr/>
               </a:pPr>
-              <a:t>14</a:t>
+              <a:t>16</a:t>
             </a:fld>
             <a:endParaRPr lang="es-ES" noProof="0">
               <a:solidFill>
@@ -14864,7 +15266,7 @@
 </p:sld>
 </file>
 
-<file path=ppt/slides/slide15.xml><?xml version="1.0" encoding="utf-8"?>
+<file path=ppt/slides/slide17.xml><?xml version="1.0" encoding="utf-8"?>
 <p:sld xmlns:a="http://schemas.openxmlformats.org/drawingml/2006/main" xmlns:r="http://schemas.openxmlformats.org/officeDocument/2006/relationships" xmlns:p="http://schemas.openxmlformats.org/presentationml/2006/main">
   <p:cSld>
     <p:spTree>
@@ -14958,100 +15360,6 @@
       </p:pic>
       <p:sp>
         <p:nvSpPr>
-          <p:cNvPr id="5" name="Marcador de fecha 4">
-            <a:extLst>
-              <a:ext uri="{FF2B5EF4-FFF2-40B4-BE49-F238E27FC236}">
-                <a16:creationId xmlns:a16="http://schemas.microsoft.com/office/drawing/2014/main" id="{50B79849-55F4-48E3-8978-BAEA91C0E8F8}"/>
-              </a:ext>
-            </a:extLst>
-          </p:cNvPr>
-          <p:cNvSpPr>
-            <a:spLocks noGrp="1"/>
-          </p:cNvSpPr>
-          <p:nvPr>
-            <p:ph type="dt" sz="half" idx="10"/>
-          </p:nvPr>
-        </p:nvSpPr>
-        <p:spPr>
-          <a:xfrm>
-            <a:off x="838200" y="6356350"/>
-            <a:ext cx="2743200" cy="365125"/>
-          </a:xfrm>
-        </p:spPr>
-        <p:txBody>
-          <a:bodyPr anchor="ctr">
-            <a:normAutofit/>
-          </a:bodyPr>
-          <a:lstStyle/>
-          <a:p>
-            <a:pPr rtl="0">
-              <a:spcAft>
-                <a:spcPts val="600"/>
-              </a:spcAft>
-              <a:defRPr/>
-            </a:pPr>
-            <a:r>
-              <a:rPr lang="es-ES" noProof="0" dirty="0">
-                <a:solidFill>
-                  <a:prstClr val="black">
-                    <a:tint val="75000"/>
-                  </a:prstClr>
-                </a:solidFill>
-              </a:rPr>
-              <a:t>3/9/20XX</a:t>
-            </a:r>
-          </a:p>
-        </p:txBody>
-      </p:sp>
-      <p:sp>
-        <p:nvSpPr>
-          <p:cNvPr id="6" name="Marcador de pie de página 5">
-            <a:extLst>
-              <a:ext uri="{FF2B5EF4-FFF2-40B4-BE49-F238E27FC236}">
-                <a16:creationId xmlns:a16="http://schemas.microsoft.com/office/drawing/2014/main" id="{F9AA2089-BC95-4199-BFB0-03FBB959FB2D}"/>
-              </a:ext>
-            </a:extLst>
-          </p:cNvPr>
-          <p:cNvSpPr>
-            <a:spLocks noGrp="1"/>
-          </p:cNvSpPr>
-          <p:nvPr>
-            <p:ph type="ftr" sz="quarter" idx="11"/>
-          </p:nvPr>
-        </p:nvSpPr>
-        <p:spPr>
-          <a:xfrm>
-            <a:off x="4038600" y="6356350"/>
-            <a:ext cx="4114800" cy="365125"/>
-          </a:xfrm>
-        </p:spPr>
-        <p:txBody>
-          <a:bodyPr anchor="ctr">
-            <a:normAutofit/>
-          </a:bodyPr>
-          <a:lstStyle/>
-          <a:p>
-            <a:pPr rtl="0">
-              <a:spcAft>
-                <a:spcPts val="600"/>
-              </a:spcAft>
-              <a:defRPr/>
-            </a:pPr>
-            <a:r>
-              <a:rPr lang="es-ES" noProof="0">
-                <a:solidFill>
-                  <a:prstClr val="black">
-                    <a:tint val="75000"/>
-                  </a:prstClr>
-                </a:solidFill>
-              </a:rPr>
-              <a:t>Título de la presentación</a:t>
-            </a:r>
-          </a:p>
-        </p:txBody>
-      </p:sp>
-      <p:sp>
-        <p:nvSpPr>
           <p:cNvPr id="7" name="Marcador de número de diapositiva 6">
             <a:extLst>
               <a:ext uri="{FF2B5EF4-FFF2-40B4-BE49-F238E27FC236}">
@@ -15098,7 +15406,7 @@
                 </a:spcAft>
                 <a:defRPr/>
               </a:pPr>
-              <a:t>15</a:t>
+              <a:t>17</a:t>
             </a:fld>
             <a:endParaRPr lang="es-ES" noProof="0">
               <a:solidFill>
@@ -15123,7 +15431,7 @@
 </p:sld>
 </file>
 
-<file path=ppt/slides/slide16.xml><?xml version="1.0" encoding="utf-8"?>
+<file path=ppt/slides/slide18.xml><?xml version="1.0" encoding="utf-8"?>
 <p:sld xmlns:a="http://schemas.openxmlformats.org/drawingml/2006/main" xmlns:r="http://schemas.openxmlformats.org/officeDocument/2006/relationships" xmlns:p="http://schemas.openxmlformats.org/presentationml/2006/main">
   <p:cSld>
     <p:spTree>
@@ -15265,100 +15573,6 @@
               <a:t>) y se comparó el tiempo de ejecución de cado uno de ellos.</a:t>
             </a:r>
             <a:endParaRPr lang="en-US" dirty="0"/>
-          </a:p>
-        </p:txBody>
-      </p:sp>
-      <p:sp>
-        <p:nvSpPr>
-          <p:cNvPr id="5" name="Marcador de fecha 4">
-            <a:extLst>
-              <a:ext uri="{FF2B5EF4-FFF2-40B4-BE49-F238E27FC236}">
-                <a16:creationId xmlns:a16="http://schemas.microsoft.com/office/drawing/2014/main" id="{8BB584FD-6084-4492-BA1A-FBC794F21754}"/>
-              </a:ext>
-            </a:extLst>
-          </p:cNvPr>
-          <p:cNvSpPr>
-            <a:spLocks noGrp="1"/>
-          </p:cNvSpPr>
-          <p:nvPr>
-            <p:ph type="dt" sz="half" idx="10"/>
-          </p:nvPr>
-        </p:nvSpPr>
-        <p:spPr>
-          <a:xfrm>
-            <a:off x="838200" y="6356350"/>
-            <a:ext cx="2743200" cy="365125"/>
-          </a:xfrm>
-        </p:spPr>
-        <p:txBody>
-          <a:bodyPr anchor="ctr">
-            <a:normAutofit/>
-          </a:bodyPr>
-          <a:lstStyle/>
-          <a:p>
-            <a:pPr rtl="0">
-              <a:spcAft>
-                <a:spcPts val="600"/>
-              </a:spcAft>
-              <a:defRPr/>
-            </a:pPr>
-            <a:r>
-              <a:rPr lang="es-ES" noProof="0">
-                <a:solidFill>
-                  <a:prstClr val="black">
-                    <a:tint val="75000"/>
-                  </a:prstClr>
-                </a:solidFill>
-              </a:rPr>
-              <a:t>3/9/20XX</a:t>
-            </a:r>
-          </a:p>
-        </p:txBody>
-      </p:sp>
-      <p:sp>
-        <p:nvSpPr>
-          <p:cNvPr id="6" name="Marcador de pie de página 5">
-            <a:extLst>
-              <a:ext uri="{FF2B5EF4-FFF2-40B4-BE49-F238E27FC236}">
-                <a16:creationId xmlns:a16="http://schemas.microsoft.com/office/drawing/2014/main" id="{9E1BE0B4-D3F5-402F-B747-BB1D72EFD2BE}"/>
-              </a:ext>
-            </a:extLst>
-          </p:cNvPr>
-          <p:cNvSpPr>
-            <a:spLocks noGrp="1"/>
-          </p:cNvSpPr>
-          <p:nvPr>
-            <p:ph type="ftr" sz="quarter" idx="11"/>
-          </p:nvPr>
-        </p:nvSpPr>
-        <p:spPr>
-          <a:xfrm>
-            <a:off x="4038600" y="6356350"/>
-            <a:ext cx="4114800" cy="365125"/>
-          </a:xfrm>
-        </p:spPr>
-        <p:txBody>
-          <a:bodyPr anchor="ctr">
-            <a:normAutofit/>
-          </a:bodyPr>
-          <a:lstStyle/>
-          <a:p>
-            <a:pPr rtl="0">
-              <a:spcAft>
-                <a:spcPts val="600"/>
-              </a:spcAft>
-              <a:defRPr/>
-            </a:pPr>
-            <a:r>
-              <a:rPr lang="es-ES" noProof="0">
-                <a:solidFill>
-                  <a:prstClr val="black">
-                    <a:tint val="75000"/>
-                  </a:prstClr>
-                </a:solidFill>
-              </a:rPr>
-              <a:t>Título de la presentación</a:t>
-            </a:r>
           </a:p>
         </p:txBody>
       </p:sp>
@@ -15410,7 +15624,7 @@
                 </a:spcAft>
                 <a:defRPr/>
               </a:pPr>
-              <a:t>16</a:t>
+              <a:t>18</a:t>
             </a:fld>
             <a:endParaRPr lang="es-ES" noProof="0">
               <a:solidFill>
@@ -15665,7 +15879,7 @@
 </p:sld>
 </file>
 
-<file path=ppt/slides/slide17.xml><?xml version="1.0" encoding="utf-8"?>
+<file path=ppt/slides/slide19.xml><?xml version="1.0" encoding="utf-8"?>
 <p:sld xmlns:a="http://schemas.openxmlformats.org/drawingml/2006/main" xmlns:r="http://schemas.openxmlformats.org/officeDocument/2006/relationships" xmlns:p="http://schemas.openxmlformats.org/presentationml/2006/main">
   <p:cSld>
     <p:spTree>
@@ -15908,7 +16122,7 @@
                 <a:tabLst/>
                 <a:defRPr/>
               </a:pPr>
-              <a:t>17</a:t>
+              <a:t>19</a:t>
             </a:fld>
             <a:endParaRPr kumimoji="0" lang="es-ES" b="0" i="0" u="none" strike="noStrike" kern="1200" cap="none" spc="0" normalizeH="0" baseline="0">
               <a:ln>
@@ -15930,690 +16144,6 @@
     <p:extLst>
       <p:ext uri="{BB962C8B-B14F-4D97-AF65-F5344CB8AC3E}">
         <p14:creationId xmlns:p14="http://schemas.microsoft.com/office/powerpoint/2010/main" val="2232007123"/>
-      </p:ext>
-    </p:extLst>
-  </p:cSld>
-  <p:clrMapOvr>
-    <a:masterClrMapping/>
-  </p:clrMapOvr>
-</p:sld>
-</file>
-
-<file path=ppt/slides/slide18.xml><?xml version="1.0" encoding="utf-8"?>
-<p:sld xmlns:a="http://schemas.openxmlformats.org/drawingml/2006/main" xmlns:r="http://schemas.openxmlformats.org/officeDocument/2006/relationships" xmlns:p="http://schemas.openxmlformats.org/presentationml/2006/main">
-  <p:cSld>
-    <p:spTree>
-      <p:nvGrpSpPr>
-        <p:cNvPr id="1" name=""/>
-        <p:cNvGrpSpPr/>
-        <p:nvPr/>
-      </p:nvGrpSpPr>
-      <p:grpSpPr>
-        <a:xfrm>
-          <a:off x="0" y="0"/>
-          <a:ext cx="0" cy="0"/>
-          <a:chOff x="0" y="0"/>
-          <a:chExt cx="0" cy="0"/>
-        </a:xfrm>
-      </p:grpSpPr>
-      <p:sp>
-        <p:nvSpPr>
-          <p:cNvPr id="2" name="Título 1">
-            <a:extLst>
-              <a:ext uri="{FF2B5EF4-FFF2-40B4-BE49-F238E27FC236}">
-                <a16:creationId xmlns:a16="http://schemas.microsoft.com/office/drawing/2014/main" id="{40EB430E-F69D-41A9-A50E-2656CB55B392}"/>
-              </a:ext>
-            </a:extLst>
-          </p:cNvPr>
-          <p:cNvSpPr>
-            <a:spLocks noGrp="1"/>
-          </p:cNvSpPr>
-          <p:nvPr>
-            <p:ph type="title"/>
-          </p:nvPr>
-        </p:nvSpPr>
-        <p:spPr/>
-        <p:txBody>
-          <a:bodyPr/>
-          <a:lstStyle/>
-          <a:p>
-            <a:r>
-              <a:rPr lang="en-US" dirty="0" err="1"/>
-              <a:t>Descripción</a:t>
-            </a:r>
-            <a:r>
-              <a:rPr lang="en-US" dirty="0"/>
-              <a:t> del dataset</a:t>
-            </a:r>
-          </a:p>
-        </p:txBody>
-      </p:sp>
-      <p:sp>
-        <p:nvSpPr>
-          <p:cNvPr id="3" name="Marcador de contenido 2">
-            <a:extLst>
-              <a:ext uri="{FF2B5EF4-FFF2-40B4-BE49-F238E27FC236}">
-                <a16:creationId xmlns:a16="http://schemas.microsoft.com/office/drawing/2014/main" id="{66F34B46-F768-4F16-8147-A29B79597829}"/>
-              </a:ext>
-            </a:extLst>
-          </p:cNvPr>
-          <p:cNvSpPr>
-            <a:spLocks noGrp="1"/>
-          </p:cNvSpPr>
-          <p:nvPr>
-            <p:ph sz="half" idx="1"/>
-          </p:nvPr>
-        </p:nvSpPr>
-        <p:spPr/>
-        <p:txBody>
-          <a:bodyPr>
-            <a:normAutofit fontScale="70000" lnSpcReduction="20000"/>
-          </a:bodyPr>
-          <a:lstStyle/>
-          <a:p>
-            <a:r>
-              <a:rPr lang="es-MX" sz="2600" dirty="0"/>
-              <a:t>El </a:t>
-            </a:r>
-            <a:r>
-              <a:rPr lang="es-MX" sz="2600" dirty="0" err="1"/>
-              <a:t>dataset</a:t>
-            </a:r>
-            <a:r>
-              <a:rPr lang="es-MX" sz="2600" dirty="0"/>
-              <a:t> a utilizar viene de un repositorio en </a:t>
-            </a:r>
-            <a:r>
-              <a:rPr lang="es-MX" sz="2600" dirty="0" err="1"/>
-              <a:t>github</a:t>
-            </a:r>
-            <a:r>
-              <a:rPr lang="es-MX" sz="2600" dirty="0"/>
-              <a:t>.</a:t>
-            </a:r>
-          </a:p>
-          <a:p>
-            <a:r>
-              <a:rPr lang="es-MX" sz="2600" dirty="0"/>
-              <a:t>El </a:t>
-            </a:r>
-            <a:r>
-              <a:rPr lang="es-MX" sz="2600" dirty="0" err="1"/>
-              <a:t>dataset</a:t>
-            </a:r>
-            <a:r>
-              <a:rPr lang="es-MX" sz="2600" dirty="0"/>
-              <a:t> contiene información de los vuelos del 6 enero de 2019 de una cierta aerolínea en Estados Unidos y muestra los registros de sus 565 vuelos de ese día para únicamente 10 aeropuertos. </a:t>
-            </a:r>
-          </a:p>
-          <a:p>
-            <a:endParaRPr lang="en-US" sz="1800" dirty="0"/>
-          </a:p>
-        </p:txBody>
-      </p:sp>
-      <p:sp>
-        <p:nvSpPr>
-          <p:cNvPr id="5" name="Marcador de fecha 4">
-            <a:extLst>
-              <a:ext uri="{FF2B5EF4-FFF2-40B4-BE49-F238E27FC236}">
-                <a16:creationId xmlns:a16="http://schemas.microsoft.com/office/drawing/2014/main" id="{318C4090-B6A2-41B6-9F24-39B6ECBF22D1}"/>
-              </a:ext>
-            </a:extLst>
-          </p:cNvPr>
-          <p:cNvSpPr>
-            <a:spLocks noGrp="1"/>
-          </p:cNvSpPr>
-          <p:nvPr>
-            <p:ph type="dt" sz="half" idx="10"/>
-          </p:nvPr>
-        </p:nvSpPr>
-        <p:spPr/>
-        <p:txBody>
-          <a:bodyPr/>
-          <a:lstStyle/>
-          <a:p>
-            <a:pPr rtl="0">
-              <a:defRPr/>
-            </a:pPr>
-            <a:r>
-              <a:rPr lang="es-ES" noProof="0">
-                <a:solidFill>
-                  <a:prstClr val="black">
-                    <a:tint val="75000"/>
-                  </a:prstClr>
-                </a:solidFill>
-              </a:rPr>
-              <a:t>3/9/20XX</a:t>
-            </a:r>
-          </a:p>
-        </p:txBody>
-      </p:sp>
-      <p:sp>
-        <p:nvSpPr>
-          <p:cNvPr id="6" name="Marcador de pie de página 5">
-            <a:extLst>
-              <a:ext uri="{FF2B5EF4-FFF2-40B4-BE49-F238E27FC236}">
-                <a16:creationId xmlns:a16="http://schemas.microsoft.com/office/drawing/2014/main" id="{24EB3927-1177-47DD-AFE2-B0E9730CF6DB}"/>
-              </a:ext>
-            </a:extLst>
-          </p:cNvPr>
-          <p:cNvSpPr>
-            <a:spLocks noGrp="1"/>
-          </p:cNvSpPr>
-          <p:nvPr>
-            <p:ph type="ftr" sz="quarter" idx="11"/>
-          </p:nvPr>
-        </p:nvSpPr>
-        <p:spPr/>
-        <p:txBody>
-          <a:bodyPr/>
-          <a:lstStyle/>
-          <a:p>
-            <a:pPr rtl="0">
-              <a:defRPr/>
-            </a:pPr>
-            <a:r>
-              <a:rPr lang="es-ES" noProof="0">
-                <a:solidFill>
-                  <a:prstClr val="black">
-                    <a:tint val="75000"/>
-                  </a:prstClr>
-                </a:solidFill>
-              </a:rPr>
-              <a:t>Título de la presentación</a:t>
-            </a:r>
-          </a:p>
-        </p:txBody>
-      </p:sp>
-      <p:sp>
-        <p:nvSpPr>
-          <p:cNvPr id="7" name="Marcador de número de diapositiva 6">
-            <a:extLst>
-              <a:ext uri="{FF2B5EF4-FFF2-40B4-BE49-F238E27FC236}">
-                <a16:creationId xmlns:a16="http://schemas.microsoft.com/office/drawing/2014/main" id="{D9F671EC-902F-4C7A-8068-F2801AD56BCC}"/>
-              </a:ext>
-            </a:extLst>
-          </p:cNvPr>
-          <p:cNvSpPr>
-            <a:spLocks noGrp="1"/>
-          </p:cNvSpPr>
-          <p:nvPr>
-            <p:ph type="sldNum" sz="quarter" idx="12"/>
-          </p:nvPr>
-        </p:nvSpPr>
-        <p:spPr/>
-        <p:txBody>
-          <a:bodyPr/>
-          <a:lstStyle/>
-          <a:p>
-            <a:pPr rtl="0">
-              <a:defRPr/>
-            </a:pPr>
-            <a:fld id="{D76B855D-E9CC-4FF8-AD85-6CDC7B89A0DE}" type="slidenum">
-              <a:rPr lang="es-ES" noProof="0" smtClean="0">
-                <a:solidFill>
-                  <a:prstClr val="black">
-                    <a:tint val="75000"/>
-                  </a:prstClr>
-                </a:solidFill>
-              </a:rPr>
-              <a:pPr rtl="0">
-                <a:defRPr/>
-              </a:pPr>
-              <a:t>18</a:t>
-            </a:fld>
-            <a:endParaRPr lang="es-ES" noProof="0">
-              <a:solidFill>
-                <a:prstClr val="black">
-                  <a:tint val="75000"/>
-                </a:prstClr>
-              </a:solidFill>
-            </a:endParaRPr>
-          </a:p>
-        </p:txBody>
-      </p:sp>
-      <p:sp>
-        <p:nvSpPr>
-          <p:cNvPr id="13" name="Marcador de contenido 12">
-            <a:extLst>
-              <a:ext uri="{FF2B5EF4-FFF2-40B4-BE49-F238E27FC236}">
-                <a16:creationId xmlns:a16="http://schemas.microsoft.com/office/drawing/2014/main" id="{4E39429C-E896-497F-9888-2956C0B20243}"/>
-              </a:ext>
-            </a:extLst>
-          </p:cNvPr>
-          <p:cNvSpPr>
-            <a:spLocks noGrp="1"/>
-          </p:cNvSpPr>
-          <p:nvPr>
-            <p:ph sz="half" idx="2"/>
-          </p:nvPr>
-        </p:nvSpPr>
-        <p:spPr/>
-        <p:txBody>
-          <a:bodyPr>
-            <a:normAutofit fontScale="70000" lnSpcReduction="20000"/>
-          </a:bodyPr>
-          <a:lstStyle/>
-          <a:p>
-            <a:pPr marL="0" indent="0">
-              <a:buNone/>
-            </a:pPr>
-            <a:r>
-              <a:rPr lang="es-MX" dirty="0"/>
-              <a:t>El </a:t>
-            </a:r>
-            <a:r>
-              <a:rPr lang="es-MX" dirty="0" err="1"/>
-              <a:t>dataset</a:t>
-            </a:r>
-            <a:r>
-              <a:rPr lang="es-MX" dirty="0"/>
-              <a:t> cuenta con cinco columnas:</a:t>
-            </a:r>
-          </a:p>
-          <a:p>
-            <a:endParaRPr lang="es-MX" dirty="0"/>
-          </a:p>
-          <a:p>
-            <a:r>
-              <a:rPr lang="es-MX" dirty="0" err="1"/>
-              <a:t>Source</a:t>
-            </a:r>
-            <a:r>
-              <a:rPr lang="es-MX" dirty="0"/>
-              <a:t>: identificador del aeropuerto origen del que sale el vuelo</a:t>
-            </a:r>
-          </a:p>
-          <a:p>
-            <a:r>
-              <a:rPr lang="es-MX" dirty="0" err="1"/>
-              <a:t>Destination</a:t>
-            </a:r>
-            <a:r>
-              <a:rPr lang="es-MX" dirty="0"/>
-              <a:t>: identificador del aeropuerto destino al que llega el vuelo</a:t>
-            </a:r>
-          </a:p>
-          <a:p>
-            <a:r>
-              <a:rPr lang="es-MX" dirty="0" err="1"/>
-              <a:t>Departure</a:t>
-            </a:r>
-            <a:r>
-              <a:rPr lang="es-MX" dirty="0"/>
-              <a:t>: hora de despegue del vuelo en el aeropuerto origen en horas militares</a:t>
-            </a:r>
-          </a:p>
-          <a:p>
-            <a:r>
-              <a:rPr lang="es-MX" dirty="0" err="1"/>
-              <a:t>Arrival</a:t>
-            </a:r>
-            <a:r>
-              <a:rPr lang="es-MX" dirty="0"/>
-              <a:t>: hora de aterrizaje del vuelo en el aeropuerto destino en horas militares</a:t>
-            </a:r>
-          </a:p>
-          <a:p>
-            <a:r>
-              <a:rPr lang="es-MX" dirty="0" err="1"/>
-              <a:t>capacity</a:t>
-            </a:r>
-            <a:r>
-              <a:rPr lang="es-MX" dirty="0"/>
-              <a:t>: cantidad máxima de pasajeros que puede transportar el vuelo (sin contar al </a:t>
-            </a:r>
-            <a:r>
-              <a:rPr lang="es-MX" dirty="0" err="1"/>
-              <a:t>crew</a:t>
-            </a:r>
-            <a:r>
-              <a:rPr lang="es-MX" dirty="0"/>
-              <a:t>)</a:t>
-            </a:r>
-            <a:endParaRPr lang="en-US" dirty="0"/>
-          </a:p>
-        </p:txBody>
-      </p:sp>
-      <p:pic>
-        <p:nvPicPr>
-          <p:cNvPr id="17" name="Imagen 16">
-            <a:extLst>
-              <a:ext uri="{FF2B5EF4-FFF2-40B4-BE49-F238E27FC236}">
-                <a16:creationId xmlns:a16="http://schemas.microsoft.com/office/drawing/2014/main" id="{9B571B55-1069-430C-BAFA-F1C5AD23FEF4}"/>
-              </a:ext>
-            </a:extLst>
-          </p:cNvPr>
-          <p:cNvPicPr>
-            <a:picLocks noChangeAspect="1"/>
-          </p:cNvPicPr>
-          <p:nvPr/>
-        </p:nvPicPr>
-        <p:blipFill>
-          <a:blip r:embed="rId2"/>
-          <a:stretch>
-            <a:fillRect/>
-          </a:stretch>
-        </p:blipFill>
-        <p:spPr>
-          <a:xfrm>
-            <a:off x="1204602" y="3630260"/>
-            <a:ext cx="4448796" cy="2172003"/>
-          </a:xfrm>
-          <a:prstGeom prst="rect">
-            <a:avLst/>
-          </a:prstGeom>
-        </p:spPr>
-      </p:pic>
-    </p:spTree>
-    <p:extLst>
-      <p:ext uri="{BB962C8B-B14F-4D97-AF65-F5344CB8AC3E}">
-        <p14:creationId xmlns:p14="http://schemas.microsoft.com/office/powerpoint/2010/main" val="2405662673"/>
-      </p:ext>
-    </p:extLst>
-  </p:cSld>
-  <p:clrMapOvr>
-    <a:masterClrMapping/>
-  </p:clrMapOvr>
-</p:sld>
-</file>
-
-<file path=ppt/slides/slide19.xml><?xml version="1.0" encoding="utf-8"?>
-<p:sld xmlns:a="http://schemas.openxmlformats.org/drawingml/2006/main" xmlns:r="http://schemas.openxmlformats.org/officeDocument/2006/relationships" xmlns:p="http://schemas.openxmlformats.org/presentationml/2006/main">
-  <p:cSld>
-    <p:spTree>
-      <p:nvGrpSpPr>
-        <p:cNvPr id="1" name=""/>
-        <p:cNvGrpSpPr/>
-        <p:nvPr/>
-      </p:nvGrpSpPr>
-      <p:grpSpPr>
-        <a:xfrm>
-          <a:off x="0" y="0"/>
-          <a:ext cx="0" cy="0"/>
-          <a:chOff x="0" y="0"/>
-          <a:chExt cx="0" cy="0"/>
-        </a:xfrm>
-      </p:grpSpPr>
-      <p:sp>
-        <p:nvSpPr>
-          <p:cNvPr id="71" name="Title 1">
-            <a:extLst>
-              <a:ext uri="{FF2B5EF4-FFF2-40B4-BE49-F238E27FC236}">
-                <a16:creationId xmlns:a16="http://schemas.microsoft.com/office/drawing/2014/main" id="{FB32599D-D1DA-4C81-AF20-285979709633}"/>
-              </a:ext>
-            </a:extLst>
-          </p:cNvPr>
-          <p:cNvSpPr>
-            <a:spLocks noGrp="1"/>
-          </p:cNvSpPr>
-          <p:nvPr>
-            <p:ph type="title"/>
-          </p:nvPr>
-        </p:nvSpPr>
-        <p:spPr>
-          <a:xfrm>
-            <a:off x="838200" y="365125"/>
-            <a:ext cx="10515600" cy="1325563"/>
-          </a:xfrm>
-        </p:spPr>
-        <p:txBody>
-          <a:bodyPr anchor="ctr">
-            <a:normAutofit/>
-          </a:bodyPr>
-          <a:lstStyle/>
-          <a:p>
-            <a:r>
-              <a:rPr lang="en-US" dirty="0" err="1"/>
-              <a:t>Gráfica</a:t>
-            </a:r>
-            <a:r>
-              <a:rPr lang="en-US" dirty="0"/>
-              <a:t> de las </a:t>
-            </a:r>
-            <a:r>
-              <a:rPr lang="en-US" dirty="0" err="1"/>
-              <a:t>rutas</a:t>
-            </a:r>
-            <a:endParaRPr lang="en-US" dirty="0"/>
-          </a:p>
-        </p:txBody>
-      </p:sp>
-      <p:pic>
-        <p:nvPicPr>
-          <p:cNvPr id="9" name="Imagen 8">
-            <a:extLst>
-              <a:ext uri="{FF2B5EF4-FFF2-40B4-BE49-F238E27FC236}">
-                <a16:creationId xmlns:a16="http://schemas.microsoft.com/office/drawing/2014/main" id="{AFE2707D-5AFA-442B-AC20-9279C839A16E}"/>
-              </a:ext>
-            </a:extLst>
-          </p:cNvPr>
-          <p:cNvPicPr>
-            <a:picLocks noChangeAspect="1"/>
-          </p:cNvPicPr>
-          <p:nvPr/>
-        </p:nvPicPr>
-        <p:blipFill rotWithShape="1">
-          <a:blip r:embed="rId2"/>
-          <a:srcRect l="2132" r="3" b="3"/>
-          <a:stretch/>
-        </p:blipFill>
-        <p:spPr>
-          <a:xfrm>
-            <a:off x="912812" y="1690688"/>
-            <a:ext cx="5157787" cy="3684588"/>
-          </a:xfrm>
-          <a:prstGeom prst="rect">
-            <a:avLst/>
-          </a:prstGeom>
-          <a:noFill/>
-        </p:spPr>
-      </p:pic>
-      <p:pic>
-        <p:nvPicPr>
-          <p:cNvPr id="1026" name="Picture 2">
-            <a:extLst>
-              <a:ext uri="{FF2B5EF4-FFF2-40B4-BE49-F238E27FC236}">
-                <a16:creationId xmlns:a16="http://schemas.microsoft.com/office/drawing/2014/main" id="{1E0CF21C-D45E-49CB-850F-7BD01EBE1CF1}"/>
-              </a:ext>
-            </a:extLst>
-          </p:cNvPr>
-          <p:cNvPicPr>
-            <a:picLocks noChangeAspect="1" noChangeArrowheads="1"/>
-          </p:cNvPicPr>
-          <p:nvPr/>
-        </p:nvPicPr>
-        <p:blipFill rotWithShape="1">
-          <a:blip r:embed="rId3">
-            <a:extLst>
-              <a:ext uri="{28A0092B-C50C-407E-A947-70E740481C1C}">
-                <a14:useLocalDpi xmlns:a14="http://schemas.microsoft.com/office/drawing/2010/main" val="0"/>
-              </a:ext>
-            </a:extLst>
-          </a:blip>
-          <a:srcRect r="7858" b="-2"/>
-          <a:stretch/>
-        </p:blipFill>
-        <p:spPr bwMode="auto">
-          <a:xfrm>
-            <a:off x="6096000" y="1690688"/>
-            <a:ext cx="5183188" cy="3684588"/>
-          </a:xfrm>
-          <a:prstGeom prst="rect">
-            <a:avLst/>
-          </a:prstGeom>
-          <a:solidFill>
-            <a:srgbClr val="FFFFFF"/>
-          </a:solidFill>
-          <a:extLst>
-            <a:ext uri="{909E8E84-426E-40DD-AFC4-6F175D3DCCD1}">
-              <a14:hiddenFill xmlns:a14="http://schemas.microsoft.com/office/drawing/2010/main">
-                <a:solidFill>
-                  <a:srgbClr val="FFFFFF"/>
-                </a:solidFill>
-              </a14:hiddenFill>
-            </a:ext>
-          </a:extLst>
-        </p:spPr>
-      </p:pic>
-      <p:sp>
-        <p:nvSpPr>
-          <p:cNvPr id="5" name="Marcador de fecha 4">
-            <a:extLst>
-              <a:ext uri="{FF2B5EF4-FFF2-40B4-BE49-F238E27FC236}">
-                <a16:creationId xmlns:a16="http://schemas.microsoft.com/office/drawing/2014/main" id="{50B79849-55F4-48E3-8978-BAEA91C0E8F8}"/>
-              </a:ext>
-            </a:extLst>
-          </p:cNvPr>
-          <p:cNvSpPr>
-            <a:spLocks noGrp="1"/>
-          </p:cNvSpPr>
-          <p:nvPr>
-            <p:ph type="dt" sz="half" idx="10"/>
-          </p:nvPr>
-        </p:nvSpPr>
-        <p:spPr>
-          <a:xfrm>
-            <a:off x="838200" y="6356350"/>
-            <a:ext cx="2743200" cy="365125"/>
-          </a:xfrm>
-        </p:spPr>
-        <p:txBody>
-          <a:bodyPr anchor="ctr">
-            <a:normAutofit/>
-          </a:bodyPr>
-          <a:lstStyle/>
-          <a:p>
-            <a:pPr rtl="0">
-              <a:spcAft>
-                <a:spcPts val="600"/>
-              </a:spcAft>
-              <a:defRPr/>
-            </a:pPr>
-            <a:r>
-              <a:rPr lang="es-ES" noProof="0">
-                <a:solidFill>
-                  <a:prstClr val="black">
-                    <a:tint val="75000"/>
-                  </a:prstClr>
-                </a:solidFill>
-              </a:rPr>
-              <a:t>3/9/20XX</a:t>
-            </a:r>
-          </a:p>
-        </p:txBody>
-      </p:sp>
-      <p:sp>
-        <p:nvSpPr>
-          <p:cNvPr id="6" name="Marcador de pie de página 5">
-            <a:extLst>
-              <a:ext uri="{FF2B5EF4-FFF2-40B4-BE49-F238E27FC236}">
-                <a16:creationId xmlns:a16="http://schemas.microsoft.com/office/drawing/2014/main" id="{F9AA2089-BC95-4199-BFB0-03FBB959FB2D}"/>
-              </a:ext>
-            </a:extLst>
-          </p:cNvPr>
-          <p:cNvSpPr>
-            <a:spLocks noGrp="1"/>
-          </p:cNvSpPr>
-          <p:nvPr>
-            <p:ph type="ftr" sz="quarter" idx="11"/>
-          </p:nvPr>
-        </p:nvSpPr>
-        <p:spPr>
-          <a:xfrm>
-            <a:off x="4038600" y="6356350"/>
-            <a:ext cx="4114800" cy="365125"/>
-          </a:xfrm>
-        </p:spPr>
-        <p:txBody>
-          <a:bodyPr anchor="ctr">
-            <a:normAutofit/>
-          </a:bodyPr>
-          <a:lstStyle/>
-          <a:p>
-            <a:pPr rtl="0">
-              <a:spcAft>
-                <a:spcPts val="600"/>
-              </a:spcAft>
-              <a:defRPr/>
-            </a:pPr>
-            <a:r>
-              <a:rPr lang="es-ES" noProof="0">
-                <a:solidFill>
-                  <a:prstClr val="black">
-                    <a:tint val="75000"/>
-                  </a:prstClr>
-                </a:solidFill>
-              </a:rPr>
-              <a:t>Título de la presentación</a:t>
-            </a:r>
-          </a:p>
-        </p:txBody>
-      </p:sp>
-      <p:sp>
-        <p:nvSpPr>
-          <p:cNvPr id="7" name="Marcador de número de diapositiva 6">
-            <a:extLst>
-              <a:ext uri="{FF2B5EF4-FFF2-40B4-BE49-F238E27FC236}">
-                <a16:creationId xmlns:a16="http://schemas.microsoft.com/office/drawing/2014/main" id="{01324B33-FD84-4510-918A-37BDD691F73E}"/>
-              </a:ext>
-            </a:extLst>
-          </p:cNvPr>
-          <p:cNvSpPr>
-            <a:spLocks noGrp="1"/>
-          </p:cNvSpPr>
-          <p:nvPr>
-            <p:ph type="sldNum" sz="quarter" idx="12"/>
-          </p:nvPr>
-        </p:nvSpPr>
-        <p:spPr>
-          <a:xfrm>
-            <a:off x="8610600" y="6356350"/>
-            <a:ext cx="2743200" cy="365125"/>
-          </a:xfrm>
-        </p:spPr>
-        <p:txBody>
-          <a:bodyPr anchor="ctr">
-            <a:normAutofit/>
-          </a:bodyPr>
-          <a:lstStyle/>
-          <a:p>
-            <a:pPr rtl="0">
-              <a:spcAft>
-                <a:spcPts val="600"/>
-              </a:spcAft>
-              <a:defRPr/>
-            </a:pPr>
-            <a:fld id="{D76B855D-E9CC-4FF8-AD85-6CDC7B89A0DE}" type="slidenum">
-              <a:rPr lang="es-ES" noProof="0" smtClean="0">
-                <a:solidFill>
-                  <a:prstClr val="black">
-                    <a:tint val="75000"/>
-                  </a:prstClr>
-                </a:solidFill>
-              </a:rPr>
-              <a:pPr rtl="0">
-                <a:spcAft>
-                  <a:spcPts val="600"/>
-                </a:spcAft>
-                <a:defRPr/>
-              </a:pPr>
-              <a:t>19</a:t>
-            </a:fld>
-            <a:endParaRPr lang="es-ES" noProof="0">
-              <a:solidFill>
-                <a:prstClr val="black">
-                  <a:tint val="75000"/>
-                </a:prstClr>
-              </a:solidFill>
-            </a:endParaRPr>
-          </a:p>
-        </p:txBody>
-      </p:sp>
-    </p:spTree>
-    <p:extLst>
-      <p:ext uri="{BB962C8B-B14F-4D97-AF65-F5344CB8AC3E}">
-        <p14:creationId xmlns:p14="http://schemas.microsoft.com/office/powerpoint/2010/main" val="4091659100"/>
       </p:ext>
     </p:extLst>
   </p:cSld>
@@ -16859,6 +16389,522 @@
 </file>
 
 <file path=ppt/slides/slide20.xml><?xml version="1.0" encoding="utf-8"?>
+<p:sld xmlns:a="http://schemas.openxmlformats.org/drawingml/2006/main" xmlns:r="http://schemas.openxmlformats.org/officeDocument/2006/relationships" xmlns:p="http://schemas.openxmlformats.org/presentationml/2006/main">
+  <p:cSld>
+    <p:spTree>
+      <p:nvGrpSpPr>
+        <p:cNvPr id="1" name=""/>
+        <p:cNvGrpSpPr/>
+        <p:nvPr/>
+      </p:nvGrpSpPr>
+      <p:grpSpPr>
+        <a:xfrm>
+          <a:off x="0" y="0"/>
+          <a:ext cx="0" cy="0"/>
+          <a:chOff x="0" y="0"/>
+          <a:chExt cx="0" cy="0"/>
+        </a:xfrm>
+      </p:grpSpPr>
+      <p:sp>
+        <p:nvSpPr>
+          <p:cNvPr id="2" name="Título 1">
+            <a:extLst>
+              <a:ext uri="{FF2B5EF4-FFF2-40B4-BE49-F238E27FC236}">
+                <a16:creationId xmlns:a16="http://schemas.microsoft.com/office/drawing/2014/main" id="{40EB430E-F69D-41A9-A50E-2656CB55B392}"/>
+              </a:ext>
+            </a:extLst>
+          </p:cNvPr>
+          <p:cNvSpPr>
+            <a:spLocks noGrp="1"/>
+          </p:cNvSpPr>
+          <p:nvPr>
+            <p:ph type="title"/>
+          </p:nvPr>
+        </p:nvSpPr>
+        <p:spPr/>
+        <p:txBody>
+          <a:bodyPr/>
+          <a:lstStyle/>
+          <a:p>
+            <a:r>
+              <a:rPr lang="en-US" dirty="0" err="1"/>
+              <a:t>Descripción</a:t>
+            </a:r>
+            <a:r>
+              <a:rPr lang="en-US" dirty="0"/>
+              <a:t> del dataset</a:t>
+            </a:r>
+          </a:p>
+        </p:txBody>
+      </p:sp>
+      <p:sp>
+        <p:nvSpPr>
+          <p:cNvPr id="3" name="Marcador de contenido 2">
+            <a:extLst>
+              <a:ext uri="{FF2B5EF4-FFF2-40B4-BE49-F238E27FC236}">
+                <a16:creationId xmlns:a16="http://schemas.microsoft.com/office/drawing/2014/main" id="{66F34B46-F768-4F16-8147-A29B79597829}"/>
+              </a:ext>
+            </a:extLst>
+          </p:cNvPr>
+          <p:cNvSpPr>
+            <a:spLocks noGrp="1"/>
+          </p:cNvSpPr>
+          <p:nvPr>
+            <p:ph sz="half" idx="1"/>
+          </p:nvPr>
+        </p:nvSpPr>
+        <p:spPr/>
+        <p:txBody>
+          <a:bodyPr>
+            <a:normAutofit fontScale="70000" lnSpcReduction="20000"/>
+          </a:bodyPr>
+          <a:lstStyle/>
+          <a:p>
+            <a:r>
+              <a:rPr lang="es-MX" sz="2600" dirty="0"/>
+              <a:t>El </a:t>
+            </a:r>
+            <a:r>
+              <a:rPr lang="es-MX" sz="2600" dirty="0" err="1"/>
+              <a:t>dataset</a:t>
+            </a:r>
+            <a:r>
+              <a:rPr lang="es-MX" sz="2600" dirty="0"/>
+              <a:t> a utilizar viene de un repositorio en </a:t>
+            </a:r>
+            <a:r>
+              <a:rPr lang="es-MX" sz="2600" dirty="0" err="1"/>
+              <a:t>github</a:t>
+            </a:r>
+            <a:r>
+              <a:rPr lang="es-MX" sz="2600" dirty="0"/>
+              <a:t>.</a:t>
+            </a:r>
+          </a:p>
+          <a:p>
+            <a:r>
+              <a:rPr lang="es-MX" sz="2600" dirty="0"/>
+              <a:t>El </a:t>
+            </a:r>
+            <a:r>
+              <a:rPr lang="es-MX" sz="2600" dirty="0" err="1"/>
+              <a:t>dataset</a:t>
+            </a:r>
+            <a:r>
+              <a:rPr lang="es-MX" sz="2600" dirty="0"/>
+              <a:t> contiene información de los vuelos del 6 enero de 2019 de una cierta aerolínea en Estados Unidos y muestra los registros de sus 565 vuelos de ese día para únicamente 10 aeropuertos. </a:t>
+            </a:r>
+          </a:p>
+          <a:p>
+            <a:endParaRPr lang="en-US" sz="1800" dirty="0"/>
+          </a:p>
+        </p:txBody>
+      </p:sp>
+      <p:sp>
+        <p:nvSpPr>
+          <p:cNvPr id="7" name="Marcador de número de diapositiva 6">
+            <a:extLst>
+              <a:ext uri="{FF2B5EF4-FFF2-40B4-BE49-F238E27FC236}">
+                <a16:creationId xmlns:a16="http://schemas.microsoft.com/office/drawing/2014/main" id="{D9F671EC-902F-4C7A-8068-F2801AD56BCC}"/>
+              </a:ext>
+            </a:extLst>
+          </p:cNvPr>
+          <p:cNvSpPr>
+            <a:spLocks noGrp="1"/>
+          </p:cNvSpPr>
+          <p:nvPr>
+            <p:ph type="sldNum" sz="quarter" idx="12"/>
+          </p:nvPr>
+        </p:nvSpPr>
+        <p:spPr/>
+        <p:txBody>
+          <a:bodyPr/>
+          <a:lstStyle/>
+          <a:p>
+            <a:pPr rtl="0">
+              <a:defRPr/>
+            </a:pPr>
+            <a:fld id="{D76B855D-E9CC-4FF8-AD85-6CDC7B89A0DE}" type="slidenum">
+              <a:rPr lang="es-ES" noProof="0" smtClean="0">
+                <a:solidFill>
+                  <a:prstClr val="black">
+                    <a:tint val="75000"/>
+                  </a:prstClr>
+                </a:solidFill>
+              </a:rPr>
+              <a:pPr rtl="0">
+                <a:defRPr/>
+              </a:pPr>
+              <a:t>20</a:t>
+            </a:fld>
+            <a:endParaRPr lang="es-ES" noProof="0">
+              <a:solidFill>
+                <a:prstClr val="black">
+                  <a:tint val="75000"/>
+                </a:prstClr>
+              </a:solidFill>
+            </a:endParaRPr>
+          </a:p>
+        </p:txBody>
+      </p:sp>
+      <p:sp>
+        <p:nvSpPr>
+          <p:cNvPr id="13" name="Marcador de contenido 12">
+            <a:extLst>
+              <a:ext uri="{FF2B5EF4-FFF2-40B4-BE49-F238E27FC236}">
+                <a16:creationId xmlns:a16="http://schemas.microsoft.com/office/drawing/2014/main" id="{4E39429C-E896-497F-9888-2956C0B20243}"/>
+              </a:ext>
+            </a:extLst>
+          </p:cNvPr>
+          <p:cNvSpPr>
+            <a:spLocks noGrp="1"/>
+          </p:cNvSpPr>
+          <p:nvPr>
+            <p:ph sz="half" idx="2"/>
+          </p:nvPr>
+        </p:nvSpPr>
+        <p:spPr/>
+        <p:txBody>
+          <a:bodyPr>
+            <a:normAutofit fontScale="70000" lnSpcReduction="20000"/>
+          </a:bodyPr>
+          <a:lstStyle/>
+          <a:p>
+            <a:pPr marL="0" indent="0">
+              <a:buNone/>
+            </a:pPr>
+            <a:r>
+              <a:rPr lang="es-MX" dirty="0"/>
+              <a:t>El </a:t>
+            </a:r>
+            <a:r>
+              <a:rPr lang="es-MX" dirty="0" err="1"/>
+              <a:t>dataset</a:t>
+            </a:r>
+            <a:r>
+              <a:rPr lang="es-MX" dirty="0"/>
+              <a:t> cuenta con cinco columnas:</a:t>
+            </a:r>
+          </a:p>
+          <a:p>
+            <a:endParaRPr lang="es-MX" dirty="0"/>
+          </a:p>
+          <a:p>
+            <a:r>
+              <a:rPr lang="es-MX" dirty="0" err="1"/>
+              <a:t>Source</a:t>
+            </a:r>
+            <a:r>
+              <a:rPr lang="es-MX" dirty="0"/>
+              <a:t>: identificador del aeropuerto origen del que sale el vuelo</a:t>
+            </a:r>
+          </a:p>
+          <a:p>
+            <a:r>
+              <a:rPr lang="es-MX" dirty="0" err="1"/>
+              <a:t>Destination</a:t>
+            </a:r>
+            <a:r>
+              <a:rPr lang="es-MX" dirty="0"/>
+              <a:t>: identificador del aeropuerto destino al que llega el vuelo</a:t>
+            </a:r>
+          </a:p>
+          <a:p>
+            <a:r>
+              <a:rPr lang="es-MX" dirty="0" err="1"/>
+              <a:t>Departure</a:t>
+            </a:r>
+            <a:r>
+              <a:rPr lang="es-MX" dirty="0"/>
+              <a:t>: hora de despegue del vuelo en el aeropuerto origen en horas militares</a:t>
+            </a:r>
+          </a:p>
+          <a:p>
+            <a:r>
+              <a:rPr lang="es-MX" dirty="0" err="1"/>
+              <a:t>Arrival</a:t>
+            </a:r>
+            <a:r>
+              <a:rPr lang="es-MX" dirty="0"/>
+              <a:t>: hora de aterrizaje del vuelo en el aeropuerto destino en horas militares</a:t>
+            </a:r>
+          </a:p>
+          <a:p>
+            <a:r>
+              <a:rPr lang="es-MX" dirty="0" err="1"/>
+              <a:t>capacity</a:t>
+            </a:r>
+            <a:r>
+              <a:rPr lang="es-MX" dirty="0"/>
+              <a:t>: cantidad máxima de pasajeros que puede transportar el vuelo (sin contar al </a:t>
+            </a:r>
+            <a:r>
+              <a:rPr lang="es-MX" dirty="0" err="1"/>
+              <a:t>crew</a:t>
+            </a:r>
+            <a:r>
+              <a:rPr lang="es-MX" dirty="0"/>
+              <a:t>)</a:t>
+            </a:r>
+            <a:endParaRPr lang="en-US" dirty="0"/>
+          </a:p>
+        </p:txBody>
+      </p:sp>
+      <p:pic>
+        <p:nvPicPr>
+          <p:cNvPr id="17" name="Imagen 16">
+            <a:extLst>
+              <a:ext uri="{FF2B5EF4-FFF2-40B4-BE49-F238E27FC236}">
+                <a16:creationId xmlns:a16="http://schemas.microsoft.com/office/drawing/2014/main" id="{9B571B55-1069-430C-BAFA-F1C5AD23FEF4}"/>
+              </a:ext>
+            </a:extLst>
+          </p:cNvPr>
+          <p:cNvPicPr>
+            <a:picLocks noChangeAspect="1"/>
+          </p:cNvPicPr>
+          <p:nvPr/>
+        </p:nvPicPr>
+        <p:blipFill>
+          <a:blip r:embed="rId2"/>
+          <a:stretch>
+            <a:fillRect/>
+          </a:stretch>
+        </p:blipFill>
+        <p:spPr>
+          <a:xfrm>
+            <a:off x="1204602" y="3630260"/>
+            <a:ext cx="4448796" cy="2172003"/>
+          </a:xfrm>
+          <a:prstGeom prst="rect">
+            <a:avLst/>
+          </a:prstGeom>
+        </p:spPr>
+      </p:pic>
+    </p:spTree>
+    <p:extLst>
+      <p:ext uri="{BB962C8B-B14F-4D97-AF65-F5344CB8AC3E}">
+        <p14:creationId xmlns:p14="http://schemas.microsoft.com/office/powerpoint/2010/main" val="2405662673"/>
+      </p:ext>
+    </p:extLst>
+  </p:cSld>
+  <p:clrMapOvr>
+    <a:masterClrMapping/>
+  </p:clrMapOvr>
+</p:sld>
+</file>
+
+<file path=ppt/slides/slide21.xml><?xml version="1.0" encoding="utf-8"?>
+<p:sld xmlns:a="http://schemas.openxmlformats.org/drawingml/2006/main" xmlns:r="http://schemas.openxmlformats.org/officeDocument/2006/relationships" xmlns:p="http://schemas.openxmlformats.org/presentationml/2006/main">
+  <p:cSld>
+    <p:spTree>
+      <p:nvGrpSpPr>
+        <p:cNvPr id="1" name=""/>
+        <p:cNvGrpSpPr/>
+        <p:nvPr/>
+      </p:nvGrpSpPr>
+      <p:grpSpPr>
+        <a:xfrm>
+          <a:off x="0" y="0"/>
+          <a:ext cx="0" cy="0"/>
+          <a:chOff x="0" y="0"/>
+          <a:chExt cx="0" cy="0"/>
+        </a:xfrm>
+      </p:grpSpPr>
+      <p:sp>
+        <p:nvSpPr>
+          <p:cNvPr id="71" name="Title 1">
+            <a:extLst>
+              <a:ext uri="{FF2B5EF4-FFF2-40B4-BE49-F238E27FC236}">
+                <a16:creationId xmlns:a16="http://schemas.microsoft.com/office/drawing/2014/main" id="{FB32599D-D1DA-4C81-AF20-285979709633}"/>
+              </a:ext>
+            </a:extLst>
+          </p:cNvPr>
+          <p:cNvSpPr>
+            <a:spLocks noGrp="1"/>
+          </p:cNvSpPr>
+          <p:nvPr>
+            <p:ph type="title"/>
+          </p:nvPr>
+        </p:nvSpPr>
+        <p:spPr>
+          <a:xfrm>
+            <a:off x="838200" y="365125"/>
+            <a:ext cx="10515600" cy="1325563"/>
+          </a:xfrm>
+        </p:spPr>
+        <p:txBody>
+          <a:bodyPr anchor="ctr">
+            <a:normAutofit/>
+          </a:bodyPr>
+          <a:lstStyle/>
+          <a:p>
+            <a:r>
+              <a:rPr lang="en-US" dirty="0" err="1"/>
+              <a:t>Gráfica</a:t>
+            </a:r>
+            <a:r>
+              <a:rPr lang="en-US" dirty="0"/>
+              <a:t> de las </a:t>
+            </a:r>
+            <a:r>
+              <a:rPr lang="en-US" dirty="0" err="1"/>
+              <a:t>rutas</a:t>
+            </a:r>
+            <a:endParaRPr lang="en-US" dirty="0"/>
+          </a:p>
+        </p:txBody>
+      </p:sp>
+      <p:pic>
+        <p:nvPicPr>
+          <p:cNvPr id="9" name="Imagen 8">
+            <a:extLst>
+              <a:ext uri="{FF2B5EF4-FFF2-40B4-BE49-F238E27FC236}">
+                <a16:creationId xmlns:a16="http://schemas.microsoft.com/office/drawing/2014/main" id="{AFE2707D-5AFA-442B-AC20-9279C839A16E}"/>
+              </a:ext>
+            </a:extLst>
+          </p:cNvPr>
+          <p:cNvPicPr>
+            <a:picLocks noChangeAspect="1"/>
+          </p:cNvPicPr>
+          <p:nvPr/>
+        </p:nvPicPr>
+        <p:blipFill rotWithShape="1">
+          <a:blip r:embed="rId2"/>
+          <a:srcRect l="2132" r="3" b="3"/>
+          <a:stretch/>
+        </p:blipFill>
+        <p:spPr>
+          <a:xfrm>
+            <a:off x="912812" y="1690688"/>
+            <a:ext cx="5157787" cy="3684588"/>
+          </a:xfrm>
+          <a:prstGeom prst="rect">
+            <a:avLst/>
+          </a:prstGeom>
+          <a:noFill/>
+        </p:spPr>
+      </p:pic>
+      <p:pic>
+        <p:nvPicPr>
+          <p:cNvPr id="1026" name="Picture 2">
+            <a:extLst>
+              <a:ext uri="{FF2B5EF4-FFF2-40B4-BE49-F238E27FC236}">
+                <a16:creationId xmlns:a16="http://schemas.microsoft.com/office/drawing/2014/main" id="{1E0CF21C-D45E-49CB-850F-7BD01EBE1CF1}"/>
+              </a:ext>
+            </a:extLst>
+          </p:cNvPr>
+          <p:cNvPicPr>
+            <a:picLocks noChangeAspect="1" noChangeArrowheads="1"/>
+          </p:cNvPicPr>
+          <p:nvPr/>
+        </p:nvPicPr>
+        <p:blipFill rotWithShape="1">
+          <a:blip r:embed="rId3">
+            <a:extLst>
+              <a:ext uri="{28A0092B-C50C-407E-A947-70E740481C1C}">
+                <a14:useLocalDpi xmlns:a14="http://schemas.microsoft.com/office/drawing/2010/main" val="0"/>
+              </a:ext>
+            </a:extLst>
+          </a:blip>
+          <a:srcRect r="7858" b="-2"/>
+          <a:stretch/>
+        </p:blipFill>
+        <p:spPr bwMode="auto">
+          <a:xfrm>
+            <a:off x="6096000" y="1690688"/>
+            <a:ext cx="5183188" cy="3684588"/>
+          </a:xfrm>
+          <a:prstGeom prst="rect">
+            <a:avLst/>
+          </a:prstGeom>
+          <a:solidFill>
+            <a:srgbClr val="FFFFFF"/>
+          </a:solidFill>
+          <a:extLst>
+            <a:ext uri="{909E8E84-426E-40DD-AFC4-6F175D3DCCD1}">
+              <a14:hiddenFill xmlns:a14="http://schemas.microsoft.com/office/drawing/2010/main">
+                <a:solidFill>
+                  <a:srgbClr val="FFFFFF"/>
+                </a:solidFill>
+              </a14:hiddenFill>
+            </a:ext>
+          </a:extLst>
+        </p:spPr>
+      </p:pic>
+      <p:sp>
+        <p:nvSpPr>
+          <p:cNvPr id="7" name="Marcador de número de diapositiva 6">
+            <a:extLst>
+              <a:ext uri="{FF2B5EF4-FFF2-40B4-BE49-F238E27FC236}">
+                <a16:creationId xmlns:a16="http://schemas.microsoft.com/office/drawing/2014/main" id="{01324B33-FD84-4510-918A-37BDD691F73E}"/>
+              </a:ext>
+            </a:extLst>
+          </p:cNvPr>
+          <p:cNvSpPr>
+            <a:spLocks noGrp="1"/>
+          </p:cNvSpPr>
+          <p:nvPr>
+            <p:ph type="sldNum" sz="quarter" idx="12"/>
+          </p:nvPr>
+        </p:nvSpPr>
+        <p:spPr>
+          <a:xfrm>
+            <a:off x="8610600" y="6356350"/>
+            <a:ext cx="2743200" cy="365125"/>
+          </a:xfrm>
+        </p:spPr>
+        <p:txBody>
+          <a:bodyPr anchor="ctr">
+            <a:normAutofit/>
+          </a:bodyPr>
+          <a:lstStyle/>
+          <a:p>
+            <a:pPr rtl="0">
+              <a:spcAft>
+                <a:spcPts val="600"/>
+              </a:spcAft>
+              <a:defRPr/>
+            </a:pPr>
+            <a:fld id="{D76B855D-E9CC-4FF8-AD85-6CDC7B89A0DE}" type="slidenum">
+              <a:rPr lang="es-ES" noProof="0" smtClean="0">
+                <a:solidFill>
+                  <a:prstClr val="black">
+                    <a:tint val="75000"/>
+                  </a:prstClr>
+                </a:solidFill>
+              </a:rPr>
+              <a:pPr rtl="0">
+                <a:spcAft>
+                  <a:spcPts val="600"/>
+                </a:spcAft>
+                <a:defRPr/>
+              </a:pPr>
+              <a:t>21</a:t>
+            </a:fld>
+            <a:endParaRPr lang="es-ES" noProof="0">
+              <a:solidFill>
+                <a:prstClr val="black">
+                  <a:tint val="75000"/>
+                </a:prstClr>
+              </a:solidFill>
+            </a:endParaRPr>
+          </a:p>
+        </p:txBody>
+      </p:sp>
+    </p:spTree>
+    <p:extLst>
+      <p:ext uri="{BB962C8B-B14F-4D97-AF65-F5344CB8AC3E}">
+        <p14:creationId xmlns:p14="http://schemas.microsoft.com/office/powerpoint/2010/main" val="4091659100"/>
+      </p:ext>
+    </p:extLst>
+  </p:cSld>
+  <p:clrMapOvr>
+    <a:masterClrMapping/>
+  </p:clrMapOvr>
+</p:sld>
+</file>
+
+<file path=ppt/slides/slide22.xml><?xml version="1.0" encoding="utf-8"?>
 <p:sld xmlns:a="http://schemas.openxmlformats.org/drawingml/2006/main" xmlns:r="http://schemas.openxmlformats.org/officeDocument/2006/relationships" xmlns:p="http://schemas.openxmlformats.org/presentationml/2006/main">
   <p:cSld>
     <p:spTree>
@@ -17584,7 +17630,7 @@
                 </a:spcAft>
                 <a:defRPr/>
               </a:pPr>
-              <a:t>20</a:t>
+              <a:t>22</a:t>
             </a:fld>
             <a:endParaRPr lang="es-ES" noProof="0">
               <a:solidFill>
@@ -17609,7 +17655,7 @@
 </p:sld>
 </file>
 
-<file path=ppt/slides/slide21.xml><?xml version="1.0" encoding="utf-8"?>
+<file path=ppt/slides/slide23.xml><?xml version="1.0" encoding="utf-8"?>
 <p:sld xmlns:a="http://schemas.openxmlformats.org/drawingml/2006/main" xmlns:r="http://schemas.openxmlformats.org/officeDocument/2006/relationships" xmlns:p="http://schemas.openxmlformats.org/presentationml/2006/main">
   <p:cSld>
     <p:spTree>
@@ -17751,100 +17797,6 @@
               <a:t>) y se comparó el tiempo de ejecución de cado uno de ellos.</a:t>
             </a:r>
             <a:endParaRPr lang="en-US" dirty="0"/>
-          </a:p>
-        </p:txBody>
-      </p:sp>
-      <p:sp>
-        <p:nvSpPr>
-          <p:cNvPr id="5" name="Marcador de fecha 4">
-            <a:extLst>
-              <a:ext uri="{FF2B5EF4-FFF2-40B4-BE49-F238E27FC236}">
-                <a16:creationId xmlns:a16="http://schemas.microsoft.com/office/drawing/2014/main" id="{8BB584FD-6084-4492-BA1A-FBC794F21754}"/>
-              </a:ext>
-            </a:extLst>
-          </p:cNvPr>
-          <p:cNvSpPr>
-            <a:spLocks noGrp="1"/>
-          </p:cNvSpPr>
-          <p:nvPr>
-            <p:ph type="dt" sz="half" idx="10"/>
-          </p:nvPr>
-        </p:nvSpPr>
-        <p:spPr>
-          <a:xfrm>
-            <a:off x="838200" y="6356350"/>
-            <a:ext cx="2743200" cy="365125"/>
-          </a:xfrm>
-        </p:spPr>
-        <p:txBody>
-          <a:bodyPr anchor="ctr">
-            <a:normAutofit/>
-          </a:bodyPr>
-          <a:lstStyle/>
-          <a:p>
-            <a:pPr rtl="0">
-              <a:spcAft>
-                <a:spcPts val="600"/>
-              </a:spcAft>
-              <a:defRPr/>
-            </a:pPr>
-            <a:r>
-              <a:rPr lang="es-ES" noProof="0">
-                <a:solidFill>
-                  <a:prstClr val="black">
-                    <a:tint val="75000"/>
-                  </a:prstClr>
-                </a:solidFill>
-              </a:rPr>
-              <a:t>3/9/20XX</a:t>
-            </a:r>
-          </a:p>
-        </p:txBody>
-      </p:sp>
-      <p:sp>
-        <p:nvSpPr>
-          <p:cNvPr id="6" name="Marcador de pie de página 5">
-            <a:extLst>
-              <a:ext uri="{FF2B5EF4-FFF2-40B4-BE49-F238E27FC236}">
-                <a16:creationId xmlns:a16="http://schemas.microsoft.com/office/drawing/2014/main" id="{9E1BE0B4-D3F5-402F-B747-BB1D72EFD2BE}"/>
-              </a:ext>
-            </a:extLst>
-          </p:cNvPr>
-          <p:cNvSpPr>
-            <a:spLocks noGrp="1"/>
-          </p:cNvSpPr>
-          <p:nvPr>
-            <p:ph type="ftr" sz="quarter" idx="11"/>
-          </p:nvPr>
-        </p:nvSpPr>
-        <p:spPr>
-          <a:xfrm>
-            <a:off x="4038600" y="6356350"/>
-            <a:ext cx="4114800" cy="365125"/>
-          </a:xfrm>
-        </p:spPr>
-        <p:txBody>
-          <a:bodyPr anchor="ctr">
-            <a:normAutofit/>
-          </a:bodyPr>
-          <a:lstStyle/>
-          <a:p>
-            <a:pPr rtl="0">
-              <a:spcAft>
-                <a:spcPts val="600"/>
-              </a:spcAft>
-              <a:defRPr/>
-            </a:pPr>
-            <a:r>
-              <a:rPr lang="es-ES" noProof="0">
-                <a:solidFill>
-                  <a:prstClr val="black">
-                    <a:tint val="75000"/>
-                  </a:prstClr>
-                </a:solidFill>
-              </a:rPr>
-              <a:t>Título de la presentación</a:t>
-            </a:r>
           </a:p>
         </p:txBody>
       </p:sp>
@@ -17896,7 +17848,7 @@
                 </a:spcAft>
                 <a:defRPr/>
               </a:pPr>
-              <a:t>21</a:t>
+              <a:t>23</a:t>
             </a:fld>
             <a:endParaRPr lang="es-ES" noProof="0">
               <a:solidFill>
@@ -18200,7 +18152,7 @@
 </p:sld>
 </file>
 
-<file path=ppt/slides/slide22.xml><?xml version="1.0" encoding="utf-8"?>
+<file path=ppt/slides/slide24.xml><?xml version="1.0" encoding="utf-8"?>
 <p:sld xmlns:a="http://schemas.openxmlformats.org/drawingml/2006/main" xmlns:r="http://schemas.openxmlformats.org/officeDocument/2006/relationships" xmlns:p="http://schemas.openxmlformats.org/presentationml/2006/main">
   <p:cSld>
     <p:spTree>
@@ -18252,7 +18204,7 @@
               <a:pPr rtl="0">
                 <a:defRPr/>
               </a:pPr>
-              <a:t>22</a:t>
+              <a:t>24</a:t>
             </a:fld>
             <a:endParaRPr lang="es-ES" noProof="0">
               <a:solidFill>
@@ -18732,7 +18684,7 @@
 </p:sld>
 </file>
 
-<file path=ppt/slides/slide23.xml><?xml version="1.0" encoding="utf-8"?>
+<file path=ppt/slides/slide25.xml><?xml version="1.0" encoding="utf-8"?>
 <p:sld xmlns:a="http://schemas.openxmlformats.org/drawingml/2006/main" xmlns:r="http://schemas.openxmlformats.org/officeDocument/2006/relationships" xmlns:p="http://schemas.openxmlformats.org/presentationml/2006/main">
   <p:cSld>
     <p:spTree>
@@ -18803,7 +18755,7 @@
             <a:fld id="{D76B855D-E9CC-4FF8-AD85-6CDC7B89A0DE}" type="slidenum">
               <a:rPr lang="es-ES" smtClean="0"/>
               <a:pPr lvl="0" rtl="0"/>
-              <a:t>23</a:t>
+              <a:t>25</a:t>
             </a:fld>
             <a:endParaRPr lang="es-ES"/>
           </a:p>
@@ -20806,80 +20758,6 @@
       </mc:AlternateContent>
       <p:sp>
         <p:nvSpPr>
-          <p:cNvPr id="7" name="Marcador de fecha 6">
-            <a:extLst>
-              <a:ext uri="{FF2B5EF4-FFF2-40B4-BE49-F238E27FC236}">
-                <a16:creationId xmlns:a16="http://schemas.microsoft.com/office/drawing/2014/main" id="{4A8C702F-9BE6-4C19-A983-CE8E9F27947A}"/>
-              </a:ext>
-            </a:extLst>
-          </p:cNvPr>
-          <p:cNvSpPr>
-            <a:spLocks noGrp="1"/>
-          </p:cNvSpPr>
-          <p:nvPr>
-            <p:ph type="dt" sz="half" idx="10"/>
-          </p:nvPr>
-        </p:nvSpPr>
-        <p:spPr/>
-        <p:txBody>
-          <a:bodyPr/>
-          <a:lstStyle/>
-          <a:p>
-            <a:pPr rtl="0">
-              <a:defRPr/>
-            </a:pPr>
-            <a:r>
-              <a:rPr lang="es-ES" noProof="0">
-                <a:solidFill>
-                  <a:prstClr val="black">
-                    <a:tint val="75000"/>
-                  </a:prstClr>
-                </a:solidFill>
-              </a:rPr>
-              <a:t>3/9/20XX</a:t>
-            </a:r>
-          </a:p>
-        </p:txBody>
-      </p:sp>
-      <p:sp>
-        <p:nvSpPr>
-          <p:cNvPr id="8" name="Marcador de pie de página 7">
-            <a:extLst>
-              <a:ext uri="{FF2B5EF4-FFF2-40B4-BE49-F238E27FC236}">
-                <a16:creationId xmlns:a16="http://schemas.microsoft.com/office/drawing/2014/main" id="{ED94A60F-A2A5-4CA4-BEAB-B0CB6C3BF708}"/>
-              </a:ext>
-            </a:extLst>
-          </p:cNvPr>
-          <p:cNvSpPr>
-            <a:spLocks noGrp="1"/>
-          </p:cNvSpPr>
-          <p:nvPr>
-            <p:ph type="ftr" sz="quarter" idx="11"/>
-          </p:nvPr>
-        </p:nvSpPr>
-        <p:spPr/>
-        <p:txBody>
-          <a:bodyPr/>
-          <a:lstStyle/>
-          <a:p>
-            <a:pPr rtl="0">
-              <a:defRPr/>
-            </a:pPr>
-            <a:r>
-              <a:rPr lang="es-ES" noProof="0">
-                <a:solidFill>
-                  <a:prstClr val="black">
-                    <a:tint val="75000"/>
-                  </a:prstClr>
-                </a:solidFill>
-              </a:rPr>
-              <a:t>Título de la presentación</a:t>
-            </a:r>
-          </a:p>
-        </p:txBody>
-      </p:sp>
-      <p:sp>
-        <p:nvSpPr>
           <p:cNvPr id="9" name="Marcador de número de diapositiva 8">
             <a:extLst>
               <a:ext uri="{FF2B5EF4-FFF2-40B4-BE49-F238E27FC236}">
@@ -21979,76 +21857,6 @@
           </a:extLst>
         </p:spPr>
       </p:pic>
-      <p:sp>
-        <p:nvSpPr>
-          <p:cNvPr id="10" name="Marcador de pie de página 4">
-            <a:extLst>
-              <a:ext uri="{FF2B5EF4-FFF2-40B4-BE49-F238E27FC236}">
-                <a16:creationId xmlns:a16="http://schemas.microsoft.com/office/drawing/2014/main" id="{89103879-10F1-4F05-B8CF-D3C9B47F242F}"/>
-              </a:ext>
-            </a:extLst>
-          </p:cNvPr>
-          <p:cNvSpPr>
-            <a:spLocks noGrp="1"/>
-          </p:cNvSpPr>
-          <p:nvPr>
-            <p:ph type="ftr" sz="quarter" idx="11"/>
-          </p:nvPr>
-        </p:nvSpPr>
-        <p:spPr>
-          <a:xfrm>
-            <a:off x="4038600" y="6356350"/>
-            <a:ext cx="4114800" cy="365125"/>
-          </a:xfrm>
-        </p:spPr>
-        <p:txBody>
-          <a:bodyPr rtlCol="0"/>
-          <a:lstStyle/>
-          <a:p>
-            <a:pPr marL="0" marR="0" lvl="0" indent="0" algn="ctr" defTabSz="914400" rtl="0" eaLnBrk="1" fontAlgn="auto" latinLnBrk="0" hangingPunct="1">
-              <a:lnSpc>
-                <a:spcPct val="100000"/>
-              </a:lnSpc>
-              <a:spcBef>
-                <a:spcPts val="0"/>
-              </a:spcBef>
-              <a:spcAft>
-                <a:spcPts val="0"/>
-              </a:spcAft>
-              <a:buClrTx/>
-              <a:buSzTx/>
-              <a:buFontTx/>
-              <a:buNone/>
-              <a:tabLst/>
-              <a:defRPr/>
-            </a:pPr>
-            <a:r>
-              <a:rPr lang="es-MX" b="0" i="0" u="none" strike="noStrike" dirty="0" err="1">
-                <a:effectLst/>
-                <a:latin typeface="-apple-system"/>
-                <a:hlinkClick r:id="rId3"/>
-              </a:rPr>
-              <a:t>ffaxflow</a:t>
-            </a:r>
-            <a:endParaRPr lang="es-ES" sz="1200" b="0" i="0" u="none" strike="noStrike" kern="1200" cap="none" spc="0" normalizeH="0" dirty="0">
-              <a:ln>
-                <a:noFill/>
-              </a:ln>
-              <a:solidFill>
-                <a:prstClr val="black">
-                  <a:tint val="75000"/>
-                </a:prstClr>
-              </a:solidFill>
-              <a:effectLst/>
-              <a:uLnTx/>
-              <a:uFillTx/>
-              <a:latin typeface="Calibri" panose="020F0502020204030204"/>
-              <a:ea typeface="+mn-ea"/>
-              <a:cs typeface="+mn-cs"/>
-            </a:endParaRPr>
-          </a:p>
-        </p:txBody>
-      </p:sp>
     </p:spTree>
     <p:extLst>
       <p:ext uri="{BB962C8B-B14F-4D97-AF65-F5344CB8AC3E}">

</xml_diff>

<commit_message>
Se eliminí sección se Kale y Kubeflow
</commit_message>
<xml_diff>
--- a/documentos/Presentacion_ffmf.pptx
+++ b/documentos/Presentacion_ffmf.pptx
@@ -5,10 +5,10 @@
     <p:sldMasterId id="2147483768" r:id="rId4"/>
   </p:sldMasterIdLst>
   <p:notesMasterIdLst>
-    <p:notesMasterId r:id="rId30"/>
+    <p:notesMasterId r:id="rId28"/>
   </p:notesMasterIdLst>
   <p:handoutMasterIdLst>
-    <p:handoutMasterId r:id="rId31"/>
+    <p:handoutMasterId r:id="rId29"/>
   </p:handoutMasterIdLst>
   <p:sldIdLst>
     <p:sldId id="3825" r:id="rId5"/>
@@ -19,23 +19,21 @@
     <p:sldId id="3848" r:id="rId10"/>
     <p:sldId id="3846" r:id="rId11"/>
     <p:sldId id="3843" r:id="rId12"/>
-    <p:sldId id="3844" r:id="rId13"/>
-    <p:sldId id="3845" r:id="rId14"/>
-    <p:sldId id="3858" r:id="rId15"/>
-    <p:sldId id="3859" r:id="rId16"/>
-    <p:sldId id="3836" r:id="rId17"/>
-    <p:sldId id="3837" r:id="rId18"/>
-    <p:sldId id="3838" r:id="rId19"/>
-    <p:sldId id="3855" r:id="rId20"/>
-    <p:sldId id="3856" r:id="rId21"/>
-    <p:sldId id="3857" r:id="rId22"/>
-    <p:sldId id="3840" r:id="rId23"/>
-    <p:sldId id="3852" r:id="rId24"/>
-    <p:sldId id="3853" r:id="rId25"/>
-    <p:sldId id="3841" r:id="rId26"/>
-    <p:sldId id="3854" r:id="rId27"/>
-    <p:sldId id="3851" r:id="rId28"/>
-    <p:sldId id="3834" r:id="rId29"/>
+    <p:sldId id="3858" r:id="rId13"/>
+    <p:sldId id="3859" r:id="rId14"/>
+    <p:sldId id="3836" r:id="rId15"/>
+    <p:sldId id="3837" r:id="rId16"/>
+    <p:sldId id="3838" r:id="rId17"/>
+    <p:sldId id="3855" r:id="rId18"/>
+    <p:sldId id="3856" r:id="rId19"/>
+    <p:sldId id="3857" r:id="rId20"/>
+    <p:sldId id="3840" r:id="rId21"/>
+    <p:sldId id="3852" r:id="rId22"/>
+    <p:sldId id="3853" r:id="rId23"/>
+    <p:sldId id="3841" r:id="rId24"/>
+    <p:sldId id="3854" r:id="rId25"/>
+    <p:sldId id="3851" r:id="rId26"/>
+    <p:sldId id="3834" r:id="rId27"/>
   </p:sldIdLst>
   <p:sldSz cx="12192000" cy="6858000"/>
   <p:notesSz cx="6858000" cy="9144000"/>
@@ -869,7 +867,7 @@
             <a:pPr rtl="0"/>
             <a:fld id="{D40C6A29-4676-420C-BBE3-ACC2B80F64D4}" type="slidenum">
               <a:rPr lang="es-ES" smtClean="0"/>
-              <a:t>25</a:t>
+              <a:t>23</a:t>
             </a:fld>
             <a:endParaRPr lang="es-ES"/>
           </a:p>
@@ -1379,7 +1377,7 @@
             <a:pPr rtl="0"/>
             <a:fld id="{D40C6A29-4676-420C-BBE3-ACC2B80F64D4}" type="slidenum">
               <a:rPr lang="es-ES" smtClean="0"/>
-              <a:t>13</a:t>
+              <a:t>11</a:t>
             </a:fld>
             <a:endParaRPr lang="es-ES"/>
           </a:p>
@@ -1464,7 +1462,7 @@
             <a:pPr rtl="0"/>
             <a:fld id="{D40C6A29-4676-420C-BBE3-ACC2B80F64D4}" type="slidenum">
               <a:rPr lang="es-ES" smtClean="0"/>
-              <a:t>14</a:t>
+              <a:t>12</a:t>
             </a:fld>
             <a:endParaRPr lang="es-ES"/>
           </a:p>
@@ -1549,7 +1547,7 @@
             <a:pPr rtl="0"/>
             <a:fld id="{D40C6A29-4676-420C-BBE3-ACC2B80F64D4}" type="slidenum">
               <a:rPr lang="es-ES" smtClean="0"/>
-              <a:t>19</a:t>
+              <a:t>17</a:t>
             </a:fld>
             <a:endParaRPr lang="es-ES"/>
           </a:p>
@@ -13453,10 +13451,10 @@
       </p:grpSpPr>
       <p:sp>
         <p:nvSpPr>
-          <p:cNvPr id="2" name="Título 1">
+          <p:cNvPr id="4" name="Título 3">
             <a:extLst>
               <a:ext uri="{FF2B5EF4-FFF2-40B4-BE49-F238E27FC236}">
-                <a16:creationId xmlns:a16="http://schemas.microsoft.com/office/drawing/2014/main" id="{3FED4CB1-C256-4377-99FC-26A6E933CED2}"/>
+                <a16:creationId xmlns:a16="http://schemas.microsoft.com/office/drawing/2014/main" id="{A4BBC044-C46D-48AD-B954-0344D2E6C3FA}"/>
               </a:ext>
             </a:extLst>
           </p:cNvPr>
@@ -13469,68 +13467,46 @@
         </p:nvSpPr>
         <p:spPr>
           <a:xfrm>
-            <a:off x="839788" y="457200"/>
-            <a:ext cx="3932237" cy="762000"/>
+            <a:off x="838200" y="365125"/>
+            <a:ext cx="10515600" cy="1325563"/>
           </a:xfrm>
         </p:spPr>
         <p:txBody>
-          <a:bodyPr anchor="b">
+          <a:bodyPr anchor="ctr">
             <a:normAutofit/>
           </a:bodyPr>
           <a:lstStyle/>
           <a:p>
             <a:r>
+              <a:rPr lang="en-US" dirty="0" err="1"/>
+              <a:t>Reimplementación</a:t>
+            </a:r>
+            <a:r>
               <a:rPr lang="en-US" dirty="0"/>
-              <a:t>Kale</a:t>
-            </a:r>
+              <a:t> </a:t>
+            </a:r>
+            <a:r>
+              <a:rPr lang="en-US" dirty="0" err="1"/>
+              <a:t>en</a:t>
+            </a:r>
+            <a:r>
+              <a:rPr lang="en-US" dirty="0"/>
+              <a:t> </a:t>
+            </a:r>
+            <a:r>
+              <a:rPr lang="en-US" dirty="0" err="1"/>
+              <a:t>Cython</a:t>
+            </a:r>
+            <a:endParaRPr lang="en-US" dirty="0"/>
           </a:p>
         </p:txBody>
       </p:sp>
-      <p:pic>
-        <p:nvPicPr>
-          <p:cNvPr id="8194" name="Picture 2" descr="kale">
+      <p:sp>
+        <p:nvSpPr>
+          <p:cNvPr id="71" name="Content Placeholder 2">
             <a:extLst>
               <a:ext uri="{FF2B5EF4-FFF2-40B4-BE49-F238E27FC236}">
-                <a16:creationId xmlns:a16="http://schemas.microsoft.com/office/drawing/2014/main" id="{471BFB35-C83F-4460-8E1C-E470B2825FB4}"/>
-              </a:ext>
-            </a:extLst>
-          </p:cNvPr>
-          <p:cNvPicPr>
-            <a:picLocks noChangeAspect="1" noChangeArrowheads="1"/>
-          </p:cNvPicPr>
-          <p:nvPr/>
-        </p:nvPicPr>
-        <p:blipFill>
-          <a:blip r:embed="rId2">
-            <a:extLst>
-              <a:ext uri="{28A0092B-C50C-407E-A947-70E740481C1C}">
-                <a14:useLocalDpi xmlns:a14="http://schemas.microsoft.com/office/drawing/2010/main" val="0"/>
-              </a:ext>
-            </a:extLst>
-          </a:blip>
-          <a:stretch>
-            <a:fillRect/>
-          </a:stretch>
-        </p:blipFill>
-        <p:spPr bwMode="auto">
-          <a:xfrm>
-            <a:off x="4862977" y="1843395"/>
-            <a:ext cx="7166582" cy="3171210"/>
-          </a:xfrm>
-          <a:prstGeom prst="rect">
-            <a:avLst/>
-          </a:prstGeom>
-          <a:solidFill>
-            <a:srgbClr val="FFFFFF"/>
-          </a:solidFill>
-        </p:spPr>
-      </p:pic>
-      <p:sp>
-        <p:nvSpPr>
-          <p:cNvPr id="8196" name="Text Placeholder 3">
-            <a:extLst>
-              <a:ext uri="{FF2B5EF4-FFF2-40B4-BE49-F238E27FC236}">
-                <a16:creationId xmlns:a16="http://schemas.microsoft.com/office/drawing/2014/main" id="{9EA78002-EE7E-49EE-9946-113EC2184352}"/>
+                <a16:creationId xmlns:a16="http://schemas.microsoft.com/office/drawing/2014/main" id="{A292AE45-1B5A-405A-B21A-98816FABC7D3}"/>
               </a:ext>
             </a:extLst>
           </p:cNvPr>
@@ -13538,279 +13514,61 @@
             <a:spLocks noGrp="1"/>
           </p:cNvSpPr>
           <p:nvPr>
-            <p:ph type="body" sz="half" idx="2"/>
+            <p:ph sz="half" idx="1"/>
           </p:nvPr>
         </p:nvSpPr>
         <p:spPr>
           <a:xfrm>
-            <a:off x="839788" y="1524000"/>
-            <a:ext cx="3932237" cy="4344988"/>
+            <a:off x="838200" y="1825625"/>
+            <a:ext cx="5181600" cy="4351338"/>
           </a:xfrm>
         </p:spPr>
         <p:txBody>
-          <a:bodyPr/>
+          <a:bodyPr>
+            <a:normAutofit/>
+          </a:bodyPr>
           <a:lstStyle/>
           <a:p>
             <a:r>
-              <a:rPr lang="es-MX" b="0" i="0" dirty="0">
-                <a:solidFill>
-                  <a:srgbClr val="000000"/>
-                </a:solidFill>
-                <a:effectLst/>
-                <a:latin typeface="Helvetica Neue"/>
-              </a:rPr>
-              <a:t>Kale, acrónimo de </a:t>
-            </a:r>
-            <a:r>
-              <a:rPr lang="es-MX" b="0" i="0" dirty="0" err="1">
-                <a:solidFill>
-                  <a:srgbClr val="000000"/>
-                </a:solidFill>
-                <a:effectLst/>
-                <a:latin typeface="Helvetica Neue"/>
-              </a:rPr>
-              <a:t>Kubeflow</a:t>
-            </a:r>
-            <a:r>
-              <a:rPr lang="es-MX" b="0" i="0" dirty="0">
-                <a:solidFill>
-                  <a:srgbClr val="000000"/>
-                </a:solidFill>
-                <a:effectLst/>
-                <a:latin typeface="Helvetica Neue"/>
-              </a:rPr>
-              <a:t> </a:t>
-            </a:r>
-            <a:r>
-              <a:rPr lang="es-MX" b="0" i="0" dirty="0" err="1">
-                <a:solidFill>
-                  <a:srgbClr val="000000"/>
-                </a:solidFill>
-                <a:effectLst/>
-                <a:latin typeface="Helvetica Neue"/>
-              </a:rPr>
-              <a:t>Automated</a:t>
-            </a:r>
-            <a:r>
-              <a:rPr lang="es-MX" b="0" i="0" dirty="0">
-                <a:solidFill>
-                  <a:srgbClr val="000000"/>
-                </a:solidFill>
-                <a:effectLst/>
-                <a:latin typeface="Helvetica Neue"/>
-              </a:rPr>
-              <a:t> </a:t>
-            </a:r>
-            <a:r>
-              <a:rPr lang="es-MX" b="0" i="0" dirty="0" err="1">
-                <a:solidFill>
-                  <a:srgbClr val="000000"/>
-                </a:solidFill>
-                <a:effectLst/>
-                <a:latin typeface="Helvetica Neue"/>
-              </a:rPr>
-              <a:t>pipeLines</a:t>
-            </a:r>
-            <a:r>
-              <a:rPr lang="es-MX" b="0" i="0" dirty="0">
-                <a:solidFill>
-                  <a:srgbClr val="000000"/>
-                </a:solidFill>
-                <a:effectLst/>
-                <a:latin typeface="Helvetica Neue"/>
-              </a:rPr>
-              <a:t> </a:t>
-            </a:r>
-            <a:r>
-              <a:rPr lang="es-MX" b="0" i="0" dirty="0" err="1">
-                <a:solidFill>
-                  <a:srgbClr val="000000"/>
-                </a:solidFill>
-                <a:effectLst/>
-                <a:latin typeface="Helvetica Neue"/>
-              </a:rPr>
-              <a:t>Engine</a:t>
-            </a:r>
-            <a:r>
-              <a:rPr lang="es-MX" b="0" i="0" dirty="0">
-                <a:solidFill>
-                  <a:srgbClr val="000000"/>
-                </a:solidFill>
-                <a:effectLst/>
-                <a:latin typeface="Helvetica Neue"/>
-              </a:rPr>
-              <a:t>, simplifica el uso de </a:t>
-            </a:r>
-            <a:r>
-              <a:rPr lang="es-MX" b="0" i="0" dirty="0" err="1">
-                <a:solidFill>
-                  <a:srgbClr val="000000"/>
-                </a:solidFill>
-                <a:effectLst/>
-                <a:latin typeface="Helvetica Neue"/>
-              </a:rPr>
-              <a:t>kubeflow</a:t>
-            </a:r>
-            <a:r>
-              <a:rPr lang="es-MX" b="0" i="0" dirty="0">
-                <a:solidFill>
-                  <a:srgbClr val="000000"/>
-                </a:solidFill>
-                <a:effectLst/>
-                <a:latin typeface="Helvetica Neue"/>
-              </a:rPr>
-              <a:t> permitiéndole a los usuarios enfocarse completamente en su código en lugar </a:t>
-            </a:r>
-            <a:r>
-              <a:rPr lang="es-MX" b="0" i="0" dirty="0" err="1">
-                <a:solidFill>
-                  <a:srgbClr val="000000"/>
-                </a:solidFill>
-                <a:effectLst/>
-                <a:latin typeface="Helvetica Neue"/>
-              </a:rPr>
-              <a:t>sel</a:t>
-            </a:r>
-            <a:r>
-              <a:rPr lang="es-MX" b="0" i="0" dirty="0">
-                <a:solidFill>
-                  <a:srgbClr val="000000"/>
-                </a:solidFill>
-                <a:effectLst/>
-                <a:latin typeface="Helvetica Neue"/>
-              </a:rPr>
-              <a:t> </a:t>
-            </a:r>
-            <a:r>
-              <a:rPr lang="es-MX" b="0" i="0" dirty="0" err="1">
-                <a:solidFill>
-                  <a:srgbClr val="000000"/>
-                </a:solidFill>
-                <a:effectLst/>
-                <a:latin typeface="Helvetica Neue"/>
-              </a:rPr>
-              <a:t>setup</a:t>
-            </a:r>
-            <a:r>
-              <a:rPr lang="es-MX" b="0" i="0" dirty="0">
-                <a:solidFill>
-                  <a:srgbClr val="000000"/>
-                </a:solidFill>
-                <a:effectLst/>
-                <a:latin typeface="Helvetica Neue"/>
-              </a:rPr>
-              <a:t> de las pipelines. Kale permite desplegar un notebook de </a:t>
-            </a:r>
-            <a:r>
-              <a:rPr lang="es-MX" b="0" i="0" dirty="0" err="1">
-                <a:solidFill>
-                  <a:srgbClr val="000000"/>
-                </a:solidFill>
-                <a:effectLst/>
-                <a:latin typeface="Helvetica Neue"/>
-              </a:rPr>
-              <a:t>Jupyter</a:t>
-            </a:r>
-            <a:r>
-              <a:rPr lang="es-MX" b="0" i="0" dirty="0">
-                <a:solidFill>
-                  <a:srgbClr val="000000"/>
-                </a:solidFill>
-                <a:effectLst/>
-                <a:latin typeface="Helvetica Neue"/>
-              </a:rPr>
-              <a:t> a </a:t>
-            </a:r>
-            <a:r>
-              <a:rPr lang="es-MX" b="0" i="0" dirty="0" err="1">
-                <a:solidFill>
-                  <a:srgbClr val="000000"/>
-                </a:solidFill>
-                <a:effectLst/>
-                <a:latin typeface="Helvetica Neue"/>
-              </a:rPr>
-              <a:t>Kubeflow</a:t>
-            </a:r>
-            <a:r>
-              <a:rPr lang="es-MX" b="0" i="0" dirty="0">
-                <a:solidFill>
-                  <a:srgbClr val="000000"/>
-                </a:solidFill>
-                <a:effectLst/>
-                <a:latin typeface="Helvetica Neue"/>
-              </a:rPr>
-              <a:t> Pipelines de manera fácil e intuitiva.</a:t>
-            </a:r>
-          </a:p>
-          <a:p>
-            <a:endParaRPr lang="es-MX" dirty="0">
-              <a:solidFill>
-                <a:srgbClr val="000000"/>
-              </a:solidFill>
-              <a:latin typeface="Helvetica Neue"/>
-            </a:endParaRPr>
-          </a:p>
-          <a:p>
-            <a:r>
-              <a:rPr lang="es-MX" b="0" i="0" dirty="0">
-                <a:solidFill>
-                  <a:srgbClr val="000000"/>
-                </a:solidFill>
-                <a:effectLst/>
-                <a:latin typeface="Helvetica Neue"/>
-              </a:rPr>
-              <a:t>Kale busca explotar la estructura JSON de los notebooks de </a:t>
-            </a:r>
-            <a:r>
-              <a:rPr lang="es-MX" b="0" i="0" dirty="0" err="1">
-                <a:solidFill>
-                  <a:srgbClr val="000000"/>
-                </a:solidFill>
-                <a:effectLst/>
-                <a:latin typeface="Helvetica Neue"/>
-              </a:rPr>
-              <a:t>Jupyter</a:t>
-            </a:r>
-            <a:r>
-              <a:rPr lang="es-MX" b="0" i="0" dirty="0">
-                <a:solidFill>
-                  <a:srgbClr val="000000"/>
-                </a:solidFill>
-                <a:effectLst/>
-                <a:latin typeface="Helvetica Neue"/>
-              </a:rPr>
-              <a:t> para hacer anotaciones tanto en la </a:t>
-            </a:r>
-            <a:r>
-              <a:rPr lang="es-MX" b="0" i="0" dirty="0" err="1">
-                <a:solidFill>
-                  <a:srgbClr val="000000"/>
-                </a:solidFill>
-                <a:effectLst/>
-                <a:latin typeface="Helvetica Neue"/>
-              </a:rPr>
-              <a:t>metadata</a:t>
-            </a:r>
-            <a:r>
-              <a:rPr lang="es-MX" b="0" i="0" dirty="0">
-                <a:solidFill>
-                  <a:srgbClr val="000000"/>
-                </a:solidFill>
-                <a:effectLst/>
-                <a:latin typeface="Helvetica Neue"/>
-              </a:rPr>
-              <a:t> del notebook como de las celdas.</a:t>
-            </a:r>
-            <a:endParaRPr lang="en-US" dirty="0"/>
+              <a:rPr lang="es-MX" sz="2000" dirty="0"/>
+              <a:t>Con ayuda de las anotaciones amarillas dadas por </a:t>
+            </a:r>
+            <a:r>
+              <a:rPr lang="es-MX" sz="2000" dirty="0" err="1"/>
+              <a:t>Cython</a:t>
+            </a:r>
+            <a:r>
+              <a:rPr lang="es-MX" sz="2000" dirty="0"/>
+              <a:t> obtenidas a partir del archivo con extensión .</a:t>
+            </a:r>
+            <a:r>
+              <a:rPr lang="es-MX" sz="2000" dirty="0" err="1"/>
+              <a:t>pyx</a:t>
+            </a:r>
+            <a:r>
+              <a:rPr lang="es-MX" sz="2000" dirty="0"/>
+              <a:t> se identificaron las líneas que "más Python utilizaban". Recordemos que mientras más código que se pueda traducir a C se tenga, menor será el tiempo de ejecución. En particular, estas anotaciones se realizan sobre un archivo </a:t>
+            </a:r>
+            <a:r>
+              <a:rPr lang="es-MX" sz="2000" dirty="0" err="1"/>
+              <a:t>html</a:t>
+            </a:r>
+            <a:r>
+              <a:rPr lang="es-MX" sz="2000" dirty="0"/>
+              <a:t>, donde las líneas más amarillas representan que se está usando más Python y las blancas, más C.</a:t>
+            </a:r>
+          </a:p>
+          <a:p>
+            <a:endParaRPr lang="es-MX" dirty="0"/>
           </a:p>
         </p:txBody>
       </p:sp>
       <p:sp>
         <p:nvSpPr>
-          <p:cNvPr id="7" name="Marcador de número de diapositiva 6">
+          <p:cNvPr id="8" name="Marcador de número de diapositiva 7">
             <a:extLst>
               <a:ext uri="{FF2B5EF4-FFF2-40B4-BE49-F238E27FC236}">
-                <a16:creationId xmlns:a16="http://schemas.microsoft.com/office/drawing/2014/main" id="{D4FB3A2A-9E0E-43B9-9BA0-3C3020E64E3E}"/>
+                <a16:creationId xmlns:a16="http://schemas.microsoft.com/office/drawing/2014/main" id="{8BC9F251-CBE9-4932-BC7E-5A2BEE77A221}"/>
               </a:ext>
             </a:extLst>
           </p:cNvPr>
@@ -13854,414 +13612,6 @@
                 <a:defRPr/>
               </a:pPr>
               <a:t>10</a:t>
-            </a:fld>
-            <a:endParaRPr lang="es-ES" noProof="0">
-              <a:solidFill>
-                <a:prstClr val="black">
-                  <a:tint val="75000"/>
-                </a:prstClr>
-              </a:solidFill>
-            </a:endParaRPr>
-          </a:p>
-        </p:txBody>
-      </p:sp>
-    </p:spTree>
-    <p:extLst>
-      <p:ext uri="{BB962C8B-B14F-4D97-AF65-F5344CB8AC3E}">
-        <p14:creationId xmlns:p14="http://schemas.microsoft.com/office/powerpoint/2010/main" val="1805479730"/>
-      </p:ext>
-    </p:extLst>
-  </p:cSld>
-  <p:clrMapOvr>
-    <a:masterClrMapping/>
-  </p:clrMapOvr>
-</p:sld>
-</file>
-
-<file path=ppt/slides/slide11.xml><?xml version="1.0" encoding="utf-8"?>
-<p:sld xmlns:a="http://schemas.openxmlformats.org/drawingml/2006/main" xmlns:r="http://schemas.openxmlformats.org/officeDocument/2006/relationships" xmlns:p="http://schemas.openxmlformats.org/presentationml/2006/main">
-  <p:cSld>
-    <p:spTree>
-      <p:nvGrpSpPr>
-        <p:cNvPr id="1" name=""/>
-        <p:cNvGrpSpPr/>
-        <p:nvPr/>
-      </p:nvGrpSpPr>
-      <p:grpSpPr>
-        <a:xfrm>
-          <a:off x="0" y="0"/>
-          <a:ext cx="0" cy="0"/>
-          <a:chOff x="0" y="0"/>
-          <a:chExt cx="0" cy="0"/>
-        </a:xfrm>
-      </p:grpSpPr>
-      <p:sp>
-        <p:nvSpPr>
-          <p:cNvPr id="2" name="Título 1">
-            <a:extLst>
-              <a:ext uri="{FF2B5EF4-FFF2-40B4-BE49-F238E27FC236}">
-                <a16:creationId xmlns:a16="http://schemas.microsoft.com/office/drawing/2014/main" id="{B32EF64A-5A7F-4E25-B723-6DA7FDC0B4A4}"/>
-              </a:ext>
-            </a:extLst>
-          </p:cNvPr>
-          <p:cNvSpPr>
-            <a:spLocks noGrp="1"/>
-          </p:cNvSpPr>
-          <p:nvPr>
-            <p:ph type="title"/>
-          </p:nvPr>
-        </p:nvSpPr>
-        <p:spPr/>
-        <p:txBody>
-          <a:bodyPr/>
-          <a:lstStyle/>
-          <a:p>
-            <a:r>
-              <a:rPr lang="en-US" dirty="0" err="1"/>
-              <a:t>Reimplementación</a:t>
-            </a:r>
-            <a:endParaRPr lang="en-US" dirty="0"/>
-          </a:p>
-        </p:txBody>
-      </p:sp>
-      <p:sp>
-        <p:nvSpPr>
-          <p:cNvPr id="3" name="Marcador de contenido 2">
-            <a:extLst>
-              <a:ext uri="{FF2B5EF4-FFF2-40B4-BE49-F238E27FC236}">
-                <a16:creationId xmlns:a16="http://schemas.microsoft.com/office/drawing/2014/main" id="{A953B6D4-9143-4D74-838D-AD9F6E723317}"/>
-              </a:ext>
-            </a:extLst>
-          </p:cNvPr>
-          <p:cNvSpPr>
-            <a:spLocks noGrp="1"/>
-          </p:cNvSpPr>
-          <p:nvPr>
-            <p:ph idx="1"/>
-          </p:nvPr>
-        </p:nvSpPr>
-        <p:spPr/>
-        <p:txBody>
-          <a:bodyPr>
-            <a:normAutofit fontScale="62500" lnSpcReduction="20000"/>
-          </a:bodyPr>
-          <a:lstStyle/>
-          <a:p>
-            <a:r>
-              <a:rPr lang="es-MX" dirty="0"/>
-              <a:t>La implementación del paquete se realizó a través de Python haciendo uso de clases.</a:t>
-            </a:r>
-          </a:p>
-          <a:p>
-            <a:endParaRPr lang="es-MX" dirty="0"/>
-          </a:p>
-          <a:p>
-            <a:r>
-              <a:rPr lang="es-MX" dirty="0"/>
-              <a:t>Una vez desarrollado el paquete de manera básica utilizamos las herramientas de kale y </a:t>
-            </a:r>
-            <a:r>
-              <a:rPr lang="es-MX" dirty="0" err="1"/>
-              <a:t>minikube</a:t>
-            </a:r>
-            <a:r>
-              <a:rPr lang="es-MX" dirty="0"/>
-              <a:t> para correr varios experimentos y así detectar valores con los cuales falla nuestro paquete o posibles mejoras a realizar.</a:t>
-            </a:r>
-          </a:p>
-          <a:p>
-            <a:endParaRPr lang="es-MX" dirty="0"/>
-          </a:p>
-          <a:p>
-            <a:r>
-              <a:rPr lang="es-MX" dirty="0"/>
-              <a:t>Ante de iniciar con la reimplementación realizamos un perfilamiento de </a:t>
-            </a:r>
-            <a:r>
-              <a:rPr lang="es-MX" dirty="0" err="1"/>
-              <a:t>ffmaxflow</a:t>
-            </a:r>
-            <a:r>
-              <a:rPr lang="es-MX" dirty="0"/>
-              <a:t> para así tener una idea del desempeño de nuestro paquete. Durante el perfilamiento descubrimos que el método de </a:t>
-            </a:r>
-            <a:r>
-              <a:rPr lang="es-MX" dirty="0" err="1"/>
-              <a:t>get_path</a:t>
-            </a:r>
-            <a:r>
-              <a:rPr lang="es-MX" dirty="0"/>
-              <a:t> toma mucho tiempo en relación con los tiempos de las demás líneas, además de la creación de </a:t>
-            </a:r>
-            <a:r>
-              <a:rPr lang="es-MX" dirty="0" err="1"/>
-              <a:t>vertices</a:t>
-            </a:r>
-            <a:r>
-              <a:rPr lang="es-MX" dirty="0"/>
-              <a:t> y el cálculo mismo del flujo máximo.</a:t>
-            </a:r>
-          </a:p>
-          <a:p>
-            <a:endParaRPr lang="es-MX" dirty="0"/>
-          </a:p>
-          <a:p>
-            <a:r>
-              <a:rPr lang="es-MX" dirty="0"/>
-              <a:t>En cuanto al perfilamiento de memoria, no encontramos que nuestro paquete estuviera usando memoria excesiva por lo que decidimos optimizar únicamente el tiempo de ejecución y la optimización se realizara con </a:t>
-            </a:r>
-            <a:r>
-              <a:rPr lang="es-MX" dirty="0" err="1"/>
-              <a:t>Cython</a:t>
-            </a:r>
-            <a:r>
-              <a:rPr lang="es-MX" dirty="0"/>
-              <a:t>.</a:t>
-            </a:r>
-            <a:endParaRPr lang="en-US" dirty="0"/>
-          </a:p>
-        </p:txBody>
-      </p:sp>
-      <p:sp>
-        <p:nvSpPr>
-          <p:cNvPr id="6" name="Marcador de número de diapositiva 5">
-            <a:extLst>
-              <a:ext uri="{FF2B5EF4-FFF2-40B4-BE49-F238E27FC236}">
-                <a16:creationId xmlns:a16="http://schemas.microsoft.com/office/drawing/2014/main" id="{A9A5B82C-EDD8-4256-BC74-16150B694C81}"/>
-              </a:ext>
-            </a:extLst>
-          </p:cNvPr>
-          <p:cNvSpPr>
-            <a:spLocks noGrp="1"/>
-          </p:cNvSpPr>
-          <p:nvPr>
-            <p:ph type="sldNum" sz="quarter" idx="12"/>
-          </p:nvPr>
-        </p:nvSpPr>
-        <p:spPr/>
-        <p:txBody>
-          <a:bodyPr/>
-          <a:lstStyle/>
-          <a:p>
-            <a:pPr rtl="0">
-              <a:defRPr/>
-            </a:pPr>
-            <a:fld id="{D76B855D-E9CC-4FF8-AD85-6CDC7B89A0DE}" type="slidenum">
-              <a:rPr lang="es-ES" noProof="0" smtClean="0">
-                <a:solidFill>
-                  <a:prstClr val="black">
-                    <a:tint val="75000"/>
-                  </a:prstClr>
-                </a:solidFill>
-              </a:rPr>
-              <a:pPr rtl="0">
-                <a:defRPr/>
-              </a:pPr>
-              <a:t>11</a:t>
-            </a:fld>
-            <a:endParaRPr lang="es-ES" noProof="0">
-              <a:solidFill>
-                <a:prstClr val="black">
-                  <a:tint val="75000"/>
-                </a:prstClr>
-              </a:solidFill>
-            </a:endParaRPr>
-          </a:p>
-        </p:txBody>
-      </p:sp>
-    </p:spTree>
-    <p:extLst>
-      <p:ext uri="{BB962C8B-B14F-4D97-AF65-F5344CB8AC3E}">
-        <p14:creationId xmlns:p14="http://schemas.microsoft.com/office/powerpoint/2010/main" val="579773198"/>
-      </p:ext>
-    </p:extLst>
-  </p:cSld>
-  <p:clrMapOvr>
-    <a:masterClrMapping/>
-  </p:clrMapOvr>
-</p:sld>
-</file>
-
-<file path=ppt/slides/slide12.xml><?xml version="1.0" encoding="utf-8"?>
-<p:sld xmlns:a="http://schemas.openxmlformats.org/drawingml/2006/main" xmlns:r="http://schemas.openxmlformats.org/officeDocument/2006/relationships" xmlns:p="http://schemas.openxmlformats.org/presentationml/2006/main">
-  <p:cSld>
-    <p:spTree>
-      <p:nvGrpSpPr>
-        <p:cNvPr id="1" name=""/>
-        <p:cNvGrpSpPr/>
-        <p:nvPr/>
-      </p:nvGrpSpPr>
-      <p:grpSpPr>
-        <a:xfrm>
-          <a:off x="0" y="0"/>
-          <a:ext cx="0" cy="0"/>
-          <a:chOff x="0" y="0"/>
-          <a:chExt cx="0" cy="0"/>
-        </a:xfrm>
-      </p:grpSpPr>
-      <p:sp>
-        <p:nvSpPr>
-          <p:cNvPr id="4" name="Título 3">
-            <a:extLst>
-              <a:ext uri="{FF2B5EF4-FFF2-40B4-BE49-F238E27FC236}">
-                <a16:creationId xmlns:a16="http://schemas.microsoft.com/office/drawing/2014/main" id="{A4BBC044-C46D-48AD-B954-0344D2E6C3FA}"/>
-              </a:ext>
-            </a:extLst>
-          </p:cNvPr>
-          <p:cNvSpPr>
-            <a:spLocks noGrp="1"/>
-          </p:cNvSpPr>
-          <p:nvPr>
-            <p:ph type="title"/>
-          </p:nvPr>
-        </p:nvSpPr>
-        <p:spPr>
-          <a:xfrm>
-            <a:off x="838200" y="365125"/>
-            <a:ext cx="10515600" cy="1325563"/>
-          </a:xfrm>
-        </p:spPr>
-        <p:txBody>
-          <a:bodyPr anchor="ctr">
-            <a:normAutofit/>
-          </a:bodyPr>
-          <a:lstStyle/>
-          <a:p>
-            <a:r>
-              <a:rPr lang="en-US" dirty="0" err="1"/>
-              <a:t>Reimplementación</a:t>
-            </a:r>
-            <a:r>
-              <a:rPr lang="en-US" dirty="0"/>
-              <a:t> </a:t>
-            </a:r>
-            <a:r>
-              <a:rPr lang="en-US" dirty="0" err="1"/>
-              <a:t>en</a:t>
-            </a:r>
-            <a:r>
-              <a:rPr lang="en-US" dirty="0"/>
-              <a:t> </a:t>
-            </a:r>
-            <a:r>
-              <a:rPr lang="en-US" dirty="0" err="1"/>
-              <a:t>Cython</a:t>
-            </a:r>
-            <a:endParaRPr lang="en-US" dirty="0"/>
-          </a:p>
-        </p:txBody>
-      </p:sp>
-      <p:sp>
-        <p:nvSpPr>
-          <p:cNvPr id="71" name="Content Placeholder 2">
-            <a:extLst>
-              <a:ext uri="{FF2B5EF4-FFF2-40B4-BE49-F238E27FC236}">
-                <a16:creationId xmlns:a16="http://schemas.microsoft.com/office/drawing/2014/main" id="{A292AE45-1B5A-405A-B21A-98816FABC7D3}"/>
-              </a:ext>
-            </a:extLst>
-          </p:cNvPr>
-          <p:cNvSpPr>
-            <a:spLocks noGrp="1"/>
-          </p:cNvSpPr>
-          <p:nvPr>
-            <p:ph sz="half" idx="1"/>
-          </p:nvPr>
-        </p:nvSpPr>
-        <p:spPr>
-          <a:xfrm>
-            <a:off x="838200" y="1825625"/>
-            <a:ext cx="5181600" cy="4351338"/>
-          </a:xfrm>
-        </p:spPr>
-        <p:txBody>
-          <a:bodyPr>
-            <a:normAutofit/>
-          </a:bodyPr>
-          <a:lstStyle/>
-          <a:p>
-            <a:r>
-              <a:rPr lang="es-MX" sz="2000" dirty="0"/>
-              <a:t>Con ayuda de las anotaciones amarillas dadas por </a:t>
-            </a:r>
-            <a:r>
-              <a:rPr lang="es-MX" sz="2000" dirty="0" err="1"/>
-              <a:t>Cython</a:t>
-            </a:r>
-            <a:r>
-              <a:rPr lang="es-MX" sz="2000" dirty="0"/>
-              <a:t> obtenidas a partir del archivo con extensión .</a:t>
-            </a:r>
-            <a:r>
-              <a:rPr lang="es-MX" sz="2000" dirty="0" err="1"/>
-              <a:t>pyx</a:t>
-            </a:r>
-            <a:r>
-              <a:rPr lang="es-MX" sz="2000" dirty="0"/>
-              <a:t> se identificaron las líneas que "más Python utilizaban". Recordemos que mientras más código que se pueda traducir a C se tenga, menor será el tiempo de ejecución. En particular, estas anotaciones se realizan sobre un archivo </a:t>
-            </a:r>
-            <a:r>
-              <a:rPr lang="es-MX" sz="2000" dirty="0" err="1"/>
-              <a:t>html</a:t>
-            </a:r>
-            <a:r>
-              <a:rPr lang="es-MX" sz="2000" dirty="0"/>
-              <a:t>, donde las líneas más amarillas representan que se está usando más Python y las blancas, más C.</a:t>
-            </a:r>
-          </a:p>
-          <a:p>
-            <a:endParaRPr lang="es-MX" dirty="0"/>
-          </a:p>
-        </p:txBody>
-      </p:sp>
-      <p:sp>
-        <p:nvSpPr>
-          <p:cNvPr id="8" name="Marcador de número de diapositiva 7">
-            <a:extLst>
-              <a:ext uri="{FF2B5EF4-FFF2-40B4-BE49-F238E27FC236}">
-                <a16:creationId xmlns:a16="http://schemas.microsoft.com/office/drawing/2014/main" id="{8BC9F251-CBE9-4932-BC7E-5A2BEE77A221}"/>
-              </a:ext>
-            </a:extLst>
-          </p:cNvPr>
-          <p:cNvSpPr>
-            <a:spLocks noGrp="1"/>
-          </p:cNvSpPr>
-          <p:nvPr>
-            <p:ph type="sldNum" sz="quarter" idx="12"/>
-          </p:nvPr>
-        </p:nvSpPr>
-        <p:spPr>
-          <a:xfrm>
-            <a:off x="8610600" y="6356350"/>
-            <a:ext cx="2743200" cy="365125"/>
-          </a:xfrm>
-        </p:spPr>
-        <p:txBody>
-          <a:bodyPr anchor="ctr">
-            <a:normAutofit/>
-          </a:bodyPr>
-          <a:lstStyle/>
-          <a:p>
-            <a:pPr rtl="0">
-              <a:spcAft>
-                <a:spcPts val="600"/>
-              </a:spcAft>
-              <a:defRPr/>
-            </a:pPr>
-            <a:fld id="{D76B855D-E9CC-4FF8-AD85-6CDC7B89A0DE}" type="slidenum">
-              <a:rPr lang="es-ES" noProof="0" smtClean="0">
-                <a:solidFill>
-                  <a:prstClr val="black">
-                    <a:tint val="75000"/>
-                  </a:prstClr>
-                </a:solidFill>
-              </a:rPr>
-              <a:pPr rtl="0">
-                <a:spcAft>
-                  <a:spcPts val="600"/>
-                </a:spcAft>
-                <a:defRPr/>
-              </a:pPr>
-              <a:t>12</a:t>
             </a:fld>
             <a:endParaRPr lang="es-ES" noProof="0">
               <a:solidFill>
@@ -14428,7 +13778,7 @@
 </p:sld>
 </file>
 
-<file path=ppt/slides/slide13.xml><?xml version="1.0" encoding="utf-8"?>
+<file path=ppt/slides/slide11.xml><?xml version="1.0" encoding="utf-8"?>
 <p:sld xmlns:a="http://schemas.openxmlformats.org/drawingml/2006/main" xmlns:r="http://schemas.openxmlformats.org/officeDocument/2006/relationships" xmlns:p="http://schemas.openxmlformats.org/presentationml/2006/main">
   <p:cSld>
     <p:spTree>
@@ -14529,7 +13879,7 @@
 </p:sld>
 </file>
 
-<file path=ppt/slides/slide14.xml><?xml version="1.0" encoding="utf-8"?>
+<file path=ppt/slides/slide12.xml><?xml version="1.0" encoding="utf-8"?>
 <p:sld xmlns:a="http://schemas.openxmlformats.org/drawingml/2006/main" xmlns:r="http://schemas.openxmlformats.org/officeDocument/2006/relationships" xmlns:p="http://schemas.openxmlformats.org/presentationml/2006/main">
   <p:cSld>
     <p:spTree>
@@ -14711,7 +14061,7 @@
                 <a:tabLst/>
                 <a:defRPr/>
               </a:pPr>
-              <a:t>14</a:t>
+              <a:t>12</a:t>
             </a:fld>
             <a:endParaRPr kumimoji="0" lang="es-ES" b="0" i="0" u="none" strike="noStrike" kern="1200" cap="none" spc="0" normalizeH="0" baseline="0">
               <a:ln>
@@ -14742,7 +14092,7 @@
 </p:sld>
 </file>
 
-<file path=ppt/slides/slide15.xml><?xml version="1.0" encoding="utf-8"?>
+<file path=ppt/slides/slide13.xml><?xml version="1.0" encoding="utf-8"?>
 <p:sld xmlns:a="http://schemas.openxmlformats.org/drawingml/2006/main" xmlns:r="http://schemas.openxmlformats.org/officeDocument/2006/relationships" xmlns:p="http://schemas.openxmlformats.org/presentationml/2006/main">
   <p:cSld>
     <p:spTree>
@@ -14953,7 +14303,7 @@
                 </a:spcAft>
                 <a:defRPr/>
               </a:pPr>
-              <a:t>15</a:t>
+              <a:t>13</a:t>
             </a:fld>
             <a:endParaRPr lang="es-ES" noProof="0" dirty="0">
               <a:solidFill>
@@ -14978,7 +14328,7 @@
 </p:sld>
 </file>
 
-<file path=ppt/slides/slide16.xml><?xml version="1.0" encoding="utf-8"?>
+<file path=ppt/slides/slide14.xml><?xml version="1.0" encoding="utf-8"?>
 <p:sld xmlns:a="http://schemas.openxmlformats.org/drawingml/2006/main" xmlns:r="http://schemas.openxmlformats.org/officeDocument/2006/relationships" xmlns:p="http://schemas.openxmlformats.org/presentationml/2006/main">
   <p:cSld>
     <p:spTree>
@@ -15211,7 +14561,7 @@
               <a:pPr rtl="0">
                 <a:defRPr/>
               </a:pPr>
-              <a:t>16</a:t>
+              <a:t>14</a:t>
             </a:fld>
             <a:endParaRPr lang="es-ES" noProof="0">
               <a:solidFill>
@@ -15266,7 +14616,7 @@
 </p:sld>
 </file>
 
-<file path=ppt/slides/slide17.xml><?xml version="1.0" encoding="utf-8"?>
+<file path=ppt/slides/slide15.xml><?xml version="1.0" encoding="utf-8"?>
 <p:sld xmlns:a="http://schemas.openxmlformats.org/drawingml/2006/main" xmlns:r="http://schemas.openxmlformats.org/officeDocument/2006/relationships" xmlns:p="http://schemas.openxmlformats.org/presentationml/2006/main">
   <p:cSld>
     <p:spTree>
@@ -15406,7 +14756,7 @@
                 </a:spcAft>
                 <a:defRPr/>
               </a:pPr>
-              <a:t>17</a:t>
+              <a:t>15</a:t>
             </a:fld>
             <a:endParaRPr lang="es-ES" noProof="0">
               <a:solidFill>
@@ -15431,7 +14781,7 @@
 </p:sld>
 </file>
 
-<file path=ppt/slides/slide18.xml><?xml version="1.0" encoding="utf-8"?>
+<file path=ppt/slides/slide16.xml><?xml version="1.0" encoding="utf-8"?>
 <p:sld xmlns:a="http://schemas.openxmlformats.org/drawingml/2006/main" xmlns:r="http://schemas.openxmlformats.org/officeDocument/2006/relationships" xmlns:p="http://schemas.openxmlformats.org/presentationml/2006/main">
   <p:cSld>
     <p:spTree>
@@ -15624,7 +14974,7 @@
                 </a:spcAft>
                 <a:defRPr/>
               </a:pPr>
-              <a:t>18</a:t>
+              <a:t>16</a:t>
             </a:fld>
             <a:endParaRPr lang="es-ES" noProof="0">
               <a:solidFill>
@@ -15879,7 +15229,7 @@
 </p:sld>
 </file>
 
-<file path=ppt/slides/slide19.xml><?xml version="1.0" encoding="utf-8"?>
+<file path=ppt/slides/slide17.xml><?xml version="1.0" encoding="utf-8"?>
 <p:sld xmlns:a="http://schemas.openxmlformats.org/drawingml/2006/main" xmlns:r="http://schemas.openxmlformats.org/officeDocument/2006/relationships" xmlns:p="http://schemas.openxmlformats.org/presentationml/2006/main">
   <p:cSld>
     <p:spTree>
@@ -16122,7 +15472,7 @@
                 <a:tabLst/>
                 <a:defRPr/>
               </a:pPr>
-              <a:t>19</a:t>
+              <a:t>17</a:t>
             </a:fld>
             <a:endParaRPr kumimoji="0" lang="es-ES" b="0" i="0" u="none" strike="noStrike" kern="1200" cap="none" spc="0" normalizeH="0" baseline="0">
               <a:ln>
@@ -16144,6 +15494,522 @@
     <p:extLst>
       <p:ext uri="{BB962C8B-B14F-4D97-AF65-F5344CB8AC3E}">
         <p14:creationId xmlns:p14="http://schemas.microsoft.com/office/powerpoint/2010/main" val="2232007123"/>
+      </p:ext>
+    </p:extLst>
+  </p:cSld>
+  <p:clrMapOvr>
+    <a:masterClrMapping/>
+  </p:clrMapOvr>
+</p:sld>
+</file>
+
+<file path=ppt/slides/slide18.xml><?xml version="1.0" encoding="utf-8"?>
+<p:sld xmlns:a="http://schemas.openxmlformats.org/drawingml/2006/main" xmlns:r="http://schemas.openxmlformats.org/officeDocument/2006/relationships" xmlns:p="http://schemas.openxmlformats.org/presentationml/2006/main">
+  <p:cSld>
+    <p:spTree>
+      <p:nvGrpSpPr>
+        <p:cNvPr id="1" name=""/>
+        <p:cNvGrpSpPr/>
+        <p:nvPr/>
+      </p:nvGrpSpPr>
+      <p:grpSpPr>
+        <a:xfrm>
+          <a:off x="0" y="0"/>
+          <a:ext cx="0" cy="0"/>
+          <a:chOff x="0" y="0"/>
+          <a:chExt cx="0" cy="0"/>
+        </a:xfrm>
+      </p:grpSpPr>
+      <p:sp>
+        <p:nvSpPr>
+          <p:cNvPr id="2" name="Título 1">
+            <a:extLst>
+              <a:ext uri="{FF2B5EF4-FFF2-40B4-BE49-F238E27FC236}">
+                <a16:creationId xmlns:a16="http://schemas.microsoft.com/office/drawing/2014/main" id="{40EB430E-F69D-41A9-A50E-2656CB55B392}"/>
+              </a:ext>
+            </a:extLst>
+          </p:cNvPr>
+          <p:cNvSpPr>
+            <a:spLocks noGrp="1"/>
+          </p:cNvSpPr>
+          <p:nvPr>
+            <p:ph type="title"/>
+          </p:nvPr>
+        </p:nvSpPr>
+        <p:spPr/>
+        <p:txBody>
+          <a:bodyPr/>
+          <a:lstStyle/>
+          <a:p>
+            <a:r>
+              <a:rPr lang="en-US" dirty="0" err="1"/>
+              <a:t>Descripción</a:t>
+            </a:r>
+            <a:r>
+              <a:rPr lang="en-US" dirty="0"/>
+              <a:t> del dataset</a:t>
+            </a:r>
+          </a:p>
+        </p:txBody>
+      </p:sp>
+      <p:sp>
+        <p:nvSpPr>
+          <p:cNvPr id="3" name="Marcador de contenido 2">
+            <a:extLst>
+              <a:ext uri="{FF2B5EF4-FFF2-40B4-BE49-F238E27FC236}">
+                <a16:creationId xmlns:a16="http://schemas.microsoft.com/office/drawing/2014/main" id="{66F34B46-F768-4F16-8147-A29B79597829}"/>
+              </a:ext>
+            </a:extLst>
+          </p:cNvPr>
+          <p:cNvSpPr>
+            <a:spLocks noGrp="1"/>
+          </p:cNvSpPr>
+          <p:nvPr>
+            <p:ph sz="half" idx="1"/>
+          </p:nvPr>
+        </p:nvSpPr>
+        <p:spPr/>
+        <p:txBody>
+          <a:bodyPr>
+            <a:normAutofit fontScale="70000" lnSpcReduction="20000"/>
+          </a:bodyPr>
+          <a:lstStyle/>
+          <a:p>
+            <a:r>
+              <a:rPr lang="es-MX" sz="2600" dirty="0"/>
+              <a:t>El </a:t>
+            </a:r>
+            <a:r>
+              <a:rPr lang="es-MX" sz="2600" dirty="0" err="1"/>
+              <a:t>dataset</a:t>
+            </a:r>
+            <a:r>
+              <a:rPr lang="es-MX" sz="2600" dirty="0"/>
+              <a:t> a utilizar viene de un repositorio en </a:t>
+            </a:r>
+            <a:r>
+              <a:rPr lang="es-MX" sz="2600" dirty="0" err="1"/>
+              <a:t>github</a:t>
+            </a:r>
+            <a:r>
+              <a:rPr lang="es-MX" sz="2600" dirty="0"/>
+              <a:t>.</a:t>
+            </a:r>
+          </a:p>
+          <a:p>
+            <a:r>
+              <a:rPr lang="es-MX" sz="2600" dirty="0"/>
+              <a:t>El </a:t>
+            </a:r>
+            <a:r>
+              <a:rPr lang="es-MX" sz="2600" dirty="0" err="1"/>
+              <a:t>dataset</a:t>
+            </a:r>
+            <a:r>
+              <a:rPr lang="es-MX" sz="2600" dirty="0"/>
+              <a:t> contiene información de los vuelos del 6 enero de 2019 de una cierta aerolínea en Estados Unidos y muestra los registros de sus 565 vuelos de ese día para únicamente 10 aeropuertos. </a:t>
+            </a:r>
+          </a:p>
+          <a:p>
+            <a:endParaRPr lang="en-US" sz="1800" dirty="0"/>
+          </a:p>
+        </p:txBody>
+      </p:sp>
+      <p:sp>
+        <p:nvSpPr>
+          <p:cNvPr id="7" name="Marcador de número de diapositiva 6">
+            <a:extLst>
+              <a:ext uri="{FF2B5EF4-FFF2-40B4-BE49-F238E27FC236}">
+                <a16:creationId xmlns:a16="http://schemas.microsoft.com/office/drawing/2014/main" id="{D9F671EC-902F-4C7A-8068-F2801AD56BCC}"/>
+              </a:ext>
+            </a:extLst>
+          </p:cNvPr>
+          <p:cNvSpPr>
+            <a:spLocks noGrp="1"/>
+          </p:cNvSpPr>
+          <p:nvPr>
+            <p:ph type="sldNum" sz="quarter" idx="12"/>
+          </p:nvPr>
+        </p:nvSpPr>
+        <p:spPr/>
+        <p:txBody>
+          <a:bodyPr/>
+          <a:lstStyle/>
+          <a:p>
+            <a:pPr rtl="0">
+              <a:defRPr/>
+            </a:pPr>
+            <a:fld id="{D76B855D-E9CC-4FF8-AD85-6CDC7B89A0DE}" type="slidenum">
+              <a:rPr lang="es-ES" noProof="0" smtClean="0">
+                <a:solidFill>
+                  <a:prstClr val="black">
+                    <a:tint val="75000"/>
+                  </a:prstClr>
+                </a:solidFill>
+              </a:rPr>
+              <a:pPr rtl="0">
+                <a:defRPr/>
+              </a:pPr>
+              <a:t>18</a:t>
+            </a:fld>
+            <a:endParaRPr lang="es-ES" noProof="0">
+              <a:solidFill>
+                <a:prstClr val="black">
+                  <a:tint val="75000"/>
+                </a:prstClr>
+              </a:solidFill>
+            </a:endParaRPr>
+          </a:p>
+        </p:txBody>
+      </p:sp>
+      <p:sp>
+        <p:nvSpPr>
+          <p:cNvPr id="13" name="Marcador de contenido 12">
+            <a:extLst>
+              <a:ext uri="{FF2B5EF4-FFF2-40B4-BE49-F238E27FC236}">
+                <a16:creationId xmlns:a16="http://schemas.microsoft.com/office/drawing/2014/main" id="{4E39429C-E896-497F-9888-2956C0B20243}"/>
+              </a:ext>
+            </a:extLst>
+          </p:cNvPr>
+          <p:cNvSpPr>
+            <a:spLocks noGrp="1"/>
+          </p:cNvSpPr>
+          <p:nvPr>
+            <p:ph sz="half" idx="2"/>
+          </p:nvPr>
+        </p:nvSpPr>
+        <p:spPr/>
+        <p:txBody>
+          <a:bodyPr>
+            <a:normAutofit fontScale="70000" lnSpcReduction="20000"/>
+          </a:bodyPr>
+          <a:lstStyle/>
+          <a:p>
+            <a:pPr marL="0" indent="0">
+              <a:buNone/>
+            </a:pPr>
+            <a:r>
+              <a:rPr lang="es-MX" dirty="0"/>
+              <a:t>El </a:t>
+            </a:r>
+            <a:r>
+              <a:rPr lang="es-MX" dirty="0" err="1"/>
+              <a:t>dataset</a:t>
+            </a:r>
+            <a:r>
+              <a:rPr lang="es-MX" dirty="0"/>
+              <a:t> cuenta con cinco columnas:</a:t>
+            </a:r>
+          </a:p>
+          <a:p>
+            <a:endParaRPr lang="es-MX" dirty="0"/>
+          </a:p>
+          <a:p>
+            <a:r>
+              <a:rPr lang="es-MX" dirty="0" err="1"/>
+              <a:t>Source</a:t>
+            </a:r>
+            <a:r>
+              <a:rPr lang="es-MX" dirty="0"/>
+              <a:t>: identificador del aeropuerto origen del que sale el vuelo</a:t>
+            </a:r>
+          </a:p>
+          <a:p>
+            <a:r>
+              <a:rPr lang="es-MX" dirty="0" err="1"/>
+              <a:t>Destination</a:t>
+            </a:r>
+            <a:r>
+              <a:rPr lang="es-MX" dirty="0"/>
+              <a:t>: identificador del aeropuerto destino al que llega el vuelo</a:t>
+            </a:r>
+          </a:p>
+          <a:p>
+            <a:r>
+              <a:rPr lang="es-MX" dirty="0" err="1"/>
+              <a:t>Departure</a:t>
+            </a:r>
+            <a:r>
+              <a:rPr lang="es-MX" dirty="0"/>
+              <a:t>: hora de despegue del vuelo en el aeropuerto origen en horas militares</a:t>
+            </a:r>
+          </a:p>
+          <a:p>
+            <a:r>
+              <a:rPr lang="es-MX" dirty="0" err="1"/>
+              <a:t>Arrival</a:t>
+            </a:r>
+            <a:r>
+              <a:rPr lang="es-MX" dirty="0"/>
+              <a:t>: hora de aterrizaje del vuelo en el aeropuerto destino en horas militares</a:t>
+            </a:r>
+          </a:p>
+          <a:p>
+            <a:r>
+              <a:rPr lang="es-MX" dirty="0" err="1"/>
+              <a:t>capacity</a:t>
+            </a:r>
+            <a:r>
+              <a:rPr lang="es-MX" dirty="0"/>
+              <a:t>: cantidad máxima de pasajeros que puede transportar el vuelo (sin contar al </a:t>
+            </a:r>
+            <a:r>
+              <a:rPr lang="es-MX" dirty="0" err="1"/>
+              <a:t>crew</a:t>
+            </a:r>
+            <a:r>
+              <a:rPr lang="es-MX" dirty="0"/>
+              <a:t>)</a:t>
+            </a:r>
+            <a:endParaRPr lang="en-US" dirty="0"/>
+          </a:p>
+        </p:txBody>
+      </p:sp>
+      <p:pic>
+        <p:nvPicPr>
+          <p:cNvPr id="17" name="Imagen 16">
+            <a:extLst>
+              <a:ext uri="{FF2B5EF4-FFF2-40B4-BE49-F238E27FC236}">
+                <a16:creationId xmlns:a16="http://schemas.microsoft.com/office/drawing/2014/main" id="{9B571B55-1069-430C-BAFA-F1C5AD23FEF4}"/>
+              </a:ext>
+            </a:extLst>
+          </p:cNvPr>
+          <p:cNvPicPr>
+            <a:picLocks noChangeAspect="1"/>
+          </p:cNvPicPr>
+          <p:nvPr/>
+        </p:nvPicPr>
+        <p:blipFill>
+          <a:blip r:embed="rId2"/>
+          <a:stretch>
+            <a:fillRect/>
+          </a:stretch>
+        </p:blipFill>
+        <p:spPr>
+          <a:xfrm>
+            <a:off x="1204602" y="3630260"/>
+            <a:ext cx="4448796" cy="2172003"/>
+          </a:xfrm>
+          <a:prstGeom prst="rect">
+            <a:avLst/>
+          </a:prstGeom>
+        </p:spPr>
+      </p:pic>
+    </p:spTree>
+    <p:extLst>
+      <p:ext uri="{BB962C8B-B14F-4D97-AF65-F5344CB8AC3E}">
+        <p14:creationId xmlns:p14="http://schemas.microsoft.com/office/powerpoint/2010/main" val="2405662673"/>
+      </p:ext>
+    </p:extLst>
+  </p:cSld>
+  <p:clrMapOvr>
+    <a:masterClrMapping/>
+  </p:clrMapOvr>
+</p:sld>
+</file>
+
+<file path=ppt/slides/slide19.xml><?xml version="1.0" encoding="utf-8"?>
+<p:sld xmlns:a="http://schemas.openxmlformats.org/drawingml/2006/main" xmlns:r="http://schemas.openxmlformats.org/officeDocument/2006/relationships" xmlns:p="http://schemas.openxmlformats.org/presentationml/2006/main">
+  <p:cSld>
+    <p:spTree>
+      <p:nvGrpSpPr>
+        <p:cNvPr id="1" name=""/>
+        <p:cNvGrpSpPr/>
+        <p:nvPr/>
+      </p:nvGrpSpPr>
+      <p:grpSpPr>
+        <a:xfrm>
+          <a:off x="0" y="0"/>
+          <a:ext cx="0" cy="0"/>
+          <a:chOff x="0" y="0"/>
+          <a:chExt cx="0" cy="0"/>
+        </a:xfrm>
+      </p:grpSpPr>
+      <p:sp>
+        <p:nvSpPr>
+          <p:cNvPr id="71" name="Title 1">
+            <a:extLst>
+              <a:ext uri="{FF2B5EF4-FFF2-40B4-BE49-F238E27FC236}">
+                <a16:creationId xmlns:a16="http://schemas.microsoft.com/office/drawing/2014/main" id="{FB32599D-D1DA-4C81-AF20-285979709633}"/>
+              </a:ext>
+            </a:extLst>
+          </p:cNvPr>
+          <p:cNvSpPr>
+            <a:spLocks noGrp="1"/>
+          </p:cNvSpPr>
+          <p:nvPr>
+            <p:ph type="title"/>
+          </p:nvPr>
+        </p:nvSpPr>
+        <p:spPr>
+          <a:xfrm>
+            <a:off x="838200" y="365125"/>
+            <a:ext cx="10515600" cy="1325563"/>
+          </a:xfrm>
+        </p:spPr>
+        <p:txBody>
+          <a:bodyPr anchor="ctr">
+            <a:normAutofit/>
+          </a:bodyPr>
+          <a:lstStyle/>
+          <a:p>
+            <a:r>
+              <a:rPr lang="en-US" dirty="0" err="1"/>
+              <a:t>Gráfica</a:t>
+            </a:r>
+            <a:r>
+              <a:rPr lang="en-US" dirty="0"/>
+              <a:t> de las </a:t>
+            </a:r>
+            <a:r>
+              <a:rPr lang="en-US" dirty="0" err="1"/>
+              <a:t>rutas</a:t>
+            </a:r>
+            <a:endParaRPr lang="en-US" dirty="0"/>
+          </a:p>
+        </p:txBody>
+      </p:sp>
+      <p:pic>
+        <p:nvPicPr>
+          <p:cNvPr id="9" name="Imagen 8">
+            <a:extLst>
+              <a:ext uri="{FF2B5EF4-FFF2-40B4-BE49-F238E27FC236}">
+                <a16:creationId xmlns:a16="http://schemas.microsoft.com/office/drawing/2014/main" id="{AFE2707D-5AFA-442B-AC20-9279C839A16E}"/>
+              </a:ext>
+            </a:extLst>
+          </p:cNvPr>
+          <p:cNvPicPr>
+            <a:picLocks noChangeAspect="1"/>
+          </p:cNvPicPr>
+          <p:nvPr/>
+        </p:nvPicPr>
+        <p:blipFill rotWithShape="1">
+          <a:blip r:embed="rId2"/>
+          <a:srcRect l="2132" r="3" b="3"/>
+          <a:stretch/>
+        </p:blipFill>
+        <p:spPr>
+          <a:xfrm>
+            <a:off x="912812" y="1690688"/>
+            <a:ext cx="5157787" cy="3684588"/>
+          </a:xfrm>
+          <a:prstGeom prst="rect">
+            <a:avLst/>
+          </a:prstGeom>
+          <a:noFill/>
+        </p:spPr>
+      </p:pic>
+      <p:pic>
+        <p:nvPicPr>
+          <p:cNvPr id="1026" name="Picture 2">
+            <a:extLst>
+              <a:ext uri="{FF2B5EF4-FFF2-40B4-BE49-F238E27FC236}">
+                <a16:creationId xmlns:a16="http://schemas.microsoft.com/office/drawing/2014/main" id="{1E0CF21C-D45E-49CB-850F-7BD01EBE1CF1}"/>
+              </a:ext>
+            </a:extLst>
+          </p:cNvPr>
+          <p:cNvPicPr>
+            <a:picLocks noChangeAspect="1" noChangeArrowheads="1"/>
+          </p:cNvPicPr>
+          <p:nvPr/>
+        </p:nvPicPr>
+        <p:blipFill rotWithShape="1">
+          <a:blip r:embed="rId3">
+            <a:extLst>
+              <a:ext uri="{28A0092B-C50C-407E-A947-70E740481C1C}">
+                <a14:useLocalDpi xmlns:a14="http://schemas.microsoft.com/office/drawing/2010/main" val="0"/>
+              </a:ext>
+            </a:extLst>
+          </a:blip>
+          <a:srcRect r="7858" b="-2"/>
+          <a:stretch/>
+        </p:blipFill>
+        <p:spPr bwMode="auto">
+          <a:xfrm>
+            <a:off x="6096000" y="1690688"/>
+            <a:ext cx="5183188" cy="3684588"/>
+          </a:xfrm>
+          <a:prstGeom prst="rect">
+            <a:avLst/>
+          </a:prstGeom>
+          <a:solidFill>
+            <a:srgbClr val="FFFFFF"/>
+          </a:solidFill>
+          <a:extLst>
+            <a:ext uri="{909E8E84-426E-40DD-AFC4-6F175D3DCCD1}">
+              <a14:hiddenFill xmlns:a14="http://schemas.microsoft.com/office/drawing/2010/main">
+                <a:solidFill>
+                  <a:srgbClr val="FFFFFF"/>
+                </a:solidFill>
+              </a14:hiddenFill>
+            </a:ext>
+          </a:extLst>
+        </p:spPr>
+      </p:pic>
+      <p:sp>
+        <p:nvSpPr>
+          <p:cNvPr id="7" name="Marcador de número de diapositiva 6">
+            <a:extLst>
+              <a:ext uri="{FF2B5EF4-FFF2-40B4-BE49-F238E27FC236}">
+                <a16:creationId xmlns:a16="http://schemas.microsoft.com/office/drawing/2014/main" id="{01324B33-FD84-4510-918A-37BDD691F73E}"/>
+              </a:ext>
+            </a:extLst>
+          </p:cNvPr>
+          <p:cNvSpPr>
+            <a:spLocks noGrp="1"/>
+          </p:cNvSpPr>
+          <p:nvPr>
+            <p:ph type="sldNum" sz="quarter" idx="12"/>
+          </p:nvPr>
+        </p:nvSpPr>
+        <p:spPr>
+          <a:xfrm>
+            <a:off x="8610600" y="6356350"/>
+            <a:ext cx="2743200" cy="365125"/>
+          </a:xfrm>
+        </p:spPr>
+        <p:txBody>
+          <a:bodyPr anchor="ctr">
+            <a:normAutofit/>
+          </a:bodyPr>
+          <a:lstStyle/>
+          <a:p>
+            <a:pPr rtl="0">
+              <a:spcAft>
+                <a:spcPts val="600"/>
+              </a:spcAft>
+              <a:defRPr/>
+            </a:pPr>
+            <a:fld id="{D76B855D-E9CC-4FF8-AD85-6CDC7B89A0DE}" type="slidenum">
+              <a:rPr lang="es-ES" noProof="0" smtClean="0">
+                <a:solidFill>
+                  <a:prstClr val="black">
+                    <a:tint val="75000"/>
+                  </a:prstClr>
+                </a:solidFill>
+              </a:rPr>
+              <a:pPr rtl="0">
+                <a:spcAft>
+                  <a:spcPts val="600"/>
+                </a:spcAft>
+                <a:defRPr/>
+              </a:pPr>
+              <a:t>19</a:t>
+            </a:fld>
+            <a:endParaRPr lang="es-ES" noProof="0">
+              <a:solidFill>
+                <a:prstClr val="black">
+                  <a:tint val="75000"/>
+                </a:prstClr>
+              </a:solidFill>
+            </a:endParaRPr>
+          </a:p>
+        </p:txBody>
+      </p:sp>
+    </p:spTree>
+    <p:extLst>
+      <p:ext uri="{BB962C8B-B14F-4D97-AF65-F5344CB8AC3E}">
+        <p14:creationId xmlns:p14="http://schemas.microsoft.com/office/powerpoint/2010/main" val="4091659100"/>
       </p:ext>
     </p:extLst>
   </p:cSld>
@@ -16389,522 +16255,6 @@
 </file>
 
 <file path=ppt/slides/slide20.xml><?xml version="1.0" encoding="utf-8"?>
-<p:sld xmlns:a="http://schemas.openxmlformats.org/drawingml/2006/main" xmlns:r="http://schemas.openxmlformats.org/officeDocument/2006/relationships" xmlns:p="http://schemas.openxmlformats.org/presentationml/2006/main">
-  <p:cSld>
-    <p:spTree>
-      <p:nvGrpSpPr>
-        <p:cNvPr id="1" name=""/>
-        <p:cNvGrpSpPr/>
-        <p:nvPr/>
-      </p:nvGrpSpPr>
-      <p:grpSpPr>
-        <a:xfrm>
-          <a:off x="0" y="0"/>
-          <a:ext cx="0" cy="0"/>
-          <a:chOff x="0" y="0"/>
-          <a:chExt cx="0" cy="0"/>
-        </a:xfrm>
-      </p:grpSpPr>
-      <p:sp>
-        <p:nvSpPr>
-          <p:cNvPr id="2" name="Título 1">
-            <a:extLst>
-              <a:ext uri="{FF2B5EF4-FFF2-40B4-BE49-F238E27FC236}">
-                <a16:creationId xmlns:a16="http://schemas.microsoft.com/office/drawing/2014/main" id="{40EB430E-F69D-41A9-A50E-2656CB55B392}"/>
-              </a:ext>
-            </a:extLst>
-          </p:cNvPr>
-          <p:cNvSpPr>
-            <a:spLocks noGrp="1"/>
-          </p:cNvSpPr>
-          <p:nvPr>
-            <p:ph type="title"/>
-          </p:nvPr>
-        </p:nvSpPr>
-        <p:spPr/>
-        <p:txBody>
-          <a:bodyPr/>
-          <a:lstStyle/>
-          <a:p>
-            <a:r>
-              <a:rPr lang="en-US" dirty="0" err="1"/>
-              <a:t>Descripción</a:t>
-            </a:r>
-            <a:r>
-              <a:rPr lang="en-US" dirty="0"/>
-              <a:t> del dataset</a:t>
-            </a:r>
-          </a:p>
-        </p:txBody>
-      </p:sp>
-      <p:sp>
-        <p:nvSpPr>
-          <p:cNvPr id="3" name="Marcador de contenido 2">
-            <a:extLst>
-              <a:ext uri="{FF2B5EF4-FFF2-40B4-BE49-F238E27FC236}">
-                <a16:creationId xmlns:a16="http://schemas.microsoft.com/office/drawing/2014/main" id="{66F34B46-F768-4F16-8147-A29B79597829}"/>
-              </a:ext>
-            </a:extLst>
-          </p:cNvPr>
-          <p:cNvSpPr>
-            <a:spLocks noGrp="1"/>
-          </p:cNvSpPr>
-          <p:nvPr>
-            <p:ph sz="half" idx="1"/>
-          </p:nvPr>
-        </p:nvSpPr>
-        <p:spPr/>
-        <p:txBody>
-          <a:bodyPr>
-            <a:normAutofit fontScale="70000" lnSpcReduction="20000"/>
-          </a:bodyPr>
-          <a:lstStyle/>
-          <a:p>
-            <a:r>
-              <a:rPr lang="es-MX" sz="2600" dirty="0"/>
-              <a:t>El </a:t>
-            </a:r>
-            <a:r>
-              <a:rPr lang="es-MX" sz="2600" dirty="0" err="1"/>
-              <a:t>dataset</a:t>
-            </a:r>
-            <a:r>
-              <a:rPr lang="es-MX" sz="2600" dirty="0"/>
-              <a:t> a utilizar viene de un repositorio en </a:t>
-            </a:r>
-            <a:r>
-              <a:rPr lang="es-MX" sz="2600" dirty="0" err="1"/>
-              <a:t>github</a:t>
-            </a:r>
-            <a:r>
-              <a:rPr lang="es-MX" sz="2600" dirty="0"/>
-              <a:t>.</a:t>
-            </a:r>
-          </a:p>
-          <a:p>
-            <a:r>
-              <a:rPr lang="es-MX" sz="2600" dirty="0"/>
-              <a:t>El </a:t>
-            </a:r>
-            <a:r>
-              <a:rPr lang="es-MX" sz="2600" dirty="0" err="1"/>
-              <a:t>dataset</a:t>
-            </a:r>
-            <a:r>
-              <a:rPr lang="es-MX" sz="2600" dirty="0"/>
-              <a:t> contiene información de los vuelos del 6 enero de 2019 de una cierta aerolínea en Estados Unidos y muestra los registros de sus 565 vuelos de ese día para únicamente 10 aeropuertos. </a:t>
-            </a:r>
-          </a:p>
-          <a:p>
-            <a:endParaRPr lang="en-US" sz="1800" dirty="0"/>
-          </a:p>
-        </p:txBody>
-      </p:sp>
-      <p:sp>
-        <p:nvSpPr>
-          <p:cNvPr id="7" name="Marcador de número de diapositiva 6">
-            <a:extLst>
-              <a:ext uri="{FF2B5EF4-FFF2-40B4-BE49-F238E27FC236}">
-                <a16:creationId xmlns:a16="http://schemas.microsoft.com/office/drawing/2014/main" id="{D9F671EC-902F-4C7A-8068-F2801AD56BCC}"/>
-              </a:ext>
-            </a:extLst>
-          </p:cNvPr>
-          <p:cNvSpPr>
-            <a:spLocks noGrp="1"/>
-          </p:cNvSpPr>
-          <p:nvPr>
-            <p:ph type="sldNum" sz="quarter" idx="12"/>
-          </p:nvPr>
-        </p:nvSpPr>
-        <p:spPr/>
-        <p:txBody>
-          <a:bodyPr/>
-          <a:lstStyle/>
-          <a:p>
-            <a:pPr rtl="0">
-              <a:defRPr/>
-            </a:pPr>
-            <a:fld id="{D76B855D-E9CC-4FF8-AD85-6CDC7B89A0DE}" type="slidenum">
-              <a:rPr lang="es-ES" noProof="0" smtClean="0">
-                <a:solidFill>
-                  <a:prstClr val="black">
-                    <a:tint val="75000"/>
-                  </a:prstClr>
-                </a:solidFill>
-              </a:rPr>
-              <a:pPr rtl="0">
-                <a:defRPr/>
-              </a:pPr>
-              <a:t>20</a:t>
-            </a:fld>
-            <a:endParaRPr lang="es-ES" noProof="0">
-              <a:solidFill>
-                <a:prstClr val="black">
-                  <a:tint val="75000"/>
-                </a:prstClr>
-              </a:solidFill>
-            </a:endParaRPr>
-          </a:p>
-        </p:txBody>
-      </p:sp>
-      <p:sp>
-        <p:nvSpPr>
-          <p:cNvPr id="13" name="Marcador de contenido 12">
-            <a:extLst>
-              <a:ext uri="{FF2B5EF4-FFF2-40B4-BE49-F238E27FC236}">
-                <a16:creationId xmlns:a16="http://schemas.microsoft.com/office/drawing/2014/main" id="{4E39429C-E896-497F-9888-2956C0B20243}"/>
-              </a:ext>
-            </a:extLst>
-          </p:cNvPr>
-          <p:cNvSpPr>
-            <a:spLocks noGrp="1"/>
-          </p:cNvSpPr>
-          <p:nvPr>
-            <p:ph sz="half" idx="2"/>
-          </p:nvPr>
-        </p:nvSpPr>
-        <p:spPr/>
-        <p:txBody>
-          <a:bodyPr>
-            <a:normAutofit fontScale="70000" lnSpcReduction="20000"/>
-          </a:bodyPr>
-          <a:lstStyle/>
-          <a:p>
-            <a:pPr marL="0" indent="0">
-              <a:buNone/>
-            </a:pPr>
-            <a:r>
-              <a:rPr lang="es-MX" dirty="0"/>
-              <a:t>El </a:t>
-            </a:r>
-            <a:r>
-              <a:rPr lang="es-MX" dirty="0" err="1"/>
-              <a:t>dataset</a:t>
-            </a:r>
-            <a:r>
-              <a:rPr lang="es-MX" dirty="0"/>
-              <a:t> cuenta con cinco columnas:</a:t>
-            </a:r>
-          </a:p>
-          <a:p>
-            <a:endParaRPr lang="es-MX" dirty="0"/>
-          </a:p>
-          <a:p>
-            <a:r>
-              <a:rPr lang="es-MX" dirty="0" err="1"/>
-              <a:t>Source</a:t>
-            </a:r>
-            <a:r>
-              <a:rPr lang="es-MX" dirty="0"/>
-              <a:t>: identificador del aeropuerto origen del que sale el vuelo</a:t>
-            </a:r>
-          </a:p>
-          <a:p>
-            <a:r>
-              <a:rPr lang="es-MX" dirty="0" err="1"/>
-              <a:t>Destination</a:t>
-            </a:r>
-            <a:r>
-              <a:rPr lang="es-MX" dirty="0"/>
-              <a:t>: identificador del aeropuerto destino al que llega el vuelo</a:t>
-            </a:r>
-          </a:p>
-          <a:p>
-            <a:r>
-              <a:rPr lang="es-MX" dirty="0" err="1"/>
-              <a:t>Departure</a:t>
-            </a:r>
-            <a:r>
-              <a:rPr lang="es-MX" dirty="0"/>
-              <a:t>: hora de despegue del vuelo en el aeropuerto origen en horas militares</a:t>
-            </a:r>
-          </a:p>
-          <a:p>
-            <a:r>
-              <a:rPr lang="es-MX" dirty="0" err="1"/>
-              <a:t>Arrival</a:t>
-            </a:r>
-            <a:r>
-              <a:rPr lang="es-MX" dirty="0"/>
-              <a:t>: hora de aterrizaje del vuelo en el aeropuerto destino en horas militares</a:t>
-            </a:r>
-          </a:p>
-          <a:p>
-            <a:r>
-              <a:rPr lang="es-MX" dirty="0" err="1"/>
-              <a:t>capacity</a:t>
-            </a:r>
-            <a:r>
-              <a:rPr lang="es-MX" dirty="0"/>
-              <a:t>: cantidad máxima de pasajeros que puede transportar el vuelo (sin contar al </a:t>
-            </a:r>
-            <a:r>
-              <a:rPr lang="es-MX" dirty="0" err="1"/>
-              <a:t>crew</a:t>
-            </a:r>
-            <a:r>
-              <a:rPr lang="es-MX" dirty="0"/>
-              <a:t>)</a:t>
-            </a:r>
-            <a:endParaRPr lang="en-US" dirty="0"/>
-          </a:p>
-        </p:txBody>
-      </p:sp>
-      <p:pic>
-        <p:nvPicPr>
-          <p:cNvPr id="17" name="Imagen 16">
-            <a:extLst>
-              <a:ext uri="{FF2B5EF4-FFF2-40B4-BE49-F238E27FC236}">
-                <a16:creationId xmlns:a16="http://schemas.microsoft.com/office/drawing/2014/main" id="{9B571B55-1069-430C-BAFA-F1C5AD23FEF4}"/>
-              </a:ext>
-            </a:extLst>
-          </p:cNvPr>
-          <p:cNvPicPr>
-            <a:picLocks noChangeAspect="1"/>
-          </p:cNvPicPr>
-          <p:nvPr/>
-        </p:nvPicPr>
-        <p:blipFill>
-          <a:blip r:embed="rId2"/>
-          <a:stretch>
-            <a:fillRect/>
-          </a:stretch>
-        </p:blipFill>
-        <p:spPr>
-          <a:xfrm>
-            <a:off x="1204602" y="3630260"/>
-            <a:ext cx="4448796" cy="2172003"/>
-          </a:xfrm>
-          <a:prstGeom prst="rect">
-            <a:avLst/>
-          </a:prstGeom>
-        </p:spPr>
-      </p:pic>
-    </p:spTree>
-    <p:extLst>
-      <p:ext uri="{BB962C8B-B14F-4D97-AF65-F5344CB8AC3E}">
-        <p14:creationId xmlns:p14="http://schemas.microsoft.com/office/powerpoint/2010/main" val="2405662673"/>
-      </p:ext>
-    </p:extLst>
-  </p:cSld>
-  <p:clrMapOvr>
-    <a:masterClrMapping/>
-  </p:clrMapOvr>
-</p:sld>
-</file>
-
-<file path=ppt/slides/slide21.xml><?xml version="1.0" encoding="utf-8"?>
-<p:sld xmlns:a="http://schemas.openxmlformats.org/drawingml/2006/main" xmlns:r="http://schemas.openxmlformats.org/officeDocument/2006/relationships" xmlns:p="http://schemas.openxmlformats.org/presentationml/2006/main">
-  <p:cSld>
-    <p:spTree>
-      <p:nvGrpSpPr>
-        <p:cNvPr id="1" name=""/>
-        <p:cNvGrpSpPr/>
-        <p:nvPr/>
-      </p:nvGrpSpPr>
-      <p:grpSpPr>
-        <a:xfrm>
-          <a:off x="0" y="0"/>
-          <a:ext cx="0" cy="0"/>
-          <a:chOff x="0" y="0"/>
-          <a:chExt cx="0" cy="0"/>
-        </a:xfrm>
-      </p:grpSpPr>
-      <p:sp>
-        <p:nvSpPr>
-          <p:cNvPr id="71" name="Title 1">
-            <a:extLst>
-              <a:ext uri="{FF2B5EF4-FFF2-40B4-BE49-F238E27FC236}">
-                <a16:creationId xmlns:a16="http://schemas.microsoft.com/office/drawing/2014/main" id="{FB32599D-D1DA-4C81-AF20-285979709633}"/>
-              </a:ext>
-            </a:extLst>
-          </p:cNvPr>
-          <p:cNvSpPr>
-            <a:spLocks noGrp="1"/>
-          </p:cNvSpPr>
-          <p:nvPr>
-            <p:ph type="title"/>
-          </p:nvPr>
-        </p:nvSpPr>
-        <p:spPr>
-          <a:xfrm>
-            <a:off x="838200" y="365125"/>
-            <a:ext cx="10515600" cy="1325563"/>
-          </a:xfrm>
-        </p:spPr>
-        <p:txBody>
-          <a:bodyPr anchor="ctr">
-            <a:normAutofit/>
-          </a:bodyPr>
-          <a:lstStyle/>
-          <a:p>
-            <a:r>
-              <a:rPr lang="en-US" dirty="0" err="1"/>
-              <a:t>Gráfica</a:t>
-            </a:r>
-            <a:r>
-              <a:rPr lang="en-US" dirty="0"/>
-              <a:t> de las </a:t>
-            </a:r>
-            <a:r>
-              <a:rPr lang="en-US" dirty="0" err="1"/>
-              <a:t>rutas</a:t>
-            </a:r>
-            <a:endParaRPr lang="en-US" dirty="0"/>
-          </a:p>
-        </p:txBody>
-      </p:sp>
-      <p:pic>
-        <p:nvPicPr>
-          <p:cNvPr id="9" name="Imagen 8">
-            <a:extLst>
-              <a:ext uri="{FF2B5EF4-FFF2-40B4-BE49-F238E27FC236}">
-                <a16:creationId xmlns:a16="http://schemas.microsoft.com/office/drawing/2014/main" id="{AFE2707D-5AFA-442B-AC20-9279C839A16E}"/>
-              </a:ext>
-            </a:extLst>
-          </p:cNvPr>
-          <p:cNvPicPr>
-            <a:picLocks noChangeAspect="1"/>
-          </p:cNvPicPr>
-          <p:nvPr/>
-        </p:nvPicPr>
-        <p:blipFill rotWithShape="1">
-          <a:blip r:embed="rId2"/>
-          <a:srcRect l="2132" r="3" b="3"/>
-          <a:stretch/>
-        </p:blipFill>
-        <p:spPr>
-          <a:xfrm>
-            <a:off x="912812" y="1690688"/>
-            <a:ext cx="5157787" cy="3684588"/>
-          </a:xfrm>
-          <a:prstGeom prst="rect">
-            <a:avLst/>
-          </a:prstGeom>
-          <a:noFill/>
-        </p:spPr>
-      </p:pic>
-      <p:pic>
-        <p:nvPicPr>
-          <p:cNvPr id="1026" name="Picture 2">
-            <a:extLst>
-              <a:ext uri="{FF2B5EF4-FFF2-40B4-BE49-F238E27FC236}">
-                <a16:creationId xmlns:a16="http://schemas.microsoft.com/office/drawing/2014/main" id="{1E0CF21C-D45E-49CB-850F-7BD01EBE1CF1}"/>
-              </a:ext>
-            </a:extLst>
-          </p:cNvPr>
-          <p:cNvPicPr>
-            <a:picLocks noChangeAspect="1" noChangeArrowheads="1"/>
-          </p:cNvPicPr>
-          <p:nvPr/>
-        </p:nvPicPr>
-        <p:blipFill rotWithShape="1">
-          <a:blip r:embed="rId3">
-            <a:extLst>
-              <a:ext uri="{28A0092B-C50C-407E-A947-70E740481C1C}">
-                <a14:useLocalDpi xmlns:a14="http://schemas.microsoft.com/office/drawing/2010/main" val="0"/>
-              </a:ext>
-            </a:extLst>
-          </a:blip>
-          <a:srcRect r="7858" b="-2"/>
-          <a:stretch/>
-        </p:blipFill>
-        <p:spPr bwMode="auto">
-          <a:xfrm>
-            <a:off x="6096000" y="1690688"/>
-            <a:ext cx="5183188" cy="3684588"/>
-          </a:xfrm>
-          <a:prstGeom prst="rect">
-            <a:avLst/>
-          </a:prstGeom>
-          <a:solidFill>
-            <a:srgbClr val="FFFFFF"/>
-          </a:solidFill>
-          <a:extLst>
-            <a:ext uri="{909E8E84-426E-40DD-AFC4-6F175D3DCCD1}">
-              <a14:hiddenFill xmlns:a14="http://schemas.microsoft.com/office/drawing/2010/main">
-                <a:solidFill>
-                  <a:srgbClr val="FFFFFF"/>
-                </a:solidFill>
-              </a14:hiddenFill>
-            </a:ext>
-          </a:extLst>
-        </p:spPr>
-      </p:pic>
-      <p:sp>
-        <p:nvSpPr>
-          <p:cNvPr id="7" name="Marcador de número de diapositiva 6">
-            <a:extLst>
-              <a:ext uri="{FF2B5EF4-FFF2-40B4-BE49-F238E27FC236}">
-                <a16:creationId xmlns:a16="http://schemas.microsoft.com/office/drawing/2014/main" id="{01324B33-FD84-4510-918A-37BDD691F73E}"/>
-              </a:ext>
-            </a:extLst>
-          </p:cNvPr>
-          <p:cNvSpPr>
-            <a:spLocks noGrp="1"/>
-          </p:cNvSpPr>
-          <p:nvPr>
-            <p:ph type="sldNum" sz="quarter" idx="12"/>
-          </p:nvPr>
-        </p:nvSpPr>
-        <p:spPr>
-          <a:xfrm>
-            <a:off x="8610600" y="6356350"/>
-            <a:ext cx="2743200" cy="365125"/>
-          </a:xfrm>
-        </p:spPr>
-        <p:txBody>
-          <a:bodyPr anchor="ctr">
-            <a:normAutofit/>
-          </a:bodyPr>
-          <a:lstStyle/>
-          <a:p>
-            <a:pPr rtl="0">
-              <a:spcAft>
-                <a:spcPts val="600"/>
-              </a:spcAft>
-              <a:defRPr/>
-            </a:pPr>
-            <a:fld id="{D76B855D-E9CC-4FF8-AD85-6CDC7B89A0DE}" type="slidenum">
-              <a:rPr lang="es-ES" noProof="0" smtClean="0">
-                <a:solidFill>
-                  <a:prstClr val="black">
-                    <a:tint val="75000"/>
-                  </a:prstClr>
-                </a:solidFill>
-              </a:rPr>
-              <a:pPr rtl="0">
-                <a:spcAft>
-                  <a:spcPts val="600"/>
-                </a:spcAft>
-                <a:defRPr/>
-              </a:pPr>
-              <a:t>21</a:t>
-            </a:fld>
-            <a:endParaRPr lang="es-ES" noProof="0">
-              <a:solidFill>
-                <a:prstClr val="black">
-                  <a:tint val="75000"/>
-                </a:prstClr>
-              </a:solidFill>
-            </a:endParaRPr>
-          </a:p>
-        </p:txBody>
-      </p:sp>
-    </p:spTree>
-    <p:extLst>
-      <p:ext uri="{BB962C8B-B14F-4D97-AF65-F5344CB8AC3E}">
-        <p14:creationId xmlns:p14="http://schemas.microsoft.com/office/powerpoint/2010/main" val="4091659100"/>
-      </p:ext>
-    </p:extLst>
-  </p:cSld>
-  <p:clrMapOvr>
-    <a:masterClrMapping/>
-  </p:clrMapOvr>
-</p:sld>
-</file>
-
-<file path=ppt/slides/slide22.xml><?xml version="1.0" encoding="utf-8"?>
 <p:sld xmlns:a="http://schemas.openxmlformats.org/drawingml/2006/main" xmlns:r="http://schemas.openxmlformats.org/officeDocument/2006/relationships" xmlns:p="http://schemas.openxmlformats.org/presentationml/2006/main">
   <p:cSld>
     <p:spTree>
@@ -17630,7 +16980,7 @@
                 </a:spcAft>
                 <a:defRPr/>
               </a:pPr>
-              <a:t>22</a:t>
+              <a:t>20</a:t>
             </a:fld>
             <a:endParaRPr lang="es-ES" noProof="0">
               <a:solidFill>
@@ -17655,7 +17005,7 @@
 </p:sld>
 </file>
 
-<file path=ppt/slides/slide23.xml><?xml version="1.0" encoding="utf-8"?>
+<file path=ppt/slides/slide21.xml><?xml version="1.0" encoding="utf-8"?>
 <p:sld xmlns:a="http://schemas.openxmlformats.org/drawingml/2006/main" xmlns:r="http://schemas.openxmlformats.org/officeDocument/2006/relationships" xmlns:p="http://schemas.openxmlformats.org/presentationml/2006/main">
   <p:cSld>
     <p:spTree>
@@ -17848,7 +17198,7 @@
                 </a:spcAft>
                 <a:defRPr/>
               </a:pPr>
-              <a:t>23</a:t>
+              <a:t>21</a:t>
             </a:fld>
             <a:endParaRPr lang="es-ES" noProof="0">
               <a:solidFill>
@@ -18152,7 +17502,7 @@
 </p:sld>
 </file>
 
-<file path=ppt/slides/slide24.xml><?xml version="1.0" encoding="utf-8"?>
+<file path=ppt/slides/slide22.xml><?xml version="1.0" encoding="utf-8"?>
 <p:sld xmlns:a="http://schemas.openxmlformats.org/drawingml/2006/main" xmlns:r="http://schemas.openxmlformats.org/officeDocument/2006/relationships" xmlns:p="http://schemas.openxmlformats.org/presentationml/2006/main">
   <p:cSld>
     <p:spTree>
@@ -18204,7 +17554,7 @@
               <a:pPr rtl="0">
                 <a:defRPr/>
               </a:pPr>
-              <a:t>24</a:t>
+              <a:t>22</a:t>
             </a:fld>
             <a:endParaRPr lang="es-ES" noProof="0">
               <a:solidFill>
@@ -18464,26 +17814,54 @@
           </a:lstStyle>
           <a:p>
             <a:r>
-              <a:rPr lang="es-MX" sz="1300"/>
-              <a:t>Kale es una herramienta sencilla de utilizar que nos permite familiarizarnos con el flujo de trabajo de kubeflow con kubernetes, además nos permite llevar a cabo experimentos de manera local sin tener que preocuparnos por el momento de levantar clústeres o interactuar con la línea de comandos, nos deja enforcarnos totalmente en nuestro código.</a:t>
-            </a:r>
-          </a:p>
-          <a:p>
-            <a:r>
-              <a:rPr lang="es-MX" sz="1300"/>
-              <a:t>La compilación a C con ayuda de Cython es una buena opción para optimizar y agilizar código en Python que no utiliza objetos vectorizados o que no pueden ser vectorizados, cuando se utiliza Python "pelón" y cuando las variables no cambian de tipo durante la ejecución del código.</a:t>
-            </a:r>
-          </a:p>
-          <a:p>
-            <a:r>
-              <a:rPr lang="es-MX" sz="1300"/>
+              <a:rPr lang="es-MX" sz="1300" dirty="0"/>
+              <a:t>Kale es una herramienta sencilla de utilizar que nos permite familiarizarnos con el flujo de trabajo de </a:t>
+            </a:r>
+            <a:r>
+              <a:rPr lang="es-MX" sz="1300" dirty="0" err="1"/>
+              <a:t>kubeflow</a:t>
+            </a:r>
+            <a:r>
+              <a:rPr lang="es-MX" sz="1300" dirty="0"/>
+              <a:t> con </a:t>
+            </a:r>
+            <a:r>
+              <a:rPr lang="es-MX" sz="1300" dirty="0" err="1"/>
+              <a:t>kubernetes</a:t>
+            </a:r>
+            <a:r>
+              <a:rPr lang="es-MX" sz="1300" dirty="0"/>
+              <a:t>, además nos permite llevar a cabo experimentos de manera local sin tener que preocuparnos por el momento de levantar clústeres o interactuar con la línea de comandos, nos deja enforcarnos totalmente en nuestro código.</a:t>
+            </a:r>
+          </a:p>
+          <a:p>
+            <a:r>
+              <a:rPr lang="es-MX" sz="1300" dirty="0"/>
+              <a:t>La compilación a C con ayuda de </a:t>
+            </a:r>
+            <a:r>
+              <a:rPr lang="es-MX" sz="1300" dirty="0" err="1"/>
+              <a:t>Cython</a:t>
+            </a:r>
+            <a:r>
+              <a:rPr lang="es-MX" sz="1300" dirty="0"/>
+              <a:t> es una buena opción para optimizar y agilizar código en Python que no utiliza objetos vectorizados o que no pueden ser vectorizados, cuando se utiliza Python "pelón" y cuando las variables no cambian de tipo durante la ejecución del código.</a:t>
+            </a:r>
+          </a:p>
+          <a:p>
+            <a:r>
+              <a:rPr lang="es-MX" sz="1300" dirty="0"/>
               <a:t>No todas las líneas de código tienen su equivalente en C, pues en C no existe el concepto de clase ni de objeto.</a:t>
             </a:r>
           </a:p>
           <a:p>
             <a:r>
-              <a:rPr lang="es-MX" sz="1300"/>
-              <a:t>Cython nos permite tener la comodidad de programar en Python y la velocidad de un módulo compilado anticipadamente. El costo es que se requiere de conocimiento del lenguaje de C.</a:t>
+              <a:rPr lang="es-MX" sz="1300" dirty="0" err="1"/>
+              <a:t>Cython</a:t>
+            </a:r>
+            <a:r>
+              <a:rPr lang="es-MX" sz="1300" dirty="0"/>
+              <a:t> nos permite tener la comodidad de programar en Python y la velocidad de un módulo compilado anticipadamente. El costo es que se requiere de conocimiento del lenguaje de C.</a:t>
             </a:r>
           </a:p>
           <a:p>
@@ -18684,7 +18062,7 @@
 </p:sld>
 </file>
 
-<file path=ppt/slides/slide25.xml><?xml version="1.0" encoding="utf-8"?>
+<file path=ppt/slides/slide23.xml><?xml version="1.0" encoding="utf-8"?>
 <p:sld xmlns:a="http://schemas.openxmlformats.org/drawingml/2006/main" xmlns:r="http://schemas.openxmlformats.org/officeDocument/2006/relationships" xmlns:p="http://schemas.openxmlformats.org/presentationml/2006/main">
   <p:cSld>
     <p:spTree>
@@ -18755,7 +18133,7 @@
             <a:fld id="{D76B855D-E9CC-4FF8-AD85-6CDC7B89A0DE}" type="slidenum">
               <a:rPr lang="es-ES" smtClean="0"/>
               <a:pPr lvl="0" rtl="0"/>
-              <a:t>25</a:t>
+              <a:t>23</a:t>
             </a:fld>
             <a:endParaRPr lang="es-ES"/>
           </a:p>
@@ -21601,7 +20979,7 @@
           <p:cNvPr id="2" name="Título 1">
             <a:extLst>
               <a:ext uri="{FF2B5EF4-FFF2-40B4-BE49-F238E27FC236}">
-                <a16:creationId xmlns:a16="http://schemas.microsoft.com/office/drawing/2014/main" id="{3FED4CB1-C256-4377-99FC-26A6E933CED2}"/>
+                <a16:creationId xmlns:a16="http://schemas.microsoft.com/office/drawing/2014/main" id="{B32EF64A-5A7F-4E25-B723-6DA7FDC0B4A4}"/>
               </a:ext>
             </a:extLst>
           </p:cNvPr>
@@ -21612,29 +20990,25 @@
             <p:ph type="title"/>
           </p:nvPr>
         </p:nvSpPr>
-        <p:spPr>
-          <a:xfrm>
-            <a:off x="839788" y="457200"/>
-            <a:ext cx="3932237" cy="785952"/>
-          </a:xfrm>
-        </p:spPr>
+        <p:spPr/>
         <p:txBody>
           <a:bodyPr/>
           <a:lstStyle/>
           <a:p>
             <a:r>
-              <a:rPr lang="en-US" dirty="0"/>
-              <a:t>Kubeflow</a:t>
-            </a:r>
+              <a:rPr lang="en-US" dirty="0" err="1"/>
+              <a:t>Reimplementación</a:t>
+            </a:r>
+            <a:endParaRPr lang="en-US" dirty="0"/>
           </a:p>
         </p:txBody>
       </p:sp>
       <p:sp>
         <p:nvSpPr>
-          <p:cNvPr id="4" name="Marcador de texto 3">
+          <p:cNvPr id="3" name="Marcador de contenido 2">
             <a:extLst>
               <a:ext uri="{FF2B5EF4-FFF2-40B4-BE49-F238E27FC236}">
-                <a16:creationId xmlns:a16="http://schemas.microsoft.com/office/drawing/2014/main" id="{F64C6A99-A660-4DB2-98AC-DDEAD462F771}"/>
+                <a16:creationId xmlns:a16="http://schemas.microsoft.com/office/drawing/2014/main" id="{A953B6D4-9143-4D74-838D-AD9F6E723317}"/>
               </a:ext>
             </a:extLst>
           </p:cNvPr>
@@ -21642,120 +21016,86 @@
             <a:spLocks noGrp="1"/>
           </p:cNvSpPr>
           <p:nvPr>
-            <p:ph type="body" sz="half" idx="2"/>
+            <p:ph idx="1"/>
           </p:nvPr>
         </p:nvSpPr>
-        <p:spPr>
-          <a:xfrm>
-            <a:off x="839788" y="1506818"/>
-            <a:ext cx="3932237" cy="4362170"/>
-          </a:xfrm>
-        </p:spPr>
+        <p:spPr/>
         <p:txBody>
-          <a:bodyPr/>
+          <a:bodyPr>
+            <a:normAutofit fontScale="62500" lnSpcReduction="20000"/>
+          </a:bodyPr>
           <a:lstStyle/>
           <a:p>
             <a:r>
-              <a:rPr lang="es-MX" b="0" i="0" dirty="0" err="1">
-                <a:solidFill>
-                  <a:srgbClr val="000000"/>
-                </a:solidFill>
-                <a:effectLst/>
-                <a:latin typeface="Helvetica Neue"/>
-              </a:rPr>
-              <a:t>Kubeflow</a:t>
-            </a:r>
-            <a:r>
-              <a:rPr lang="es-MX" b="0" i="0" dirty="0">
-                <a:solidFill>
-                  <a:srgbClr val="000000"/>
-                </a:solidFill>
-                <a:effectLst/>
-                <a:latin typeface="Helvetica Neue"/>
-              </a:rPr>
-              <a:t> es un proyecto construido encima de </a:t>
-            </a:r>
-            <a:r>
-              <a:rPr lang="es-MX" b="0" i="0" dirty="0" err="1">
-                <a:solidFill>
-                  <a:srgbClr val="000000"/>
-                </a:solidFill>
-                <a:effectLst/>
-                <a:latin typeface="Helvetica Neue"/>
-              </a:rPr>
-              <a:t>kubernetes</a:t>
-            </a:r>
-            <a:r>
-              <a:rPr lang="es-MX" b="0" i="0" dirty="0">
-                <a:solidFill>
-                  <a:srgbClr val="000000"/>
-                </a:solidFill>
-                <a:effectLst/>
-                <a:latin typeface="Helvetica Neue"/>
-              </a:rPr>
-              <a:t> compuesto por varias herramientas y </a:t>
-            </a:r>
-            <a:r>
-              <a:rPr lang="es-MX" b="0" i="1" dirty="0" err="1">
-                <a:solidFill>
-                  <a:srgbClr val="000000"/>
-                </a:solidFill>
-                <a:effectLst/>
-                <a:latin typeface="Helvetica Neue"/>
-              </a:rPr>
-              <a:t>frameworks</a:t>
-            </a:r>
-            <a:r>
-              <a:rPr lang="es-MX" b="0" i="0" dirty="0">
-                <a:solidFill>
-                  <a:srgbClr val="000000"/>
-                </a:solidFill>
-                <a:effectLst/>
-                <a:latin typeface="Helvetica Neue"/>
-              </a:rPr>
-              <a:t> para realizar el desarrollo, despliegue y administración de modelos de aprendizaje de máquina de forma sencilla y escalable. El objetivo de </a:t>
-            </a:r>
-            <a:r>
-              <a:rPr lang="es-MX" b="0" i="0" dirty="0" err="1">
-                <a:solidFill>
-                  <a:srgbClr val="000000"/>
-                </a:solidFill>
-                <a:effectLst/>
-                <a:latin typeface="Helvetica Neue"/>
-              </a:rPr>
-              <a:t>kubeflow</a:t>
-            </a:r>
-            <a:r>
-              <a:rPr lang="es-MX" b="0" i="0" dirty="0">
-                <a:solidFill>
-                  <a:srgbClr val="000000"/>
-                </a:solidFill>
-                <a:effectLst/>
-                <a:latin typeface="Helvetica Neue"/>
-              </a:rPr>
-              <a:t> es servir como un administrador de inicio a fin para infraestructura de aprendizaje de máquina de manera simple, portable y escalable.</a:t>
-            </a:r>
-          </a:p>
-          <a:p>
-            <a:r>
-              <a:rPr lang="es-MX" b="0" i="0" dirty="0" err="1">
-                <a:solidFill>
-                  <a:srgbClr val="000000"/>
-                </a:solidFill>
-                <a:effectLst/>
-                <a:latin typeface="Helvetica Neue"/>
-              </a:rPr>
-              <a:t>Kubeflow</a:t>
-            </a:r>
-            <a:r>
-              <a:rPr lang="es-MX" b="0" i="0" dirty="0">
-                <a:solidFill>
-                  <a:srgbClr val="000000"/>
-                </a:solidFill>
-                <a:effectLst/>
-                <a:latin typeface="Helvetica Neue"/>
-              </a:rPr>
-              <a:t> facilita el escalamiento de proyectos tomando en cuenta el despliegue del proyecto desde sus fases iniciales de desarrollo hasta el propio despliegue a gran escala.</a:t>
+              <a:rPr lang="es-MX" dirty="0"/>
+              <a:t>La implementación del paquete se realizó a través de Python haciendo uso de clases.</a:t>
+            </a:r>
+          </a:p>
+          <a:p>
+            <a:endParaRPr lang="es-MX" dirty="0"/>
+          </a:p>
+          <a:p>
+            <a:r>
+              <a:rPr lang="es-MX" dirty="0"/>
+              <a:t>Una vez desarrollado el paquete de manera básica utilizamos las herramientas de kale y </a:t>
+            </a:r>
+            <a:r>
+              <a:rPr lang="es-MX" dirty="0" err="1"/>
+              <a:t>minikube</a:t>
+            </a:r>
+            <a:r>
+              <a:rPr lang="es-MX" dirty="0"/>
+              <a:t> para correr varios experimentos y así detectar valores con los cuales falla nuestro paquete o posibles mejoras a realizar.</a:t>
+            </a:r>
+          </a:p>
+          <a:p>
+            <a:endParaRPr lang="es-MX" dirty="0"/>
+          </a:p>
+          <a:p>
+            <a:r>
+              <a:rPr lang="es-MX" dirty="0"/>
+              <a:t>Ante de iniciar con la reimplementación realizamos un perfilamiento de </a:t>
+            </a:r>
+            <a:r>
+              <a:rPr lang="es-MX" dirty="0" err="1"/>
+              <a:t>ffmaxflow</a:t>
+            </a:r>
+            <a:r>
+              <a:rPr lang="es-MX" dirty="0"/>
+              <a:t> para así tener una idea del desempeño de nuestro paquete. Durante el perfilamiento descubrimos que el método de </a:t>
+            </a:r>
+            <a:r>
+              <a:rPr lang="es-MX" dirty="0" err="1"/>
+              <a:t>get_path</a:t>
+            </a:r>
+            <a:r>
+              <a:rPr lang="es-MX" dirty="0"/>
+              <a:t> toma mucho tiempo en relación con los tiempos de las demás líneas, además de la creación de </a:t>
+            </a:r>
+            <a:r>
+              <a:rPr lang="es-MX" dirty="0" err="1"/>
+              <a:t>vertices</a:t>
+            </a:r>
+            <a:r>
+              <a:rPr lang="es-MX" dirty="0"/>
+              <a:t> y el cálculo mismo del flujo máximo.</a:t>
+            </a:r>
+          </a:p>
+          <a:p>
+            <a:endParaRPr lang="es-MX" dirty="0"/>
+          </a:p>
+          <a:p>
+            <a:r>
+              <a:rPr lang="es-MX" dirty="0"/>
+              <a:t>En cuanto al perfilamiento de memoria, no encontramos que nuestro paquete estuviera usando memoria excesiva por lo que decidimos optimizar únicamente el tiempo de ejecución y la optimización se realizara con </a:t>
+            </a:r>
+            <a:r>
+              <a:rPr lang="es-MX" dirty="0" err="1"/>
+              <a:t>Cython</a:t>
+            </a:r>
+            <a:r>
+              <a:rPr lang="es-MX" dirty="0"/>
+              <a:t>.</a:t>
             </a:r>
             <a:endParaRPr lang="en-US" dirty="0"/>
           </a:p>
@@ -21763,10 +21103,10 @@
       </p:sp>
       <p:sp>
         <p:nvSpPr>
-          <p:cNvPr id="7" name="Marcador de número de diapositiva 6">
+          <p:cNvPr id="6" name="Marcador de número de diapositiva 5">
             <a:extLst>
               <a:ext uri="{FF2B5EF4-FFF2-40B4-BE49-F238E27FC236}">
-                <a16:creationId xmlns:a16="http://schemas.microsoft.com/office/drawing/2014/main" id="{D4FB3A2A-9E0E-43B9-9BA0-3C3020E64E3E}"/>
+                <a16:creationId xmlns:a16="http://schemas.microsoft.com/office/drawing/2014/main" id="{A9A5B82C-EDD8-4256-BC74-16150B694C81}"/>
               </a:ext>
             </a:extLst>
           </p:cNvPr>
@@ -21808,59 +21148,10 @@
           </a:p>
         </p:txBody>
       </p:sp>
-      <p:pic>
-        <p:nvPicPr>
-          <p:cNvPr id="7170" name="Picture 2" descr="kubeflow">
-            <a:extLst>
-              <a:ext uri="{FF2B5EF4-FFF2-40B4-BE49-F238E27FC236}">
-                <a16:creationId xmlns:a16="http://schemas.microsoft.com/office/drawing/2014/main" id="{B2773EB4-4A12-4173-8FA8-386D71E66E77}"/>
-              </a:ext>
-            </a:extLst>
-          </p:cNvPr>
-          <p:cNvPicPr>
-            <a:picLocks noGrp="1" noChangeAspect="1" noChangeArrowheads="1"/>
-          </p:cNvPicPr>
-          <p:nvPr>
-            <p:ph idx="1"/>
-          </p:nvPr>
-        </p:nvPicPr>
-        <p:blipFill>
-          <a:blip r:embed="rId2">
-            <a:extLst>
-              <a:ext uri="{28A0092B-C50C-407E-A947-70E740481C1C}">
-                <a14:useLocalDpi xmlns:a14="http://schemas.microsoft.com/office/drawing/2010/main" val="0"/>
-              </a:ext>
-            </a:extLst>
-          </a:blip>
-          <a:srcRect/>
-          <a:stretch>
-            <a:fillRect/>
-          </a:stretch>
-        </p:blipFill>
-        <p:spPr bwMode="auto">
-          <a:xfrm>
-            <a:off x="5183188" y="1243152"/>
-            <a:ext cx="6172200" cy="4362170"/>
-          </a:xfrm>
-          <a:prstGeom prst="rect">
-            <a:avLst/>
-          </a:prstGeom>
-          <a:noFill/>
-          <a:extLst>
-            <a:ext uri="{909E8E84-426E-40DD-AFC4-6F175D3DCCD1}">
-              <a14:hiddenFill xmlns:a14="http://schemas.microsoft.com/office/drawing/2010/main">
-                <a:solidFill>
-                  <a:srgbClr val="FFFFFF"/>
-                </a:solidFill>
-              </a14:hiddenFill>
-            </a:ext>
-          </a:extLst>
-        </p:spPr>
-      </p:pic>
     </p:spTree>
     <p:extLst>
       <p:ext uri="{BB962C8B-B14F-4D97-AF65-F5344CB8AC3E}">
-        <p14:creationId xmlns:p14="http://schemas.microsoft.com/office/powerpoint/2010/main" val="2718452947"/>
+        <p14:creationId xmlns:p14="http://schemas.microsoft.com/office/powerpoint/2010/main" val="579773198"/>
       </p:ext>
     </p:extLst>
   </p:cSld>
@@ -22903,9 +22194,16 @@
 <file path=customXml/itemProps1.xml><?xml version="1.0" encoding="utf-8"?>
 <ds:datastoreItem xmlns:ds="http://schemas.openxmlformats.org/officeDocument/2006/customXml" ds:itemID="{FBDEF148-1770-458F-8F5B-C3D0A278AA97}">
   <ds:schemaRefs>
+    <ds:schemaRef ds:uri="http://schemas.microsoft.com/office/infopath/2007/PartnerControls"/>
+    <ds:schemaRef ds:uri="http://purl.org/dc/elements/1.1/"/>
+    <ds:schemaRef ds:uri="16c05727-aa75-4e4a-9b5f-8a80a1165891"/>
+    <ds:schemaRef ds:uri="http://schemas.microsoft.com/office/2006/documentManagement/types"/>
+    <ds:schemaRef ds:uri="http://www.w3.org/XML/1998/namespace"/>
+    <ds:schemaRef ds:uri="http://purl.org/dc/dcmitype/"/>
+    <ds:schemaRef ds:uri="http://purl.org/dc/terms/"/>
+    <ds:schemaRef ds:uri="http://schemas.openxmlformats.org/package/2006/metadata/core-properties"/>
+    <ds:schemaRef ds:uri="71af3243-3dd4-4a8d-8c0d-dd76da1f02a5"/>
     <ds:schemaRef ds:uri="http://schemas.microsoft.com/office/2006/metadata/properties"/>
-    <ds:schemaRef ds:uri="http://schemas.microsoft.com/office/infopath/2007/PartnerControls"/>
-    <ds:schemaRef ds:uri="71af3243-3dd4-4a8d-8c0d-dd76da1f02a5"/>
   </ds:schemaRefs>
 </ds:datastoreItem>
 </file>

</xml_diff>

<commit_message>
Se corrigió agenda en la presentación
</commit_message>
<xml_diff>
--- a/documentos/Presentacion_ffmf.pptx
+++ b/documentos/Presentacion_ffmf.pptx
@@ -16106,20 +16106,6 @@
             <a:r>
               <a:rPr lang="es-ES" dirty="0" err="1"/>
               <a:t>Fulkerson</a:t>
-            </a:r>
-            <a:endParaRPr lang="es-ES" dirty="0"/>
-          </a:p>
-          <a:p>
-            <a:pPr marL="0" indent="0" rtl="0">
-              <a:buNone/>
-            </a:pPr>
-            <a:r>
-              <a:rPr lang="es-ES" dirty="0"/>
-              <a:t>Desarrollo de </a:t>
-            </a:r>
-            <a:r>
-              <a:rPr lang="es-ES" dirty="0" err="1"/>
-              <a:t>ffmaxflow</a:t>
             </a:r>
             <a:endParaRPr lang="es-ES" dirty="0"/>
           </a:p>
@@ -22194,16 +22180,16 @@
 <file path=customXml/itemProps1.xml><?xml version="1.0" encoding="utf-8"?>
 <ds:datastoreItem xmlns:ds="http://schemas.openxmlformats.org/officeDocument/2006/customXml" ds:itemID="{FBDEF148-1770-458F-8F5B-C3D0A278AA97}">
   <ds:schemaRefs>
+    <ds:schemaRef ds:uri="http://purl.org/dc/terms/"/>
+    <ds:schemaRef ds:uri="http://www.w3.org/XML/1998/namespace"/>
+    <ds:schemaRef ds:uri="16c05727-aa75-4e4a-9b5f-8a80a1165891"/>
+    <ds:schemaRef ds:uri="http://purl.org/dc/elements/1.1/"/>
+    <ds:schemaRef ds:uri="http://schemas.microsoft.com/office/2006/documentManagement/types"/>
+    <ds:schemaRef ds:uri="http://schemas.microsoft.com/office/2006/metadata/properties"/>
+    <ds:schemaRef ds:uri="http://purl.org/dc/dcmitype/"/>
+    <ds:schemaRef ds:uri="71af3243-3dd4-4a8d-8c0d-dd76da1f02a5"/>
     <ds:schemaRef ds:uri="http://schemas.microsoft.com/office/infopath/2007/PartnerControls"/>
-    <ds:schemaRef ds:uri="http://purl.org/dc/elements/1.1/"/>
-    <ds:schemaRef ds:uri="16c05727-aa75-4e4a-9b5f-8a80a1165891"/>
-    <ds:schemaRef ds:uri="http://schemas.microsoft.com/office/2006/documentManagement/types"/>
-    <ds:schemaRef ds:uri="http://www.w3.org/XML/1998/namespace"/>
-    <ds:schemaRef ds:uri="http://purl.org/dc/dcmitype/"/>
-    <ds:schemaRef ds:uri="http://purl.org/dc/terms/"/>
     <ds:schemaRef ds:uri="http://schemas.openxmlformats.org/package/2006/metadata/core-properties"/>
-    <ds:schemaRef ds:uri="71af3243-3dd4-4a8d-8c0d-dd76da1f02a5"/>
-    <ds:schemaRef ds:uri="http://schemas.microsoft.com/office/2006/metadata/properties"/>
   </ds:schemaRefs>
 </ds:datastoreItem>
 </file>

</xml_diff>

<commit_message>
Actualización de presentación, corrección de secciones #8
</commit_message>
<xml_diff>
--- a/documentos/Presentacion_ffmf.pptx
+++ b/documentos/Presentacion_ffmf.pptx
@@ -13814,7 +13814,7 @@
         <p:spPr/>
         <p:txBody>
           <a:bodyPr rtlCol="0">
-            <a:normAutofit fontScale="90000"/>
+            <a:normAutofit/>
           </a:bodyPr>
           <a:lstStyle/>
           <a:p>
@@ -13827,7 +13827,7 @@
                 <a:effectLst/>
                 <a:latin typeface="Helvetica Neue"/>
               </a:rPr>
-              <a:t>Aplicaciones en la vida real con datos reales</a:t>
+              <a:t>Aplicaciones en la vida real</a:t>
             </a:r>
           </a:p>
         </p:txBody>
@@ -15001,14 +15001,14 @@
           <p:nvPr>
             <p:extLst>
               <p:ext uri="{D42A27DB-BD31-4B8C-83A1-F6EECF244321}">
-                <p14:modId xmlns:p14="http://schemas.microsoft.com/office/powerpoint/2010/main" val="4190164854"/>
+                <p14:modId xmlns:p14="http://schemas.microsoft.com/office/powerpoint/2010/main" val="126380465"/>
               </p:ext>
             </p:extLst>
           </p:nvPr>
         </p:nvGraphicFramePr>
         <p:xfrm>
           <a:off x="3386667" y="3773585"/>
-          <a:ext cx="5418666" cy="1483360"/>
+          <a:ext cx="4061248" cy="1483360"/>
         </p:xfrm>
         <a:graphic>
           <a:graphicData uri="http://schemas.openxmlformats.org/drawingml/2006/table">
@@ -15017,7 +15017,7 @@
                 <a:tableStyleId>{21E4AEA4-8DFA-4A89-87EB-49C32662AFE0}</a:tableStyleId>
               </a:tblPr>
               <a:tblGrid>
-                <a:gridCol w="2709333">
+                <a:gridCol w="1351915">
                   <a:extLst>
                     <a:ext uri="{9D8B030D-6E8A-4147-A177-3AD203B41FA5}">
                       <a16:colId xmlns:a16="http://schemas.microsoft.com/office/drawing/2014/main" val="1629945468"/>
@@ -15142,7 +15142,7 @@
                           <a:ea typeface="+mn-ea"/>
                           <a:cs typeface="+mn-cs"/>
                         </a:rPr>
-                        <a:t>ffmaxflowc</a:t>
+                        <a:t>ffmaxc</a:t>
                       </a:r>
                       <a:endParaRPr lang="en-US" dirty="0"/>
                     </a:p>
@@ -16128,8 +16128,12 @@
               <a:buNone/>
             </a:pPr>
             <a:r>
+              <a:rPr lang="es-ES" dirty="0" err="1"/>
+              <a:t>Aplicaciónes</a:t>
+            </a:r>
+            <a:r>
               <a:rPr lang="es-ES" dirty="0"/>
-              <a:t>Aplicación a datos reales</a:t>
+              <a:t> en la vida real</a:t>
             </a:r>
           </a:p>
         </p:txBody>
@@ -17211,7 +17215,7 @@
           <p:nvPr>
             <p:extLst>
               <p:ext uri="{D42A27DB-BD31-4B8C-83A1-F6EECF244321}">
-                <p14:modId xmlns:p14="http://schemas.microsoft.com/office/powerpoint/2010/main" val="1435988066"/>
+                <p14:modId xmlns:p14="http://schemas.microsoft.com/office/powerpoint/2010/main" val="360290957"/>
               </p:ext>
             </p:extLst>
           </p:nvPr>
@@ -17377,7 +17381,7 @@
                           <a:ea typeface="+mn-ea"/>
                           <a:cs typeface="+mn-cs"/>
                         </a:rPr>
-                        <a:t>ffmaxflowc</a:t>
+                        <a:t>ffmaxc</a:t>
                       </a:r>
                       <a:endParaRPr lang="en-US" dirty="0"/>
                     </a:p>

</xml_diff>

<commit_message>
Se agregaron gráficos de kale de ejemplos
</commit_message>
<xml_diff>
--- a/documentos/Presentacion_ffmf.pptx
+++ b/documentos/Presentacion_ffmf.pptx
@@ -264,7 +264,7 @@
           <a:p>
             <a:fld id="{86412843-E4DF-409D-B381-08D9B0CEB225}" type="datetime1">
               <a:rPr lang="es-ES" smtClean="0"/>
-              <a:t>19/05/2021</a:t>
+              <a:t>20/05/2021</a:t>
             </a:fld>
             <a:endParaRPr lang="es-ES" dirty="0"/>
           </a:p>
@@ -444,7 +444,7 @@
             <a:fld id="{E49A0D20-FBC3-42BB-85EB-DAC7A2C5FD7C}" type="datetime1">
               <a:rPr lang="es-ES" smtClean="0"/>
               <a:pPr/>
-              <a:t>19/05/2021</a:t>
+              <a:t>20/05/2021</a:t>
             </a:fld>
             <a:endParaRPr lang="es-ES" dirty="0"/>
           </a:p>
@@ -13660,15 +13660,6 @@
           <a:solidFill>
             <a:srgbClr val="FFFFFF"/>
           </a:solidFill>
-          <a:extLst>
-            <a:ext uri="{909E8E84-426E-40DD-AFC4-6F175D3DCCD1}">
-              <a14:hiddenFill xmlns:a14="http://schemas.microsoft.com/office/drawing/2010/main">
-                <a:solidFill>
-                  <a:srgbClr val="FFFFFF"/>
-                </a:solidFill>
-              </a14:hiddenFill>
-            </a:ext>
-          </a:extLst>
         </p:spPr>
       </p:pic>
       <p:pic>
@@ -14377,8 +14368,8 @@
           </a:p>
         </p:txBody>
       </p:sp>
-      <mc:AlternateContent xmlns:mc="http://schemas.openxmlformats.org/markup-compatibility/2006">
-        <mc:Choice xmlns:a14="http://schemas.microsoft.com/office/drawing/2010/main" Requires="a14">
+      <mc:AlternateContent xmlns:mc="http://schemas.openxmlformats.org/markup-compatibility/2006" xmlns:a14="http://schemas.microsoft.com/office/drawing/2010/main">
+        <mc:Choice Requires="a14">
           <p:sp>
             <p:nvSpPr>
               <p:cNvPr id="3" name="Marcador de contenido 2">
@@ -14486,7 +14477,7 @@
             </p:txBody>
           </p:sp>
         </mc:Choice>
-        <mc:Fallback>
+        <mc:Fallback xmlns="">
           <p:sp>
             <p:nvSpPr>
               <p:cNvPr id="3" name="Marcador de contenido 2">
@@ -14852,7 +14843,7 @@
         </p:nvSpPr>
         <p:spPr>
           <a:xfrm>
-            <a:off x="838200" y="1825625"/>
+            <a:off x="838200" y="1390619"/>
             <a:ext cx="10515600" cy="4351338"/>
           </a:xfrm>
         </p:spPr>
@@ -14988,10 +14979,10 @@
       </p:sp>
       <p:graphicFrame>
         <p:nvGraphicFramePr>
-          <p:cNvPr id="8" name="Tabla 9">
+          <p:cNvPr id="6" name="Tabla 5">
             <a:extLst>
               <a:ext uri="{FF2B5EF4-FFF2-40B4-BE49-F238E27FC236}">
-                <a16:creationId xmlns:a16="http://schemas.microsoft.com/office/drawing/2014/main" id="{E03866CE-2D32-49F7-8DAE-C6B53D878132}"/>
+                <a16:creationId xmlns:a16="http://schemas.microsoft.com/office/drawing/2014/main" id="{296B660A-D8D8-4749-B0EA-B9F0FEB196BC}"/>
               </a:ext>
             </a:extLst>
           </p:cNvPr>
@@ -15001,14 +14992,14 @@
           <p:nvPr>
             <p:extLst>
               <p:ext uri="{D42A27DB-BD31-4B8C-83A1-F6EECF244321}">
-                <p14:modId xmlns:p14="http://schemas.microsoft.com/office/powerpoint/2010/main" val="126380465"/>
+                <p14:modId xmlns:p14="http://schemas.microsoft.com/office/powerpoint/2010/main" val="1543214251"/>
               </p:ext>
             </p:extLst>
           </p:nvPr>
         </p:nvGraphicFramePr>
         <p:xfrm>
-          <a:off x="3386667" y="3773585"/>
-          <a:ext cx="4061248" cy="1483360"/>
+          <a:off x="987473" y="3270391"/>
+          <a:ext cx="5108527" cy="1478280"/>
         </p:xfrm>
         <a:graphic>
           <a:graphicData uri="http://schemas.openxmlformats.org/drawingml/2006/table">
@@ -15017,14 +15008,21 @@
                 <a:tableStyleId>{21E4AEA4-8DFA-4A89-87EB-49C32662AFE0}</a:tableStyleId>
               </a:tblPr>
               <a:tblGrid>
-                <a:gridCol w="1351915">
+                <a:gridCol w="1217227">
                   <a:extLst>
                     <a:ext uri="{9D8B030D-6E8A-4147-A177-3AD203B41FA5}">
                       <a16:colId xmlns:a16="http://schemas.microsoft.com/office/drawing/2014/main" val="1629945468"/>
                     </a:ext>
                   </a:extLst>
                 </a:gridCol>
-                <a:gridCol w="2709333">
+                <a:gridCol w="1375053">
+                  <a:extLst>
+                    <a:ext uri="{9D8B030D-6E8A-4147-A177-3AD203B41FA5}">
+                      <a16:colId xmlns:a16="http://schemas.microsoft.com/office/drawing/2014/main" val="1152541639"/>
+                    </a:ext>
+                  </a:extLst>
+                </a:gridCol>
+                <a:gridCol w="2516247">
                   <a:extLst>
                     <a:ext uri="{9D8B030D-6E8A-4147-A177-3AD203B41FA5}">
                       <a16:colId xmlns:a16="http://schemas.microsoft.com/office/drawing/2014/main" val="1414973209"/>
@@ -15032,7 +15030,7 @@
                   </a:extLst>
                 </a:gridCol>
               </a:tblGrid>
-              <a:tr h="370840">
+              <a:tr h="0">
                 <a:tc>
                   <a:txBody>
                     <a:bodyPr/>
@@ -15041,6 +15039,20 @@
                       <a:r>
                         <a:rPr lang="en-US" dirty="0" err="1"/>
                         <a:t>Método</a:t>
+                      </a:r>
+                      <a:endParaRPr lang="en-US" dirty="0"/>
+                    </a:p>
+                  </a:txBody>
+                  <a:tcPr/>
+                </a:tc>
+                <a:tc>
+                  <a:txBody>
+                    <a:bodyPr/>
+                    <a:lstStyle/>
+                    <a:p>
+                      <a:r>
+                        <a:rPr lang="en-US" dirty="0" err="1"/>
+                        <a:t>Resultado</a:t>
                       </a:r>
                       <a:endParaRPr lang="en-US" dirty="0"/>
                     </a:p>
@@ -15104,6 +15116,19 @@
                     <a:lstStyle/>
                     <a:p>
                       <a:r>
+                        <a:rPr lang="en-US" dirty="0"/>
+                        <a:t>11</a:t>
+                      </a:r>
+                    </a:p>
+                  </a:txBody>
+                  <a:tcPr/>
+                </a:tc>
+                <a:tc>
+                  <a:txBody>
+                    <a:bodyPr/>
+                    <a:lstStyle/>
+                    <a:p>
+                      <a:r>
                         <a:rPr lang="es-MX" sz="1800" b="0" i="0" kern="1200" dirty="0">
                           <a:solidFill>
                             <a:schemeClr val="dk1"/>
@@ -15143,6 +15168,33 @@
                           <a:cs typeface="+mn-cs"/>
                         </a:rPr>
                         <a:t>ffmaxc</a:t>
+                      </a:r>
+                      <a:endParaRPr lang="en-US" dirty="0"/>
+                    </a:p>
+                  </a:txBody>
+                  <a:tcPr/>
+                </a:tc>
+                <a:tc>
+                  <a:txBody>
+                    <a:bodyPr/>
+                    <a:lstStyle/>
+                    <a:p>
+                      <a:r>
+                        <a:rPr kumimoji="0" lang="en-US" sz="1800" b="0" i="0" u="none" strike="noStrike" kern="1200" cap="none" spc="0" normalizeH="0" baseline="0" noProof="0">
+                          <a:ln>
+                            <a:noFill/>
+                          </a:ln>
+                          <a:solidFill>
+                            <a:prstClr val="black"/>
+                          </a:solidFill>
+                          <a:effectLst/>
+                          <a:uLnTx/>
+                          <a:uFillTx/>
+                          <a:latin typeface="Avenir Next LT Pro"/>
+                          <a:ea typeface="+mn-ea"/>
+                          <a:cs typeface="+mn-cs"/>
+                        </a:rPr>
+                        <a:t>11</a:t>
                       </a:r>
                       <a:endParaRPr lang="en-US" dirty="0"/>
                     </a:p>
@@ -15198,6 +15250,33 @@
                     <a:lstStyle/>
                     <a:p>
                       <a:r>
+                        <a:rPr kumimoji="0" lang="en-US" sz="1800" b="0" i="0" u="none" strike="noStrike" kern="1200" cap="none" spc="0" normalizeH="0" baseline="0" noProof="0" dirty="0">
+                          <a:ln>
+                            <a:noFill/>
+                          </a:ln>
+                          <a:solidFill>
+                            <a:prstClr val="black"/>
+                          </a:solidFill>
+                          <a:effectLst/>
+                          <a:uLnTx/>
+                          <a:uFillTx/>
+                          <a:latin typeface="Avenir Next LT Pro"/>
+                          <a:ea typeface="+mn-ea"/>
+                          <a:cs typeface="+mn-cs"/>
+                        </a:rPr>
+                        <a:t>11</a:t>
+                      </a:r>
+                      <a:endParaRPr lang="en-US" dirty="0"/>
+                    </a:p>
+                  </a:txBody>
+                  <a:tcPr/>
+                </a:tc>
+                <a:tc>
+                  <a:txBody>
+                    <a:bodyPr/>
+                    <a:lstStyle/>
+                    <a:p>
+                      <a:r>
                         <a:rPr lang="es-MX" dirty="0"/>
                         <a:t>0.006794 s</a:t>
                       </a:r>
@@ -15216,6 +15295,51 @@
           </a:graphicData>
         </a:graphic>
       </p:graphicFrame>
+      <p:pic>
+        <p:nvPicPr>
+          <p:cNvPr id="1026" name="Picture 2">
+            <a:extLst>
+              <a:ext uri="{FF2B5EF4-FFF2-40B4-BE49-F238E27FC236}">
+                <a16:creationId xmlns:a16="http://schemas.microsoft.com/office/drawing/2014/main" id="{4EACEB26-961A-45FE-8216-99D1B8546CC0}"/>
+              </a:ext>
+            </a:extLst>
+          </p:cNvPr>
+          <p:cNvPicPr>
+            <a:picLocks noChangeAspect="1" noChangeArrowheads="1"/>
+          </p:cNvPicPr>
+          <p:nvPr/>
+        </p:nvPicPr>
+        <p:blipFill rotWithShape="1">
+          <a:blip r:embed="rId2">
+            <a:extLst>
+              <a:ext uri="{28A0092B-C50C-407E-A947-70E740481C1C}">
+                <a14:useLocalDpi xmlns:a14="http://schemas.microsoft.com/office/drawing/2010/main" val="0"/>
+              </a:ext>
+            </a:extLst>
+          </a:blip>
+          <a:srcRect l="-1292" t="978" r="2779" b="7776"/>
+          <a:stretch/>
+        </p:blipFill>
+        <p:spPr bwMode="auto">
+          <a:xfrm>
+            <a:off x="6375322" y="2283040"/>
+            <a:ext cx="5414223" cy="4284724"/>
+          </a:xfrm>
+          <a:prstGeom prst="rect">
+            <a:avLst/>
+          </a:prstGeom>
+          <a:noFill/>
+          <a:extLst>
+            <a:ext uri="{909E8E84-426E-40DD-AFC4-6F175D3DCCD1}">
+              <a14:hiddenFill xmlns:a14="http://schemas.microsoft.com/office/drawing/2010/main">
+                <a:solidFill>
+                  <a:srgbClr val="FFFFFF"/>
+                </a:solidFill>
+              </a14:hiddenFill>
+            </a:ext>
+          </a:extLst>
+        </p:spPr>
+      </p:pic>
     </p:spTree>
     <p:extLst>
       <p:ext uri="{BB962C8B-B14F-4D97-AF65-F5344CB8AC3E}">
@@ -15935,15 +16059,6 @@
           <a:solidFill>
             <a:srgbClr val="FFFFFF"/>
           </a:solidFill>
-          <a:extLst>
-            <a:ext uri="{909E8E84-426E-40DD-AFC4-6F175D3DCCD1}">
-              <a14:hiddenFill xmlns:a14="http://schemas.microsoft.com/office/drawing/2010/main">
-                <a:solidFill>
-                  <a:srgbClr val="FFFFFF"/>
-                </a:solidFill>
-              </a14:hiddenFill>
-            </a:ext>
-          </a:extLst>
         </p:spPr>
       </p:pic>
       <p:sp>
@@ -17066,8 +17181,8 @@
         </p:nvSpPr>
         <p:spPr>
           <a:xfrm>
-            <a:off x="838200" y="1825625"/>
-            <a:ext cx="10515600" cy="4351338"/>
+            <a:off x="838200" y="1509204"/>
+            <a:ext cx="10515600" cy="4667759"/>
           </a:xfrm>
         </p:spPr>
         <p:txBody>
@@ -17202,10 +17317,10 @@
       </p:sp>
       <p:graphicFrame>
         <p:nvGraphicFramePr>
-          <p:cNvPr id="10" name="Tabla 9">
+          <p:cNvPr id="6" name="Tabla 5">
             <a:extLst>
               <a:ext uri="{FF2B5EF4-FFF2-40B4-BE49-F238E27FC236}">
-                <a16:creationId xmlns:a16="http://schemas.microsoft.com/office/drawing/2014/main" id="{3B430DC6-CB10-4B5A-9E87-B4D6B8D29CE6}"/>
+                <a16:creationId xmlns:a16="http://schemas.microsoft.com/office/drawing/2014/main" id="{D8AC42BC-5F8C-4880-8A27-0CADCD2E2749}"/>
               </a:ext>
             </a:extLst>
           </p:cNvPr>
@@ -17215,14 +17330,14 @@
           <p:nvPr>
             <p:extLst>
               <p:ext uri="{D42A27DB-BD31-4B8C-83A1-F6EECF244321}">
-                <p14:modId xmlns:p14="http://schemas.microsoft.com/office/powerpoint/2010/main" val="360290957"/>
+                <p14:modId xmlns:p14="http://schemas.microsoft.com/office/powerpoint/2010/main" val="32022602"/>
               </p:ext>
             </p:extLst>
           </p:nvPr>
         </p:nvGraphicFramePr>
         <p:xfrm>
-          <a:off x="1854201" y="3827583"/>
-          <a:ext cx="8127999" cy="1483360"/>
+          <a:off x="987473" y="3429000"/>
+          <a:ext cx="5108527" cy="1478280"/>
         </p:xfrm>
         <a:graphic>
           <a:graphicData uri="http://schemas.openxmlformats.org/drawingml/2006/table">
@@ -17231,21 +17346,21 @@
                 <a:tableStyleId>{21E4AEA4-8DFA-4A89-87EB-49C32662AFE0}</a:tableStyleId>
               </a:tblPr>
               <a:tblGrid>
-                <a:gridCol w="2709333">
+                <a:gridCol w="1217227">
                   <a:extLst>
                     <a:ext uri="{9D8B030D-6E8A-4147-A177-3AD203B41FA5}">
                       <a16:colId xmlns:a16="http://schemas.microsoft.com/office/drawing/2014/main" val="1629945468"/>
                     </a:ext>
                   </a:extLst>
                 </a:gridCol>
-                <a:gridCol w="2709333">
+                <a:gridCol w="1375053">
                   <a:extLst>
                     <a:ext uri="{9D8B030D-6E8A-4147-A177-3AD203B41FA5}">
                       <a16:colId xmlns:a16="http://schemas.microsoft.com/office/drawing/2014/main" val="1152541639"/>
                     </a:ext>
                   </a:extLst>
                 </a:gridCol>
-                <a:gridCol w="2709333">
+                <a:gridCol w="2516247">
                   <a:extLst>
                     <a:ext uri="{9D8B030D-6E8A-4147-A177-3AD203B41FA5}">
                       <a16:colId xmlns:a16="http://schemas.microsoft.com/office/drawing/2014/main" val="1414973209"/>
@@ -17253,7 +17368,7 @@
                   </a:extLst>
                 </a:gridCol>
               </a:tblGrid>
-              <a:tr h="370840">
+              <a:tr h="0">
                 <a:tc>
                   <a:txBody>
                     <a:bodyPr/>
@@ -17479,6 +17594,51 @@
           </a:graphicData>
         </a:graphic>
       </p:graphicFrame>
+      <p:pic>
+        <p:nvPicPr>
+          <p:cNvPr id="2050" name="Picture 2">
+            <a:extLst>
+              <a:ext uri="{FF2B5EF4-FFF2-40B4-BE49-F238E27FC236}">
+                <a16:creationId xmlns:a16="http://schemas.microsoft.com/office/drawing/2014/main" id="{92F17D21-FD12-4DA9-B397-EA469C3E657E}"/>
+              </a:ext>
+            </a:extLst>
+          </p:cNvPr>
+          <p:cNvPicPr>
+            <a:picLocks noChangeAspect="1" noChangeArrowheads="1"/>
+          </p:cNvPicPr>
+          <p:nvPr/>
+        </p:nvPicPr>
+        <p:blipFill rotWithShape="1">
+          <a:blip r:embed="rId2">
+            <a:extLst>
+              <a:ext uri="{28A0092B-C50C-407E-A947-70E740481C1C}">
+                <a14:useLocalDpi xmlns:a14="http://schemas.microsoft.com/office/drawing/2010/main" val="0"/>
+              </a:ext>
+            </a:extLst>
+          </a:blip>
+          <a:srcRect t="212" r="25118" b="7936"/>
+          <a:stretch/>
+        </p:blipFill>
+        <p:spPr bwMode="auto">
+          <a:xfrm>
+            <a:off x="6750113" y="2632291"/>
+            <a:ext cx="4871482" cy="4225709"/>
+          </a:xfrm>
+          <a:prstGeom prst="rect">
+            <a:avLst/>
+          </a:prstGeom>
+          <a:noFill/>
+          <a:extLst>
+            <a:ext uri="{909E8E84-426E-40DD-AFC4-6F175D3DCCD1}">
+              <a14:hiddenFill xmlns:a14="http://schemas.microsoft.com/office/drawing/2010/main">
+                <a:solidFill>
+                  <a:srgbClr val="FFFFFF"/>
+                </a:solidFill>
+              </a14:hiddenFill>
+            </a:ext>
+          </a:extLst>
+        </p:spPr>
+      </p:pic>
     </p:spTree>
     <p:extLst>
       <p:ext uri="{BB962C8B-B14F-4D97-AF65-F5344CB8AC3E}">
@@ -21943,21 +22103,21 @@
 </file>
 
 <file path=customXml/item1.xml><?xml version="1.0" encoding="utf-8"?>
+<?mso-contentType ?>
+<FormTemplates xmlns="http://schemas.microsoft.com/sharepoint/v3/contenttype/forms">
+  <Display>DocumentLibraryForm</Display>
+  <Edit>DocumentLibraryForm</Edit>
+  <New>DocumentLibraryForm</New>
+</FormTemplates>
+</file>
+
+<file path=customXml/item2.xml><?xml version="1.0" encoding="utf-8"?>
 <p:properties xmlns:p="http://schemas.microsoft.com/office/2006/metadata/properties" xmlns:xsi="http://www.w3.org/2001/XMLSchema-instance" xmlns:pc="http://schemas.microsoft.com/office/infopath/2007/PartnerControls">
   <documentManagement>
     <Status xmlns="71af3243-3dd4-4a8d-8c0d-dd76da1f02a5">Not started</Status>
     <MediaServiceKeyPoints xmlns="71af3243-3dd4-4a8d-8c0d-dd76da1f02a5" xsi:nil="true"/>
   </documentManagement>
 </p:properties>
-</file>
-
-<file path=customXml/item2.xml><?xml version="1.0" encoding="utf-8"?>
-<?mso-contentType ?>
-<FormTemplates xmlns="http://schemas.microsoft.com/sharepoint/v3/contenttype/forms">
-  <Display>DocumentLibraryForm</Display>
-  <Edit>DocumentLibraryForm</Edit>
-  <New>DocumentLibraryForm</New>
-</FormTemplates>
 </file>
 
 <file path=customXml/item3.xml><?xml version="1.0" encoding="utf-8"?>
@@ -22182,6 +22342,14 @@
 </file>
 
 <file path=customXml/itemProps1.xml><?xml version="1.0" encoding="utf-8"?>
+<ds:datastoreItem xmlns:ds="http://schemas.openxmlformats.org/officeDocument/2006/customXml" ds:itemID="{1A449C04-64B3-4403-94B7-8D2284C38D1B}">
+  <ds:schemaRefs>
+    <ds:schemaRef ds:uri="http://schemas.microsoft.com/sharepoint/v3/contenttype/forms"/>
+  </ds:schemaRefs>
+</ds:datastoreItem>
+</file>
+
+<file path=customXml/itemProps2.xml><?xml version="1.0" encoding="utf-8"?>
 <ds:datastoreItem xmlns:ds="http://schemas.openxmlformats.org/officeDocument/2006/customXml" ds:itemID="{FBDEF148-1770-458F-8F5B-C3D0A278AA97}">
   <ds:schemaRefs>
     <ds:schemaRef ds:uri="http://purl.org/dc/terms/"/>
@@ -22194,14 +22362,6 @@
     <ds:schemaRef ds:uri="71af3243-3dd4-4a8d-8c0d-dd76da1f02a5"/>
     <ds:schemaRef ds:uri="http://schemas.microsoft.com/office/infopath/2007/PartnerControls"/>
     <ds:schemaRef ds:uri="http://schemas.openxmlformats.org/package/2006/metadata/core-properties"/>
-  </ds:schemaRefs>
-</ds:datastoreItem>
-</file>
-
-<file path=customXml/itemProps2.xml><?xml version="1.0" encoding="utf-8"?>
-<ds:datastoreItem xmlns:ds="http://schemas.openxmlformats.org/officeDocument/2006/customXml" ds:itemID="{1A449C04-64B3-4403-94B7-8D2284C38D1B}">
-  <ds:schemaRefs>
-    <ds:schemaRef ds:uri="http://schemas.microsoft.com/sharepoint/v3/contenttype/forms"/>
   </ds:schemaRefs>
 </ds:datastoreItem>
 </file>

</xml_diff>

<commit_message>
Presentación última versión #8
</commit_message>
<xml_diff>
--- a/documentos/Presentacion_ffmf.pptx
+++ b/documentos/Presentacion_ffmf.pptx
@@ -5,10 +5,10 @@
     <p:sldMasterId id="2147483768" r:id="rId4"/>
   </p:sldMasterIdLst>
   <p:notesMasterIdLst>
-    <p:notesMasterId r:id="rId28"/>
+    <p:notesMasterId r:id="rId32"/>
   </p:notesMasterIdLst>
   <p:handoutMasterIdLst>
-    <p:handoutMasterId r:id="rId29"/>
+    <p:handoutMasterId r:id="rId33"/>
   </p:handoutMasterIdLst>
   <p:sldIdLst>
     <p:sldId id="3825" r:id="rId5"/>
@@ -32,8 +32,12 @@
     <p:sldId id="3853" r:id="rId23"/>
     <p:sldId id="3841" r:id="rId24"/>
     <p:sldId id="3854" r:id="rId25"/>
-    <p:sldId id="3851" r:id="rId26"/>
-    <p:sldId id="3834" r:id="rId27"/>
+    <p:sldId id="3860" r:id="rId26"/>
+    <p:sldId id="3861" r:id="rId27"/>
+    <p:sldId id="3862" r:id="rId28"/>
+    <p:sldId id="3863" r:id="rId29"/>
+    <p:sldId id="3851" r:id="rId30"/>
+    <p:sldId id="3834" r:id="rId31"/>
   </p:sldIdLst>
   <p:sldSz cx="12192000" cy="6858000"/>
   <p:notesSz cx="6858000" cy="9144000"/>
@@ -867,7 +871,7 @@
             <a:pPr rtl="0"/>
             <a:fld id="{D40C6A29-4676-420C-BBE3-ACC2B80F64D4}" type="slidenum">
               <a:rPr lang="es-ES" smtClean="0"/>
-              <a:t>23</a:t>
+              <a:t>27</a:t>
             </a:fld>
             <a:endParaRPr lang="es-ES"/>
           </a:p>
@@ -17671,10 +17675,543 @@
       </p:grpSpPr>
       <p:sp>
         <p:nvSpPr>
-          <p:cNvPr id="4" name="Marcador de número de diapositiva 3">
+          <p:cNvPr id="2" name="Título 1">
             <a:extLst>
               <a:ext uri="{FF2B5EF4-FFF2-40B4-BE49-F238E27FC236}">
-                <a16:creationId xmlns:a16="http://schemas.microsoft.com/office/drawing/2014/main" id="{95BFE720-516E-44D5-90AC-64994C09A837}"/>
+                <a16:creationId xmlns:a16="http://schemas.microsoft.com/office/drawing/2014/main" id="{25A28C61-B7CD-49E0-AFAA-691BEC64A86D}"/>
+              </a:ext>
+            </a:extLst>
+          </p:cNvPr>
+          <p:cNvSpPr>
+            <a:spLocks noGrp="1"/>
+          </p:cNvSpPr>
+          <p:nvPr>
+            <p:ph type="title"/>
+          </p:nvPr>
+        </p:nvSpPr>
+        <p:spPr/>
+        <p:txBody>
+          <a:bodyPr/>
+          <a:lstStyle/>
+          <a:p>
+            <a:r>
+              <a:rPr lang="es-MX" dirty="0"/>
+              <a:t>Problema de flujo con oferta y demanda</a:t>
+            </a:r>
+            <a:endParaRPr lang="en-US" dirty="0"/>
+          </a:p>
+        </p:txBody>
+      </p:sp>
+      <mc:AlternateContent xmlns:mc="http://schemas.openxmlformats.org/markup-compatibility/2006">
+        <mc:Choice xmlns:a14="http://schemas.microsoft.com/office/drawing/2010/main" Requires="a14">
+          <p:sp>
+            <p:nvSpPr>
+              <p:cNvPr id="3" name="Marcador de contenido 2">
+                <a:extLst>
+                  <a:ext uri="{FF2B5EF4-FFF2-40B4-BE49-F238E27FC236}">
+                    <a16:creationId xmlns:a16="http://schemas.microsoft.com/office/drawing/2014/main" id="{4CA9AAA2-1498-41A8-9566-AA34EEF366A0}"/>
+                  </a:ext>
+                </a:extLst>
+              </p:cNvPr>
+              <p:cNvSpPr>
+                <a:spLocks noGrp="1"/>
+              </p:cNvSpPr>
+              <p:nvPr>
+                <p:ph sz="half" idx="1"/>
+              </p:nvPr>
+            </p:nvSpPr>
+            <p:spPr>
+              <a:xfrm>
+                <a:off x="838199" y="1615736"/>
+                <a:ext cx="10515599" cy="4561227"/>
+              </a:xfrm>
+            </p:spPr>
+            <p:txBody>
+              <a:bodyPr>
+                <a:normAutofit fontScale="47500" lnSpcReduction="20000"/>
+              </a:bodyPr>
+              <a:lstStyle/>
+              <a:p>
+                <a:r>
+                  <a:rPr lang="es-MX" dirty="0"/>
+                  <a:t>Otra de las aplicaciones de este paquete es resolver problemas de flujo con oferta y demanda, este tipo de problemas es muy similar al problema original de flujo máximo pero ahora los nodos cuentan con un parámetro extra, una oferta o una demanda, es decir, un nodo origen debería tener una capacidad de oferta y un nodo destino debería tener una capacidad de demanda.</a:t>
+                </a:r>
+              </a:p>
+              <a:p>
+                <a:endParaRPr lang="es-MX" dirty="0"/>
+              </a:p>
+              <a:p>
+                <a:r>
+                  <a:rPr lang="es-MX" dirty="0"/>
+                  <a:t>Ahora el problema a resolver es encontrar un flujo que satisfaga la demanda, podemos hallar una solución para este problema con el algoritmo de Ford-</a:t>
+                </a:r>
+                <a:r>
+                  <a:rPr lang="es-MX" dirty="0" err="1"/>
+                  <a:t>Fulkerson</a:t>
+                </a:r>
+                <a:r>
+                  <a:rPr lang="es-MX" dirty="0"/>
+                  <a:t>, transformando la red de tal manera que la solución del problema de flujo máximo nos de la solución del problema de flujo con oferta y demanda.</a:t>
+                </a:r>
+              </a:p>
+              <a:p>
+                <a:endParaRPr lang="es-MX" dirty="0"/>
+              </a:p>
+              <a:p>
+                <a:r>
+                  <a:rPr lang="es-MX" dirty="0"/>
+                  <a:t>Para poder hacer esta transformación necesitamos:</a:t>
+                </a:r>
+                <a:br>
+                  <a:rPr lang="es-MX" dirty="0"/>
+                </a:br>
+                <a:endParaRPr lang="es-MX" dirty="0"/>
+              </a:p>
+              <a:p>
+                <a:pPr marL="0" indent="0">
+                  <a:buNone/>
+                </a:pPr>
+                <a:r>
+                  <a:rPr lang="es-MX" dirty="0"/>
+                  <a:t>Agregar un nodo de origen </a:t>
+                </a:r>
+                <a14:m>
+                  <m:oMath xmlns:m="http://schemas.openxmlformats.org/officeDocument/2006/math">
+                    <m:r>
+                      <a:rPr lang="es-MX" b="0" i="1" smtClean="0">
+                        <a:latin typeface="Cambria Math" panose="02040503050406030204" pitchFamily="18" charset="0"/>
+                      </a:rPr>
+                      <m:t>𝑠</m:t>
+                    </m:r>
+                  </m:oMath>
+                </a14:m>
+                <a:r>
+                  <a:rPr lang="es-MX" dirty="0"/>
+                  <a:t> y arcos desde él a cada nodo origen original </a:t>
+                </a:r>
+                <a14:m>
+                  <m:oMath xmlns:m="http://schemas.openxmlformats.org/officeDocument/2006/math">
+                    <m:sSub>
+                      <m:sSubPr>
+                        <m:ctrlPr>
+                          <a:rPr lang="es-MX" b="0" i="1" smtClean="0">
+                            <a:latin typeface="Cambria Math" panose="02040503050406030204" pitchFamily="18" charset="0"/>
+                          </a:rPr>
+                        </m:ctrlPr>
+                      </m:sSubPr>
+                      <m:e>
+                        <m:r>
+                          <a:rPr lang="es-MX" b="0" i="1" smtClean="0">
+                            <a:latin typeface="Cambria Math" panose="02040503050406030204" pitchFamily="18" charset="0"/>
+                          </a:rPr>
+                          <m:t>𝑝</m:t>
+                        </m:r>
+                      </m:e>
+                      <m:sub>
+                        <m:r>
+                          <a:rPr lang="es-MX" b="0" i="1" smtClean="0">
+                            <a:latin typeface="Cambria Math" panose="02040503050406030204" pitchFamily="18" charset="0"/>
+                          </a:rPr>
+                          <m:t>𝑖</m:t>
+                        </m:r>
+                      </m:sub>
+                    </m:sSub>
+                  </m:oMath>
+                </a14:m>
+                <a:r>
+                  <a:rPr lang="es-MX" dirty="0"/>
+                  <a:t> con capacidad </a:t>
+                </a:r>
+                <a14:m>
+                  <m:oMath xmlns:m="http://schemas.openxmlformats.org/officeDocument/2006/math">
+                    <m:sSub>
+                      <m:sSubPr>
+                        <m:ctrlPr>
+                          <a:rPr lang="es-MX" i="1">
+                            <a:latin typeface="Cambria Math" panose="02040503050406030204" pitchFamily="18" charset="0"/>
+                          </a:rPr>
+                        </m:ctrlPr>
+                      </m:sSubPr>
+                      <m:e>
+                        <m:r>
+                          <a:rPr lang="es-MX" i="1">
+                            <a:latin typeface="Cambria Math" panose="02040503050406030204" pitchFamily="18" charset="0"/>
+                          </a:rPr>
+                          <m:t>𝑝</m:t>
+                        </m:r>
+                      </m:e>
+                      <m:sub>
+                        <m:r>
+                          <a:rPr lang="es-MX" i="1">
+                            <a:latin typeface="Cambria Math" panose="02040503050406030204" pitchFamily="18" charset="0"/>
+                          </a:rPr>
+                          <m:t>𝑖</m:t>
+                        </m:r>
+                      </m:sub>
+                    </m:sSub>
+                  </m:oMath>
+                </a14:m>
+                <a:r>
+                  <a:rPr lang="es-MX" dirty="0"/>
+                  <a:t> donde </a:t>
+                </a:r>
+                <a14:m>
+                  <m:oMath xmlns:m="http://schemas.openxmlformats.org/officeDocument/2006/math">
+                    <m:sSub>
+                      <m:sSubPr>
+                        <m:ctrlPr>
+                          <a:rPr lang="es-MX" i="1">
+                            <a:latin typeface="Cambria Math" panose="02040503050406030204" pitchFamily="18" charset="0"/>
+                          </a:rPr>
+                        </m:ctrlPr>
+                      </m:sSubPr>
+                      <m:e>
+                        <m:r>
+                          <a:rPr lang="es-MX" i="1">
+                            <a:latin typeface="Cambria Math" panose="02040503050406030204" pitchFamily="18" charset="0"/>
+                          </a:rPr>
+                          <m:t>𝑝</m:t>
+                        </m:r>
+                      </m:e>
+                      <m:sub>
+                        <m:r>
+                          <a:rPr lang="es-MX" i="1">
+                            <a:latin typeface="Cambria Math" panose="02040503050406030204" pitchFamily="18" charset="0"/>
+                          </a:rPr>
+                          <m:t>𝑖</m:t>
+                        </m:r>
+                      </m:sub>
+                    </m:sSub>
+                  </m:oMath>
+                </a14:m>
+                <a:r>
+                  <a:rPr lang="es-MX" dirty="0"/>
+                  <a:t> es la oferta de cada nodo origen original.</a:t>
+                </a:r>
+                <a:br>
+                  <a:rPr lang="es-MX" dirty="0"/>
+                </a:br>
+                <a:br>
+                  <a:rPr lang="es-MX" dirty="0"/>
+                </a:br>
+                <a:r>
+                  <a:rPr lang="es-MX" dirty="0"/>
+                  <a:t>Agregar un nodo destino </a:t>
+                </a:r>
+                <a14:m>
+                  <m:oMath xmlns:m="http://schemas.openxmlformats.org/officeDocument/2006/math">
+                    <m:r>
+                      <a:rPr lang="es-MX" b="0" i="1" smtClean="0">
+                        <a:latin typeface="Cambria Math" panose="02040503050406030204" pitchFamily="18" charset="0"/>
+                      </a:rPr>
+                      <m:t>𝑡</m:t>
+                    </m:r>
+                  </m:oMath>
+                </a14:m>
+                <a:r>
+                  <a:rPr lang="es-MX" dirty="0"/>
+                  <a:t> y arcos de todas los nodos destino originales </a:t>
+                </a:r>
+                <a14:m>
+                  <m:oMath xmlns:m="http://schemas.openxmlformats.org/officeDocument/2006/math">
+                    <m:sSub>
+                      <m:sSubPr>
+                        <m:ctrlPr>
+                          <a:rPr lang="es-MX" i="1" smtClean="0">
+                            <a:latin typeface="Cambria Math" panose="02040503050406030204" pitchFamily="18" charset="0"/>
+                          </a:rPr>
+                        </m:ctrlPr>
+                      </m:sSubPr>
+                      <m:e>
+                        <m:r>
+                          <a:rPr lang="es-MX" b="0" i="1" smtClean="0">
+                            <a:latin typeface="Cambria Math" panose="02040503050406030204" pitchFamily="18" charset="0"/>
+                          </a:rPr>
+                          <m:t>𝑣</m:t>
+                        </m:r>
+                      </m:e>
+                      <m:sub>
+                        <m:r>
+                          <a:rPr lang="es-MX" i="1">
+                            <a:latin typeface="Cambria Math" panose="02040503050406030204" pitchFamily="18" charset="0"/>
+                          </a:rPr>
+                          <m:t>𝑖</m:t>
+                        </m:r>
+                      </m:sub>
+                    </m:sSub>
+                  </m:oMath>
+                </a14:m>
+                <a:r>
+                  <a:rPr lang="es-MX" dirty="0"/>
+                  <a:t> a </a:t>
+                </a:r>
+                <a14:m>
+                  <m:oMath xmlns:m="http://schemas.openxmlformats.org/officeDocument/2006/math">
+                    <m:r>
+                      <a:rPr lang="es-MX" i="1">
+                        <a:latin typeface="Cambria Math" panose="02040503050406030204" pitchFamily="18" charset="0"/>
+                      </a:rPr>
+                      <m:t>𝑡</m:t>
+                    </m:r>
+                  </m:oMath>
+                </a14:m>
+                <a:r>
+                  <a:rPr lang="es-MX" dirty="0"/>
+                  <a:t> con capacidad </a:t>
+                </a:r>
+                <a14:m>
+                  <m:oMath xmlns:m="http://schemas.openxmlformats.org/officeDocument/2006/math">
+                    <m:sSub>
+                      <m:sSubPr>
+                        <m:ctrlPr>
+                          <a:rPr lang="es-MX" i="1">
+                            <a:latin typeface="Cambria Math" panose="02040503050406030204" pitchFamily="18" charset="0"/>
+                          </a:rPr>
+                        </m:ctrlPr>
+                      </m:sSubPr>
+                      <m:e>
+                        <m:r>
+                          <a:rPr lang="es-MX" i="1">
+                            <a:latin typeface="Cambria Math" panose="02040503050406030204" pitchFamily="18" charset="0"/>
+                          </a:rPr>
+                          <m:t>𝑑</m:t>
+                        </m:r>
+                      </m:e>
+                      <m:sub>
+                        <m:r>
+                          <a:rPr lang="es-MX" i="1">
+                            <a:latin typeface="Cambria Math" panose="02040503050406030204" pitchFamily="18" charset="0"/>
+                          </a:rPr>
+                          <m:t>𝑖</m:t>
+                        </m:r>
+                      </m:sub>
+                    </m:sSub>
+                  </m:oMath>
+                </a14:m>
+                <a:r>
+                  <a:rPr lang="es-MX" dirty="0"/>
+                  <a:t> donde </a:t>
+                </a:r>
+                <a14:m>
+                  <m:oMath xmlns:m="http://schemas.openxmlformats.org/officeDocument/2006/math">
+                    <m:sSub>
+                      <m:sSubPr>
+                        <m:ctrlPr>
+                          <a:rPr lang="es-MX" i="1">
+                            <a:latin typeface="Cambria Math" panose="02040503050406030204" pitchFamily="18" charset="0"/>
+                          </a:rPr>
+                        </m:ctrlPr>
+                      </m:sSubPr>
+                      <m:e>
+                        <m:r>
+                          <a:rPr lang="es-MX" i="1">
+                            <a:latin typeface="Cambria Math" panose="02040503050406030204" pitchFamily="18" charset="0"/>
+                          </a:rPr>
+                          <m:t>𝑑</m:t>
+                        </m:r>
+                      </m:e>
+                      <m:sub>
+                        <m:r>
+                          <a:rPr lang="es-MX" i="1">
+                            <a:latin typeface="Cambria Math" panose="02040503050406030204" pitchFamily="18" charset="0"/>
+                          </a:rPr>
+                          <m:t>𝑖</m:t>
+                        </m:r>
+                      </m:sub>
+                    </m:sSub>
+                  </m:oMath>
+                </a14:m>
+                <a:r>
+                  <a:rPr lang="es-MX" dirty="0"/>
+                  <a:t> es la demanda de cada nodo destino original.</a:t>
+                </a:r>
+                <a:br>
+                  <a:rPr lang="es-MX" dirty="0"/>
+                </a:br>
+                <a:br>
+                  <a:rPr lang="es-MX" dirty="0"/>
+                </a:br>
+                <a:r>
+                  <a:rPr lang="es-MX" dirty="0"/>
+                  <a:t>Ahora con esta nueva red, existe un flujo que satisface la demanda si y solo si:</a:t>
+                </a:r>
+              </a:p>
+              <a:p>
+                <a:pPr marL="0" indent="0">
+                  <a:buNone/>
+                </a:pPr>
+                <a:endParaRPr lang="es-MX" dirty="0"/>
+              </a:p>
+              <a:p>
+                <a:pPr marL="0" indent="0">
+                  <a:buNone/>
+                </a:pPr>
+                <a14:m>
+                  <m:oMathPara xmlns:m="http://schemas.openxmlformats.org/officeDocument/2006/math">
+                    <m:oMathParaPr>
+                      <m:jc m:val="centerGroup"/>
+                    </m:oMathParaPr>
+                    <m:oMath xmlns:m="http://schemas.openxmlformats.org/officeDocument/2006/math">
+                      <m:r>
+                        <a:rPr lang="es-MX" b="0" i="1" smtClean="0">
+                          <a:latin typeface="Cambria Math" panose="02040503050406030204" pitchFamily="18" charset="0"/>
+                        </a:rPr>
+                        <m:t>𝐹𝑙𝑢𝑗𝑜</m:t>
+                      </m:r>
+                      <m:r>
+                        <a:rPr lang="es-MX" b="0" i="1" smtClean="0">
+                          <a:latin typeface="Cambria Math" panose="02040503050406030204" pitchFamily="18" charset="0"/>
+                        </a:rPr>
+                        <m:t> </m:t>
+                      </m:r>
+                      <m:r>
+                        <a:rPr lang="es-MX" b="0" i="1" smtClean="0">
+                          <a:latin typeface="Cambria Math" panose="02040503050406030204" pitchFamily="18" charset="0"/>
+                        </a:rPr>
+                        <m:t>𝑀</m:t>
+                      </m:r>
+                      <m:r>
+                        <a:rPr lang="es-MX" b="0" i="1" smtClean="0">
+                          <a:latin typeface="Cambria Math" panose="02040503050406030204" pitchFamily="18" charset="0"/>
+                        </a:rPr>
+                        <m:t>á</m:t>
+                      </m:r>
+                      <m:r>
+                        <a:rPr lang="es-MX" b="0" i="1" smtClean="0">
+                          <a:latin typeface="Cambria Math" panose="02040503050406030204" pitchFamily="18" charset="0"/>
+                        </a:rPr>
+                        <m:t>𝑥𝑖𝑚𝑜</m:t>
+                      </m:r>
+                      <m:r>
+                        <a:rPr lang="es-MX" b="0" i="1" smtClean="0">
+                          <a:latin typeface="Cambria Math" panose="02040503050406030204" pitchFamily="18" charset="0"/>
+                        </a:rPr>
+                        <m:t>=</m:t>
+                      </m:r>
+                      <m:nary>
+                        <m:naryPr>
+                          <m:chr m:val="∑"/>
+                          <m:ctrlPr>
+                            <a:rPr lang="es-MX" b="0" i="1" smtClean="0">
+                              <a:latin typeface="Cambria Math" panose="02040503050406030204" pitchFamily="18" charset="0"/>
+                            </a:rPr>
+                          </m:ctrlPr>
+                        </m:naryPr>
+                        <m:sub>
+                          <m:r>
+                            <m:rPr>
+                              <m:brk m:alnAt="23"/>
+                            </m:rPr>
+                            <a:rPr lang="es-MX" b="0" i="1" smtClean="0">
+                              <a:latin typeface="Cambria Math" panose="02040503050406030204" pitchFamily="18" charset="0"/>
+                            </a:rPr>
+                            <m:t>𝑖</m:t>
+                          </m:r>
+                        </m:sub>
+                        <m:sup>
+                          <m:r>
+                            <a:rPr lang="es-MX" b="0" i="1" smtClean="0">
+                              <a:latin typeface="Cambria Math" panose="02040503050406030204" pitchFamily="18" charset="0"/>
+                            </a:rPr>
+                            <m:t>𝑉</m:t>
+                          </m:r>
+                        </m:sup>
+                        <m:e>
+                          <m:sSub>
+                            <m:sSubPr>
+                              <m:ctrlPr>
+                                <a:rPr lang="es-MX" b="0" i="1" smtClean="0">
+                                  <a:latin typeface="Cambria Math" panose="02040503050406030204" pitchFamily="18" charset="0"/>
+                                </a:rPr>
+                              </m:ctrlPr>
+                            </m:sSubPr>
+                            <m:e>
+                              <m:r>
+                                <a:rPr lang="es-MX" b="0" i="1" smtClean="0">
+                                  <a:latin typeface="Cambria Math" panose="02040503050406030204" pitchFamily="18" charset="0"/>
+                                </a:rPr>
+                                <m:t>𝑑</m:t>
+                              </m:r>
+                            </m:e>
+                            <m:sub>
+                              <m:r>
+                                <a:rPr lang="es-MX" b="0" i="1" smtClean="0">
+                                  <a:latin typeface="Cambria Math" panose="02040503050406030204" pitchFamily="18" charset="0"/>
+                                </a:rPr>
+                                <m:t>𝑖</m:t>
+                              </m:r>
+                            </m:sub>
+                          </m:sSub>
+                        </m:e>
+                      </m:nary>
+                    </m:oMath>
+                  </m:oMathPara>
+                </a14:m>
+                <a:endParaRPr lang="es-MX" dirty="0"/>
+              </a:p>
+              <a:p>
+                <a:pPr marL="0" indent="0">
+                  <a:buNone/>
+                </a:pPr>
+                <a:r>
+                  <a:rPr lang="es-MX" dirty="0"/>
+                  <a:t>Si ocurre lo anterior, la solución del problema de flujo máximo nos daría la respuesta de cuantas unidades enviar por cada arco para satisfacer la demanda, es decir, obtendríamos la solución del problema de flujo con oferta y demanda.</a:t>
+                </a:r>
+                <a:endParaRPr lang="en-US" dirty="0"/>
+              </a:p>
+            </p:txBody>
+          </p:sp>
+        </mc:Choice>
+        <mc:Fallback>
+          <p:sp>
+            <p:nvSpPr>
+              <p:cNvPr id="3" name="Marcador de contenido 2">
+                <a:extLst>
+                  <a:ext uri="{FF2B5EF4-FFF2-40B4-BE49-F238E27FC236}">
+                    <a16:creationId xmlns:a16="http://schemas.microsoft.com/office/drawing/2014/main" id="{4CA9AAA2-1498-41A8-9566-AA34EEF366A0}"/>
+                  </a:ext>
+                </a:extLst>
+              </p:cNvPr>
+              <p:cNvSpPr>
+                <a:spLocks noGrp="1" noRot="1" noChangeAspect="1" noMove="1" noResize="1" noEditPoints="1" noAdjustHandles="1" noChangeArrowheads="1" noChangeShapeType="1" noTextEdit="1"/>
+              </p:cNvSpPr>
+              <p:nvPr>
+                <p:ph sz="half" idx="1"/>
+              </p:nvPr>
+            </p:nvSpPr>
+            <p:spPr>
+              <a:xfrm>
+                <a:off x="838199" y="1615736"/>
+                <a:ext cx="10515599" cy="4561227"/>
+              </a:xfrm>
+              <a:blipFill>
+                <a:blip r:embed="rId2"/>
+                <a:stretch>
+                  <a:fillRect l="-58" t="-1203" r="-232" b="-5481"/>
+                </a:stretch>
+              </a:blipFill>
+            </p:spPr>
+            <p:txBody>
+              <a:bodyPr/>
+              <a:lstStyle/>
+              <a:p>
+                <a:r>
+                  <a:rPr lang="en-US">
+                    <a:noFill/>
+                  </a:rPr>
+                  <a:t> </a:t>
+                </a:r>
+              </a:p>
+            </p:txBody>
+          </p:sp>
+        </mc:Fallback>
+      </mc:AlternateContent>
+      <p:sp>
+        <p:nvSpPr>
+          <p:cNvPr id="7" name="Marcador de número de diapositiva 6">
+            <a:extLst>
+              <a:ext uri="{FF2B5EF4-FFF2-40B4-BE49-F238E27FC236}">
+                <a16:creationId xmlns:a16="http://schemas.microsoft.com/office/drawing/2014/main" id="{4DECDF82-F244-4B14-8924-816333935F00}"/>
               </a:ext>
             </a:extLst>
           </p:cNvPr>
@@ -17705,6 +18242,1361 @@
                 <a:defRPr/>
               </a:pPr>
               <a:t>22</a:t>
+            </a:fld>
+            <a:endParaRPr lang="es-ES" noProof="0">
+              <a:solidFill>
+                <a:prstClr val="black">
+                  <a:tint val="75000"/>
+                </a:prstClr>
+              </a:solidFill>
+            </a:endParaRPr>
+          </a:p>
+        </p:txBody>
+      </p:sp>
+    </p:spTree>
+    <p:extLst>
+      <p:ext uri="{BB962C8B-B14F-4D97-AF65-F5344CB8AC3E}">
+        <p14:creationId xmlns:p14="http://schemas.microsoft.com/office/powerpoint/2010/main" val="2210356505"/>
+      </p:ext>
+    </p:extLst>
+  </p:cSld>
+  <p:clrMapOvr>
+    <a:masterClrMapping/>
+  </p:clrMapOvr>
+</p:sld>
+</file>
+
+<file path=ppt/slides/slide23.xml><?xml version="1.0" encoding="utf-8"?>
+<p:sld xmlns:a="http://schemas.openxmlformats.org/drawingml/2006/main" xmlns:r="http://schemas.openxmlformats.org/officeDocument/2006/relationships" xmlns:p="http://schemas.openxmlformats.org/presentationml/2006/main">
+  <p:cSld>
+    <p:spTree>
+      <p:nvGrpSpPr>
+        <p:cNvPr id="1" name=""/>
+        <p:cNvGrpSpPr/>
+        <p:nvPr/>
+      </p:nvGrpSpPr>
+      <p:grpSpPr>
+        <a:xfrm>
+          <a:off x="0" y="0"/>
+          <a:ext cx="0" cy="0"/>
+          <a:chOff x="0" y="0"/>
+          <a:chExt cx="0" cy="0"/>
+        </a:xfrm>
+      </p:grpSpPr>
+      <p:sp>
+        <p:nvSpPr>
+          <p:cNvPr id="71" name="Title 1">
+            <a:extLst>
+              <a:ext uri="{FF2B5EF4-FFF2-40B4-BE49-F238E27FC236}">
+                <a16:creationId xmlns:a16="http://schemas.microsoft.com/office/drawing/2014/main" id="{769E5028-762C-4BBF-8875-CD5D6B9F4677}"/>
+              </a:ext>
+            </a:extLst>
+          </p:cNvPr>
+          <p:cNvSpPr>
+            <a:spLocks noGrp="1"/>
+          </p:cNvSpPr>
+          <p:nvPr>
+            <p:ph type="title"/>
+          </p:nvPr>
+        </p:nvSpPr>
+        <p:spPr>
+          <a:xfrm>
+            <a:off x="838200" y="365125"/>
+            <a:ext cx="10515600" cy="925195"/>
+          </a:xfrm>
+        </p:spPr>
+        <p:txBody>
+          <a:bodyPr/>
+          <a:lstStyle/>
+          <a:p>
+            <a:r>
+              <a:rPr lang="en-US" dirty="0" err="1"/>
+              <a:t>Solución</a:t>
+            </a:r>
+            <a:endParaRPr lang="en-US" dirty="0"/>
+          </a:p>
+        </p:txBody>
+      </p:sp>
+      <mc:AlternateContent xmlns:mc="http://schemas.openxmlformats.org/markup-compatibility/2006">
+        <mc:Choice xmlns:a14="http://schemas.microsoft.com/office/drawing/2010/main" Requires="a14">
+          <p:sp>
+            <p:nvSpPr>
+              <p:cNvPr id="3" name="Marcador de contenido 2">
+                <a:extLst>
+                  <a:ext uri="{FF2B5EF4-FFF2-40B4-BE49-F238E27FC236}">
+                    <a16:creationId xmlns:a16="http://schemas.microsoft.com/office/drawing/2014/main" id="{A765FF4E-F02C-4A95-B89B-25410EB8B4FA}"/>
+                  </a:ext>
+                </a:extLst>
+              </p:cNvPr>
+              <p:cNvSpPr>
+                <a:spLocks noGrp="1"/>
+              </p:cNvSpPr>
+              <p:nvPr>
+                <p:ph sz="half" idx="1"/>
+              </p:nvPr>
+            </p:nvSpPr>
+            <p:spPr>
+              <a:xfrm>
+                <a:off x="838199" y="1209040"/>
+                <a:ext cx="10880035" cy="2521585"/>
+              </a:xfrm>
+            </p:spPr>
+            <p:txBody>
+              <a:bodyPr>
+                <a:normAutofit/>
+              </a:bodyPr>
+              <a:lstStyle/>
+              <a:p>
+                <a:pPr marL="0" indent="0">
+                  <a:buNone/>
+                </a:pPr>
+                <a:r>
+                  <a:rPr lang="es-MX" sz="1400" dirty="0"/>
+                  <a:t>En (a) observamos los nodos originales, estos tienen un número en su interior que representa la oferta y la demanda, los nodos blancos representan los nodos origen, por lo que el número representa una oferta y los nodos grises son nodos destino y estos tienen una demanda que cumplir. Observamos 5 arcos con un número que representa la capacidad de cada arco.</a:t>
+                </a:r>
+              </a:p>
+              <a:p>
+                <a:pPr marL="0" indent="0">
+                  <a:buNone/>
+                </a:pPr>
+                <a:endParaRPr lang="es-MX" sz="1400" dirty="0"/>
+              </a:p>
+              <a:p>
+                <a:pPr marL="0" indent="0">
+                  <a:buNone/>
+                </a:pPr>
+                <a:r>
+                  <a:rPr lang="es-MX" sz="1400" dirty="0"/>
+                  <a:t>En (b) observamos la creación de dos nodos extra, </a:t>
+                </a:r>
+                <a14:m>
+                  <m:oMath xmlns:m="http://schemas.openxmlformats.org/officeDocument/2006/math">
+                    <m:sSup>
+                      <m:sSupPr>
+                        <m:ctrlPr>
+                          <a:rPr lang="es-MX" sz="1400" i="1" smtClean="0">
+                            <a:latin typeface="Cambria Math" panose="02040503050406030204" pitchFamily="18" charset="0"/>
+                          </a:rPr>
+                        </m:ctrlPr>
+                      </m:sSupPr>
+                      <m:e>
+                        <m:r>
+                          <a:rPr lang="es-MX" sz="1400" b="0" i="1" smtClean="0">
+                            <a:latin typeface="Cambria Math" panose="02040503050406030204" pitchFamily="18" charset="0"/>
+                          </a:rPr>
+                          <m:t>𝑠</m:t>
+                        </m:r>
+                      </m:e>
+                      <m:sup>
+                        <m:r>
+                          <a:rPr lang="es-MX" sz="1400" b="0" i="1" smtClean="0">
+                            <a:latin typeface="Cambria Math" panose="02040503050406030204" pitchFamily="18" charset="0"/>
+                          </a:rPr>
+                          <m:t>∗</m:t>
+                        </m:r>
+                      </m:sup>
+                    </m:sSup>
+                  </m:oMath>
+                </a14:m>
+                <a:r>
+                  <a:rPr lang="es-MX" sz="1400" dirty="0"/>
+                  <a:t> y </a:t>
+                </a:r>
+                <a14:m>
+                  <m:oMath xmlns:m="http://schemas.openxmlformats.org/officeDocument/2006/math">
+                    <m:sSup>
+                      <m:sSupPr>
+                        <m:ctrlPr>
+                          <a:rPr lang="es-MX" sz="1400" i="1">
+                            <a:latin typeface="Cambria Math" panose="02040503050406030204" pitchFamily="18" charset="0"/>
+                          </a:rPr>
+                        </m:ctrlPr>
+                      </m:sSupPr>
+                      <m:e>
+                        <m:r>
+                          <a:rPr lang="es-MX" sz="1400" b="0" i="1" smtClean="0">
+                            <a:latin typeface="Cambria Math" panose="02040503050406030204" pitchFamily="18" charset="0"/>
+                          </a:rPr>
+                          <m:t>𝑡</m:t>
+                        </m:r>
+                      </m:e>
+                      <m:sup>
+                        <m:r>
+                          <a:rPr lang="es-MX" sz="1400" i="1">
+                            <a:latin typeface="Cambria Math" panose="02040503050406030204" pitchFamily="18" charset="0"/>
+                          </a:rPr>
+                          <m:t>∗</m:t>
+                        </m:r>
+                      </m:sup>
+                    </m:sSup>
+                  </m:oMath>
+                </a14:m>
+                <a:r>
+                  <a:rPr lang="es-MX" sz="1400" dirty="0"/>
+                  <a:t>, que serán nuestros nuevos nodos origen y destino respectivamente, también se crearon nuevos arcos con capacidad igual a la oferta o demanda del nodo al que se conectan.</a:t>
+                </a:r>
+              </a:p>
+              <a:p>
+                <a:pPr marL="0" indent="0">
+                  <a:buNone/>
+                </a:pPr>
+                <a:endParaRPr lang="es-MX" sz="1400" dirty="0"/>
+              </a:p>
+              <a:p>
+                <a:pPr marL="0" indent="0">
+                  <a:buNone/>
+                </a:pPr>
+                <a:r>
+                  <a:rPr lang="es-MX" sz="1400" dirty="0"/>
+                  <a:t>En (c) observamos la solución de este problema, la solución del problema de flujo máximo es </a:t>
+                </a:r>
+                <a14:m>
+                  <m:oMath xmlns:m="http://schemas.openxmlformats.org/officeDocument/2006/math">
+                    <m:r>
+                      <a:rPr lang="es-MX" sz="1400" b="0" i="1" smtClean="0">
+                        <a:latin typeface="Cambria Math" panose="02040503050406030204" pitchFamily="18" charset="0"/>
+                      </a:rPr>
+                      <m:t>6</m:t>
+                    </m:r>
+                    <m:r>
+                      <a:rPr lang="es-MX" sz="1400" b="0" i="1" smtClean="0">
+                        <a:latin typeface="Cambria Math" panose="02040503050406030204" pitchFamily="18" charset="0"/>
+                      </a:rPr>
+                      <m:t> </m:t>
+                    </m:r>
+                  </m:oMath>
+                </a14:m>
+                <a:r>
+                  <a:rPr lang="es-MX" sz="1400" dirty="0"/>
+                  <a:t>y es igual a la demanda de nuestra red, por lo que también se resolvió el problema de flujo con oferta y demanda.</a:t>
+                </a:r>
+                <a:endParaRPr lang="en-US" sz="1400" dirty="0"/>
+              </a:p>
+            </p:txBody>
+          </p:sp>
+        </mc:Choice>
+        <mc:Fallback>
+          <p:sp>
+            <p:nvSpPr>
+              <p:cNvPr id="3" name="Marcador de contenido 2">
+                <a:extLst>
+                  <a:ext uri="{FF2B5EF4-FFF2-40B4-BE49-F238E27FC236}">
+                    <a16:creationId xmlns:a16="http://schemas.microsoft.com/office/drawing/2014/main" id="{A765FF4E-F02C-4A95-B89B-25410EB8B4FA}"/>
+                  </a:ext>
+                </a:extLst>
+              </p:cNvPr>
+              <p:cNvSpPr>
+                <a:spLocks noGrp="1" noRot="1" noChangeAspect="1" noMove="1" noResize="1" noEditPoints="1" noAdjustHandles="1" noChangeArrowheads="1" noChangeShapeType="1" noTextEdit="1"/>
+              </p:cNvSpPr>
+              <p:nvPr>
+                <p:ph sz="half" idx="1"/>
+              </p:nvPr>
+            </p:nvSpPr>
+            <p:spPr>
+              <a:xfrm>
+                <a:off x="838199" y="1209040"/>
+                <a:ext cx="10880035" cy="2521585"/>
+              </a:xfrm>
+              <a:blipFill>
+                <a:blip r:embed="rId2"/>
+                <a:stretch>
+                  <a:fillRect l="-112" t="-1208"/>
+                </a:stretch>
+              </a:blipFill>
+            </p:spPr>
+            <p:txBody>
+              <a:bodyPr/>
+              <a:lstStyle/>
+              <a:p>
+                <a:r>
+                  <a:rPr lang="en-US">
+                    <a:noFill/>
+                  </a:rPr>
+                  <a:t> </a:t>
+                </a:r>
+              </a:p>
+            </p:txBody>
+          </p:sp>
+        </mc:Fallback>
+      </mc:AlternateContent>
+      <p:sp>
+        <p:nvSpPr>
+          <p:cNvPr id="7" name="Marcador de número de diapositiva 6">
+            <a:extLst>
+              <a:ext uri="{FF2B5EF4-FFF2-40B4-BE49-F238E27FC236}">
+                <a16:creationId xmlns:a16="http://schemas.microsoft.com/office/drawing/2014/main" id="{2B13A0AB-B747-4FB1-BA72-F81FE9798673}"/>
+              </a:ext>
+            </a:extLst>
+          </p:cNvPr>
+          <p:cNvSpPr>
+            <a:spLocks noGrp="1"/>
+          </p:cNvSpPr>
+          <p:nvPr>
+            <p:ph type="sldNum" sz="quarter" idx="12"/>
+          </p:nvPr>
+        </p:nvSpPr>
+        <p:spPr>
+          <a:xfrm>
+            <a:off x="8610600" y="6356350"/>
+            <a:ext cx="2743200" cy="365125"/>
+          </a:xfrm>
+        </p:spPr>
+        <p:txBody>
+          <a:bodyPr anchor="ctr">
+            <a:normAutofit/>
+          </a:bodyPr>
+          <a:lstStyle/>
+          <a:p>
+            <a:pPr rtl="0">
+              <a:spcAft>
+                <a:spcPts val="600"/>
+              </a:spcAft>
+              <a:defRPr/>
+            </a:pPr>
+            <a:fld id="{D76B855D-E9CC-4FF8-AD85-6CDC7B89A0DE}" type="slidenum">
+              <a:rPr lang="es-ES" noProof="0" smtClean="0">
+                <a:solidFill>
+                  <a:prstClr val="black">
+                    <a:tint val="75000"/>
+                  </a:prstClr>
+                </a:solidFill>
+              </a:rPr>
+              <a:pPr rtl="0">
+                <a:spcAft>
+                  <a:spcPts val="600"/>
+                </a:spcAft>
+                <a:defRPr/>
+              </a:pPr>
+              <a:t>23</a:t>
+            </a:fld>
+            <a:endParaRPr lang="es-ES" noProof="0">
+              <a:solidFill>
+                <a:prstClr val="black">
+                  <a:tint val="75000"/>
+                </a:prstClr>
+              </a:solidFill>
+            </a:endParaRPr>
+          </a:p>
+        </p:txBody>
+      </p:sp>
+      <p:pic>
+        <p:nvPicPr>
+          <p:cNvPr id="3074" name="Picture 2" descr="Flujo">
+            <a:extLst>
+              <a:ext uri="{FF2B5EF4-FFF2-40B4-BE49-F238E27FC236}">
+                <a16:creationId xmlns:a16="http://schemas.microsoft.com/office/drawing/2014/main" id="{39787714-7575-4EAA-B677-D94A93E3E834}"/>
+              </a:ext>
+            </a:extLst>
+          </p:cNvPr>
+          <p:cNvPicPr>
+            <a:picLocks noChangeAspect="1" noChangeArrowheads="1"/>
+          </p:cNvPicPr>
+          <p:nvPr/>
+        </p:nvPicPr>
+        <p:blipFill>
+          <a:blip r:embed="rId3">
+            <a:extLst>
+              <a:ext uri="{28A0092B-C50C-407E-A947-70E740481C1C}">
+                <a14:useLocalDpi xmlns:a14="http://schemas.microsoft.com/office/drawing/2010/main" val="0"/>
+              </a:ext>
+            </a:extLst>
+          </a:blip>
+          <a:srcRect/>
+          <a:stretch>
+            <a:fillRect/>
+          </a:stretch>
+        </p:blipFill>
+        <p:spPr bwMode="auto">
+          <a:xfrm>
+            <a:off x="2106266" y="3916045"/>
+            <a:ext cx="8343900" cy="2762250"/>
+          </a:xfrm>
+          <a:prstGeom prst="rect">
+            <a:avLst/>
+          </a:prstGeom>
+          <a:noFill/>
+          <a:extLst>
+            <a:ext uri="{909E8E84-426E-40DD-AFC4-6F175D3DCCD1}">
+              <a14:hiddenFill xmlns:a14="http://schemas.microsoft.com/office/drawing/2010/main">
+                <a:solidFill>
+                  <a:srgbClr val="FFFFFF"/>
+                </a:solidFill>
+              </a14:hiddenFill>
+            </a:ext>
+          </a:extLst>
+        </p:spPr>
+      </p:pic>
+    </p:spTree>
+    <p:extLst>
+      <p:ext uri="{BB962C8B-B14F-4D97-AF65-F5344CB8AC3E}">
+        <p14:creationId xmlns:p14="http://schemas.microsoft.com/office/powerpoint/2010/main" val="3830066744"/>
+      </p:ext>
+    </p:extLst>
+  </p:cSld>
+  <p:clrMapOvr>
+    <a:masterClrMapping/>
+  </p:clrMapOvr>
+</p:sld>
+</file>
+
+<file path=ppt/slides/slide24.xml><?xml version="1.0" encoding="utf-8"?>
+<p:sld xmlns:a="http://schemas.openxmlformats.org/drawingml/2006/main" xmlns:r="http://schemas.openxmlformats.org/officeDocument/2006/relationships" xmlns:p="http://schemas.openxmlformats.org/presentationml/2006/main">
+  <p:cSld>
+    <p:spTree>
+      <p:nvGrpSpPr>
+        <p:cNvPr id="1" name=""/>
+        <p:cNvGrpSpPr/>
+        <p:nvPr/>
+      </p:nvGrpSpPr>
+      <p:grpSpPr>
+        <a:xfrm>
+          <a:off x="0" y="0"/>
+          <a:ext cx="0" cy="0"/>
+          <a:chOff x="0" y="0"/>
+          <a:chExt cx="0" cy="0"/>
+        </a:xfrm>
+      </p:grpSpPr>
+      <p:sp>
+        <p:nvSpPr>
+          <p:cNvPr id="71" name="Title 1">
+            <a:extLst>
+              <a:ext uri="{FF2B5EF4-FFF2-40B4-BE49-F238E27FC236}">
+                <a16:creationId xmlns:a16="http://schemas.microsoft.com/office/drawing/2014/main" id="{FB32599D-D1DA-4C81-AF20-285979709633}"/>
+              </a:ext>
+            </a:extLst>
+          </p:cNvPr>
+          <p:cNvSpPr>
+            <a:spLocks noGrp="1"/>
+          </p:cNvSpPr>
+          <p:nvPr>
+            <p:ph type="title"/>
+          </p:nvPr>
+        </p:nvSpPr>
+        <p:spPr>
+          <a:xfrm>
+            <a:off x="838200" y="365125"/>
+            <a:ext cx="10515600" cy="1325563"/>
+          </a:xfrm>
+        </p:spPr>
+        <p:txBody>
+          <a:bodyPr anchor="ctr">
+            <a:normAutofit/>
+          </a:bodyPr>
+          <a:lstStyle/>
+          <a:p>
+            <a:r>
+              <a:rPr lang="en-US" dirty="0" err="1"/>
+              <a:t>Gráfica</a:t>
+            </a:r>
+            <a:r>
+              <a:rPr lang="en-US" dirty="0"/>
+              <a:t> de las </a:t>
+            </a:r>
+            <a:r>
+              <a:rPr lang="en-US" dirty="0" err="1"/>
+              <a:t>rutas</a:t>
+            </a:r>
+            <a:endParaRPr lang="en-US" dirty="0"/>
+          </a:p>
+        </p:txBody>
+      </p:sp>
+      <p:pic>
+        <p:nvPicPr>
+          <p:cNvPr id="4098" name="Picture 2" descr="FlujoMax">
+            <a:extLst>
+              <a:ext uri="{FF2B5EF4-FFF2-40B4-BE49-F238E27FC236}">
+                <a16:creationId xmlns:a16="http://schemas.microsoft.com/office/drawing/2014/main" id="{A8641CF8-7980-4494-A459-8DBD02680DFF}"/>
+              </a:ext>
+            </a:extLst>
+          </p:cNvPr>
+          <p:cNvPicPr>
+            <a:picLocks noChangeAspect="1" noChangeArrowheads="1"/>
+          </p:cNvPicPr>
+          <p:nvPr/>
+        </p:nvPicPr>
+        <p:blipFill>
+          <a:blip r:embed="rId2">
+            <a:extLst>
+              <a:ext uri="{28A0092B-C50C-407E-A947-70E740481C1C}">
+                <a14:useLocalDpi xmlns:a14="http://schemas.microsoft.com/office/drawing/2010/main" val="0"/>
+              </a:ext>
+            </a:extLst>
+          </a:blip>
+          <a:stretch>
+            <a:fillRect/>
+          </a:stretch>
+        </p:blipFill>
+        <p:spPr bwMode="auto">
+          <a:xfrm>
+            <a:off x="6172200" y="2258981"/>
+            <a:ext cx="5181600" cy="3484626"/>
+          </a:xfrm>
+          <a:prstGeom prst="rect">
+            <a:avLst/>
+          </a:prstGeom>
+          <a:solidFill>
+            <a:srgbClr val="FFFFFF"/>
+          </a:solidFill>
+          <a:extLst>
+            <a:ext uri="{909E8E84-426E-40DD-AFC4-6F175D3DCCD1}">
+              <a14:hiddenFill xmlns:a14="http://schemas.microsoft.com/office/drawing/2010/main">
+                <a:solidFill>
+                  <a:srgbClr val="FFFFFF"/>
+                </a:solidFill>
+              </a14:hiddenFill>
+            </a:ext>
+          </a:extLst>
+        </p:spPr>
+      </p:pic>
+      <p:sp>
+        <p:nvSpPr>
+          <p:cNvPr id="137" name="Date Placeholder 4">
+            <a:extLst>
+              <a:ext uri="{FF2B5EF4-FFF2-40B4-BE49-F238E27FC236}">
+                <a16:creationId xmlns:a16="http://schemas.microsoft.com/office/drawing/2014/main" id="{0629F44E-CC29-49E5-BDFA-F8024976B498}"/>
+              </a:ext>
+            </a:extLst>
+          </p:cNvPr>
+          <p:cNvSpPr>
+            <a:spLocks noGrp="1"/>
+          </p:cNvSpPr>
+          <p:nvPr>
+            <p:ph type="dt" sz="half" idx="10"/>
+          </p:nvPr>
+        </p:nvSpPr>
+        <p:spPr>
+          <a:xfrm>
+            <a:off x="838200" y="6356350"/>
+            <a:ext cx="2743200" cy="365125"/>
+          </a:xfrm>
+        </p:spPr>
+        <p:txBody>
+          <a:bodyPr/>
+          <a:lstStyle/>
+          <a:p>
+            <a:pPr rtl="0">
+              <a:spcAft>
+                <a:spcPts val="600"/>
+              </a:spcAft>
+              <a:defRPr/>
+            </a:pPr>
+            <a:r>
+              <a:rPr lang="es-ES" noProof="0">
+                <a:solidFill>
+                  <a:prstClr val="black">
+                    <a:tint val="75000"/>
+                  </a:prstClr>
+                </a:solidFill>
+              </a:rPr>
+              <a:t>3/9/20XX</a:t>
+            </a:r>
+          </a:p>
+        </p:txBody>
+      </p:sp>
+      <p:sp>
+        <p:nvSpPr>
+          <p:cNvPr id="139" name="Footer Placeholder 5">
+            <a:extLst>
+              <a:ext uri="{FF2B5EF4-FFF2-40B4-BE49-F238E27FC236}">
+                <a16:creationId xmlns:a16="http://schemas.microsoft.com/office/drawing/2014/main" id="{54F36DE4-397E-4DFC-B053-E65C3C06B591}"/>
+              </a:ext>
+            </a:extLst>
+          </p:cNvPr>
+          <p:cNvSpPr>
+            <a:spLocks noGrp="1"/>
+          </p:cNvSpPr>
+          <p:nvPr>
+            <p:ph type="ftr" sz="quarter" idx="11"/>
+          </p:nvPr>
+        </p:nvSpPr>
+        <p:spPr>
+          <a:xfrm>
+            <a:off x="4038600" y="6356350"/>
+            <a:ext cx="4114800" cy="365125"/>
+          </a:xfrm>
+        </p:spPr>
+        <p:txBody>
+          <a:bodyPr/>
+          <a:lstStyle/>
+          <a:p>
+            <a:pPr rtl="0">
+              <a:spcAft>
+                <a:spcPts val="600"/>
+              </a:spcAft>
+              <a:defRPr/>
+            </a:pPr>
+            <a:r>
+              <a:rPr lang="es-ES" noProof="0">
+                <a:solidFill>
+                  <a:prstClr val="black">
+                    <a:tint val="75000"/>
+                  </a:prstClr>
+                </a:solidFill>
+              </a:rPr>
+              <a:t>Título de la presentación</a:t>
+            </a:r>
+          </a:p>
+        </p:txBody>
+      </p:sp>
+      <p:sp>
+        <p:nvSpPr>
+          <p:cNvPr id="7" name="Marcador de número de diapositiva 6">
+            <a:extLst>
+              <a:ext uri="{FF2B5EF4-FFF2-40B4-BE49-F238E27FC236}">
+                <a16:creationId xmlns:a16="http://schemas.microsoft.com/office/drawing/2014/main" id="{01324B33-FD84-4510-918A-37BDD691F73E}"/>
+              </a:ext>
+            </a:extLst>
+          </p:cNvPr>
+          <p:cNvSpPr>
+            <a:spLocks noGrp="1"/>
+          </p:cNvSpPr>
+          <p:nvPr>
+            <p:ph type="sldNum" sz="quarter" idx="12"/>
+          </p:nvPr>
+        </p:nvSpPr>
+        <p:spPr>
+          <a:xfrm>
+            <a:off x="8610600" y="6356350"/>
+            <a:ext cx="2743200" cy="365125"/>
+          </a:xfrm>
+        </p:spPr>
+        <p:txBody>
+          <a:bodyPr anchor="ctr">
+            <a:normAutofit/>
+          </a:bodyPr>
+          <a:lstStyle/>
+          <a:p>
+            <a:pPr rtl="0">
+              <a:spcAft>
+                <a:spcPts val="600"/>
+              </a:spcAft>
+              <a:defRPr/>
+            </a:pPr>
+            <a:fld id="{D76B855D-E9CC-4FF8-AD85-6CDC7B89A0DE}" type="slidenum">
+              <a:rPr lang="es-ES" noProof="0" smtClean="0">
+                <a:solidFill>
+                  <a:prstClr val="black">
+                    <a:tint val="75000"/>
+                  </a:prstClr>
+                </a:solidFill>
+              </a:rPr>
+              <a:pPr rtl="0">
+                <a:spcAft>
+                  <a:spcPts val="600"/>
+                </a:spcAft>
+                <a:defRPr/>
+              </a:pPr>
+              <a:t>24</a:t>
+            </a:fld>
+            <a:endParaRPr lang="es-ES" noProof="0">
+              <a:solidFill>
+                <a:prstClr val="black">
+                  <a:tint val="75000"/>
+                </a:prstClr>
+              </a:solidFill>
+            </a:endParaRPr>
+          </a:p>
+        </p:txBody>
+      </p:sp>
+      <p:pic>
+        <p:nvPicPr>
+          <p:cNvPr id="4102" name="Picture 6" descr="Inicial">
+            <a:extLst>
+              <a:ext uri="{FF2B5EF4-FFF2-40B4-BE49-F238E27FC236}">
+                <a16:creationId xmlns:a16="http://schemas.microsoft.com/office/drawing/2014/main" id="{CFDCAB3F-F315-4CB6-9869-906DBA4834F1}"/>
+              </a:ext>
+            </a:extLst>
+          </p:cNvPr>
+          <p:cNvPicPr>
+            <a:picLocks noGrp="1" noChangeAspect="1" noChangeArrowheads="1"/>
+          </p:cNvPicPr>
+          <p:nvPr>
+            <p:ph sz="half" idx="1"/>
+          </p:nvPr>
+        </p:nvPicPr>
+        <p:blipFill>
+          <a:blip r:embed="rId3">
+            <a:extLst>
+              <a:ext uri="{28A0092B-C50C-407E-A947-70E740481C1C}">
+                <a14:useLocalDpi xmlns:a14="http://schemas.microsoft.com/office/drawing/2010/main" val="0"/>
+              </a:ext>
+            </a:extLst>
+          </a:blip>
+          <a:srcRect/>
+          <a:stretch>
+            <a:fillRect/>
+          </a:stretch>
+        </p:blipFill>
+        <p:spPr bwMode="auto">
+          <a:xfrm>
+            <a:off x="838200" y="3141377"/>
+            <a:ext cx="5181600" cy="1719834"/>
+          </a:xfrm>
+          <a:prstGeom prst="rect">
+            <a:avLst/>
+          </a:prstGeom>
+          <a:noFill/>
+          <a:extLst>
+            <a:ext uri="{909E8E84-426E-40DD-AFC4-6F175D3DCCD1}">
+              <a14:hiddenFill xmlns:a14="http://schemas.microsoft.com/office/drawing/2010/main">
+                <a:solidFill>
+                  <a:srgbClr val="FFFFFF"/>
+                </a:solidFill>
+              </a14:hiddenFill>
+            </a:ext>
+          </a:extLst>
+        </p:spPr>
+      </p:pic>
+      <p:sp>
+        <p:nvSpPr>
+          <p:cNvPr id="2" name="CuadroTexto 1">
+            <a:extLst>
+              <a:ext uri="{FF2B5EF4-FFF2-40B4-BE49-F238E27FC236}">
+                <a16:creationId xmlns:a16="http://schemas.microsoft.com/office/drawing/2014/main" id="{23548038-6DA7-4FF8-B9D1-ABB49834DF44}"/>
+              </a:ext>
+            </a:extLst>
+          </p:cNvPr>
+          <p:cNvSpPr txBox="1"/>
+          <p:nvPr/>
+        </p:nvSpPr>
+        <p:spPr>
+          <a:xfrm>
+            <a:off x="626165" y="1530626"/>
+            <a:ext cx="5181600" cy="369332"/>
+          </a:xfrm>
+          <a:prstGeom prst="rect">
+            <a:avLst/>
+          </a:prstGeom>
+          <a:noFill/>
+        </p:spPr>
+        <p:txBody>
+          <a:bodyPr wrap="square" rtlCol="0">
+            <a:spAutoFit/>
+          </a:bodyPr>
+          <a:lstStyle/>
+          <a:p>
+            <a:r>
+              <a:rPr lang="en-US" dirty="0" err="1"/>
+              <a:t>Ejemplo</a:t>
+            </a:r>
+            <a:r>
+              <a:rPr lang="en-US" dirty="0"/>
+              <a:t> 1</a:t>
+            </a:r>
+          </a:p>
+        </p:txBody>
+      </p:sp>
+      <p:sp>
+        <p:nvSpPr>
+          <p:cNvPr id="13" name="CuadroTexto 12">
+            <a:extLst>
+              <a:ext uri="{FF2B5EF4-FFF2-40B4-BE49-F238E27FC236}">
+                <a16:creationId xmlns:a16="http://schemas.microsoft.com/office/drawing/2014/main" id="{0E751EFF-F12E-4F91-BE02-E71121386D32}"/>
+              </a:ext>
+            </a:extLst>
+          </p:cNvPr>
+          <p:cNvSpPr txBox="1"/>
+          <p:nvPr/>
+        </p:nvSpPr>
+        <p:spPr>
+          <a:xfrm>
+            <a:off x="6172200" y="1530626"/>
+            <a:ext cx="5181600" cy="369332"/>
+          </a:xfrm>
+          <a:prstGeom prst="rect">
+            <a:avLst/>
+          </a:prstGeom>
+          <a:noFill/>
+        </p:spPr>
+        <p:txBody>
+          <a:bodyPr wrap="square" rtlCol="0">
+            <a:spAutoFit/>
+          </a:bodyPr>
+          <a:lstStyle/>
+          <a:p>
+            <a:r>
+              <a:rPr lang="en-US" dirty="0" err="1"/>
+              <a:t>Ejemplo</a:t>
+            </a:r>
+            <a:r>
+              <a:rPr lang="en-US" dirty="0"/>
+              <a:t> 2</a:t>
+            </a:r>
+          </a:p>
+        </p:txBody>
+      </p:sp>
+    </p:spTree>
+    <p:extLst>
+      <p:ext uri="{BB962C8B-B14F-4D97-AF65-F5344CB8AC3E}">
+        <p14:creationId xmlns:p14="http://schemas.microsoft.com/office/powerpoint/2010/main" val="919937992"/>
+      </p:ext>
+    </p:extLst>
+  </p:cSld>
+  <p:clrMapOvr>
+    <a:masterClrMapping/>
+  </p:clrMapOvr>
+</p:sld>
+</file>
+
+<file path=ppt/slides/slide25.xml><?xml version="1.0" encoding="utf-8"?>
+<p:sld xmlns:a="http://schemas.openxmlformats.org/drawingml/2006/main" xmlns:r="http://schemas.openxmlformats.org/officeDocument/2006/relationships" xmlns:p="http://schemas.openxmlformats.org/presentationml/2006/main">
+  <p:cSld>
+    <p:spTree>
+      <p:nvGrpSpPr>
+        <p:cNvPr id="1" name=""/>
+        <p:cNvGrpSpPr/>
+        <p:nvPr/>
+      </p:nvGrpSpPr>
+      <p:grpSpPr>
+        <a:xfrm>
+          <a:off x="0" y="0"/>
+          <a:ext cx="0" cy="0"/>
+          <a:chOff x="0" y="0"/>
+          <a:chExt cx="0" cy="0"/>
+        </a:xfrm>
+      </p:grpSpPr>
+      <p:sp>
+        <p:nvSpPr>
+          <p:cNvPr id="2" name="Título 1">
+            <a:extLst>
+              <a:ext uri="{FF2B5EF4-FFF2-40B4-BE49-F238E27FC236}">
+                <a16:creationId xmlns:a16="http://schemas.microsoft.com/office/drawing/2014/main" id="{15E79C85-C865-4DA7-8EF1-81F045D4796A}"/>
+              </a:ext>
+            </a:extLst>
+          </p:cNvPr>
+          <p:cNvSpPr>
+            <a:spLocks noGrp="1"/>
+          </p:cNvSpPr>
+          <p:nvPr>
+            <p:ph type="title"/>
+          </p:nvPr>
+        </p:nvSpPr>
+        <p:spPr>
+          <a:xfrm>
+            <a:off x="838200" y="365125"/>
+            <a:ext cx="10515600" cy="1325563"/>
+          </a:xfrm>
+        </p:spPr>
+        <p:txBody>
+          <a:bodyPr anchor="ctr">
+            <a:normAutofit/>
+          </a:bodyPr>
+          <a:lstStyle/>
+          <a:p>
+            <a:r>
+              <a:rPr lang="en-US" dirty="0" err="1"/>
+              <a:t>Resultados</a:t>
+            </a:r>
+            <a:endParaRPr lang="en-US" dirty="0"/>
+          </a:p>
+        </p:txBody>
+      </p:sp>
+      <p:sp>
+        <p:nvSpPr>
+          <p:cNvPr id="3" name="Marcador de contenido 2">
+            <a:extLst>
+              <a:ext uri="{FF2B5EF4-FFF2-40B4-BE49-F238E27FC236}">
+                <a16:creationId xmlns:a16="http://schemas.microsoft.com/office/drawing/2014/main" id="{F43B265C-25D0-475B-8B2A-B45C613BAB76}"/>
+              </a:ext>
+            </a:extLst>
+          </p:cNvPr>
+          <p:cNvSpPr>
+            <a:spLocks noGrp="1"/>
+          </p:cNvSpPr>
+          <p:nvPr>
+            <p:ph sz="half" idx="1"/>
+          </p:nvPr>
+        </p:nvSpPr>
+        <p:spPr>
+          <a:xfrm>
+            <a:off x="838200" y="1509204"/>
+            <a:ext cx="10515600" cy="4667759"/>
+          </a:xfrm>
+        </p:spPr>
+        <p:txBody>
+          <a:bodyPr>
+            <a:normAutofit/>
+          </a:bodyPr>
+          <a:lstStyle/>
+          <a:p>
+            <a:r>
+              <a:rPr lang="en-US" dirty="0"/>
+              <a:t>Se </a:t>
+            </a:r>
+            <a:r>
+              <a:rPr lang="en-US" dirty="0" err="1"/>
+              <a:t>realizó</a:t>
+            </a:r>
+            <a:r>
+              <a:rPr lang="en-US" dirty="0"/>
+              <a:t> el </a:t>
+            </a:r>
+            <a:r>
+              <a:rPr lang="en-US" dirty="0" err="1"/>
+              <a:t>ejercicio</a:t>
+            </a:r>
+            <a:r>
+              <a:rPr lang="en-US" dirty="0"/>
+              <a:t> con 3 </a:t>
+            </a:r>
+            <a:r>
+              <a:rPr lang="en-US" dirty="0" err="1"/>
+              <a:t>distintos</a:t>
+            </a:r>
+            <a:r>
+              <a:rPr lang="en-US" dirty="0"/>
+              <a:t> </a:t>
+            </a:r>
+            <a:r>
+              <a:rPr lang="en-US" dirty="0" err="1"/>
+              <a:t>paquetes</a:t>
+            </a:r>
+            <a:r>
+              <a:rPr lang="en-US" dirty="0"/>
+              <a:t> (</a:t>
+            </a:r>
+            <a:r>
+              <a:rPr lang="es-MX" i="1" dirty="0" err="1"/>
+              <a:t>ffmaxflow</a:t>
+            </a:r>
+            <a:r>
+              <a:rPr lang="es-MX" i="1" dirty="0"/>
+              <a:t>, </a:t>
+            </a:r>
+            <a:r>
+              <a:rPr lang="es-MX" i="1" dirty="0" err="1"/>
+              <a:t>ffmaxc</a:t>
+            </a:r>
+            <a:r>
+              <a:rPr lang="es-MX" i="1" dirty="0"/>
+              <a:t> y </a:t>
+            </a:r>
+            <a:r>
+              <a:rPr lang="es-MX" i="1" dirty="0" err="1"/>
+              <a:t>networkx</a:t>
+            </a:r>
+            <a:r>
+              <a:rPr lang="es-MX" dirty="0"/>
+              <a:t>) y se comparó el tiempo de ejecución de cado uno de ellos.</a:t>
+            </a:r>
+            <a:endParaRPr lang="en-US" dirty="0"/>
+          </a:p>
+        </p:txBody>
+      </p:sp>
+      <p:sp>
+        <p:nvSpPr>
+          <p:cNvPr id="7" name="Marcador de número de diapositiva 6">
+            <a:extLst>
+              <a:ext uri="{FF2B5EF4-FFF2-40B4-BE49-F238E27FC236}">
+                <a16:creationId xmlns:a16="http://schemas.microsoft.com/office/drawing/2014/main" id="{9065B48F-F636-4381-AB7F-F9C6D8562E83}"/>
+              </a:ext>
+            </a:extLst>
+          </p:cNvPr>
+          <p:cNvSpPr>
+            <a:spLocks noGrp="1"/>
+          </p:cNvSpPr>
+          <p:nvPr>
+            <p:ph type="sldNum" sz="quarter" idx="12"/>
+          </p:nvPr>
+        </p:nvSpPr>
+        <p:spPr>
+          <a:xfrm>
+            <a:off x="8610600" y="6356350"/>
+            <a:ext cx="2743200" cy="365125"/>
+          </a:xfrm>
+        </p:spPr>
+        <p:txBody>
+          <a:bodyPr anchor="ctr">
+            <a:normAutofit/>
+          </a:bodyPr>
+          <a:lstStyle/>
+          <a:p>
+            <a:pPr rtl="0">
+              <a:spcAft>
+                <a:spcPts val="600"/>
+              </a:spcAft>
+              <a:defRPr/>
+            </a:pPr>
+            <a:fld id="{D76B855D-E9CC-4FF8-AD85-6CDC7B89A0DE}" type="slidenum">
+              <a:rPr lang="es-ES" noProof="0" smtClean="0">
+                <a:solidFill>
+                  <a:prstClr val="black">
+                    <a:tint val="75000"/>
+                  </a:prstClr>
+                </a:solidFill>
+              </a:rPr>
+              <a:pPr rtl="0">
+                <a:spcAft>
+                  <a:spcPts val="600"/>
+                </a:spcAft>
+                <a:defRPr/>
+              </a:pPr>
+              <a:t>25</a:t>
+            </a:fld>
+            <a:endParaRPr lang="es-ES" noProof="0">
+              <a:solidFill>
+                <a:prstClr val="black">
+                  <a:tint val="75000"/>
+                </a:prstClr>
+              </a:solidFill>
+            </a:endParaRPr>
+          </a:p>
+        </p:txBody>
+      </p:sp>
+      <p:graphicFrame>
+        <p:nvGraphicFramePr>
+          <p:cNvPr id="6" name="Tabla 5">
+            <a:extLst>
+              <a:ext uri="{FF2B5EF4-FFF2-40B4-BE49-F238E27FC236}">
+                <a16:creationId xmlns:a16="http://schemas.microsoft.com/office/drawing/2014/main" id="{D8AC42BC-5F8C-4880-8A27-0CADCD2E2749}"/>
+              </a:ext>
+            </a:extLst>
+          </p:cNvPr>
+          <p:cNvGraphicFramePr>
+            <a:graphicFrameLocks noGrp="1"/>
+          </p:cNvGraphicFramePr>
+          <p:nvPr>
+            <p:extLst>
+              <p:ext uri="{D42A27DB-BD31-4B8C-83A1-F6EECF244321}">
+                <p14:modId xmlns:p14="http://schemas.microsoft.com/office/powerpoint/2010/main" val="3119479839"/>
+              </p:ext>
+            </p:extLst>
+          </p:nvPr>
+        </p:nvGraphicFramePr>
+        <p:xfrm>
+          <a:off x="3541736" y="3429000"/>
+          <a:ext cx="5108527" cy="1478280"/>
+        </p:xfrm>
+        <a:graphic>
+          <a:graphicData uri="http://schemas.openxmlformats.org/drawingml/2006/table">
+            <a:tbl>
+              <a:tblPr firstRow="1" bandRow="1">
+                <a:tableStyleId>{21E4AEA4-8DFA-4A89-87EB-49C32662AFE0}</a:tableStyleId>
+              </a:tblPr>
+              <a:tblGrid>
+                <a:gridCol w="1217227">
+                  <a:extLst>
+                    <a:ext uri="{9D8B030D-6E8A-4147-A177-3AD203B41FA5}">
+                      <a16:colId xmlns:a16="http://schemas.microsoft.com/office/drawing/2014/main" val="1629945468"/>
+                    </a:ext>
+                  </a:extLst>
+                </a:gridCol>
+                <a:gridCol w="1375053">
+                  <a:extLst>
+                    <a:ext uri="{9D8B030D-6E8A-4147-A177-3AD203B41FA5}">
+                      <a16:colId xmlns:a16="http://schemas.microsoft.com/office/drawing/2014/main" val="1152541639"/>
+                    </a:ext>
+                  </a:extLst>
+                </a:gridCol>
+                <a:gridCol w="2516247">
+                  <a:extLst>
+                    <a:ext uri="{9D8B030D-6E8A-4147-A177-3AD203B41FA5}">
+                      <a16:colId xmlns:a16="http://schemas.microsoft.com/office/drawing/2014/main" val="1414973209"/>
+                    </a:ext>
+                  </a:extLst>
+                </a:gridCol>
+              </a:tblGrid>
+              <a:tr h="0">
+                <a:tc>
+                  <a:txBody>
+                    <a:bodyPr/>
+                    <a:lstStyle/>
+                    <a:p>
+                      <a:r>
+                        <a:rPr lang="en-US" dirty="0" err="1"/>
+                        <a:t>Método</a:t>
+                      </a:r>
+                      <a:endParaRPr lang="en-US" dirty="0"/>
+                    </a:p>
+                  </a:txBody>
+                  <a:tcPr/>
+                </a:tc>
+                <a:tc>
+                  <a:txBody>
+                    <a:bodyPr/>
+                    <a:lstStyle/>
+                    <a:p>
+                      <a:r>
+                        <a:rPr lang="en-US" dirty="0" err="1"/>
+                        <a:t>Resultado</a:t>
+                      </a:r>
+                      <a:endParaRPr lang="en-US" dirty="0"/>
+                    </a:p>
+                  </a:txBody>
+                  <a:tcPr/>
+                </a:tc>
+                <a:tc>
+                  <a:txBody>
+                    <a:bodyPr/>
+                    <a:lstStyle/>
+                    <a:p>
+                      <a:r>
+                        <a:rPr lang="en-US" dirty="0" err="1"/>
+                        <a:t>Tiempo</a:t>
+                      </a:r>
+                      <a:r>
+                        <a:rPr lang="en-US" dirty="0"/>
+                        <a:t> de </a:t>
+                      </a:r>
+                      <a:r>
+                        <a:rPr lang="en-US" dirty="0" err="1"/>
+                        <a:t>ejecución</a:t>
+                      </a:r>
+                      <a:endParaRPr lang="en-US" dirty="0"/>
+                    </a:p>
+                  </a:txBody>
+                  <a:tcPr/>
+                </a:tc>
+                <a:extLst>
+                  <a:ext uri="{0D108BD9-81ED-4DB2-BD59-A6C34878D82A}">
+                    <a16:rowId xmlns:a16="http://schemas.microsoft.com/office/drawing/2014/main" val="416732907"/>
+                  </a:ext>
+                </a:extLst>
+              </a:tr>
+              <a:tr h="370840">
+                <a:tc>
+                  <a:txBody>
+                    <a:bodyPr/>
+                    <a:lstStyle/>
+                    <a:p>
+                      <a:r>
+                        <a:rPr lang="es-MX" sz="1800" b="0" i="0" kern="1200" dirty="0" err="1">
+                          <a:solidFill>
+                            <a:schemeClr val="dk1"/>
+                          </a:solidFill>
+                          <a:effectLst/>
+                          <a:latin typeface="+mn-lt"/>
+                          <a:ea typeface="+mn-ea"/>
+                          <a:cs typeface="+mn-cs"/>
+                        </a:rPr>
+                        <a:t>ffmaxflow</a:t>
+                      </a:r>
+                      <a:endParaRPr lang="en-US" dirty="0"/>
+                    </a:p>
+                  </a:txBody>
+                  <a:tcPr/>
+                </a:tc>
+                <a:tc>
+                  <a:txBody>
+                    <a:bodyPr/>
+                    <a:lstStyle/>
+                    <a:p>
+                      <a:r>
+                        <a:rPr lang="en-US" dirty="0"/>
+                        <a:t>6</a:t>
+                      </a:r>
+                    </a:p>
+                  </a:txBody>
+                  <a:tcPr/>
+                </a:tc>
+                <a:tc>
+                  <a:txBody>
+                    <a:bodyPr/>
+                    <a:lstStyle/>
+                    <a:p>
+                      <a:r>
+                        <a:rPr lang="es-MX" dirty="0"/>
+                        <a:t>8.86284</a:t>
+                      </a:r>
+                      <a:r>
+                        <a:rPr lang="en-US" dirty="0"/>
+                        <a:t> s</a:t>
+                      </a:r>
+                    </a:p>
+                  </a:txBody>
+                  <a:tcPr/>
+                </a:tc>
+                <a:extLst>
+                  <a:ext uri="{0D108BD9-81ED-4DB2-BD59-A6C34878D82A}">
+                    <a16:rowId xmlns:a16="http://schemas.microsoft.com/office/drawing/2014/main" val="3856107920"/>
+                  </a:ext>
+                </a:extLst>
+              </a:tr>
+              <a:tr h="370840">
+                <a:tc>
+                  <a:txBody>
+                    <a:bodyPr/>
+                    <a:lstStyle/>
+                    <a:p>
+                      <a:r>
+                        <a:rPr lang="es-MX" sz="1800" b="0" i="0" kern="1200" dirty="0" err="1">
+                          <a:solidFill>
+                            <a:schemeClr val="dk1"/>
+                          </a:solidFill>
+                          <a:effectLst/>
+                          <a:latin typeface="+mn-lt"/>
+                          <a:ea typeface="+mn-ea"/>
+                          <a:cs typeface="+mn-cs"/>
+                        </a:rPr>
+                        <a:t>ffmaxc</a:t>
+                      </a:r>
+                      <a:endParaRPr lang="en-US" dirty="0"/>
+                    </a:p>
+                  </a:txBody>
+                  <a:tcPr/>
+                </a:tc>
+                <a:tc>
+                  <a:txBody>
+                    <a:bodyPr/>
+                    <a:lstStyle/>
+                    <a:p>
+                      <a:r>
+                        <a:rPr lang="en-US" dirty="0"/>
+                        <a:t>6</a:t>
+                      </a:r>
+                    </a:p>
+                  </a:txBody>
+                  <a:tcPr/>
+                </a:tc>
+                <a:tc>
+                  <a:txBody>
+                    <a:bodyPr/>
+                    <a:lstStyle/>
+                    <a:p>
+                      <a:r>
+                        <a:rPr lang="es-MX" dirty="0"/>
+                        <a:t>6.13964</a:t>
+                      </a:r>
+                      <a:r>
+                        <a:rPr lang="en-US" dirty="0"/>
+                        <a:t> s</a:t>
+                      </a:r>
+                    </a:p>
+                  </a:txBody>
+                  <a:tcPr/>
+                </a:tc>
+                <a:extLst>
+                  <a:ext uri="{0D108BD9-81ED-4DB2-BD59-A6C34878D82A}">
+                    <a16:rowId xmlns:a16="http://schemas.microsoft.com/office/drawing/2014/main" val="3099703105"/>
+                  </a:ext>
+                </a:extLst>
+              </a:tr>
+              <a:tr h="370840">
+                <a:tc>
+                  <a:txBody>
+                    <a:bodyPr/>
+                    <a:lstStyle/>
+                    <a:p>
+                      <a:r>
+                        <a:rPr lang="es-MX" sz="1800" b="0" i="0" kern="1200" dirty="0" err="1">
+                          <a:solidFill>
+                            <a:schemeClr val="dk1"/>
+                          </a:solidFill>
+                          <a:effectLst/>
+                          <a:latin typeface="+mn-lt"/>
+                          <a:ea typeface="+mn-ea"/>
+                          <a:cs typeface="+mn-cs"/>
+                        </a:rPr>
+                        <a:t>networkx</a:t>
+                      </a:r>
+                      <a:endParaRPr lang="en-US" dirty="0"/>
+                    </a:p>
+                  </a:txBody>
+                  <a:tcPr/>
+                </a:tc>
+                <a:tc>
+                  <a:txBody>
+                    <a:bodyPr/>
+                    <a:lstStyle/>
+                    <a:p>
+                      <a:r>
+                        <a:rPr lang="en-US" dirty="0"/>
+                        <a:t>6</a:t>
+                      </a:r>
+                    </a:p>
+                  </a:txBody>
+                  <a:tcPr/>
+                </a:tc>
+                <a:tc>
+                  <a:txBody>
+                    <a:bodyPr/>
+                    <a:lstStyle/>
+                    <a:p>
+                      <a:r>
+                        <a:rPr lang="es-MX" dirty="0"/>
+                        <a:t>23.0763 s</a:t>
+                      </a:r>
+                      <a:endParaRPr lang="en-US" dirty="0"/>
+                    </a:p>
+                  </a:txBody>
+                  <a:tcPr/>
+                </a:tc>
+                <a:extLst>
+                  <a:ext uri="{0D108BD9-81ED-4DB2-BD59-A6C34878D82A}">
+                    <a16:rowId xmlns:a16="http://schemas.microsoft.com/office/drawing/2014/main" val="3751879717"/>
+                  </a:ext>
+                </a:extLst>
+              </a:tr>
+            </a:tbl>
+          </a:graphicData>
+        </a:graphic>
+      </p:graphicFrame>
+    </p:spTree>
+    <p:extLst>
+      <p:ext uri="{BB962C8B-B14F-4D97-AF65-F5344CB8AC3E}">
+        <p14:creationId xmlns:p14="http://schemas.microsoft.com/office/powerpoint/2010/main" val="35391456"/>
+      </p:ext>
+    </p:extLst>
+  </p:cSld>
+  <p:clrMapOvr>
+    <a:masterClrMapping/>
+  </p:clrMapOvr>
+</p:sld>
+</file>
+
+<file path=ppt/slides/slide26.xml><?xml version="1.0" encoding="utf-8"?>
+<p:sld xmlns:a="http://schemas.openxmlformats.org/drawingml/2006/main" xmlns:r="http://schemas.openxmlformats.org/officeDocument/2006/relationships" xmlns:p="http://schemas.openxmlformats.org/presentationml/2006/main">
+  <p:cSld>
+    <p:spTree>
+      <p:nvGrpSpPr>
+        <p:cNvPr id="1" name=""/>
+        <p:cNvGrpSpPr/>
+        <p:nvPr/>
+      </p:nvGrpSpPr>
+      <p:grpSpPr>
+        <a:xfrm>
+          <a:off x="0" y="0"/>
+          <a:ext cx="0" cy="0"/>
+          <a:chOff x="0" y="0"/>
+          <a:chExt cx="0" cy="0"/>
+        </a:xfrm>
+      </p:grpSpPr>
+      <p:sp>
+        <p:nvSpPr>
+          <p:cNvPr id="4" name="Marcador de número de diapositiva 3">
+            <a:extLst>
+              <a:ext uri="{FF2B5EF4-FFF2-40B4-BE49-F238E27FC236}">
+                <a16:creationId xmlns:a16="http://schemas.microsoft.com/office/drawing/2014/main" id="{95BFE720-516E-44D5-90AC-64994C09A837}"/>
+              </a:ext>
+            </a:extLst>
+          </p:cNvPr>
+          <p:cNvSpPr>
+            <a:spLocks noGrp="1"/>
+          </p:cNvSpPr>
+          <p:nvPr>
+            <p:ph type="sldNum" sz="quarter" idx="12"/>
+          </p:nvPr>
+        </p:nvSpPr>
+        <p:spPr/>
+        <p:txBody>
+          <a:bodyPr/>
+          <a:lstStyle/>
+          <a:p>
+            <a:pPr rtl="0">
+              <a:defRPr/>
+            </a:pPr>
+            <a:fld id="{D76B855D-E9CC-4FF8-AD85-6CDC7B89A0DE}" type="slidenum">
+              <a:rPr lang="es-ES" noProof="0" smtClean="0">
+                <a:solidFill>
+                  <a:prstClr val="black">
+                    <a:tint val="75000"/>
+                  </a:prstClr>
+                </a:solidFill>
+              </a:rPr>
+              <a:pPr rtl="0">
+                <a:defRPr/>
+              </a:pPr>
+              <a:t>26</a:t>
             </a:fld>
             <a:endParaRPr lang="es-ES" noProof="0">
               <a:solidFill>
@@ -18212,7 +20104,7 @@
 </p:sld>
 </file>
 
-<file path=ppt/slides/slide23.xml><?xml version="1.0" encoding="utf-8"?>
+<file path=ppt/slides/slide27.xml><?xml version="1.0" encoding="utf-8"?>
 <p:sld xmlns:a="http://schemas.openxmlformats.org/drawingml/2006/main" xmlns:r="http://schemas.openxmlformats.org/officeDocument/2006/relationships" xmlns:p="http://schemas.openxmlformats.org/presentationml/2006/main">
   <p:cSld>
     <p:spTree>
@@ -18283,7 +20175,7 @@
             <a:fld id="{D76B855D-E9CC-4FF8-AD85-6CDC7B89A0DE}" type="slidenum">
               <a:rPr lang="es-ES" smtClean="0"/>
               <a:pPr lvl="0" rtl="0"/>
-              <a:t>23</a:t>
+              <a:t>27</a:t>
             </a:fld>
             <a:endParaRPr lang="es-ES"/>
           </a:p>
@@ -22352,16 +24244,16 @@
 <file path=customXml/itemProps2.xml><?xml version="1.0" encoding="utf-8"?>
 <ds:datastoreItem xmlns:ds="http://schemas.openxmlformats.org/officeDocument/2006/customXml" ds:itemID="{FBDEF148-1770-458F-8F5B-C3D0A278AA97}">
   <ds:schemaRefs>
-    <ds:schemaRef ds:uri="http://purl.org/dc/terms/"/>
     <ds:schemaRef ds:uri="http://www.w3.org/XML/1998/namespace"/>
     <ds:schemaRef ds:uri="16c05727-aa75-4e4a-9b5f-8a80a1165891"/>
+    <ds:schemaRef ds:uri="http://purl.org/dc/terms/"/>
+    <ds:schemaRef ds:uri="71af3243-3dd4-4a8d-8c0d-dd76da1f02a5"/>
+    <ds:schemaRef ds:uri="http://schemas.microsoft.com/office/2006/documentManagement/types"/>
     <ds:schemaRef ds:uri="http://purl.org/dc/elements/1.1/"/>
-    <ds:schemaRef ds:uri="http://schemas.microsoft.com/office/2006/documentManagement/types"/>
+    <ds:schemaRef ds:uri="http://schemas.microsoft.com/office/infopath/2007/PartnerControls"/>
+    <ds:schemaRef ds:uri="http://schemas.openxmlformats.org/package/2006/metadata/core-properties"/>
     <ds:schemaRef ds:uri="http://schemas.microsoft.com/office/2006/metadata/properties"/>
     <ds:schemaRef ds:uri="http://purl.org/dc/dcmitype/"/>
-    <ds:schemaRef ds:uri="71af3243-3dd4-4a8d-8c0d-dd76da1f02a5"/>
-    <ds:schemaRef ds:uri="http://schemas.microsoft.com/office/infopath/2007/PartnerControls"/>
-    <ds:schemaRef ds:uri="http://schemas.openxmlformats.org/package/2006/metadata/core-properties"/>
   </ds:schemaRefs>
 </ds:datastoreItem>
 </file>

</xml_diff>